<commit_message>
Addings ome code with equations
</commit_message>
<xml_diff>
--- a/slides/code_slides.pptx
+++ b/slides/code_slides.pptx
@@ -8,6 +8,9 @@
     <p:sldId id="256" r:id="rId2"/>
     <p:sldId id="257" r:id="rId3"/>
     <p:sldId id="258" r:id="rId4"/>
+    <p:sldId id="259" r:id="rId5"/>
+    <p:sldId id="260" r:id="rId6"/>
+    <p:sldId id="261" r:id="rId7"/>
   </p:sldIdLst>
   <p:sldSz cx="9144000" cy="5143500" type="screen16x9"/>
   <p:notesSz cx="6858000" cy="9144000"/>
@@ -3174,7 +3177,7 @@
             </a:pPr>
             <a:r>
               <a:rPr/>
-              <a:t>2022-06-11</a:t>
+              <a:t>2022-06-12</a:t>
             </a:r>
           </a:p>
         </p:txBody>
@@ -3756,7 +3759,7 @@
               <a:rPr>
                 <a:latin typeface="Courier"/>
               </a:rPr>
-              <a:t>## [1] 0.4113465</a:t>
+              <a:t>## [1] 0.2015051</a:t>
             </a:r>
           </a:p>
           <a:p>
@@ -3791,17 +3794,1040 @@
 ##  Welch Two Sample t-test
 ## 
 ## data:  trt_26C and trt_8C
-## t = 2.525, df = 13.776, p-value = 0.0245
+## t = 0.8405, df = 10.991, p-value = 0.4185
 ## alternative hypothesis: true difference in means is not equal to 0
 ## 95 percent confidence interval:
-##  0.06140173 0.76129118
+##  -0.3262227  0.7292329
 ## sample estimates:
 ## mean of x mean of y 
-## 0.5352081 0.1238616</a:t>
-            </a:r>
-          </a:p>
-        </p:txBody>
-      </p:sp>
+## 0.7293553 0.5278502</a:t>
+            </a:r>
+          </a:p>
+        </p:txBody>
+      </p:sp>
+    </p:spTree>
+  </p:cSld>
+</p:sld>
+</file>
+
+<file path=ppt/slides/slide4.xml><?xml version="1.0" encoding="utf-8"?>
+<p:sld xmlns:a="http://schemas.openxmlformats.org/drawingml/2006/main" xmlns:r="http://schemas.openxmlformats.org/officeDocument/2006/relationships" xmlns:p="http://schemas.openxmlformats.org/presentationml/2006/main">
+  <p:cSld>
+    <p:spTree>
+      <p:nvGrpSpPr>
+        <p:cNvPr id="1" name=""/>
+        <p:cNvGrpSpPr/>
+        <p:nvPr/>
+      </p:nvGrpSpPr>
+      <p:grpSpPr>
+        <a:xfrm>
+          <a:off x="0" y="0"/>
+          <a:ext cx="0" cy="0"/>
+          <a:chOff x="0" y="0"/>
+          <a:chExt cx="0" cy="0"/>
+        </a:xfrm>
+      </p:grpSpPr>
+      <p:sp>
+        <p:nvSpPr>
+          <p:cNvPr id="2" name="Title 1"/>
+          <p:cNvSpPr>
+            <a:spLocks noGrp="1"/>
+          </p:cNvSpPr>
+          <p:nvPr>
+            <p:ph type="title"/>
+          </p:nvPr>
+        </p:nvSpPr>
+        <p:spPr/>
+        <p:txBody>
+          <a:bodyPr/>
+          <a:lstStyle/>
+          <a:p>
+            <a:pPr lvl="0" indent="0" marL="0">
+              <a:buNone/>
+            </a:pPr>
+            <a:r>
+              <a:rPr/>
+              <a:t>Do 1000s of experiments</a:t>
+            </a:r>
+          </a:p>
+        </p:txBody>
+      </p:sp>
+      <p:sp>
+        <p:nvSpPr>
+          <p:cNvPr id="3" name="Content Placeholder 2"/>
+          <p:cNvSpPr>
+            <a:spLocks noGrp="1"/>
+          </p:cNvSpPr>
+          <p:nvPr>
+            <p:ph idx="1"/>
+          </p:nvPr>
+        </p:nvSpPr>
+        <p:spPr/>
+        <p:txBody>
+          <a:bodyPr/>
+          <a:lstStyle/>
+          <a:p>
+            <a:pPr lvl="0" indent="0">
+              <a:buNone/>
+            </a:pPr>
+            <a:r>
+              <a:rPr>
+                <a:latin typeface="Courier"/>
+              </a:rPr>
+              <a:t>experiment </a:t>
+            </a:r>
+            <a:r>
+              <a:rPr>
+                <a:solidFill>
+                  <a:srgbClr val="007020"/>
+                </a:solidFill>
+                <a:latin typeface="Courier"/>
+              </a:rPr>
+              <a:t>&lt;-</a:t>
+            </a:r>
+            <a:r>
+              <a:rPr>
+                <a:latin typeface="Courier"/>
+              </a:rPr>
+              <a:t> </a:t>
+            </a:r>
+            <a:r>
+              <a:rPr b="1">
+                <a:solidFill>
+                  <a:srgbClr val="007020"/>
+                </a:solidFill>
+                <a:latin typeface="Courier"/>
+              </a:rPr>
+              <a:t>function</a:t>
+            </a:r>
+            <a:r>
+              <a:rPr>
+                <a:latin typeface="Courier"/>
+              </a:rPr>
+              <a:t>(times) {</a:t>
+            </a:r>
+            <a:br/>
+            <a:br/>
+            <a:r>
+              <a:rPr>
+                <a:latin typeface="Courier"/>
+              </a:rPr>
+              <a:t>    dat </a:t>
+            </a:r>
+            <a:r>
+              <a:rPr>
+                <a:solidFill>
+                  <a:srgbClr val="007020"/>
+                </a:solidFill>
+                <a:latin typeface="Courier"/>
+              </a:rPr>
+              <a:t>&lt;-</a:t>
+            </a:r>
+            <a:r>
+              <a:rPr>
+                <a:latin typeface="Courier"/>
+              </a:rPr>
+              <a:t> </a:t>
+            </a:r>
+            <a:r>
+              <a:rPr>
+                <a:solidFill>
+                  <a:srgbClr val="06287E"/>
+                </a:solidFill>
+                <a:latin typeface="Courier"/>
+              </a:rPr>
+              <a:t>data.frame</a:t>
+            </a:r>
+            <a:r>
+              <a:rPr>
+                <a:latin typeface="Courier"/>
+              </a:rPr>
+              <a:t>(</a:t>
+            </a:r>
+            <a:r>
+              <a:rPr>
+                <a:solidFill>
+                  <a:srgbClr val="06287E"/>
+                </a:solidFill>
+                <a:latin typeface="Courier"/>
+              </a:rPr>
+              <a:t>matrix</a:t>
+            </a:r>
+            <a:r>
+              <a:rPr>
+                <a:latin typeface="Courier"/>
+              </a:rPr>
+              <a:t>(</a:t>
+            </a:r>
+            <a:r>
+              <a:rPr>
+                <a:solidFill>
+                  <a:srgbClr val="7D9029"/>
+                </a:solidFill>
+                <a:latin typeface="Courier"/>
+              </a:rPr>
+              <a:t>nrow =</a:t>
+            </a:r>
+            <a:r>
+              <a:rPr>
+                <a:latin typeface="Courier"/>
+              </a:rPr>
+              <a:t> times, </a:t>
+            </a:r>
+            <a:r>
+              <a:rPr>
+                <a:solidFill>
+                  <a:srgbClr val="7D9029"/>
+                </a:solidFill>
+                <a:latin typeface="Courier"/>
+              </a:rPr>
+              <a:t>ncol =</a:t>
+            </a:r>
+            <a:r>
+              <a:rPr>
+                <a:latin typeface="Courier"/>
+              </a:rPr>
+              <a:t> </a:t>
+            </a:r>
+            <a:r>
+              <a:rPr>
+                <a:solidFill>
+                  <a:srgbClr val="40A070"/>
+                </a:solidFill>
+                <a:latin typeface="Courier"/>
+              </a:rPr>
+              <a:t>2</a:t>
+            </a:r>
+            <a:r>
+              <a:rPr>
+                <a:latin typeface="Courier"/>
+              </a:rPr>
+              <a:t>))</a:t>
+            </a:r>
+            <a:br/>
+            <a:br/>
+            <a:r>
+              <a:rPr>
+                <a:latin typeface="Courier"/>
+              </a:rPr>
+              <a:t>    </a:t>
+            </a:r>
+            <a:r>
+              <a:rPr b="1">
+                <a:solidFill>
+                  <a:srgbClr val="007020"/>
+                </a:solidFill>
+                <a:latin typeface="Courier"/>
+              </a:rPr>
+              <a:t>for</a:t>
+            </a:r>
+            <a:r>
+              <a:rPr>
+                <a:latin typeface="Courier"/>
+              </a:rPr>
+              <a:t> (i </a:t>
+            </a:r>
+            <a:r>
+              <a:rPr b="1">
+                <a:solidFill>
+                  <a:srgbClr val="007020"/>
+                </a:solidFill>
+                <a:latin typeface="Courier"/>
+              </a:rPr>
+              <a:t>in</a:t>
+            </a:r>
+            <a:r>
+              <a:rPr>
+                <a:latin typeface="Courier"/>
+              </a:rPr>
+              <a:t> </a:t>
+            </a:r>
+            <a:r>
+              <a:rPr>
+                <a:solidFill>
+                  <a:srgbClr val="40A070"/>
+                </a:solidFill>
+                <a:latin typeface="Courier"/>
+              </a:rPr>
+              <a:t>1</a:t>
+            </a:r>
+            <a:r>
+              <a:rPr>
+                <a:solidFill>
+                  <a:srgbClr val="4070A0"/>
+                </a:solidFill>
+                <a:latin typeface="Courier"/>
+              </a:rPr>
+              <a:t>:</a:t>
+            </a:r>
+            <a:r>
+              <a:rPr>
+                <a:latin typeface="Courier"/>
+              </a:rPr>
+              <a:t>times) {</a:t>
+            </a:r>
+            <a:br/>
+            <a:r>
+              <a:rPr>
+                <a:latin typeface="Courier"/>
+              </a:rPr>
+              <a:t>        </a:t>
+            </a:r>
+            <a:r>
+              <a:rPr i="1">
+                <a:solidFill>
+                  <a:srgbClr val="60A0B0"/>
+                </a:solidFill>
+                <a:latin typeface="Courier"/>
+              </a:rPr>
+              <a:t># LDH activity in 8 C treatment</a:t>
+            </a:r>
+            <a:br/>
+            <a:r>
+              <a:rPr>
+                <a:latin typeface="Courier"/>
+              </a:rPr>
+              <a:t>        trt_8C </a:t>
+            </a:r>
+            <a:r>
+              <a:rPr>
+                <a:solidFill>
+                  <a:srgbClr val="007020"/>
+                </a:solidFill>
+                <a:latin typeface="Courier"/>
+              </a:rPr>
+              <a:t>&lt;-</a:t>
+            </a:r>
+            <a:r>
+              <a:rPr>
+                <a:latin typeface="Courier"/>
+              </a:rPr>
+              <a:t> </a:t>
+            </a:r>
+            <a:r>
+              <a:rPr>
+                <a:solidFill>
+                  <a:srgbClr val="06287E"/>
+                </a:solidFill>
+                <a:latin typeface="Courier"/>
+              </a:rPr>
+              <a:t>rnorm</a:t>
+            </a:r>
+            <a:r>
+              <a:rPr>
+                <a:latin typeface="Courier"/>
+              </a:rPr>
+              <a:t>(</a:t>
+            </a:r>
+            <a:r>
+              <a:rPr>
+                <a:solidFill>
+                  <a:srgbClr val="40A070"/>
+                </a:solidFill>
+                <a:latin typeface="Courier"/>
+              </a:rPr>
+              <a:t>10</a:t>
+            </a:r>
+            <a:r>
+              <a:rPr>
+                <a:latin typeface="Courier"/>
+              </a:rPr>
+              <a:t>, </a:t>
+            </a:r>
+            <a:r>
+              <a:rPr>
+                <a:solidFill>
+                  <a:srgbClr val="40A070"/>
+                </a:solidFill>
+                <a:latin typeface="Courier"/>
+              </a:rPr>
+              <a:t>0.4</a:t>
+            </a:r>
+            <a:r>
+              <a:rPr>
+                <a:latin typeface="Courier"/>
+              </a:rPr>
+              <a:t>, </a:t>
+            </a:r>
+            <a:r>
+              <a:rPr>
+                <a:solidFill>
+                  <a:srgbClr val="40A070"/>
+                </a:solidFill>
+                <a:latin typeface="Courier"/>
+              </a:rPr>
+              <a:t>0.5</a:t>
+            </a:r>
+            <a:r>
+              <a:rPr>
+                <a:latin typeface="Courier"/>
+              </a:rPr>
+              <a:t>)</a:t>
+            </a:r>
+            <a:br/>
+            <a:br/>
+            <a:r>
+              <a:rPr>
+                <a:latin typeface="Courier"/>
+              </a:rPr>
+              <a:t>        </a:t>
+            </a:r>
+            <a:r>
+              <a:rPr i="1">
+                <a:solidFill>
+                  <a:srgbClr val="60A0B0"/>
+                </a:solidFill>
+                <a:latin typeface="Courier"/>
+              </a:rPr>
+              <a:t># LDH activity in 26 C treatment</a:t>
+            </a:r>
+            <a:br/>
+            <a:r>
+              <a:rPr>
+                <a:latin typeface="Courier"/>
+              </a:rPr>
+              <a:t>        trt_26C </a:t>
+            </a:r>
+            <a:r>
+              <a:rPr>
+                <a:solidFill>
+                  <a:srgbClr val="007020"/>
+                </a:solidFill>
+                <a:latin typeface="Courier"/>
+              </a:rPr>
+              <a:t>&lt;-</a:t>
+            </a:r>
+            <a:r>
+              <a:rPr>
+                <a:latin typeface="Courier"/>
+              </a:rPr>
+              <a:t> </a:t>
+            </a:r>
+            <a:r>
+              <a:rPr>
+                <a:solidFill>
+                  <a:srgbClr val="06287E"/>
+                </a:solidFill>
+                <a:latin typeface="Courier"/>
+              </a:rPr>
+              <a:t>rnorm</a:t>
+            </a:r>
+            <a:r>
+              <a:rPr>
+                <a:latin typeface="Courier"/>
+              </a:rPr>
+              <a:t>(</a:t>
+            </a:r>
+            <a:r>
+              <a:rPr>
+                <a:solidFill>
+                  <a:srgbClr val="40A070"/>
+                </a:solidFill>
+                <a:latin typeface="Courier"/>
+              </a:rPr>
+              <a:t>10</a:t>
+            </a:r>
+            <a:r>
+              <a:rPr>
+                <a:latin typeface="Courier"/>
+              </a:rPr>
+              <a:t>, </a:t>
+            </a:r>
+            <a:r>
+              <a:rPr>
+                <a:solidFill>
+                  <a:srgbClr val="40A070"/>
+                </a:solidFill>
+                <a:latin typeface="Courier"/>
+              </a:rPr>
+              <a:t>0.6</a:t>
+            </a:r>
+            <a:r>
+              <a:rPr>
+                <a:latin typeface="Courier"/>
+              </a:rPr>
+              <a:t>, </a:t>
+            </a:r>
+            <a:r>
+              <a:rPr>
+                <a:solidFill>
+                  <a:srgbClr val="40A070"/>
+                </a:solidFill>
+                <a:latin typeface="Courier"/>
+              </a:rPr>
+              <a:t>0.2</a:t>
+            </a:r>
+            <a:r>
+              <a:rPr>
+                <a:latin typeface="Courier"/>
+              </a:rPr>
+              <a:t>)</a:t>
+            </a:r>
+            <a:br/>
+            <a:br/>
+            <a:r>
+              <a:rPr>
+                <a:latin typeface="Courier"/>
+              </a:rPr>
+              <a:t>        </a:t>
+            </a:r>
+            <a:r>
+              <a:rPr i="1">
+                <a:solidFill>
+                  <a:srgbClr val="60A0B0"/>
+                </a:solidFill>
+                <a:latin typeface="Courier"/>
+              </a:rPr>
+              <a:t># What's the difference, i.e., effect size, between treatments?</a:t>
+            </a:r>
+            <a:br/>
+            <a:r>
+              <a:rPr>
+                <a:latin typeface="Courier"/>
+              </a:rPr>
+              <a:t>        dat[i, </a:t>
+            </a:r>
+            <a:r>
+              <a:rPr>
+                <a:solidFill>
+                  <a:srgbClr val="40A070"/>
+                </a:solidFill>
+                <a:latin typeface="Courier"/>
+              </a:rPr>
+              <a:t>1</a:t>
+            </a:r>
+            <a:r>
+              <a:rPr>
+                <a:latin typeface="Courier"/>
+              </a:rPr>
+              <a:t>] </a:t>
+            </a:r>
+            <a:r>
+              <a:rPr>
+                <a:solidFill>
+                  <a:srgbClr val="007020"/>
+                </a:solidFill>
+                <a:latin typeface="Courier"/>
+              </a:rPr>
+              <a:t>&lt;-</a:t>
+            </a:r>
+            <a:r>
+              <a:rPr>
+                <a:latin typeface="Courier"/>
+              </a:rPr>
+              <a:t> </a:t>
+            </a:r>
+            <a:r>
+              <a:rPr>
+                <a:solidFill>
+                  <a:srgbClr val="06287E"/>
+                </a:solidFill>
+                <a:latin typeface="Courier"/>
+              </a:rPr>
+              <a:t>mean</a:t>
+            </a:r>
+            <a:r>
+              <a:rPr>
+                <a:latin typeface="Courier"/>
+              </a:rPr>
+              <a:t>(trt_26C </a:t>
+            </a:r>
+            <a:r>
+              <a:rPr>
+                <a:solidFill>
+                  <a:srgbClr val="4070A0"/>
+                </a:solidFill>
+                <a:latin typeface="Courier"/>
+              </a:rPr>
+              <a:t>-</a:t>
+            </a:r>
+            <a:r>
+              <a:rPr>
+                <a:latin typeface="Courier"/>
+              </a:rPr>
+              <a:t> trt_8C)</a:t>
+            </a:r>
+            <a:br/>
+            <a:r>
+              <a:rPr>
+                <a:latin typeface="Courier"/>
+              </a:rPr>
+              <a:t>        dat[i, </a:t>
+            </a:r>
+            <a:r>
+              <a:rPr>
+                <a:solidFill>
+                  <a:srgbClr val="40A070"/>
+                </a:solidFill>
+                <a:latin typeface="Courier"/>
+              </a:rPr>
+              <a:t>2</a:t>
+            </a:r>
+            <a:r>
+              <a:rPr>
+                <a:latin typeface="Courier"/>
+              </a:rPr>
+              <a:t>] </a:t>
+            </a:r>
+            <a:r>
+              <a:rPr>
+                <a:solidFill>
+                  <a:srgbClr val="007020"/>
+                </a:solidFill>
+                <a:latin typeface="Courier"/>
+              </a:rPr>
+              <a:t>&lt;-</a:t>
+            </a:r>
+            <a:r>
+              <a:rPr>
+                <a:latin typeface="Courier"/>
+              </a:rPr>
+              <a:t> </a:t>
+            </a:r>
+            <a:r>
+              <a:rPr>
+                <a:solidFill>
+                  <a:srgbClr val="06287E"/>
+                </a:solidFill>
+                <a:latin typeface="Courier"/>
+              </a:rPr>
+              <a:t>t.test</a:t>
+            </a:r>
+            <a:r>
+              <a:rPr>
+                <a:latin typeface="Courier"/>
+              </a:rPr>
+              <a:t>(trt_26C, trt_8C)</a:t>
+            </a:r>
+            <a:r>
+              <a:rPr>
+                <a:solidFill>
+                  <a:srgbClr val="4070A0"/>
+                </a:solidFill>
+                <a:latin typeface="Courier"/>
+              </a:rPr>
+              <a:t>$</a:t>
+            </a:r>
+            <a:r>
+              <a:rPr>
+                <a:latin typeface="Courier"/>
+              </a:rPr>
+              <a:t>p.value</a:t>
+            </a:r>
+            <a:br/>
+            <a:br/>
+            <a:r>
+              <a:rPr>
+                <a:latin typeface="Courier"/>
+              </a:rPr>
+              <a:t>    }</a:t>
+            </a:r>
+            <a:br/>
+            <a:r>
+              <a:rPr>
+                <a:latin typeface="Courier"/>
+              </a:rPr>
+              <a:t>    </a:t>
+            </a:r>
+            <a:r>
+              <a:rPr>
+                <a:solidFill>
+                  <a:srgbClr val="06287E"/>
+                </a:solidFill>
+                <a:latin typeface="Courier"/>
+              </a:rPr>
+              <a:t>names</a:t>
+            </a:r>
+            <a:r>
+              <a:rPr>
+                <a:latin typeface="Courier"/>
+              </a:rPr>
+              <a:t>(dat) </a:t>
+            </a:r>
+            <a:r>
+              <a:rPr>
+                <a:solidFill>
+                  <a:srgbClr val="007020"/>
+                </a:solidFill>
+                <a:latin typeface="Courier"/>
+              </a:rPr>
+              <a:t>&lt;-</a:t>
+            </a:r>
+            <a:r>
+              <a:rPr>
+                <a:latin typeface="Courier"/>
+              </a:rPr>
+              <a:t> </a:t>
+            </a:r>
+            <a:r>
+              <a:rPr>
+                <a:solidFill>
+                  <a:srgbClr val="06287E"/>
+                </a:solidFill>
+                <a:latin typeface="Courier"/>
+              </a:rPr>
+              <a:t>c</a:t>
+            </a:r>
+            <a:r>
+              <a:rPr>
+                <a:latin typeface="Courier"/>
+              </a:rPr>
+              <a:t>(</a:t>
+            </a:r>
+            <a:r>
+              <a:rPr>
+                <a:solidFill>
+                  <a:srgbClr val="4070A0"/>
+                </a:solidFill>
+                <a:latin typeface="Courier"/>
+              </a:rPr>
+              <a:t>"effect"</a:t>
+            </a:r>
+            <a:r>
+              <a:rPr>
+                <a:latin typeface="Courier"/>
+              </a:rPr>
+              <a:t>, </a:t>
+            </a:r>
+            <a:r>
+              <a:rPr>
+                <a:solidFill>
+                  <a:srgbClr val="4070A0"/>
+                </a:solidFill>
+                <a:latin typeface="Courier"/>
+              </a:rPr>
+              <a:t>"p"</a:t>
+            </a:r>
+            <a:r>
+              <a:rPr>
+                <a:latin typeface="Courier"/>
+              </a:rPr>
+              <a:t>)</a:t>
+            </a:r>
+            <a:br/>
+            <a:r>
+              <a:rPr>
+                <a:latin typeface="Courier"/>
+              </a:rPr>
+              <a:t>    </a:t>
+            </a:r>
+            <a:r>
+              <a:rPr>
+                <a:solidFill>
+                  <a:srgbClr val="06287E"/>
+                </a:solidFill>
+                <a:latin typeface="Courier"/>
+              </a:rPr>
+              <a:t>return</a:t>
+            </a:r>
+            <a:r>
+              <a:rPr>
+                <a:latin typeface="Courier"/>
+              </a:rPr>
+              <a:t>(dat)</a:t>
+            </a:r>
+            <a:br/>
+            <a:r>
+              <a:rPr>
+                <a:latin typeface="Courier"/>
+              </a:rPr>
+              <a:t>}</a:t>
+            </a:r>
+            <a:br/>
+            <a:br/>
+            <a:r>
+              <a:rPr>
+                <a:latin typeface="Courier"/>
+              </a:rPr>
+              <a:t>expts </a:t>
+            </a:r>
+            <a:r>
+              <a:rPr>
+                <a:solidFill>
+                  <a:srgbClr val="007020"/>
+                </a:solidFill>
+                <a:latin typeface="Courier"/>
+              </a:rPr>
+              <a:t>&lt;-</a:t>
+            </a:r>
+            <a:r>
+              <a:rPr>
+                <a:latin typeface="Courier"/>
+              </a:rPr>
+              <a:t> </a:t>
+            </a:r>
+            <a:r>
+              <a:rPr>
+                <a:solidFill>
+                  <a:srgbClr val="06287E"/>
+                </a:solidFill>
+                <a:latin typeface="Courier"/>
+              </a:rPr>
+              <a:t>experiment</a:t>
+            </a:r>
+            <a:r>
+              <a:rPr>
+                <a:latin typeface="Courier"/>
+              </a:rPr>
+              <a:t>(</a:t>
+            </a:r>
+            <a:r>
+              <a:rPr>
+                <a:solidFill>
+                  <a:srgbClr val="40A070"/>
+                </a:solidFill>
+                <a:latin typeface="Courier"/>
+              </a:rPr>
+              <a:t>10000</a:t>
+            </a:r>
+            <a:r>
+              <a:rPr>
+                <a:latin typeface="Courier"/>
+              </a:rPr>
+              <a:t>)</a:t>
+            </a:r>
+          </a:p>
+        </p:txBody>
+      </p:sp>
+    </p:spTree>
+  </p:cSld>
+</p:sld>
+</file>
+
+<file path=ppt/slides/slide5.xml><?xml version="1.0" encoding="utf-8"?>
+<p:sld xmlns:a="http://schemas.openxmlformats.org/drawingml/2006/main" xmlns:r="http://schemas.openxmlformats.org/officeDocument/2006/relationships" xmlns:p="http://schemas.openxmlformats.org/presentationml/2006/main">
+  <p:cSld>
+    <p:spTree>
+      <p:nvGrpSpPr>
+        <p:cNvPr id="1" name=""/>
+        <p:cNvGrpSpPr/>
+        <p:nvPr/>
+      </p:nvGrpSpPr>
+      <p:grpSpPr>
+        <a:xfrm>
+          <a:off x="0" y="0"/>
+          <a:ext cx="0" cy="0"/>
+          <a:chOff x="0" y="0"/>
+          <a:chExt cx="0" cy="0"/>
+        </a:xfrm>
+      </p:grpSpPr>
+      <p:sp>
+        <p:nvSpPr>
+          <p:cNvPr id="2" name="Title 1"/>
+          <p:cNvSpPr>
+            <a:spLocks noGrp="1"/>
+          </p:cNvSpPr>
+          <p:nvPr>
+            <p:ph type="title"/>
+          </p:nvPr>
+        </p:nvSpPr>
+        <p:spPr/>
+        <p:txBody>
+          <a:bodyPr/>
+          <a:lstStyle/>
+          <a:p>
+            <a:pPr lvl="0" indent="0" marL="0">
+              <a:buNone/>
+            </a:pPr>
+            <a:r>
+              <a:rPr/>
+              <a:t>Figure</a:t>
+            </a:r>
+          </a:p>
+        </p:txBody>
+      </p:sp>
+      <p:pic>
+        <p:nvPicPr>
+          <p:cNvPr descr="code_slides_files/figure-pptx/simfig-1.png" id="0" name="Picture 1"/>
+          <p:cNvPicPr>
+            <a:picLocks noGrp="1" noChangeAspect="1"/>
+          </p:cNvPicPr>
+          <p:nvPr/>
+        </p:nvPicPr>
+        <p:blipFill>
+          <a:blip r:embed="rId2"/>
+          <a:stretch>
+            <a:fillRect/>
+          </a:stretch>
+        </p:blipFill>
+        <p:spPr bwMode="auto">
+          <a:xfrm>
+            <a:off x="2451100" y="1193800"/>
+            <a:ext cx="4241800" cy="3390900"/>
+          </a:xfrm>
+          <a:prstGeom prst="rect">
+            <a:avLst/>
+          </a:prstGeom>
+          <a:noFill/>
+          <a:ln w="9525">
+            <a:noFill/>
+            <a:headEnd/>
+            <a:tailEnd/>
+          </a:ln>
+        </p:spPr>
+      </p:pic>
+    </p:spTree>
+  </p:cSld>
+</p:sld>
+</file>
+
+<file path=ppt/slides/slide6.xml><?xml version="1.0" encoding="utf-8"?>
+<p:sld xmlns:a="http://schemas.openxmlformats.org/drawingml/2006/main" xmlns:r="http://schemas.openxmlformats.org/officeDocument/2006/relationships" xmlns:p="http://schemas.openxmlformats.org/presentationml/2006/main">
+  <p:cSld>
+    <p:spTree>
+      <p:nvGrpSpPr>
+        <p:cNvPr id="1" name=""/>
+        <p:cNvGrpSpPr/>
+        <p:nvPr/>
+      </p:nvGrpSpPr>
+      <p:grpSpPr>
+        <a:xfrm>
+          <a:off x="0" y="0"/>
+          <a:ext cx="0" cy="0"/>
+          <a:chOff x="0" y="0"/>
+          <a:chExt cx="0" cy="0"/>
+        </a:xfrm>
+      </p:grpSpPr>
+      <p:sp>
+        <p:nvSpPr>
+          <p:cNvPr id="2" name="Title 1"/>
+          <p:cNvSpPr>
+            <a:spLocks noGrp="1"/>
+          </p:cNvSpPr>
+          <p:nvPr>
+            <p:ph type="title"/>
+          </p:nvPr>
+        </p:nvSpPr>
+        <p:spPr/>
+        <p:txBody>
+          <a:bodyPr/>
+          <a:lstStyle/>
+          <a:p>
+            <a:pPr lvl="0" indent="0" marL="0">
+              <a:buNone/>
+            </a:pPr>
+            <a:r>
+              <a:rPr/>
+              <a:t>errors</a:t>
+            </a:r>
+          </a:p>
+        </p:txBody>
+      </p:sp>
+      <mc:AlternateContent xmlns:mc="http://schemas.openxmlformats.org/markup-compatibility/2006">
+        <mc:Choice xmlns:a14="http://schemas.microsoft.com/office/drawing/2010/main" Requires="a14">
+          <p:sp>
+            <p:nvSpPr>
+              <p:cNvPr id="3" name="Content Placeholder 2"/>
+              <p:cNvSpPr>
+                <a:spLocks noGrp="1"/>
+              </p:cNvSpPr>
+              <p:nvPr>
+                <p:ph idx="1"/>
+              </p:nvPr>
+            </p:nvSpPr>
+            <p:spPr/>
+            <p:txBody>
+              <a:bodyPr/>
+              <a:lstStyle/>
+              <a:p>
+                <a:pPr lvl="0" indent="0" marL="0">
+                  <a:buNone/>
+                </a:pPr>
+                <a14:m>
+                  <m:oMathPara xmlns:m="http://schemas.openxmlformats.org/officeDocument/2006/math">
+                    <m:oMathParaPr>
+                      <m:jc m:val="center"/>
+                    </m:oMathParaPr>
+                    <m:oMath>
+                      <m:r>
+                        <m:t>S</m:t>
+                      </m:r>
+                      <m:r>
+                        <m:t>E</m:t>
+                      </m:r>
+                      <m:r>
+                        <m:rPr>
+                          <m:sty m:val="p"/>
+                        </m:rPr>
+                        <m:t>=</m:t>
+                      </m:r>
+                      <m:r>
+                        <m:t>S</m:t>
+                      </m:r>
+                      <m:r>
+                        <m:t>D</m:t>
+                      </m:r>
+                      <m:r>
+                        <m:rPr>
+                          <m:sty m:val="p"/>
+                        </m:rPr>
+                        <m:t>/</m:t>
+                      </m:r>
+                      <m:rad>
+                        <m:radPr>
+                          <m:degHide m:val="1"/>
+                        </m:radPr>
+                        <m:deg/>
+                        <m:e>
+                          <m:r>
+                            <m:t>N</m:t>
+                          </m:r>
+                        </m:e>
+                      </m:rad>
+                    </m:oMath>
+                  </m:oMathPara>
+                </a14:m>
+              </a:p>
+              <a:p>
+                <a:pPr lvl="0" indent="0">
+                  <a:buNone/>
+                </a:pPr>
+                <a:r>
+                  <a:rPr>
+                    <a:solidFill>
+                      <a:srgbClr val="06287E"/>
+                    </a:solidFill>
+                    <a:latin typeface="Courier"/>
+                  </a:rPr>
+                  <a:t>sd</a:t>
+                </a:r>
+                <a:r>
+                  <a:rPr>
+                    <a:latin typeface="Courier"/>
+                  </a:rPr>
+                  <a:t>(expts</a:t>
+                </a:r>
+                <a:r>
+                  <a:rPr>
+                    <a:solidFill>
+                      <a:srgbClr val="4070A0"/>
+                    </a:solidFill>
+                    <a:latin typeface="Courier"/>
+                  </a:rPr>
+                  <a:t>$</a:t>
+                </a:r>
+                <a:r>
+                  <a:rPr>
+                    <a:latin typeface="Courier"/>
+                  </a:rPr>
+                  <a:t>effect)</a:t>
+                </a:r>
+              </a:p>
+              <a:p>
+                <a:pPr lvl="0" indent="0">
+                  <a:buNone/>
+                </a:pPr>
+                <a:r>
+                  <a:rPr>
+                    <a:latin typeface="Courier"/>
+                  </a:rPr>
+                  <a:t>## [1] 0.1728306</a:t>
+                </a:r>
+              </a:p>
+            </p:txBody>
+          </p:sp>
+        </mc:Choice>
+      </mc:AlternateContent>
     </p:spTree>
   </p:cSld>
 </p:sld>

</xml_diff>

<commit_message>
Code updated with simulation
</commit_message>
<xml_diff>
--- a/slides/code_slides.pptx
+++ b/slides/code_slides.pptx
@@ -11,6 +11,9 @@
     <p:sldId id="259" r:id="rId5"/>
     <p:sldId id="260" r:id="rId6"/>
     <p:sldId id="261" r:id="rId7"/>
+    <p:sldId id="262" r:id="rId8"/>
+    <p:sldId id="263" r:id="rId9"/>
+    <p:sldId id="264" r:id="rId10"/>
   </p:sldIdLst>
   <p:sldSz cx="9144000" cy="5143500" type="screen16x9"/>
   <p:notesSz cx="6858000" cy="9144000"/>
@@ -3759,7 +3762,7 @@
               <a:rPr>
                 <a:latin typeface="Courier"/>
               </a:rPr>
-              <a:t>## [1] 0.2015051</a:t>
+              <a:t>## [1] 0.07522093</a:t>
             </a:r>
           </a:p>
           <a:p>
@@ -3794,13 +3797,13 @@
 ##  Welch Two Sample t-test
 ## 
 ## data:  trt_26C and trt_8C
-## t = 0.8405, df = 10.991, p-value = 0.4185
+## t = 0.48302, df = 11.994, p-value = 0.6378
 ## alternative hypothesis: true difference in means is not equal to 0
 ## 95 percent confidence interval:
-##  -0.3262227  0.7292329
+##  -0.2641075  0.4145493
 ## sample estimates:
 ## mean of x mean of y 
-## 0.7293553 0.5278502</a:t>
+## 0.5368183 0.4615974</a:t>
             </a:r>
           </a:p>
         </p:txBody>
@@ -4821,13 +4824,797 @@
                   <a:rPr>
                     <a:latin typeface="Courier"/>
                   </a:rPr>
-                  <a:t>## [1] 0.1728306</a:t>
+                  <a:t>## [1] 0.173429</a:t>
                 </a:r>
               </a:p>
             </p:txBody>
           </p:sp>
         </mc:Choice>
       </mc:AlternateContent>
+    </p:spTree>
+  </p:cSld>
+</p:sld>
+</file>
+
+<file path=ppt/slides/slide7.xml><?xml version="1.0" encoding="utf-8"?>
+<p:sld xmlns:a="http://schemas.openxmlformats.org/drawingml/2006/main" xmlns:r="http://schemas.openxmlformats.org/officeDocument/2006/relationships" xmlns:p="http://schemas.openxmlformats.org/presentationml/2006/main">
+  <p:cSld>
+    <p:spTree>
+      <p:nvGrpSpPr>
+        <p:cNvPr id="1" name=""/>
+        <p:cNvGrpSpPr/>
+        <p:nvPr/>
+      </p:nvGrpSpPr>
+      <p:grpSpPr>
+        <a:xfrm>
+          <a:off x="0" y="0"/>
+          <a:ext cx="0" cy="0"/>
+          <a:chOff x="0" y="0"/>
+          <a:chExt cx="0" cy="0"/>
+        </a:xfrm>
+      </p:grpSpPr>
+      <p:sp>
+        <p:nvSpPr>
+          <p:cNvPr id="2" name="Title 1"/>
+          <p:cNvSpPr>
+            <a:spLocks noGrp="1"/>
+          </p:cNvSpPr>
+          <p:nvPr>
+            <p:ph type="title"/>
+          </p:nvPr>
+        </p:nvSpPr>
+        <p:spPr/>
+        <p:txBody>
+          <a:bodyPr/>
+          <a:lstStyle/>
+          <a:p>
+            <a:pPr lvl="0" indent="0" marL="0">
+              <a:buNone/>
+            </a:pPr>
+            <a:r>
+              <a:rPr/>
+              <a:t>se</a:t>
+            </a:r>
+          </a:p>
+        </p:txBody>
+      </p:sp>
+      <p:sp>
+        <p:nvSpPr>
+          <p:cNvPr id="3" name="Content Placeholder 2"/>
+          <p:cNvSpPr>
+            <a:spLocks noGrp="1"/>
+          </p:cNvSpPr>
+          <p:nvPr>
+            <p:ph idx="1"/>
+          </p:nvPr>
+        </p:nvSpPr>
+        <p:spPr/>
+        <p:txBody>
+          <a:bodyPr/>
+          <a:lstStyle/>
+          <a:p>
+            <a:pPr lvl="0" indent="0">
+              <a:buNone/>
+            </a:pPr>
+            <a:r>
+              <a:rPr>
+                <a:latin typeface="Courier"/>
+              </a:rPr>
+              <a:t>means </a:t>
+            </a:r>
+            <a:r>
+              <a:rPr>
+                <a:solidFill>
+                  <a:srgbClr val="007020"/>
+                </a:solidFill>
+                <a:latin typeface="Courier"/>
+              </a:rPr>
+              <a:t>&lt;-</a:t>
+            </a:r>
+            <a:r>
+              <a:rPr>
+                <a:latin typeface="Courier"/>
+              </a:rPr>
+              <a:t> </a:t>
+            </a:r>
+            <a:r>
+              <a:rPr>
+                <a:solidFill>
+                  <a:srgbClr val="06287E"/>
+                </a:solidFill>
+                <a:latin typeface="Courier"/>
+              </a:rPr>
+              <a:t>c</a:t>
+            </a:r>
+            <a:r>
+              <a:rPr>
+                <a:latin typeface="Courier"/>
+              </a:rPr>
+              <a:t>()</a:t>
+            </a:r>
+            <a:br/>
+            <a:br/>
+            <a:r>
+              <a:rPr b="1">
+                <a:solidFill>
+                  <a:srgbClr val="007020"/>
+                </a:solidFill>
+                <a:latin typeface="Courier"/>
+              </a:rPr>
+              <a:t>for</a:t>
+            </a:r>
+            <a:r>
+              <a:rPr>
+                <a:latin typeface="Courier"/>
+              </a:rPr>
+              <a:t> (i </a:t>
+            </a:r>
+            <a:r>
+              <a:rPr b="1">
+                <a:solidFill>
+                  <a:srgbClr val="007020"/>
+                </a:solidFill>
+                <a:latin typeface="Courier"/>
+              </a:rPr>
+              <a:t>in</a:t>
+            </a:r>
+            <a:r>
+              <a:rPr>
+                <a:latin typeface="Courier"/>
+              </a:rPr>
+              <a:t> </a:t>
+            </a:r>
+            <a:r>
+              <a:rPr>
+                <a:solidFill>
+                  <a:srgbClr val="40A070"/>
+                </a:solidFill>
+                <a:latin typeface="Courier"/>
+              </a:rPr>
+              <a:t>1</a:t>
+            </a:r>
+            <a:r>
+              <a:rPr>
+                <a:solidFill>
+                  <a:srgbClr val="4070A0"/>
+                </a:solidFill>
+                <a:latin typeface="Courier"/>
+              </a:rPr>
+              <a:t>:</a:t>
+            </a:r>
+            <a:r>
+              <a:rPr>
+                <a:solidFill>
+                  <a:srgbClr val="40A070"/>
+                </a:solidFill>
+                <a:latin typeface="Courier"/>
+              </a:rPr>
+              <a:t>1e+06</a:t>
+            </a:r>
+            <a:r>
+              <a:rPr>
+                <a:latin typeface="Courier"/>
+              </a:rPr>
+              <a:t>) {</a:t>
+            </a:r>
+            <a:br/>
+            <a:r>
+              <a:rPr>
+                <a:latin typeface="Courier"/>
+              </a:rPr>
+              <a:t>    mass </a:t>
+            </a:r>
+            <a:r>
+              <a:rPr>
+                <a:solidFill>
+                  <a:srgbClr val="007020"/>
+                </a:solidFill>
+                <a:latin typeface="Courier"/>
+              </a:rPr>
+              <a:t>&lt;-</a:t>
+            </a:r>
+            <a:r>
+              <a:rPr>
+                <a:latin typeface="Courier"/>
+              </a:rPr>
+              <a:t> </a:t>
+            </a:r>
+            <a:r>
+              <a:rPr>
+                <a:solidFill>
+                  <a:srgbClr val="06287E"/>
+                </a:solidFill>
+                <a:latin typeface="Courier"/>
+              </a:rPr>
+              <a:t>rnorm</a:t>
+            </a:r>
+            <a:r>
+              <a:rPr>
+                <a:latin typeface="Courier"/>
+              </a:rPr>
+              <a:t>(</a:t>
+            </a:r>
+            <a:r>
+              <a:rPr>
+                <a:solidFill>
+                  <a:srgbClr val="7D9029"/>
+                </a:solidFill>
+                <a:latin typeface="Courier"/>
+              </a:rPr>
+              <a:t>n =</a:t>
+            </a:r>
+            <a:r>
+              <a:rPr>
+                <a:latin typeface="Courier"/>
+              </a:rPr>
+              <a:t> </a:t>
+            </a:r>
+            <a:r>
+              <a:rPr>
+                <a:solidFill>
+                  <a:srgbClr val="40A070"/>
+                </a:solidFill>
+                <a:latin typeface="Courier"/>
+              </a:rPr>
+              <a:t>18</a:t>
+            </a:r>
+            <a:r>
+              <a:rPr>
+                <a:latin typeface="Courier"/>
+              </a:rPr>
+              <a:t>, </a:t>
+            </a:r>
+            <a:r>
+              <a:rPr>
+                <a:solidFill>
+                  <a:srgbClr val="7D9029"/>
+                </a:solidFill>
+                <a:latin typeface="Courier"/>
+              </a:rPr>
+              <a:t>mean =</a:t>
+            </a:r>
+            <a:r>
+              <a:rPr>
+                <a:latin typeface="Courier"/>
+              </a:rPr>
+              <a:t> </a:t>
+            </a:r>
+            <a:r>
+              <a:rPr>
+                <a:solidFill>
+                  <a:srgbClr val="40A070"/>
+                </a:solidFill>
+                <a:latin typeface="Courier"/>
+              </a:rPr>
+              <a:t>10.8</a:t>
+            </a:r>
+            <a:r>
+              <a:rPr>
+                <a:latin typeface="Courier"/>
+              </a:rPr>
+              <a:t>, </a:t>
+            </a:r>
+            <a:r>
+              <a:rPr>
+                <a:solidFill>
+                  <a:srgbClr val="7D9029"/>
+                </a:solidFill>
+                <a:latin typeface="Courier"/>
+              </a:rPr>
+              <a:t>sd =</a:t>
+            </a:r>
+            <a:r>
+              <a:rPr>
+                <a:latin typeface="Courier"/>
+              </a:rPr>
+              <a:t> </a:t>
+            </a:r>
+            <a:r>
+              <a:rPr>
+                <a:solidFill>
+                  <a:srgbClr val="40A070"/>
+                </a:solidFill>
+                <a:latin typeface="Courier"/>
+              </a:rPr>
+              <a:t>0.988</a:t>
+            </a:r>
+            <a:r>
+              <a:rPr>
+                <a:latin typeface="Courier"/>
+              </a:rPr>
+              <a:t>)</a:t>
+            </a:r>
+            <a:br/>
+            <a:r>
+              <a:rPr>
+                <a:latin typeface="Courier"/>
+              </a:rPr>
+              <a:t>    means </a:t>
+            </a:r>
+            <a:r>
+              <a:rPr>
+                <a:solidFill>
+                  <a:srgbClr val="007020"/>
+                </a:solidFill>
+                <a:latin typeface="Courier"/>
+              </a:rPr>
+              <a:t>&lt;-</a:t>
+            </a:r>
+            <a:r>
+              <a:rPr>
+                <a:latin typeface="Courier"/>
+              </a:rPr>
+              <a:t> </a:t>
+            </a:r>
+            <a:r>
+              <a:rPr>
+                <a:solidFill>
+                  <a:srgbClr val="06287E"/>
+                </a:solidFill>
+                <a:latin typeface="Courier"/>
+              </a:rPr>
+              <a:t>c</a:t>
+            </a:r>
+            <a:r>
+              <a:rPr>
+                <a:latin typeface="Courier"/>
+              </a:rPr>
+              <a:t>(means, </a:t>
+            </a:r>
+            <a:r>
+              <a:rPr>
+                <a:solidFill>
+                  <a:srgbClr val="06287E"/>
+                </a:solidFill>
+                <a:latin typeface="Courier"/>
+              </a:rPr>
+              <a:t>mean</a:t>
+            </a:r>
+            <a:r>
+              <a:rPr>
+                <a:latin typeface="Courier"/>
+              </a:rPr>
+              <a:t>(mass))</a:t>
+            </a:r>
+            <a:br/>
+            <a:r>
+              <a:rPr>
+                <a:latin typeface="Courier"/>
+              </a:rPr>
+              <a:t>}</a:t>
+            </a:r>
+            <a:br/>
+            <a:br/>
+            <a:r>
+              <a:rPr i="1">
+                <a:solidFill>
+                  <a:srgbClr val="60A0B0"/>
+                </a:solidFill>
+                <a:latin typeface="Courier"/>
+              </a:rPr>
+              <a:t># The mean of the means</a:t>
+            </a:r>
+            <a:br/>
+            <a:r>
+              <a:rPr>
+                <a:solidFill>
+                  <a:srgbClr val="06287E"/>
+                </a:solidFill>
+                <a:latin typeface="Courier"/>
+              </a:rPr>
+              <a:t>mean</a:t>
+            </a:r>
+            <a:r>
+              <a:rPr>
+                <a:latin typeface="Courier"/>
+              </a:rPr>
+              <a:t>(means)</a:t>
+            </a:r>
+          </a:p>
+          <a:p>
+            <a:pPr lvl="0" indent="0">
+              <a:buNone/>
+            </a:pPr>
+            <a:r>
+              <a:rPr>
+                <a:latin typeface="Courier"/>
+              </a:rPr>
+              <a:t>## [1] 10.79997</a:t>
+            </a:r>
+          </a:p>
+          <a:p>
+            <a:pPr lvl="0" indent="0">
+              <a:buNone/>
+            </a:pPr>
+            <a:r>
+              <a:rPr i="1">
+                <a:solidFill>
+                  <a:srgbClr val="60A0B0"/>
+                </a:solidFill>
+                <a:latin typeface="Courier"/>
+              </a:rPr>
+              <a:t># The standard deviation of the means or standard error</a:t>
+            </a:r>
+            <a:br/>
+            <a:r>
+              <a:rPr>
+                <a:solidFill>
+                  <a:srgbClr val="06287E"/>
+                </a:solidFill>
+                <a:latin typeface="Courier"/>
+              </a:rPr>
+              <a:t>sd</a:t>
+            </a:r>
+            <a:r>
+              <a:rPr>
+                <a:latin typeface="Courier"/>
+              </a:rPr>
+              <a:t>(means)</a:t>
+            </a:r>
+          </a:p>
+          <a:p>
+            <a:pPr lvl="0" indent="0">
+              <a:buNone/>
+            </a:pPr>
+            <a:r>
+              <a:rPr>
+                <a:latin typeface="Courier"/>
+              </a:rPr>
+              <a:t>## [1] 0.2327267</a:t>
+            </a:r>
+          </a:p>
+        </p:txBody>
+      </p:sp>
+    </p:spTree>
+  </p:cSld>
+</p:sld>
+</file>
+
+<file path=ppt/slides/slide8.xml><?xml version="1.0" encoding="utf-8"?>
+<p:sld xmlns:a="http://schemas.openxmlformats.org/drawingml/2006/main" xmlns:r="http://schemas.openxmlformats.org/officeDocument/2006/relationships" xmlns:p="http://schemas.openxmlformats.org/presentationml/2006/main">
+  <p:cSld>
+    <p:spTree>
+      <p:nvGrpSpPr>
+        <p:cNvPr id="1" name=""/>
+        <p:cNvGrpSpPr/>
+        <p:nvPr/>
+      </p:nvGrpSpPr>
+      <p:grpSpPr>
+        <a:xfrm>
+          <a:off x="0" y="0"/>
+          <a:ext cx="0" cy="0"/>
+          <a:chOff x="0" y="0"/>
+          <a:chExt cx="0" cy="0"/>
+        </a:xfrm>
+      </p:grpSpPr>
+      <p:sp>
+        <p:nvSpPr>
+          <p:cNvPr id="2" name="Title 1"/>
+          <p:cNvSpPr>
+            <a:spLocks noGrp="1"/>
+          </p:cNvSpPr>
+          <p:nvPr>
+            <p:ph type="title"/>
+          </p:nvPr>
+        </p:nvSpPr>
+        <p:spPr/>
+        <p:txBody>
+          <a:bodyPr/>
+          <a:lstStyle/>
+          <a:p>
+            <a:pPr lvl="0" indent="0" marL="0">
+              <a:buNone/>
+            </a:pPr>
+            <a:r>
+              <a:rPr/>
+              <a:t>Our analytical calculaton</a:t>
+            </a:r>
+          </a:p>
+        </p:txBody>
+      </p:sp>
+      <p:sp>
+        <p:nvSpPr>
+          <p:cNvPr id="3" name="Content Placeholder 2"/>
+          <p:cNvSpPr>
+            <a:spLocks noGrp="1"/>
+          </p:cNvSpPr>
+          <p:nvPr>
+            <p:ph idx="1"/>
+          </p:nvPr>
+        </p:nvSpPr>
+        <p:spPr/>
+        <p:txBody>
+          <a:bodyPr/>
+          <a:lstStyle/>
+          <a:p>
+            <a:pPr lvl="0" indent="0">
+              <a:buNone/>
+            </a:pPr>
+            <a:r>
+              <a:rPr>
+                <a:latin typeface="Courier"/>
+              </a:rPr>
+              <a:t>se </a:t>
+            </a:r>
+            <a:r>
+              <a:rPr>
+                <a:solidFill>
+                  <a:srgbClr val="007020"/>
+                </a:solidFill>
+                <a:latin typeface="Courier"/>
+              </a:rPr>
+              <a:t>&lt;-</a:t>
+            </a:r>
+            <a:r>
+              <a:rPr>
+                <a:latin typeface="Courier"/>
+              </a:rPr>
+              <a:t> </a:t>
+            </a:r>
+            <a:r>
+              <a:rPr>
+                <a:solidFill>
+                  <a:srgbClr val="06287E"/>
+                </a:solidFill>
+                <a:latin typeface="Courier"/>
+              </a:rPr>
+              <a:t>sd</a:t>
+            </a:r>
+            <a:r>
+              <a:rPr>
+                <a:latin typeface="Courier"/>
+              </a:rPr>
+              <a:t>(mass)</a:t>
+            </a:r>
+            <a:r>
+              <a:rPr>
+                <a:solidFill>
+                  <a:srgbClr val="4070A0"/>
+                </a:solidFill>
+                <a:latin typeface="Courier"/>
+              </a:rPr>
+              <a:t>/</a:t>
+            </a:r>
+            <a:r>
+              <a:rPr>
+                <a:solidFill>
+                  <a:srgbClr val="06287E"/>
+                </a:solidFill>
+                <a:latin typeface="Courier"/>
+              </a:rPr>
+              <a:t>sqrt</a:t>
+            </a:r>
+            <a:r>
+              <a:rPr>
+                <a:latin typeface="Courier"/>
+              </a:rPr>
+              <a:t>(</a:t>
+            </a:r>
+            <a:r>
+              <a:rPr>
+                <a:solidFill>
+                  <a:srgbClr val="06287E"/>
+                </a:solidFill>
+                <a:latin typeface="Courier"/>
+              </a:rPr>
+              <a:t>length</a:t>
+            </a:r>
+            <a:r>
+              <a:rPr>
+                <a:latin typeface="Courier"/>
+              </a:rPr>
+              <a:t>(mass))</a:t>
+            </a:r>
+            <a:br/>
+            <a:r>
+              <a:rPr>
+                <a:latin typeface="Courier"/>
+              </a:rPr>
+              <a:t>se</a:t>
+            </a:r>
+          </a:p>
+          <a:p>
+            <a:pPr lvl="0" indent="0">
+              <a:buNone/>
+            </a:pPr>
+            <a:r>
+              <a:rPr>
+                <a:latin typeface="Courier"/>
+              </a:rPr>
+              <a:t>## [1] 0.1858937</a:t>
+            </a:r>
+          </a:p>
+        </p:txBody>
+      </p:sp>
+    </p:spTree>
+  </p:cSld>
+</p:sld>
+</file>
+
+<file path=ppt/slides/slide9.xml><?xml version="1.0" encoding="utf-8"?>
+<p:sld xmlns:a="http://schemas.openxmlformats.org/drawingml/2006/main" xmlns:r="http://schemas.openxmlformats.org/officeDocument/2006/relationships" xmlns:p="http://schemas.openxmlformats.org/presentationml/2006/main">
+  <p:cSld>
+    <p:spTree>
+      <p:nvGrpSpPr>
+        <p:cNvPr id="1" name=""/>
+        <p:cNvGrpSpPr/>
+        <p:nvPr/>
+      </p:nvGrpSpPr>
+      <p:grpSpPr>
+        <a:xfrm>
+          <a:off x="0" y="0"/>
+          <a:ext cx="0" cy="0"/>
+          <a:chOff x="0" y="0"/>
+          <a:chExt cx="0" cy="0"/>
+        </a:xfrm>
+      </p:grpSpPr>
+      <p:sp>
+        <p:nvSpPr>
+          <p:cNvPr id="2" name="Title 1"/>
+          <p:cNvSpPr>
+            <a:spLocks noGrp="1"/>
+          </p:cNvSpPr>
+          <p:nvPr>
+            <p:ph type="title"/>
+          </p:nvPr>
+        </p:nvSpPr>
+        <p:spPr>
+          <a:xfrm>
+            <a:off x="457201" y="204787"/>
+            <a:ext cx="3008313" cy="871538"/>
+          </a:xfrm>
+        </p:spPr>
+        <p:txBody>
+          <a:bodyPr/>
+          <a:lstStyle/>
+          <a:p>
+            <a:pPr lvl="0" indent="0" marL="0">
+              <a:buNone/>
+            </a:pPr>
+            <a:r>
+              <a:rPr/>
+              <a:t>Plots</a:t>
+            </a:r>
+          </a:p>
+        </p:txBody>
+      </p:sp>
+      <p:sp>
+        <p:nvSpPr>
+          <p:cNvPr id="4" name="Text Placeholder 3"/>
+          <p:cNvSpPr>
+            <a:spLocks noGrp="1"/>
+          </p:cNvSpPr>
+          <p:nvPr>
+            <p:ph idx="2" sz="half" type="body"/>
+          </p:nvPr>
+        </p:nvSpPr>
+        <p:spPr/>
+        <p:txBody>
+          <a:bodyPr/>
+          <a:lstStyle/>
+          <a:p>
+            <a:pPr lvl="0" indent="0">
+              <a:buNone/>
+            </a:pPr>
+            <a:r>
+              <a:rPr>
+                <a:solidFill>
+                  <a:srgbClr val="06287E"/>
+                </a:solidFill>
+                <a:latin typeface="Courier"/>
+              </a:rPr>
+              <a:t>ggplot</a:t>
+            </a:r>
+            <a:r>
+              <a:rPr>
+                <a:latin typeface="Courier"/>
+              </a:rPr>
+              <a:t>() </a:t>
+            </a:r>
+            <a:r>
+              <a:rPr>
+                <a:solidFill>
+                  <a:srgbClr val="4070A0"/>
+                </a:solidFill>
+                <a:latin typeface="Courier"/>
+              </a:rPr>
+              <a:t>+</a:t>
+            </a:r>
+            <a:r>
+              <a:rPr>
+                <a:latin typeface="Courier"/>
+              </a:rPr>
+              <a:t> </a:t>
+            </a:r>
+            <a:r>
+              <a:rPr>
+                <a:solidFill>
+                  <a:srgbClr val="06287E"/>
+                </a:solidFill>
+                <a:latin typeface="Courier"/>
+              </a:rPr>
+              <a:t>geom_histogram</a:t>
+            </a:r>
+            <a:r>
+              <a:rPr>
+                <a:latin typeface="Courier"/>
+              </a:rPr>
+              <a:t>(</a:t>
+            </a:r>
+            <a:r>
+              <a:rPr>
+                <a:solidFill>
+                  <a:srgbClr val="06287E"/>
+                </a:solidFill>
+                <a:latin typeface="Courier"/>
+              </a:rPr>
+              <a:t>aes</a:t>
+            </a:r>
+            <a:r>
+              <a:rPr>
+                <a:latin typeface="Courier"/>
+              </a:rPr>
+              <a:t>(</a:t>
+            </a:r>
+            <a:r>
+              <a:rPr>
+                <a:solidFill>
+                  <a:srgbClr val="7D9029"/>
+                </a:solidFill>
+                <a:latin typeface="Courier"/>
+              </a:rPr>
+              <a:t>x =</a:t>
+            </a:r>
+            <a:r>
+              <a:rPr>
+                <a:latin typeface="Courier"/>
+              </a:rPr>
+              <a:t> means))</a:t>
+            </a:r>
+          </a:p>
+          <a:p>
+            <a:pPr lvl="0" indent="0">
+              <a:buNone/>
+            </a:pPr>
+            <a:r>
+              <a:rPr>
+                <a:latin typeface="Courier"/>
+              </a:rPr>
+              <a:t>## `stat_bin()` using `bins = 30`. Pick better value with `binwidth`.</a:t>
+            </a:r>
+          </a:p>
+        </p:txBody>
+      </p:sp>
+      <p:pic>
+        <p:nvPicPr>
+          <p:cNvPr descr="code_slides_files/figure-pptx/simfig3plot-1.png" id="0" name="Picture 1"/>
+          <p:cNvPicPr>
+            <a:picLocks noGrp="1" noChangeAspect="1"/>
+          </p:cNvPicPr>
+          <p:nvPr/>
+        </p:nvPicPr>
+        <p:blipFill>
+          <a:blip r:embed="rId2"/>
+          <a:stretch>
+            <a:fillRect/>
+          </a:stretch>
+        </p:blipFill>
+        <p:spPr bwMode="auto">
+          <a:xfrm>
+            <a:off x="3568700" y="355600"/>
+            <a:ext cx="5105400" cy="4089400"/>
+          </a:xfrm>
+          <a:prstGeom prst="rect">
+            <a:avLst/>
+          </a:prstGeom>
+          <a:noFill/>
+          <a:ln w="9525">
+            <a:noFill/>
+            <a:headEnd/>
+            <a:tailEnd/>
+          </a:ln>
+        </p:spPr>
+      </p:pic>
     </p:spTree>
   </p:cSld>
 </p:sld>

</xml_diff>

<commit_message>
Added some code for slides
</commit_message>
<xml_diff>
--- a/slides/code_slides.pptx
+++ b/slides/code_slides.pptx
@@ -10,10 +10,6 @@
     <p:sldId id="258" r:id="rId4"/>
     <p:sldId id="259" r:id="rId5"/>
     <p:sldId id="260" r:id="rId6"/>
-    <p:sldId id="261" r:id="rId7"/>
-    <p:sldId id="262" r:id="rId8"/>
-    <p:sldId id="263" r:id="rId9"/>
-    <p:sldId id="264" r:id="rId10"/>
   </p:sldIdLst>
   <p:sldSz cx="9144000" cy="5143500" type="screen16x9"/>
   <p:notesSz cx="6858000" cy="9144000"/>
@@ -3180,7 +3176,7 @@
             </a:pPr>
             <a:r>
               <a:rPr/>
-              <a:t>2022-06-12</a:t>
+              <a:t>2022-06-13</a:t>
             </a:r>
           </a:p>
         </p:txBody>
@@ -3207,47 +3203,34 @@
           <a:chExt cx="0" cy="0"/>
         </a:xfrm>
       </p:grpSpPr>
-      <p:sp>
-        <p:nvSpPr>
-          <p:cNvPr id="2" name="Title 1"/>
-          <p:cNvSpPr>
-            <a:spLocks noGrp="1"/>
-          </p:cNvSpPr>
-          <p:nvPr>
-            <p:ph type="title"/>
-          </p:nvPr>
-        </p:nvSpPr>
-        <p:spPr/>
-        <p:txBody>
-          <a:bodyPr/>
-          <a:lstStyle/>
-          <a:p>
-            <a:pPr lvl="0" indent="0" marL="0">
-              <a:buNone/>
-            </a:pPr>
-            <a:r>
-              <a:rPr/>
-              <a:t>Slide with Bullets</a:t>
-            </a:r>
-          </a:p>
-        </p:txBody>
-      </p:sp>
       <mc:AlternateContent xmlns:mc="http://schemas.openxmlformats.org/markup-compatibility/2006">
         <mc:Choice xmlns:a14="http://schemas.microsoft.com/office/drawing/2010/main" Requires="a14">
           <p:sp>
             <p:nvSpPr>
-              <p:cNvPr id="3" name="Content Placeholder 2"/>
+              <p:cNvPr id="4" name="Text Placeholder 3"/>
               <p:cNvSpPr>
                 <a:spLocks noGrp="1"/>
               </p:cNvSpPr>
               <p:nvPr>
-                <p:ph idx="1"/>
+                <p:ph idx="2" sz="half" type="body"/>
               </p:nvPr>
             </p:nvSpPr>
             <p:spPr/>
             <p:txBody>
               <a:bodyPr/>
               <a:lstStyle/>
+              <a:p>
+                <a:pPr lvl="0" indent="0" marL="0">
+                  <a:spcBef>
+                    <a:spcPts val="3000"/>
+                  </a:spcBef>
+                  <a:buNone/>
+                </a:pPr>
+                <a:r>
+                  <a:rPr b="1"/>
+                  <a:t>Slide with Bullets</a:t>
+                </a:r>
+              </a:p>
               <a:p>
                 <a:pPr lvl="0"/>
                 <a:r>
@@ -3327,10 +3310,1080 @@
                   <a:t>Drink coffee</a:t>
                 </a:r>
               </a:p>
+              <a:p>
+                <a:pPr lvl="0" indent="0" marL="0">
+                  <a:spcBef>
+                    <a:spcPts val="3000"/>
+                  </a:spcBef>
+                  <a:buNone/>
+                </a:pPr>
+                <a:r>
+                  <a:rPr b="1"/>
+                  <a:t>Slide with R Output</a:t>
+                </a:r>
+              </a:p>
+              <a:p>
+                <a:pPr lvl="0" indent="0">
+                  <a:buNone/>
+                </a:pPr>
+                <a:r>
+                  <a:rPr i="1">
+                    <a:solidFill>
+                      <a:srgbClr val="60A0B0"/>
+                    </a:solidFill>
+                    <a:latin typeface="Courier"/>
+                  </a:rPr>
+                  <a:t># LDH activity in 8 C treatment</a:t>
+                </a:r>
+                <a:br/>
+                <a:r>
+                  <a:rPr>
+                    <a:latin typeface="Courier"/>
+                  </a:rPr>
+                  <a:t>trt_8C </a:t>
+                </a:r>
+                <a:r>
+                  <a:rPr>
+                    <a:solidFill>
+                      <a:srgbClr val="007020"/>
+                    </a:solidFill>
+                    <a:latin typeface="Courier"/>
+                  </a:rPr>
+                  <a:t>&lt;-</a:t>
+                </a:r>
+                <a:r>
+                  <a:rPr>
+                    <a:latin typeface="Courier"/>
+                  </a:rPr>
+                  <a:t> </a:t>
+                </a:r>
+                <a:r>
+                  <a:rPr>
+                    <a:solidFill>
+                      <a:srgbClr val="06287E"/>
+                    </a:solidFill>
+                    <a:latin typeface="Courier"/>
+                  </a:rPr>
+                  <a:t>rnorm</a:t>
+                </a:r>
+                <a:r>
+                  <a:rPr>
+                    <a:latin typeface="Courier"/>
+                  </a:rPr>
+                  <a:t>(</a:t>
+                </a:r>
+                <a:r>
+                  <a:rPr>
+                    <a:solidFill>
+                      <a:srgbClr val="40A070"/>
+                    </a:solidFill>
+                    <a:latin typeface="Courier"/>
+                  </a:rPr>
+                  <a:t>10</a:t>
+                </a:r>
+                <a:r>
+                  <a:rPr>
+                    <a:latin typeface="Courier"/>
+                  </a:rPr>
+                  <a:t>, </a:t>
+                </a:r>
+                <a:r>
+                  <a:rPr>
+                    <a:solidFill>
+                      <a:srgbClr val="40A070"/>
+                    </a:solidFill>
+                    <a:latin typeface="Courier"/>
+                  </a:rPr>
+                  <a:t>0.4</a:t>
+                </a:r>
+                <a:r>
+                  <a:rPr>
+                    <a:latin typeface="Courier"/>
+                  </a:rPr>
+                  <a:t>, </a:t>
+                </a:r>
+                <a:r>
+                  <a:rPr>
+                    <a:solidFill>
+                      <a:srgbClr val="40A070"/>
+                    </a:solidFill>
+                    <a:latin typeface="Courier"/>
+                  </a:rPr>
+                  <a:t>0.5</a:t>
+                </a:r>
+                <a:r>
+                  <a:rPr>
+                    <a:latin typeface="Courier"/>
+                  </a:rPr>
+                  <a:t>)</a:t>
+                </a:r>
+                <a:br/>
+                <a:br/>
+                <a:r>
+                  <a:rPr i="1">
+                    <a:solidFill>
+                      <a:srgbClr val="60A0B0"/>
+                    </a:solidFill>
+                    <a:latin typeface="Courier"/>
+                  </a:rPr>
+                  <a:t># LDH activity in 26 C treatment</a:t>
+                </a:r>
+                <a:br/>
+                <a:r>
+                  <a:rPr>
+                    <a:latin typeface="Courier"/>
+                  </a:rPr>
+                  <a:t>trt_26C </a:t>
+                </a:r>
+                <a:r>
+                  <a:rPr>
+                    <a:solidFill>
+                      <a:srgbClr val="007020"/>
+                    </a:solidFill>
+                    <a:latin typeface="Courier"/>
+                  </a:rPr>
+                  <a:t>&lt;-</a:t>
+                </a:r>
+                <a:r>
+                  <a:rPr>
+                    <a:latin typeface="Courier"/>
+                  </a:rPr>
+                  <a:t> </a:t>
+                </a:r>
+                <a:r>
+                  <a:rPr>
+                    <a:solidFill>
+                      <a:srgbClr val="06287E"/>
+                    </a:solidFill>
+                    <a:latin typeface="Courier"/>
+                  </a:rPr>
+                  <a:t>rnorm</a:t>
+                </a:r>
+                <a:r>
+                  <a:rPr>
+                    <a:latin typeface="Courier"/>
+                  </a:rPr>
+                  <a:t>(</a:t>
+                </a:r>
+                <a:r>
+                  <a:rPr>
+                    <a:solidFill>
+                      <a:srgbClr val="40A070"/>
+                    </a:solidFill>
+                    <a:latin typeface="Courier"/>
+                  </a:rPr>
+                  <a:t>10</a:t>
+                </a:r>
+                <a:r>
+                  <a:rPr>
+                    <a:latin typeface="Courier"/>
+                  </a:rPr>
+                  <a:t>, </a:t>
+                </a:r>
+                <a:r>
+                  <a:rPr>
+                    <a:solidFill>
+                      <a:srgbClr val="40A070"/>
+                    </a:solidFill>
+                    <a:latin typeface="Courier"/>
+                  </a:rPr>
+                  <a:t>0.6</a:t>
+                </a:r>
+                <a:r>
+                  <a:rPr>
+                    <a:latin typeface="Courier"/>
+                  </a:rPr>
+                  <a:t>, </a:t>
+                </a:r>
+                <a:r>
+                  <a:rPr>
+                    <a:solidFill>
+                      <a:srgbClr val="40A070"/>
+                    </a:solidFill>
+                    <a:latin typeface="Courier"/>
+                  </a:rPr>
+                  <a:t>0.2</a:t>
+                </a:r>
+                <a:r>
+                  <a:rPr>
+                    <a:latin typeface="Courier"/>
+                  </a:rPr>
+                  <a:t>)</a:t>
+                </a:r>
+                <a:br/>
+                <a:br/>
+                <a:r>
+                  <a:rPr i="1">
+                    <a:solidFill>
+                      <a:srgbClr val="60A0B0"/>
+                    </a:solidFill>
+                    <a:latin typeface="Courier"/>
+                  </a:rPr>
+                  <a:t># What's the difference, i.e., effect size, between treatments?</a:t>
+                </a:r>
+                <a:br/>
+                <a:r>
+                  <a:rPr>
+                    <a:solidFill>
+                      <a:srgbClr val="06287E"/>
+                    </a:solidFill>
+                    <a:latin typeface="Courier"/>
+                  </a:rPr>
+                  <a:t>mean</a:t>
+                </a:r>
+                <a:r>
+                  <a:rPr>
+                    <a:latin typeface="Courier"/>
+                  </a:rPr>
+                  <a:t>(trt_26C </a:t>
+                </a:r>
+                <a:r>
+                  <a:rPr>
+                    <a:solidFill>
+                      <a:srgbClr val="4070A0"/>
+                    </a:solidFill>
+                    <a:latin typeface="Courier"/>
+                  </a:rPr>
+                  <a:t>-</a:t>
+                </a:r>
+                <a:r>
+                  <a:rPr>
+                    <a:latin typeface="Courier"/>
+                  </a:rPr>
+                  <a:t> trt_8C)</a:t>
+                </a:r>
+              </a:p>
+              <a:p>
+                <a:pPr lvl="0" indent="0">
+                  <a:buNone/>
+                </a:pPr>
+                <a:r>
+                  <a:rPr>
+                    <a:latin typeface="Courier"/>
+                  </a:rPr>
+                  <a:t>## [1] 0.1689233</a:t>
+                </a:r>
+              </a:p>
+              <a:p>
+                <a:pPr lvl="0" indent="0">
+                  <a:buNone/>
+                </a:pPr>
+                <a:r>
+                  <a:rPr>
+                    <a:solidFill>
+                      <a:srgbClr val="06287E"/>
+                    </a:solidFill>
+                    <a:latin typeface="Courier"/>
+                  </a:rPr>
+                  <a:t>t.test</a:t>
+                </a:r>
+                <a:r>
+                  <a:rPr>
+                    <a:latin typeface="Courier"/>
+                  </a:rPr>
+                  <a:t>(trt_26C, trt_8C)</a:t>
+                </a:r>
+              </a:p>
+              <a:p>
+                <a:pPr lvl="0" indent="0">
+                  <a:buNone/>
+                </a:pPr>
+                <a:r>
+                  <a:rPr>
+                    <a:latin typeface="Courier"/>
+                  </a:rPr>
+                  <a:t>## 
+##  Welch Two Sample t-test
+## 
+## data:  trt_26C and trt_8C
+## t = 0.90505, df = 12.249, p-value = 0.3829
+## alternative hypothesis: true difference in means is not equal to 0
+## 95 percent confidence interval:
+##  -0.2368285  0.5746752
+## sample estimates:
+## mean of x mean of y 
+## 0.6241681 0.4552448</a:t>
+                </a:r>
+              </a:p>
+              <a:p>
+                <a:pPr lvl="0" indent="0" marL="0">
+                  <a:spcBef>
+                    <a:spcPts val="3000"/>
+                  </a:spcBef>
+                  <a:buNone/>
+                </a:pPr>
+                <a:r>
+                  <a:rPr b="1"/>
+                  <a:t>Do 1000s of experiments</a:t>
+                </a:r>
+              </a:p>
+              <a:p>
+                <a:pPr lvl="0" indent="0">
+                  <a:buNone/>
+                </a:pPr>
+                <a:r>
+                  <a:rPr>
+                    <a:latin typeface="Courier"/>
+                  </a:rPr>
+                  <a:t>experiment </a:t>
+                </a:r>
+                <a:r>
+                  <a:rPr>
+                    <a:solidFill>
+                      <a:srgbClr val="007020"/>
+                    </a:solidFill>
+                    <a:latin typeface="Courier"/>
+                  </a:rPr>
+                  <a:t>&lt;-</a:t>
+                </a:r>
+                <a:r>
+                  <a:rPr>
+                    <a:latin typeface="Courier"/>
+                  </a:rPr>
+                  <a:t> </a:t>
+                </a:r>
+                <a:r>
+                  <a:rPr b="1">
+                    <a:solidFill>
+                      <a:srgbClr val="007020"/>
+                    </a:solidFill>
+                    <a:latin typeface="Courier"/>
+                  </a:rPr>
+                  <a:t>function</a:t>
+                </a:r>
+                <a:r>
+                  <a:rPr>
+                    <a:latin typeface="Courier"/>
+                  </a:rPr>
+                  <a:t>(times) {</a:t>
+                </a:r>
+                <a:br/>
+                <a:br/>
+                <a:r>
+                  <a:rPr>
+                    <a:latin typeface="Courier"/>
+                  </a:rPr>
+                  <a:t>    dat </a:t>
+                </a:r>
+                <a:r>
+                  <a:rPr>
+                    <a:solidFill>
+                      <a:srgbClr val="007020"/>
+                    </a:solidFill>
+                    <a:latin typeface="Courier"/>
+                  </a:rPr>
+                  <a:t>&lt;-</a:t>
+                </a:r>
+                <a:r>
+                  <a:rPr>
+                    <a:latin typeface="Courier"/>
+                  </a:rPr>
+                  <a:t> </a:t>
+                </a:r>
+                <a:r>
+                  <a:rPr>
+                    <a:solidFill>
+                      <a:srgbClr val="06287E"/>
+                    </a:solidFill>
+                    <a:latin typeface="Courier"/>
+                  </a:rPr>
+                  <a:t>data.frame</a:t>
+                </a:r>
+                <a:r>
+                  <a:rPr>
+                    <a:latin typeface="Courier"/>
+                  </a:rPr>
+                  <a:t>(</a:t>
+                </a:r>
+                <a:r>
+                  <a:rPr>
+                    <a:solidFill>
+                      <a:srgbClr val="06287E"/>
+                    </a:solidFill>
+                    <a:latin typeface="Courier"/>
+                  </a:rPr>
+                  <a:t>matrix</a:t>
+                </a:r>
+                <a:r>
+                  <a:rPr>
+                    <a:latin typeface="Courier"/>
+                  </a:rPr>
+                  <a:t>(</a:t>
+                </a:r>
+                <a:r>
+                  <a:rPr>
+                    <a:solidFill>
+                      <a:srgbClr val="7D9029"/>
+                    </a:solidFill>
+                    <a:latin typeface="Courier"/>
+                  </a:rPr>
+                  <a:t>nrow =</a:t>
+                </a:r>
+                <a:r>
+                  <a:rPr>
+                    <a:latin typeface="Courier"/>
+                  </a:rPr>
+                  <a:t> times, </a:t>
+                </a:r>
+                <a:r>
+                  <a:rPr>
+                    <a:solidFill>
+                      <a:srgbClr val="7D9029"/>
+                    </a:solidFill>
+                    <a:latin typeface="Courier"/>
+                  </a:rPr>
+                  <a:t>ncol =</a:t>
+                </a:r>
+                <a:r>
+                  <a:rPr>
+                    <a:latin typeface="Courier"/>
+                  </a:rPr>
+                  <a:t> </a:t>
+                </a:r>
+                <a:r>
+                  <a:rPr>
+                    <a:solidFill>
+                      <a:srgbClr val="40A070"/>
+                    </a:solidFill>
+                    <a:latin typeface="Courier"/>
+                  </a:rPr>
+                  <a:t>2</a:t>
+                </a:r>
+                <a:r>
+                  <a:rPr>
+                    <a:latin typeface="Courier"/>
+                  </a:rPr>
+                  <a:t>))</a:t>
+                </a:r>
+                <a:br/>
+                <a:br/>
+                <a:r>
+                  <a:rPr>
+                    <a:latin typeface="Courier"/>
+                  </a:rPr>
+                  <a:t>    </a:t>
+                </a:r>
+                <a:r>
+                  <a:rPr b="1">
+                    <a:solidFill>
+                      <a:srgbClr val="007020"/>
+                    </a:solidFill>
+                    <a:latin typeface="Courier"/>
+                  </a:rPr>
+                  <a:t>for</a:t>
+                </a:r>
+                <a:r>
+                  <a:rPr>
+                    <a:latin typeface="Courier"/>
+                  </a:rPr>
+                  <a:t> (i </a:t>
+                </a:r>
+                <a:r>
+                  <a:rPr b="1">
+                    <a:solidFill>
+                      <a:srgbClr val="007020"/>
+                    </a:solidFill>
+                    <a:latin typeface="Courier"/>
+                  </a:rPr>
+                  <a:t>in</a:t>
+                </a:r>
+                <a:r>
+                  <a:rPr>
+                    <a:latin typeface="Courier"/>
+                  </a:rPr>
+                  <a:t> </a:t>
+                </a:r>
+                <a:r>
+                  <a:rPr>
+                    <a:solidFill>
+                      <a:srgbClr val="40A070"/>
+                    </a:solidFill>
+                    <a:latin typeface="Courier"/>
+                  </a:rPr>
+                  <a:t>1</a:t>
+                </a:r>
+                <a:r>
+                  <a:rPr>
+                    <a:solidFill>
+                      <a:srgbClr val="4070A0"/>
+                    </a:solidFill>
+                    <a:latin typeface="Courier"/>
+                  </a:rPr>
+                  <a:t>:</a:t>
+                </a:r>
+                <a:r>
+                  <a:rPr>
+                    <a:latin typeface="Courier"/>
+                  </a:rPr>
+                  <a:t>times) {</a:t>
+                </a:r>
+                <a:br/>
+                <a:r>
+                  <a:rPr>
+                    <a:latin typeface="Courier"/>
+                  </a:rPr>
+                  <a:t>        </a:t>
+                </a:r>
+                <a:r>
+                  <a:rPr i="1">
+                    <a:solidFill>
+                      <a:srgbClr val="60A0B0"/>
+                    </a:solidFill>
+                    <a:latin typeface="Courier"/>
+                  </a:rPr>
+                  <a:t># LDH activity in 8 C treatment</a:t>
+                </a:r>
+                <a:br/>
+                <a:r>
+                  <a:rPr>
+                    <a:latin typeface="Courier"/>
+                  </a:rPr>
+                  <a:t>        trt_8C </a:t>
+                </a:r>
+                <a:r>
+                  <a:rPr>
+                    <a:solidFill>
+                      <a:srgbClr val="007020"/>
+                    </a:solidFill>
+                    <a:latin typeface="Courier"/>
+                  </a:rPr>
+                  <a:t>&lt;-</a:t>
+                </a:r>
+                <a:r>
+                  <a:rPr>
+                    <a:latin typeface="Courier"/>
+                  </a:rPr>
+                  <a:t> </a:t>
+                </a:r>
+                <a:r>
+                  <a:rPr>
+                    <a:solidFill>
+                      <a:srgbClr val="06287E"/>
+                    </a:solidFill>
+                    <a:latin typeface="Courier"/>
+                  </a:rPr>
+                  <a:t>rnorm</a:t>
+                </a:r>
+                <a:r>
+                  <a:rPr>
+                    <a:latin typeface="Courier"/>
+                  </a:rPr>
+                  <a:t>(</a:t>
+                </a:r>
+                <a:r>
+                  <a:rPr>
+                    <a:solidFill>
+                      <a:srgbClr val="40A070"/>
+                    </a:solidFill>
+                    <a:latin typeface="Courier"/>
+                  </a:rPr>
+                  <a:t>10</a:t>
+                </a:r>
+                <a:r>
+                  <a:rPr>
+                    <a:latin typeface="Courier"/>
+                  </a:rPr>
+                  <a:t>, </a:t>
+                </a:r>
+                <a:r>
+                  <a:rPr>
+                    <a:solidFill>
+                      <a:srgbClr val="40A070"/>
+                    </a:solidFill>
+                    <a:latin typeface="Courier"/>
+                  </a:rPr>
+                  <a:t>0.4</a:t>
+                </a:r>
+                <a:r>
+                  <a:rPr>
+                    <a:latin typeface="Courier"/>
+                  </a:rPr>
+                  <a:t>, </a:t>
+                </a:r>
+                <a:r>
+                  <a:rPr>
+                    <a:solidFill>
+                      <a:srgbClr val="40A070"/>
+                    </a:solidFill>
+                    <a:latin typeface="Courier"/>
+                  </a:rPr>
+                  <a:t>0.5</a:t>
+                </a:r>
+                <a:r>
+                  <a:rPr>
+                    <a:latin typeface="Courier"/>
+                  </a:rPr>
+                  <a:t>)</a:t>
+                </a:r>
+                <a:br/>
+                <a:br/>
+                <a:r>
+                  <a:rPr>
+                    <a:latin typeface="Courier"/>
+                  </a:rPr>
+                  <a:t>        </a:t>
+                </a:r>
+                <a:r>
+                  <a:rPr i="1">
+                    <a:solidFill>
+                      <a:srgbClr val="60A0B0"/>
+                    </a:solidFill>
+                    <a:latin typeface="Courier"/>
+                  </a:rPr>
+                  <a:t># LDH activity in 26 C treatment</a:t>
+                </a:r>
+                <a:br/>
+                <a:r>
+                  <a:rPr>
+                    <a:latin typeface="Courier"/>
+                  </a:rPr>
+                  <a:t>        trt_26C </a:t>
+                </a:r>
+                <a:r>
+                  <a:rPr>
+                    <a:solidFill>
+                      <a:srgbClr val="007020"/>
+                    </a:solidFill>
+                    <a:latin typeface="Courier"/>
+                  </a:rPr>
+                  <a:t>&lt;-</a:t>
+                </a:r>
+                <a:r>
+                  <a:rPr>
+                    <a:latin typeface="Courier"/>
+                  </a:rPr>
+                  <a:t> </a:t>
+                </a:r>
+                <a:r>
+                  <a:rPr>
+                    <a:solidFill>
+                      <a:srgbClr val="06287E"/>
+                    </a:solidFill>
+                    <a:latin typeface="Courier"/>
+                  </a:rPr>
+                  <a:t>rnorm</a:t>
+                </a:r>
+                <a:r>
+                  <a:rPr>
+                    <a:latin typeface="Courier"/>
+                  </a:rPr>
+                  <a:t>(</a:t>
+                </a:r>
+                <a:r>
+                  <a:rPr>
+                    <a:solidFill>
+                      <a:srgbClr val="40A070"/>
+                    </a:solidFill>
+                    <a:latin typeface="Courier"/>
+                  </a:rPr>
+                  <a:t>10</a:t>
+                </a:r>
+                <a:r>
+                  <a:rPr>
+                    <a:latin typeface="Courier"/>
+                  </a:rPr>
+                  <a:t>, </a:t>
+                </a:r>
+                <a:r>
+                  <a:rPr>
+                    <a:solidFill>
+                      <a:srgbClr val="40A070"/>
+                    </a:solidFill>
+                    <a:latin typeface="Courier"/>
+                  </a:rPr>
+                  <a:t>0.6</a:t>
+                </a:r>
+                <a:r>
+                  <a:rPr>
+                    <a:latin typeface="Courier"/>
+                  </a:rPr>
+                  <a:t>, </a:t>
+                </a:r>
+                <a:r>
+                  <a:rPr>
+                    <a:solidFill>
+                      <a:srgbClr val="40A070"/>
+                    </a:solidFill>
+                    <a:latin typeface="Courier"/>
+                  </a:rPr>
+                  <a:t>0.2</a:t>
+                </a:r>
+                <a:r>
+                  <a:rPr>
+                    <a:latin typeface="Courier"/>
+                  </a:rPr>
+                  <a:t>)</a:t>
+                </a:r>
+                <a:br/>
+                <a:br/>
+                <a:r>
+                  <a:rPr>
+                    <a:latin typeface="Courier"/>
+                  </a:rPr>
+                  <a:t>        </a:t>
+                </a:r>
+                <a:r>
+                  <a:rPr i="1">
+                    <a:solidFill>
+                      <a:srgbClr val="60A0B0"/>
+                    </a:solidFill>
+                    <a:latin typeface="Courier"/>
+                  </a:rPr>
+                  <a:t># What's the difference, i.e., effect size, between treatments?</a:t>
+                </a:r>
+                <a:br/>
+                <a:r>
+                  <a:rPr>
+                    <a:latin typeface="Courier"/>
+                  </a:rPr>
+                  <a:t>        dat[i, </a:t>
+                </a:r>
+                <a:r>
+                  <a:rPr>
+                    <a:solidFill>
+                      <a:srgbClr val="40A070"/>
+                    </a:solidFill>
+                    <a:latin typeface="Courier"/>
+                  </a:rPr>
+                  <a:t>1</a:t>
+                </a:r>
+                <a:r>
+                  <a:rPr>
+                    <a:latin typeface="Courier"/>
+                  </a:rPr>
+                  <a:t>] </a:t>
+                </a:r>
+                <a:r>
+                  <a:rPr>
+                    <a:solidFill>
+                      <a:srgbClr val="007020"/>
+                    </a:solidFill>
+                    <a:latin typeface="Courier"/>
+                  </a:rPr>
+                  <a:t>&lt;-</a:t>
+                </a:r>
+                <a:r>
+                  <a:rPr>
+                    <a:latin typeface="Courier"/>
+                  </a:rPr>
+                  <a:t> </a:t>
+                </a:r>
+                <a:r>
+                  <a:rPr>
+                    <a:solidFill>
+                      <a:srgbClr val="06287E"/>
+                    </a:solidFill>
+                    <a:latin typeface="Courier"/>
+                  </a:rPr>
+                  <a:t>mean</a:t>
+                </a:r>
+                <a:r>
+                  <a:rPr>
+                    <a:latin typeface="Courier"/>
+                  </a:rPr>
+                  <a:t>(trt_26C </a:t>
+                </a:r>
+                <a:r>
+                  <a:rPr>
+                    <a:solidFill>
+                      <a:srgbClr val="4070A0"/>
+                    </a:solidFill>
+                    <a:latin typeface="Courier"/>
+                  </a:rPr>
+                  <a:t>-</a:t>
+                </a:r>
+                <a:r>
+                  <a:rPr>
+                    <a:latin typeface="Courier"/>
+                  </a:rPr>
+                  <a:t> trt_8C)</a:t>
+                </a:r>
+                <a:br/>
+                <a:r>
+                  <a:rPr>
+                    <a:latin typeface="Courier"/>
+                  </a:rPr>
+                  <a:t>        dat[i, </a:t>
+                </a:r>
+                <a:r>
+                  <a:rPr>
+                    <a:solidFill>
+                      <a:srgbClr val="40A070"/>
+                    </a:solidFill>
+                    <a:latin typeface="Courier"/>
+                  </a:rPr>
+                  <a:t>2</a:t>
+                </a:r>
+                <a:r>
+                  <a:rPr>
+                    <a:latin typeface="Courier"/>
+                  </a:rPr>
+                  <a:t>] </a:t>
+                </a:r>
+                <a:r>
+                  <a:rPr>
+                    <a:solidFill>
+                      <a:srgbClr val="007020"/>
+                    </a:solidFill>
+                    <a:latin typeface="Courier"/>
+                  </a:rPr>
+                  <a:t>&lt;-</a:t>
+                </a:r>
+                <a:r>
+                  <a:rPr>
+                    <a:latin typeface="Courier"/>
+                  </a:rPr>
+                  <a:t> </a:t>
+                </a:r>
+                <a:r>
+                  <a:rPr>
+                    <a:solidFill>
+                      <a:srgbClr val="06287E"/>
+                    </a:solidFill>
+                    <a:latin typeface="Courier"/>
+                  </a:rPr>
+                  <a:t>t.test</a:t>
+                </a:r>
+                <a:r>
+                  <a:rPr>
+                    <a:latin typeface="Courier"/>
+                  </a:rPr>
+                  <a:t>(trt_26C, trt_8C)</a:t>
+                </a:r>
+                <a:r>
+                  <a:rPr>
+                    <a:solidFill>
+                      <a:srgbClr val="4070A0"/>
+                    </a:solidFill>
+                    <a:latin typeface="Courier"/>
+                  </a:rPr>
+                  <a:t>$</a:t>
+                </a:r>
+                <a:r>
+                  <a:rPr>
+                    <a:latin typeface="Courier"/>
+                  </a:rPr>
+                  <a:t>p.value</a:t>
+                </a:r>
+                <a:br/>
+                <a:br/>
+                <a:r>
+                  <a:rPr>
+                    <a:latin typeface="Courier"/>
+                  </a:rPr>
+                  <a:t>    }</a:t>
+                </a:r>
+                <a:br/>
+                <a:r>
+                  <a:rPr>
+                    <a:latin typeface="Courier"/>
+                  </a:rPr>
+                  <a:t>    </a:t>
+                </a:r>
+                <a:r>
+                  <a:rPr>
+                    <a:solidFill>
+                      <a:srgbClr val="06287E"/>
+                    </a:solidFill>
+                    <a:latin typeface="Courier"/>
+                  </a:rPr>
+                  <a:t>names</a:t>
+                </a:r>
+                <a:r>
+                  <a:rPr>
+                    <a:latin typeface="Courier"/>
+                  </a:rPr>
+                  <a:t>(dat) </a:t>
+                </a:r>
+                <a:r>
+                  <a:rPr>
+                    <a:solidFill>
+                      <a:srgbClr val="007020"/>
+                    </a:solidFill>
+                    <a:latin typeface="Courier"/>
+                  </a:rPr>
+                  <a:t>&lt;-</a:t>
+                </a:r>
+                <a:r>
+                  <a:rPr>
+                    <a:latin typeface="Courier"/>
+                  </a:rPr>
+                  <a:t> </a:t>
+                </a:r>
+                <a:r>
+                  <a:rPr>
+                    <a:solidFill>
+                      <a:srgbClr val="06287E"/>
+                    </a:solidFill>
+                    <a:latin typeface="Courier"/>
+                  </a:rPr>
+                  <a:t>c</a:t>
+                </a:r>
+                <a:r>
+                  <a:rPr>
+                    <a:latin typeface="Courier"/>
+                  </a:rPr>
+                  <a:t>(</a:t>
+                </a:r>
+                <a:r>
+                  <a:rPr>
+                    <a:solidFill>
+                      <a:srgbClr val="4070A0"/>
+                    </a:solidFill>
+                    <a:latin typeface="Courier"/>
+                  </a:rPr>
+                  <a:t>"effect"</a:t>
+                </a:r>
+                <a:r>
+                  <a:rPr>
+                    <a:latin typeface="Courier"/>
+                  </a:rPr>
+                  <a:t>, </a:t>
+                </a:r>
+                <a:r>
+                  <a:rPr>
+                    <a:solidFill>
+                      <a:srgbClr val="4070A0"/>
+                    </a:solidFill>
+                    <a:latin typeface="Courier"/>
+                  </a:rPr>
+                  <a:t>"p"</a:t>
+                </a:r>
+                <a:r>
+                  <a:rPr>
+                    <a:latin typeface="Courier"/>
+                  </a:rPr>
+                  <a:t>)</a:t>
+                </a:r>
+                <a:br/>
+                <a:r>
+                  <a:rPr>
+                    <a:latin typeface="Courier"/>
+                  </a:rPr>
+                  <a:t>    </a:t>
+                </a:r>
+                <a:r>
+                  <a:rPr>
+                    <a:solidFill>
+                      <a:srgbClr val="06287E"/>
+                    </a:solidFill>
+                    <a:latin typeface="Courier"/>
+                  </a:rPr>
+                  <a:t>return</a:t>
+                </a:r>
+                <a:r>
+                  <a:rPr>
+                    <a:latin typeface="Courier"/>
+                  </a:rPr>
+                  <a:t>(dat)</a:t>
+                </a:r>
+                <a:br/>
+                <a:r>
+                  <a:rPr>
+                    <a:latin typeface="Courier"/>
+                  </a:rPr>
+                  <a:t>}</a:t>
+                </a:r>
+                <a:br/>
+                <a:br/>
+                <a:r>
+                  <a:rPr>
+                    <a:latin typeface="Courier"/>
+                  </a:rPr>
+                  <a:t>expts </a:t>
+                </a:r>
+                <a:r>
+                  <a:rPr>
+                    <a:solidFill>
+                      <a:srgbClr val="007020"/>
+                    </a:solidFill>
+                    <a:latin typeface="Courier"/>
+                  </a:rPr>
+                  <a:t>&lt;-</a:t>
+                </a:r>
+                <a:r>
+                  <a:rPr>
+                    <a:latin typeface="Courier"/>
+                  </a:rPr>
+                  <a:t> </a:t>
+                </a:r>
+                <a:r>
+                  <a:rPr>
+                    <a:solidFill>
+                      <a:srgbClr val="06287E"/>
+                    </a:solidFill>
+                    <a:latin typeface="Courier"/>
+                  </a:rPr>
+                  <a:t>experiment</a:t>
+                </a:r>
+                <a:r>
+                  <a:rPr>
+                    <a:latin typeface="Courier"/>
+                  </a:rPr>
+                  <a:t>(</a:t>
+                </a:r>
+                <a:r>
+                  <a:rPr>
+                    <a:solidFill>
+                      <a:srgbClr val="40A070"/>
+                    </a:solidFill>
+                    <a:latin typeface="Courier"/>
+                  </a:rPr>
+                  <a:t>10000</a:t>
+                </a:r>
+                <a:r>
+                  <a:rPr>
+                    <a:latin typeface="Courier"/>
+                  </a:rPr>
+                  <a:t>)</a:t>
+                </a:r>
+              </a:p>
+              <a:p>
+                <a:pPr lvl="0" indent="0" marL="0">
+                  <a:spcBef>
+                    <a:spcPts val="3000"/>
+                  </a:spcBef>
+                  <a:buNone/>
+                </a:pPr>
+                <a:r>
+                  <a:rPr b="1"/>
+                  <a:t>Figure</a:t>
+                </a:r>
+              </a:p>
             </p:txBody>
           </p:sp>
         </mc:Choice>
       </mc:AlternateContent>
+      <p:pic>
+        <p:nvPicPr>
+          <p:cNvPr descr="code_slides_files/figure-pptx/simfig-1.png" id="0" name="Picture 1"/>
+          <p:cNvPicPr>
+            <a:picLocks noGrp="1" noChangeAspect="1"/>
+          </p:cNvPicPr>
+          <p:nvPr/>
+        </p:nvPicPr>
+        <p:blipFill>
+          <a:blip r:embed="rId2"/>
+          <a:stretch>
+            <a:fillRect/>
+          </a:stretch>
+        </p:blipFill>
+        <p:spPr bwMode="auto">
+          <a:xfrm>
+            <a:off x="3568700" y="355600"/>
+            <a:ext cx="5105400" cy="4089400"/>
+          </a:xfrm>
+          <a:prstGeom prst="rect">
+            <a:avLst/>
+          </a:prstGeom>
+          <a:noFill/>
+          <a:ln w="9525">
+            <a:noFill/>
+            <a:headEnd/>
+            <a:tailEnd/>
+          </a:ln>
+        </p:spPr>
+      </p:pic>
     </p:spTree>
   </p:cSld>
   <p:timing>
@@ -3367,9 +4420,9 @@
                                           </p:stCondLst>
                                         </p:cTn>
                                         <p:tgtEl>
-                                          <p:spTgt spid="3">
+                                          <p:spTgt spid="4">
                                             <p:txEl>
-                                              <p:pRg st="4" end="4"/>
+                                              <p:pRg st="5" end="5"/>
                                             </p:txEl>
                                           </p:spTgt>
                                         </p:tgtEl>
@@ -3416,9 +4469,9 @@
                                           </p:stCondLst>
                                         </p:cTn>
                                         <p:tgtEl>
-                                          <p:spTgt spid="3">
+                                          <p:spTgt spid="4">
                                             <p:txEl>
-                                              <p:pRg st="5" end="5"/>
+                                              <p:pRg st="6" end="6"/>
                                             </p:txEl>
                                           </p:spTgt>
                                         </p:tgtEl>
@@ -3461,7 +4514,7 @@
       </p:par>
     </p:tnLst>
     <p:bldLst>
-      <p:bldP spid="3" grpId="0" uiExpand="1" build="p"/>
+      <p:bldP spid="4" grpId="0" uiExpand="1" build="p"/>
     </p:bldLst>
   </p:timing>
 </p:sld>
@@ -3484,1238 +4537,6 @@
           <a:chExt cx="0" cy="0"/>
         </a:xfrm>
       </p:grpSpPr>
-      <p:sp>
-        <p:nvSpPr>
-          <p:cNvPr id="2" name="Title 1"/>
-          <p:cNvSpPr>
-            <a:spLocks noGrp="1"/>
-          </p:cNvSpPr>
-          <p:nvPr>
-            <p:ph type="title"/>
-          </p:nvPr>
-        </p:nvSpPr>
-        <p:spPr/>
-        <p:txBody>
-          <a:bodyPr/>
-          <a:lstStyle/>
-          <a:p>
-            <a:pPr lvl="0" indent="0" marL="0">
-              <a:buNone/>
-            </a:pPr>
-            <a:r>
-              <a:rPr/>
-              <a:t>Slide with R Output</a:t>
-            </a:r>
-          </a:p>
-        </p:txBody>
-      </p:sp>
-      <p:sp>
-        <p:nvSpPr>
-          <p:cNvPr id="3" name="Content Placeholder 2"/>
-          <p:cNvSpPr>
-            <a:spLocks noGrp="1"/>
-          </p:cNvSpPr>
-          <p:nvPr>
-            <p:ph idx="1"/>
-          </p:nvPr>
-        </p:nvSpPr>
-        <p:spPr/>
-        <p:txBody>
-          <a:bodyPr/>
-          <a:lstStyle/>
-          <a:p>
-            <a:pPr lvl="0" indent="0">
-              <a:buNone/>
-            </a:pPr>
-            <a:r>
-              <a:rPr i="1">
-                <a:solidFill>
-                  <a:srgbClr val="60A0B0"/>
-                </a:solidFill>
-                <a:latin typeface="Courier"/>
-              </a:rPr>
-              <a:t># LDH activity in 8 C treatment</a:t>
-            </a:r>
-            <a:br/>
-            <a:r>
-              <a:rPr>
-                <a:latin typeface="Courier"/>
-              </a:rPr>
-              <a:t>trt_8C </a:t>
-            </a:r>
-            <a:r>
-              <a:rPr>
-                <a:solidFill>
-                  <a:srgbClr val="007020"/>
-                </a:solidFill>
-                <a:latin typeface="Courier"/>
-              </a:rPr>
-              <a:t>&lt;-</a:t>
-            </a:r>
-            <a:r>
-              <a:rPr>
-                <a:latin typeface="Courier"/>
-              </a:rPr>
-              <a:t> </a:t>
-            </a:r>
-            <a:r>
-              <a:rPr>
-                <a:solidFill>
-                  <a:srgbClr val="06287E"/>
-                </a:solidFill>
-                <a:latin typeface="Courier"/>
-              </a:rPr>
-              <a:t>rnorm</a:t>
-            </a:r>
-            <a:r>
-              <a:rPr>
-                <a:latin typeface="Courier"/>
-              </a:rPr>
-              <a:t>(</a:t>
-            </a:r>
-            <a:r>
-              <a:rPr>
-                <a:solidFill>
-                  <a:srgbClr val="40A070"/>
-                </a:solidFill>
-                <a:latin typeface="Courier"/>
-              </a:rPr>
-              <a:t>10</a:t>
-            </a:r>
-            <a:r>
-              <a:rPr>
-                <a:latin typeface="Courier"/>
-              </a:rPr>
-              <a:t>, </a:t>
-            </a:r>
-            <a:r>
-              <a:rPr>
-                <a:solidFill>
-                  <a:srgbClr val="40A070"/>
-                </a:solidFill>
-                <a:latin typeface="Courier"/>
-              </a:rPr>
-              <a:t>0.4</a:t>
-            </a:r>
-            <a:r>
-              <a:rPr>
-                <a:latin typeface="Courier"/>
-              </a:rPr>
-              <a:t>, </a:t>
-            </a:r>
-            <a:r>
-              <a:rPr>
-                <a:solidFill>
-                  <a:srgbClr val="40A070"/>
-                </a:solidFill>
-                <a:latin typeface="Courier"/>
-              </a:rPr>
-              <a:t>0.5</a:t>
-            </a:r>
-            <a:r>
-              <a:rPr>
-                <a:latin typeface="Courier"/>
-              </a:rPr>
-              <a:t>)</a:t>
-            </a:r>
-            <a:br/>
-            <a:br/>
-            <a:r>
-              <a:rPr i="1">
-                <a:solidFill>
-                  <a:srgbClr val="60A0B0"/>
-                </a:solidFill>
-                <a:latin typeface="Courier"/>
-              </a:rPr>
-              <a:t># LDH activity in 26 C treatment</a:t>
-            </a:r>
-            <a:br/>
-            <a:r>
-              <a:rPr>
-                <a:latin typeface="Courier"/>
-              </a:rPr>
-              <a:t>trt_26C </a:t>
-            </a:r>
-            <a:r>
-              <a:rPr>
-                <a:solidFill>
-                  <a:srgbClr val="007020"/>
-                </a:solidFill>
-                <a:latin typeface="Courier"/>
-              </a:rPr>
-              <a:t>&lt;-</a:t>
-            </a:r>
-            <a:r>
-              <a:rPr>
-                <a:latin typeface="Courier"/>
-              </a:rPr>
-              <a:t> </a:t>
-            </a:r>
-            <a:r>
-              <a:rPr>
-                <a:solidFill>
-                  <a:srgbClr val="06287E"/>
-                </a:solidFill>
-                <a:latin typeface="Courier"/>
-              </a:rPr>
-              <a:t>rnorm</a:t>
-            </a:r>
-            <a:r>
-              <a:rPr>
-                <a:latin typeface="Courier"/>
-              </a:rPr>
-              <a:t>(</a:t>
-            </a:r>
-            <a:r>
-              <a:rPr>
-                <a:solidFill>
-                  <a:srgbClr val="40A070"/>
-                </a:solidFill>
-                <a:latin typeface="Courier"/>
-              </a:rPr>
-              <a:t>10</a:t>
-            </a:r>
-            <a:r>
-              <a:rPr>
-                <a:latin typeface="Courier"/>
-              </a:rPr>
-              <a:t>, </a:t>
-            </a:r>
-            <a:r>
-              <a:rPr>
-                <a:solidFill>
-                  <a:srgbClr val="40A070"/>
-                </a:solidFill>
-                <a:latin typeface="Courier"/>
-              </a:rPr>
-              <a:t>0.6</a:t>
-            </a:r>
-            <a:r>
-              <a:rPr>
-                <a:latin typeface="Courier"/>
-              </a:rPr>
-              <a:t>, </a:t>
-            </a:r>
-            <a:r>
-              <a:rPr>
-                <a:solidFill>
-                  <a:srgbClr val="40A070"/>
-                </a:solidFill>
-                <a:latin typeface="Courier"/>
-              </a:rPr>
-              <a:t>0.2</a:t>
-            </a:r>
-            <a:r>
-              <a:rPr>
-                <a:latin typeface="Courier"/>
-              </a:rPr>
-              <a:t>)</a:t>
-            </a:r>
-            <a:br/>
-            <a:br/>
-            <a:r>
-              <a:rPr i="1">
-                <a:solidFill>
-                  <a:srgbClr val="60A0B0"/>
-                </a:solidFill>
-                <a:latin typeface="Courier"/>
-              </a:rPr>
-              <a:t># What's the difference, i.e., effect size, between treatments?</a:t>
-            </a:r>
-            <a:br/>
-            <a:r>
-              <a:rPr>
-                <a:solidFill>
-                  <a:srgbClr val="06287E"/>
-                </a:solidFill>
-                <a:latin typeface="Courier"/>
-              </a:rPr>
-              <a:t>mean</a:t>
-            </a:r>
-            <a:r>
-              <a:rPr>
-                <a:latin typeface="Courier"/>
-              </a:rPr>
-              <a:t>(trt_26C </a:t>
-            </a:r>
-            <a:r>
-              <a:rPr>
-                <a:solidFill>
-                  <a:srgbClr val="4070A0"/>
-                </a:solidFill>
-                <a:latin typeface="Courier"/>
-              </a:rPr>
-              <a:t>-</a:t>
-            </a:r>
-            <a:r>
-              <a:rPr>
-                <a:latin typeface="Courier"/>
-              </a:rPr>
-              <a:t> trt_8C)</a:t>
-            </a:r>
-          </a:p>
-          <a:p>
-            <a:pPr lvl="0" indent="0">
-              <a:buNone/>
-            </a:pPr>
-            <a:r>
-              <a:rPr>
-                <a:latin typeface="Courier"/>
-              </a:rPr>
-              <a:t>## [1] 0.07522093</a:t>
-            </a:r>
-          </a:p>
-          <a:p>
-            <a:pPr lvl="0" indent="0">
-              <a:buNone/>
-            </a:pPr>
-            <a:r>
-              <a:rPr>
-                <a:solidFill>
-                  <a:srgbClr val="06287E"/>
-                </a:solidFill>
-                <a:latin typeface="Courier"/>
-              </a:rPr>
-              <a:t>t.test</a:t>
-            </a:r>
-            <a:r>
-              <a:rPr>
-                <a:latin typeface="Courier"/>
-              </a:rPr>
-              <a:t>(trt_26C, trt_8C)</a:t>
-            </a:r>
-          </a:p>
-          <a:p>
-            <a:pPr lvl="0" indent="0">
-              <a:buNone/>
-            </a:pPr>
-            <a:r>
-              <a:rPr>
-                <a:latin typeface="Courier"/>
-              </a:rPr>
-              <a:t>## 
-##  Welch Two Sample t-test
-## 
-## data:  trt_26C and trt_8C
-## t = 0.48302, df = 11.994, p-value = 0.6378
-## alternative hypothesis: true difference in means is not equal to 0
-## 95 percent confidence interval:
-##  -0.2641075  0.4145493
-## sample estimates:
-## mean of x mean of y 
-## 0.5368183 0.4615974</a:t>
-            </a:r>
-          </a:p>
-        </p:txBody>
-      </p:sp>
-    </p:spTree>
-  </p:cSld>
-</p:sld>
-</file>
-
-<file path=ppt/slides/slide4.xml><?xml version="1.0" encoding="utf-8"?>
-<p:sld xmlns:a="http://schemas.openxmlformats.org/drawingml/2006/main" xmlns:r="http://schemas.openxmlformats.org/officeDocument/2006/relationships" xmlns:p="http://schemas.openxmlformats.org/presentationml/2006/main">
-  <p:cSld>
-    <p:spTree>
-      <p:nvGrpSpPr>
-        <p:cNvPr id="1" name=""/>
-        <p:cNvGrpSpPr/>
-        <p:nvPr/>
-      </p:nvGrpSpPr>
-      <p:grpSpPr>
-        <a:xfrm>
-          <a:off x="0" y="0"/>
-          <a:ext cx="0" cy="0"/>
-          <a:chOff x="0" y="0"/>
-          <a:chExt cx="0" cy="0"/>
-        </a:xfrm>
-      </p:grpSpPr>
-      <p:sp>
-        <p:nvSpPr>
-          <p:cNvPr id="2" name="Title 1"/>
-          <p:cNvSpPr>
-            <a:spLocks noGrp="1"/>
-          </p:cNvSpPr>
-          <p:nvPr>
-            <p:ph type="title"/>
-          </p:nvPr>
-        </p:nvSpPr>
-        <p:spPr/>
-        <p:txBody>
-          <a:bodyPr/>
-          <a:lstStyle/>
-          <a:p>
-            <a:pPr lvl="0" indent="0" marL="0">
-              <a:buNone/>
-            </a:pPr>
-            <a:r>
-              <a:rPr/>
-              <a:t>Do 1000s of experiments</a:t>
-            </a:r>
-          </a:p>
-        </p:txBody>
-      </p:sp>
-      <p:sp>
-        <p:nvSpPr>
-          <p:cNvPr id="3" name="Content Placeholder 2"/>
-          <p:cNvSpPr>
-            <a:spLocks noGrp="1"/>
-          </p:cNvSpPr>
-          <p:nvPr>
-            <p:ph idx="1"/>
-          </p:nvPr>
-        </p:nvSpPr>
-        <p:spPr/>
-        <p:txBody>
-          <a:bodyPr/>
-          <a:lstStyle/>
-          <a:p>
-            <a:pPr lvl="0" indent="0">
-              <a:buNone/>
-            </a:pPr>
-            <a:r>
-              <a:rPr>
-                <a:latin typeface="Courier"/>
-              </a:rPr>
-              <a:t>experiment </a:t>
-            </a:r>
-            <a:r>
-              <a:rPr>
-                <a:solidFill>
-                  <a:srgbClr val="007020"/>
-                </a:solidFill>
-                <a:latin typeface="Courier"/>
-              </a:rPr>
-              <a:t>&lt;-</a:t>
-            </a:r>
-            <a:r>
-              <a:rPr>
-                <a:latin typeface="Courier"/>
-              </a:rPr>
-              <a:t> </a:t>
-            </a:r>
-            <a:r>
-              <a:rPr b="1">
-                <a:solidFill>
-                  <a:srgbClr val="007020"/>
-                </a:solidFill>
-                <a:latin typeface="Courier"/>
-              </a:rPr>
-              <a:t>function</a:t>
-            </a:r>
-            <a:r>
-              <a:rPr>
-                <a:latin typeface="Courier"/>
-              </a:rPr>
-              <a:t>(times) {</a:t>
-            </a:r>
-            <a:br/>
-            <a:br/>
-            <a:r>
-              <a:rPr>
-                <a:latin typeface="Courier"/>
-              </a:rPr>
-              <a:t>    dat </a:t>
-            </a:r>
-            <a:r>
-              <a:rPr>
-                <a:solidFill>
-                  <a:srgbClr val="007020"/>
-                </a:solidFill>
-                <a:latin typeface="Courier"/>
-              </a:rPr>
-              <a:t>&lt;-</a:t>
-            </a:r>
-            <a:r>
-              <a:rPr>
-                <a:latin typeface="Courier"/>
-              </a:rPr>
-              <a:t> </a:t>
-            </a:r>
-            <a:r>
-              <a:rPr>
-                <a:solidFill>
-                  <a:srgbClr val="06287E"/>
-                </a:solidFill>
-                <a:latin typeface="Courier"/>
-              </a:rPr>
-              <a:t>data.frame</a:t>
-            </a:r>
-            <a:r>
-              <a:rPr>
-                <a:latin typeface="Courier"/>
-              </a:rPr>
-              <a:t>(</a:t>
-            </a:r>
-            <a:r>
-              <a:rPr>
-                <a:solidFill>
-                  <a:srgbClr val="06287E"/>
-                </a:solidFill>
-                <a:latin typeface="Courier"/>
-              </a:rPr>
-              <a:t>matrix</a:t>
-            </a:r>
-            <a:r>
-              <a:rPr>
-                <a:latin typeface="Courier"/>
-              </a:rPr>
-              <a:t>(</a:t>
-            </a:r>
-            <a:r>
-              <a:rPr>
-                <a:solidFill>
-                  <a:srgbClr val="7D9029"/>
-                </a:solidFill>
-                <a:latin typeface="Courier"/>
-              </a:rPr>
-              <a:t>nrow =</a:t>
-            </a:r>
-            <a:r>
-              <a:rPr>
-                <a:latin typeface="Courier"/>
-              </a:rPr>
-              <a:t> times, </a:t>
-            </a:r>
-            <a:r>
-              <a:rPr>
-                <a:solidFill>
-                  <a:srgbClr val="7D9029"/>
-                </a:solidFill>
-                <a:latin typeface="Courier"/>
-              </a:rPr>
-              <a:t>ncol =</a:t>
-            </a:r>
-            <a:r>
-              <a:rPr>
-                <a:latin typeface="Courier"/>
-              </a:rPr>
-              <a:t> </a:t>
-            </a:r>
-            <a:r>
-              <a:rPr>
-                <a:solidFill>
-                  <a:srgbClr val="40A070"/>
-                </a:solidFill>
-                <a:latin typeface="Courier"/>
-              </a:rPr>
-              <a:t>2</a:t>
-            </a:r>
-            <a:r>
-              <a:rPr>
-                <a:latin typeface="Courier"/>
-              </a:rPr>
-              <a:t>))</a:t>
-            </a:r>
-            <a:br/>
-            <a:br/>
-            <a:r>
-              <a:rPr>
-                <a:latin typeface="Courier"/>
-              </a:rPr>
-              <a:t>    </a:t>
-            </a:r>
-            <a:r>
-              <a:rPr b="1">
-                <a:solidFill>
-                  <a:srgbClr val="007020"/>
-                </a:solidFill>
-                <a:latin typeface="Courier"/>
-              </a:rPr>
-              <a:t>for</a:t>
-            </a:r>
-            <a:r>
-              <a:rPr>
-                <a:latin typeface="Courier"/>
-              </a:rPr>
-              <a:t> (i </a:t>
-            </a:r>
-            <a:r>
-              <a:rPr b="1">
-                <a:solidFill>
-                  <a:srgbClr val="007020"/>
-                </a:solidFill>
-                <a:latin typeface="Courier"/>
-              </a:rPr>
-              <a:t>in</a:t>
-            </a:r>
-            <a:r>
-              <a:rPr>
-                <a:latin typeface="Courier"/>
-              </a:rPr>
-              <a:t> </a:t>
-            </a:r>
-            <a:r>
-              <a:rPr>
-                <a:solidFill>
-                  <a:srgbClr val="40A070"/>
-                </a:solidFill>
-                <a:latin typeface="Courier"/>
-              </a:rPr>
-              <a:t>1</a:t>
-            </a:r>
-            <a:r>
-              <a:rPr>
-                <a:solidFill>
-                  <a:srgbClr val="4070A0"/>
-                </a:solidFill>
-                <a:latin typeface="Courier"/>
-              </a:rPr>
-              <a:t>:</a:t>
-            </a:r>
-            <a:r>
-              <a:rPr>
-                <a:latin typeface="Courier"/>
-              </a:rPr>
-              <a:t>times) {</a:t>
-            </a:r>
-            <a:br/>
-            <a:r>
-              <a:rPr>
-                <a:latin typeface="Courier"/>
-              </a:rPr>
-              <a:t>        </a:t>
-            </a:r>
-            <a:r>
-              <a:rPr i="1">
-                <a:solidFill>
-                  <a:srgbClr val="60A0B0"/>
-                </a:solidFill>
-                <a:latin typeface="Courier"/>
-              </a:rPr>
-              <a:t># LDH activity in 8 C treatment</a:t>
-            </a:r>
-            <a:br/>
-            <a:r>
-              <a:rPr>
-                <a:latin typeface="Courier"/>
-              </a:rPr>
-              <a:t>        trt_8C </a:t>
-            </a:r>
-            <a:r>
-              <a:rPr>
-                <a:solidFill>
-                  <a:srgbClr val="007020"/>
-                </a:solidFill>
-                <a:latin typeface="Courier"/>
-              </a:rPr>
-              <a:t>&lt;-</a:t>
-            </a:r>
-            <a:r>
-              <a:rPr>
-                <a:latin typeface="Courier"/>
-              </a:rPr>
-              <a:t> </a:t>
-            </a:r>
-            <a:r>
-              <a:rPr>
-                <a:solidFill>
-                  <a:srgbClr val="06287E"/>
-                </a:solidFill>
-                <a:latin typeface="Courier"/>
-              </a:rPr>
-              <a:t>rnorm</a:t>
-            </a:r>
-            <a:r>
-              <a:rPr>
-                <a:latin typeface="Courier"/>
-              </a:rPr>
-              <a:t>(</a:t>
-            </a:r>
-            <a:r>
-              <a:rPr>
-                <a:solidFill>
-                  <a:srgbClr val="40A070"/>
-                </a:solidFill>
-                <a:latin typeface="Courier"/>
-              </a:rPr>
-              <a:t>10</a:t>
-            </a:r>
-            <a:r>
-              <a:rPr>
-                <a:latin typeface="Courier"/>
-              </a:rPr>
-              <a:t>, </a:t>
-            </a:r>
-            <a:r>
-              <a:rPr>
-                <a:solidFill>
-                  <a:srgbClr val="40A070"/>
-                </a:solidFill>
-                <a:latin typeface="Courier"/>
-              </a:rPr>
-              <a:t>0.4</a:t>
-            </a:r>
-            <a:r>
-              <a:rPr>
-                <a:latin typeface="Courier"/>
-              </a:rPr>
-              <a:t>, </a:t>
-            </a:r>
-            <a:r>
-              <a:rPr>
-                <a:solidFill>
-                  <a:srgbClr val="40A070"/>
-                </a:solidFill>
-                <a:latin typeface="Courier"/>
-              </a:rPr>
-              <a:t>0.5</a:t>
-            </a:r>
-            <a:r>
-              <a:rPr>
-                <a:latin typeface="Courier"/>
-              </a:rPr>
-              <a:t>)</a:t>
-            </a:r>
-            <a:br/>
-            <a:br/>
-            <a:r>
-              <a:rPr>
-                <a:latin typeface="Courier"/>
-              </a:rPr>
-              <a:t>        </a:t>
-            </a:r>
-            <a:r>
-              <a:rPr i="1">
-                <a:solidFill>
-                  <a:srgbClr val="60A0B0"/>
-                </a:solidFill>
-                <a:latin typeface="Courier"/>
-              </a:rPr>
-              <a:t># LDH activity in 26 C treatment</a:t>
-            </a:r>
-            <a:br/>
-            <a:r>
-              <a:rPr>
-                <a:latin typeface="Courier"/>
-              </a:rPr>
-              <a:t>        trt_26C </a:t>
-            </a:r>
-            <a:r>
-              <a:rPr>
-                <a:solidFill>
-                  <a:srgbClr val="007020"/>
-                </a:solidFill>
-                <a:latin typeface="Courier"/>
-              </a:rPr>
-              <a:t>&lt;-</a:t>
-            </a:r>
-            <a:r>
-              <a:rPr>
-                <a:latin typeface="Courier"/>
-              </a:rPr>
-              <a:t> </a:t>
-            </a:r>
-            <a:r>
-              <a:rPr>
-                <a:solidFill>
-                  <a:srgbClr val="06287E"/>
-                </a:solidFill>
-                <a:latin typeface="Courier"/>
-              </a:rPr>
-              <a:t>rnorm</a:t>
-            </a:r>
-            <a:r>
-              <a:rPr>
-                <a:latin typeface="Courier"/>
-              </a:rPr>
-              <a:t>(</a:t>
-            </a:r>
-            <a:r>
-              <a:rPr>
-                <a:solidFill>
-                  <a:srgbClr val="40A070"/>
-                </a:solidFill>
-                <a:latin typeface="Courier"/>
-              </a:rPr>
-              <a:t>10</a:t>
-            </a:r>
-            <a:r>
-              <a:rPr>
-                <a:latin typeface="Courier"/>
-              </a:rPr>
-              <a:t>, </a:t>
-            </a:r>
-            <a:r>
-              <a:rPr>
-                <a:solidFill>
-                  <a:srgbClr val="40A070"/>
-                </a:solidFill>
-                <a:latin typeface="Courier"/>
-              </a:rPr>
-              <a:t>0.6</a:t>
-            </a:r>
-            <a:r>
-              <a:rPr>
-                <a:latin typeface="Courier"/>
-              </a:rPr>
-              <a:t>, </a:t>
-            </a:r>
-            <a:r>
-              <a:rPr>
-                <a:solidFill>
-                  <a:srgbClr val="40A070"/>
-                </a:solidFill>
-                <a:latin typeface="Courier"/>
-              </a:rPr>
-              <a:t>0.2</a:t>
-            </a:r>
-            <a:r>
-              <a:rPr>
-                <a:latin typeface="Courier"/>
-              </a:rPr>
-              <a:t>)</a:t>
-            </a:r>
-            <a:br/>
-            <a:br/>
-            <a:r>
-              <a:rPr>
-                <a:latin typeface="Courier"/>
-              </a:rPr>
-              <a:t>        </a:t>
-            </a:r>
-            <a:r>
-              <a:rPr i="1">
-                <a:solidFill>
-                  <a:srgbClr val="60A0B0"/>
-                </a:solidFill>
-                <a:latin typeface="Courier"/>
-              </a:rPr>
-              <a:t># What's the difference, i.e., effect size, between treatments?</a:t>
-            </a:r>
-            <a:br/>
-            <a:r>
-              <a:rPr>
-                <a:latin typeface="Courier"/>
-              </a:rPr>
-              <a:t>        dat[i, </a:t>
-            </a:r>
-            <a:r>
-              <a:rPr>
-                <a:solidFill>
-                  <a:srgbClr val="40A070"/>
-                </a:solidFill>
-                <a:latin typeface="Courier"/>
-              </a:rPr>
-              <a:t>1</a:t>
-            </a:r>
-            <a:r>
-              <a:rPr>
-                <a:latin typeface="Courier"/>
-              </a:rPr>
-              <a:t>] </a:t>
-            </a:r>
-            <a:r>
-              <a:rPr>
-                <a:solidFill>
-                  <a:srgbClr val="007020"/>
-                </a:solidFill>
-                <a:latin typeface="Courier"/>
-              </a:rPr>
-              <a:t>&lt;-</a:t>
-            </a:r>
-            <a:r>
-              <a:rPr>
-                <a:latin typeface="Courier"/>
-              </a:rPr>
-              <a:t> </a:t>
-            </a:r>
-            <a:r>
-              <a:rPr>
-                <a:solidFill>
-                  <a:srgbClr val="06287E"/>
-                </a:solidFill>
-                <a:latin typeface="Courier"/>
-              </a:rPr>
-              <a:t>mean</a:t>
-            </a:r>
-            <a:r>
-              <a:rPr>
-                <a:latin typeface="Courier"/>
-              </a:rPr>
-              <a:t>(trt_26C </a:t>
-            </a:r>
-            <a:r>
-              <a:rPr>
-                <a:solidFill>
-                  <a:srgbClr val="4070A0"/>
-                </a:solidFill>
-                <a:latin typeface="Courier"/>
-              </a:rPr>
-              <a:t>-</a:t>
-            </a:r>
-            <a:r>
-              <a:rPr>
-                <a:latin typeface="Courier"/>
-              </a:rPr>
-              <a:t> trt_8C)</a:t>
-            </a:r>
-            <a:br/>
-            <a:r>
-              <a:rPr>
-                <a:latin typeface="Courier"/>
-              </a:rPr>
-              <a:t>        dat[i, </a:t>
-            </a:r>
-            <a:r>
-              <a:rPr>
-                <a:solidFill>
-                  <a:srgbClr val="40A070"/>
-                </a:solidFill>
-                <a:latin typeface="Courier"/>
-              </a:rPr>
-              <a:t>2</a:t>
-            </a:r>
-            <a:r>
-              <a:rPr>
-                <a:latin typeface="Courier"/>
-              </a:rPr>
-              <a:t>] </a:t>
-            </a:r>
-            <a:r>
-              <a:rPr>
-                <a:solidFill>
-                  <a:srgbClr val="007020"/>
-                </a:solidFill>
-                <a:latin typeface="Courier"/>
-              </a:rPr>
-              <a:t>&lt;-</a:t>
-            </a:r>
-            <a:r>
-              <a:rPr>
-                <a:latin typeface="Courier"/>
-              </a:rPr>
-              <a:t> </a:t>
-            </a:r>
-            <a:r>
-              <a:rPr>
-                <a:solidFill>
-                  <a:srgbClr val="06287E"/>
-                </a:solidFill>
-                <a:latin typeface="Courier"/>
-              </a:rPr>
-              <a:t>t.test</a:t>
-            </a:r>
-            <a:r>
-              <a:rPr>
-                <a:latin typeface="Courier"/>
-              </a:rPr>
-              <a:t>(trt_26C, trt_8C)</a:t>
-            </a:r>
-            <a:r>
-              <a:rPr>
-                <a:solidFill>
-                  <a:srgbClr val="4070A0"/>
-                </a:solidFill>
-                <a:latin typeface="Courier"/>
-              </a:rPr>
-              <a:t>$</a:t>
-            </a:r>
-            <a:r>
-              <a:rPr>
-                <a:latin typeface="Courier"/>
-              </a:rPr>
-              <a:t>p.value</a:t>
-            </a:r>
-            <a:br/>
-            <a:br/>
-            <a:r>
-              <a:rPr>
-                <a:latin typeface="Courier"/>
-              </a:rPr>
-              <a:t>    }</a:t>
-            </a:r>
-            <a:br/>
-            <a:r>
-              <a:rPr>
-                <a:latin typeface="Courier"/>
-              </a:rPr>
-              <a:t>    </a:t>
-            </a:r>
-            <a:r>
-              <a:rPr>
-                <a:solidFill>
-                  <a:srgbClr val="06287E"/>
-                </a:solidFill>
-                <a:latin typeface="Courier"/>
-              </a:rPr>
-              <a:t>names</a:t>
-            </a:r>
-            <a:r>
-              <a:rPr>
-                <a:latin typeface="Courier"/>
-              </a:rPr>
-              <a:t>(dat) </a:t>
-            </a:r>
-            <a:r>
-              <a:rPr>
-                <a:solidFill>
-                  <a:srgbClr val="007020"/>
-                </a:solidFill>
-                <a:latin typeface="Courier"/>
-              </a:rPr>
-              <a:t>&lt;-</a:t>
-            </a:r>
-            <a:r>
-              <a:rPr>
-                <a:latin typeface="Courier"/>
-              </a:rPr>
-              <a:t> </a:t>
-            </a:r>
-            <a:r>
-              <a:rPr>
-                <a:solidFill>
-                  <a:srgbClr val="06287E"/>
-                </a:solidFill>
-                <a:latin typeface="Courier"/>
-              </a:rPr>
-              <a:t>c</a:t>
-            </a:r>
-            <a:r>
-              <a:rPr>
-                <a:latin typeface="Courier"/>
-              </a:rPr>
-              <a:t>(</a:t>
-            </a:r>
-            <a:r>
-              <a:rPr>
-                <a:solidFill>
-                  <a:srgbClr val="4070A0"/>
-                </a:solidFill>
-                <a:latin typeface="Courier"/>
-              </a:rPr>
-              <a:t>"effect"</a:t>
-            </a:r>
-            <a:r>
-              <a:rPr>
-                <a:latin typeface="Courier"/>
-              </a:rPr>
-              <a:t>, </a:t>
-            </a:r>
-            <a:r>
-              <a:rPr>
-                <a:solidFill>
-                  <a:srgbClr val="4070A0"/>
-                </a:solidFill>
-                <a:latin typeface="Courier"/>
-              </a:rPr>
-              <a:t>"p"</a:t>
-            </a:r>
-            <a:r>
-              <a:rPr>
-                <a:latin typeface="Courier"/>
-              </a:rPr>
-              <a:t>)</a:t>
-            </a:r>
-            <a:br/>
-            <a:r>
-              <a:rPr>
-                <a:latin typeface="Courier"/>
-              </a:rPr>
-              <a:t>    </a:t>
-            </a:r>
-            <a:r>
-              <a:rPr>
-                <a:solidFill>
-                  <a:srgbClr val="06287E"/>
-                </a:solidFill>
-                <a:latin typeface="Courier"/>
-              </a:rPr>
-              <a:t>return</a:t>
-            </a:r>
-            <a:r>
-              <a:rPr>
-                <a:latin typeface="Courier"/>
-              </a:rPr>
-              <a:t>(dat)</a:t>
-            </a:r>
-            <a:br/>
-            <a:r>
-              <a:rPr>
-                <a:latin typeface="Courier"/>
-              </a:rPr>
-              <a:t>}</a:t>
-            </a:r>
-            <a:br/>
-            <a:br/>
-            <a:r>
-              <a:rPr>
-                <a:latin typeface="Courier"/>
-              </a:rPr>
-              <a:t>expts </a:t>
-            </a:r>
-            <a:r>
-              <a:rPr>
-                <a:solidFill>
-                  <a:srgbClr val="007020"/>
-                </a:solidFill>
-                <a:latin typeface="Courier"/>
-              </a:rPr>
-              <a:t>&lt;-</a:t>
-            </a:r>
-            <a:r>
-              <a:rPr>
-                <a:latin typeface="Courier"/>
-              </a:rPr>
-              <a:t> </a:t>
-            </a:r>
-            <a:r>
-              <a:rPr>
-                <a:solidFill>
-                  <a:srgbClr val="06287E"/>
-                </a:solidFill>
-                <a:latin typeface="Courier"/>
-              </a:rPr>
-              <a:t>experiment</a:t>
-            </a:r>
-            <a:r>
-              <a:rPr>
-                <a:latin typeface="Courier"/>
-              </a:rPr>
-              <a:t>(</a:t>
-            </a:r>
-            <a:r>
-              <a:rPr>
-                <a:solidFill>
-                  <a:srgbClr val="40A070"/>
-                </a:solidFill>
-                <a:latin typeface="Courier"/>
-              </a:rPr>
-              <a:t>10000</a:t>
-            </a:r>
-            <a:r>
-              <a:rPr>
-                <a:latin typeface="Courier"/>
-              </a:rPr>
-              <a:t>)</a:t>
-            </a:r>
-          </a:p>
-        </p:txBody>
-      </p:sp>
-    </p:spTree>
-  </p:cSld>
-</p:sld>
-</file>
-
-<file path=ppt/slides/slide5.xml><?xml version="1.0" encoding="utf-8"?>
-<p:sld xmlns:a="http://schemas.openxmlformats.org/drawingml/2006/main" xmlns:r="http://schemas.openxmlformats.org/officeDocument/2006/relationships" xmlns:p="http://schemas.openxmlformats.org/presentationml/2006/main">
-  <p:cSld>
-    <p:spTree>
-      <p:nvGrpSpPr>
-        <p:cNvPr id="1" name=""/>
-        <p:cNvGrpSpPr/>
-        <p:nvPr/>
-      </p:nvGrpSpPr>
-      <p:grpSpPr>
-        <a:xfrm>
-          <a:off x="0" y="0"/>
-          <a:ext cx="0" cy="0"/>
-          <a:chOff x="0" y="0"/>
-          <a:chExt cx="0" cy="0"/>
-        </a:xfrm>
-      </p:grpSpPr>
-      <p:sp>
-        <p:nvSpPr>
-          <p:cNvPr id="2" name="Title 1"/>
-          <p:cNvSpPr>
-            <a:spLocks noGrp="1"/>
-          </p:cNvSpPr>
-          <p:nvPr>
-            <p:ph type="title"/>
-          </p:nvPr>
-        </p:nvSpPr>
-        <p:spPr/>
-        <p:txBody>
-          <a:bodyPr/>
-          <a:lstStyle/>
-          <a:p>
-            <a:pPr lvl="0" indent="0" marL="0">
-              <a:buNone/>
-            </a:pPr>
-            <a:r>
-              <a:rPr/>
-              <a:t>Figure</a:t>
-            </a:r>
-          </a:p>
-        </p:txBody>
-      </p:sp>
-      <p:pic>
-        <p:nvPicPr>
-          <p:cNvPr descr="code_slides_files/figure-pptx/simfig-1.png" id="0" name="Picture 1"/>
-          <p:cNvPicPr>
-            <a:picLocks noGrp="1" noChangeAspect="1"/>
-          </p:cNvPicPr>
-          <p:nvPr/>
-        </p:nvPicPr>
-        <p:blipFill>
-          <a:blip r:embed="rId2"/>
-          <a:stretch>
-            <a:fillRect/>
-          </a:stretch>
-        </p:blipFill>
-        <p:spPr bwMode="auto">
-          <a:xfrm>
-            <a:off x="2451100" y="1193800"/>
-            <a:ext cx="4241800" cy="3390900"/>
-          </a:xfrm>
-          <a:prstGeom prst="rect">
-            <a:avLst/>
-          </a:prstGeom>
-          <a:noFill/>
-          <a:ln w="9525">
-            <a:noFill/>
-            <a:headEnd/>
-            <a:tailEnd/>
-          </a:ln>
-        </p:spPr>
-      </p:pic>
-    </p:spTree>
-  </p:cSld>
-</p:sld>
-</file>
-
-<file path=ppt/slides/slide6.xml><?xml version="1.0" encoding="utf-8"?>
-<p:sld xmlns:a="http://schemas.openxmlformats.org/drawingml/2006/main" xmlns:r="http://schemas.openxmlformats.org/officeDocument/2006/relationships" xmlns:p="http://schemas.openxmlformats.org/presentationml/2006/main">
-  <p:cSld>
-    <p:spTree>
-      <p:nvGrpSpPr>
-        <p:cNvPr id="1" name=""/>
-        <p:cNvGrpSpPr/>
-        <p:nvPr/>
-      </p:nvGrpSpPr>
-      <p:grpSpPr>
-        <a:xfrm>
-          <a:off x="0" y="0"/>
-          <a:ext cx="0" cy="0"/>
-          <a:chOff x="0" y="0"/>
-          <a:chExt cx="0" cy="0"/>
-        </a:xfrm>
-      </p:grpSpPr>
-      <p:sp>
-        <p:nvSpPr>
-          <p:cNvPr id="2" name="Title 1"/>
-          <p:cNvSpPr>
-            <a:spLocks noGrp="1"/>
-          </p:cNvSpPr>
-          <p:nvPr>
-            <p:ph type="title"/>
-          </p:nvPr>
-        </p:nvSpPr>
-        <p:spPr/>
-        <p:txBody>
-          <a:bodyPr/>
-          <a:lstStyle/>
-          <a:p>
-            <a:pPr lvl="0" indent="0" marL="0">
-              <a:buNone/>
-            </a:pPr>
-            <a:r>
-              <a:rPr/>
-              <a:t>errors</a:t>
-            </a:r>
-          </a:p>
-        </p:txBody>
-      </p:sp>
       <mc:AlternateContent xmlns:mc="http://schemas.openxmlformats.org/markup-compatibility/2006">
         <mc:Choice xmlns:a14="http://schemas.microsoft.com/office/drawing/2010/main" Requires="a14">
           <p:sp>
@@ -4732,6 +4553,23 @@
             <p:txBody>
               <a:bodyPr/>
               <a:lstStyle/>
+              <a:p>
+                <a:pPr lvl="0" indent="0" marL="0">
+                  <a:buNone/>
+                </a:pPr>
+              </a:p>
+              <a:p>
+                <a:pPr lvl="0" indent="0" marL="0">
+                  <a:spcBef>
+                    <a:spcPts val="3000"/>
+                  </a:spcBef>
+                  <a:buNone/>
+                </a:pPr>
+                <a:r>
+                  <a:rPr b="1"/>
+                  <a:t>errors</a:t>
+                </a:r>
+              </a:p>
               <a:p>
                 <a:pPr lvl="0" indent="0" marL="0">
                   <a:buNone/>
@@ -4824,7 +4662,753 @@
                   <a:rPr>
                     <a:latin typeface="Courier"/>
                   </a:rPr>
-                  <a:t>## [1] 0.173429</a:t>
+                  <a:t>## [1] 0.1706722</a:t>
+                </a:r>
+              </a:p>
+              <a:p>
+                <a:pPr lvl="0" indent="0" marL="0">
+                  <a:spcBef>
+                    <a:spcPts val="3000"/>
+                  </a:spcBef>
+                  <a:buNone/>
+                </a:pPr>
+                <a:r>
+                  <a:rPr b="1"/>
+                  <a:t>se</a:t>
+                </a:r>
+              </a:p>
+              <a:p>
+                <a:pPr lvl="0" indent="0">
+                  <a:buNone/>
+                </a:pPr>
+                <a:r>
+                  <a:rPr>
+                    <a:latin typeface="Courier"/>
+                  </a:rPr>
+                  <a:t>means </a:t>
+                </a:r>
+                <a:r>
+                  <a:rPr>
+                    <a:solidFill>
+                      <a:srgbClr val="007020"/>
+                    </a:solidFill>
+                    <a:latin typeface="Courier"/>
+                  </a:rPr>
+                  <a:t>&lt;-</a:t>
+                </a:r>
+                <a:r>
+                  <a:rPr>
+                    <a:latin typeface="Courier"/>
+                  </a:rPr>
+                  <a:t> </a:t>
+                </a:r>
+                <a:r>
+                  <a:rPr>
+                    <a:solidFill>
+                      <a:srgbClr val="06287E"/>
+                    </a:solidFill>
+                    <a:latin typeface="Courier"/>
+                  </a:rPr>
+                  <a:t>c</a:t>
+                </a:r>
+                <a:r>
+                  <a:rPr>
+                    <a:latin typeface="Courier"/>
+                  </a:rPr>
+                  <a:t>()</a:t>
+                </a:r>
+                <a:br/>
+                <a:br/>
+                <a:r>
+                  <a:rPr b="1">
+                    <a:solidFill>
+                      <a:srgbClr val="007020"/>
+                    </a:solidFill>
+                    <a:latin typeface="Courier"/>
+                  </a:rPr>
+                  <a:t>for</a:t>
+                </a:r>
+                <a:r>
+                  <a:rPr>
+                    <a:latin typeface="Courier"/>
+                  </a:rPr>
+                  <a:t> (i </a:t>
+                </a:r>
+                <a:r>
+                  <a:rPr b="1">
+                    <a:solidFill>
+                      <a:srgbClr val="007020"/>
+                    </a:solidFill>
+                    <a:latin typeface="Courier"/>
+                  </a:rPr>
+                  <a:t>in</a:t>
+                </a:r>
+                <a:r>
+                  <a:rPr>
+                    <a:latin typeface="Courier"/>
+                  </a:rPr>
+                  <a:t> </a:t>
+                </a:r>
+                <a:r>
+                  <a:rPr>
+                    <a:solidFill>
+                      <a:srgbClr val="40A070"/>
+                    </a:solidFill>
+                    <a:latin typeface="Courier"/>
+                  </a:rPr>
+                  <a:t>1</a:t>
+                </a:r>
+                <a:r>
+                  <a:rPr>
+                    <a:solidFill>
+                      <a:srgbClr val="4070A0"/>
+                    </a:solidFill>
+                    <a:latin typeface="Courier"/>
+                  </a:rPr>
+                  <a:t>:</a:t>
+                </a:r>
+                <a:r>
+                  <a:rPr>
+                    <a:solidFill>
+                      <a:srgbClr val="40A070"/>
+                    </a:solidFill>
+                    <a:latin typeface="Courier"/>
+                  </a:rPr>
+                  <a:t>1e+06</a:t>
+                </a:r>
+                <a:r>
+                  <a:rPr>
+                    <a:latin typeface="Courier"/>
+                  </a:rPr>
+                  <a:t>) {</a:t>
+                </a:r>
+                <a:br/>
+                <a:r>
+                  <a:rPr>
+                    <a:latin typeface="Courier"/>
+                  </a:rPr>
+                  <a:t>    mass </a:t>
+                </a:r>
+                <a:r>
+                  <a:rPr>
+                    <a:solidFill>
+                      <a:srgbClr val="007020"/>
+                    </a:solidFill>
+                    <a:latin typeface="Courier"/>
+                  </a:rPr>
+                  <a:t>&lt;-</a:t>
+                </a:r>
+                <a:r>
+                  <a:rPr>
+                    <a:latin typeface="Courier"/>
+                  </a:rPr>
+                  <a:t> </a:t>
+                </a:r>
+                <a:r>
+                  <a:rPr>
+                    <a:solidFill>
+                      <a:srgbClr val="06287E"/>
+                    </a:solidFill>
+                    <a:latin typeface="Courier"/>
+                  </a:rPr>
+                  <a:t>rnorm</a:t>
+                </a:r>
+                <a:r>
+                  <a:rPr>
+                    <a:latin typeface="Courier"/>
+                  </a:rPr>
+                  <a:t>(</a:t>
+                </a:r>
+                <a:r>
+                  <a:rPr>
+                    <a:solidFill>
+                      <a:srgbClr val="7D9029"/>
+                    </a:solidFill>
+                    <a:latin typeface="Courier"/>
+                  </a:rPr>
+                  <a:t>n =</a:t>
+                </a:r>
+                <a:r>
+                  <a:rPr>
+                    <a:latin typeface="Courier"/>
+                  </a:rPr>
+                  <a:t> </a:t>
+                </a:r>
+                <a:r>
+                  <a:rPr>
+                    <a:solidFill>
+                      <a:srgbClr val="40A070"/>
+                    </a:solidFill>
+                    <a:latin typeface="Courier"/>
+                  </a:rPr>
+                  <a:t>18</a:t>
+                </a:r>
+                <a:r>
+                  <a:rPr>
+                    <a:latin typeface="Courier"/>
+                  </a:rPr>
+                  <a:t>, </a:t>
+                </a:r>
+                <a:r>
+                  <a:rPr>
+                    <a:solidFill>
+                      <a:srgbClr val="7D9029"/>
+                    </a:solidFill>
+                    <a:latin typeface="Courier"/>
+                  </a:rPr>
+                  <a:t>mean =</a:t>
+                </a:r>
+                <a:r>
+                  <a:rPr>
+                    <a:latin typeface="Courier"/>
+                  </a:rPr>
+                  <a:t> </a:t>
+                </a:r>
+                <a:r>
+                  <a:rPr>
+                    <a:solidFill>
+                      <a:srgbClr val="40A070"/>
+                    </a:solidFill>
+                    <a:latin typeface="Courier"/>
+                  </a:rPr>
+                  <a:t>10.8</a:t>
+                </a:r>
+                <a:r>
+                  <a:rPr>
+                    <a:latin typeface="Courier"/>
+                  </a:rPr>
+                  <a:t>, </a:t>
+                </a:r>
+                <a:r>
+                  <a:rPr>
+                    <a:solidFill>
+                      <a:srgbClr val="7D9029"/>
+                    </a:solidFill>
+                    <a:latin typeface="Courier"/>
+                  </a:rPr>
+                  <a:t>sd =</a:t>
+                </a:r>
+                <a:r>
+                  <a:rPr>
+                    <a:latin typeface="Courier"/>
+                  </a:rPr>
+                  <a:t> </a:t>
+                </a:r>
+                <a:r>
+                  <a:rPr>
+                    <a:solidFill>
+                      <a:srgbClr val="40A070"/>
+                    </a:solidFill>
+                    <a:latin typeface="Courier"/>
+                  </a:rPr>
+                  <a:t>0.988</a:t>
+                </a:r>
+                <a:r>
+                  <a:rPr>
+                    <a:latin typeface="Courier"/>
+                  </a:rPr>
+                  <a:t>)</a:t>
+                </a:r>
+                <a:br/>
+                <a:r>
+                  <a:rPr>
+                    <a:latin typeface="Courier"/>
+                  </a:rPr>
+                  <a:t>    means </a:t>
+                </a:r>
+                <a:r>
+                  <a:rPr>
+                    <a:solidFill>
+                      <a:srgbClr val="007020"/>
+                    </a:solidFill>
+                    <a:latin typeface="Courier"/>
+                  </a:rPr>
+                  <a:t>&lt;-</a:t>
+                </a:r>
+                <a:r>
+                  <a:rPr>
+                    <a:latin typeface="Courier"/>
+                  </a:rPr>
+                  <a:t> </a:t>
+                </a:r>
+                <a:r>
+                  <a:rPr>
+                    <a:solidFill>
+                      <a:srgbClr val="06287E"/>
+                    </a:solidFill>
+                    <a:latin typeface="Courier"/>
+                  </a:rPr>
+                  <a:t>c</a:t>
+                </a:r>
+                <a:r>
+                  <a:rPr>
+                    <a:latin typeface="Courier"/>
+                  </a:rPr>
+                  <a:t>(means, </a:t>
+                </a:r>
+                <a:r>
+                  <a:rPr>
+                    <a:solidFill>
+                      <a:srgbClr val="06287E"/>
+                    </a:solidFill>
+                    <a:latin typeface="Courier"/>
+                  </a:rPr>
+                  <a:t>mean</a:t>
+                </a:r>
+                <a:r>
+                  <a:rPr>
+                    <a:latin typeface="Courier"/>
+                  </a:rPr>
+                  <a:t>(mass))</a:t>
+                </a:r>
+                <a:br/>
+                <a:r>
+                  <a:rPr>
+                    <a:latin typeface="Courier"/>
+                  </a:rPr>
+                  <a:t>}</a:t>
+                </a:r>
+                <a:br/>
+                <a:br/>
+                <a:r>
+                  <a:rPr i="1">
+                    <a:solidFill>
+                      <a:srgbClr val="60A0B0"/>
+                    </a:solidFill>
+                    <a:latin typeface="Courier"/>
+                  </a:rPr>
+                  <a:t># The mean of the means</a:t>
+                </a:r>
+                <a:br/>
+                <a:r>
+                  <a:rPr>
+                    <a:solidFill>
+                      <a:srgbClr val="06287E"/>
+                    </a:solidFill>
+                    <a:latin typeface="Courier"/>
+                  </a:rPr>
+                  <a:t>mean</a:t>
+                </a:r>
+                <a:r>
+                  <a:rPr>
+                    <a:latin typeface="Courier"/>
+                  </a:rPr>
+                  <a:t>(means)</a:t>
+                </a:r>
+                <a:br/>
+                <a:r>
+                  <a:rPr i="1">
+                    <a:solidFill>
+                      <a:srgbClr val="60A0B0"/>
+                    </a:solidFill>
+                    <a:latin typeface="Courier"/>
+                  </a:rPr>
+                  <a:t># The standard deviation of the means or standard error</a:t>
+                </a:r>
+                <a:br/>
+                <a:r>
+                  <a:rPr>
+                    <a:solidFill>
+                      <a:srgbClr val="06287E"/>
+                    </a:solidFill>
+                    <a:latin typeface="Courier"/>
+                  </a:rPr>
+                  <a:t>sd</a:t>
+                </a:r>
+                <a:r>
+                  <a:rPr>
+                    <a:latin typeface="Courier"/>
+                  </a:rPr>
+                  <a:t>(means)</a:t>
+                </a:r>
+              </a:p>
+              <a:p>
+                <a:pPr lvl="0" indent="0" marL="0">
+                  <a:spcBef>
+                    <a:spcPts val="3000"/>
+                  </a:spcBef>
+                  <a:buNone/>
+                </a:pPr>
+                <a:r>
+                  <a:rPr b="1"/>
+                  <a:t>Our analytical calculaton</a:t>
+                </a:r>
+              </a:p>
+              <a:p>
+                <a:pPr lvl="0" indent="0">
+                  <a:buNone/>
+                </a:pPr>
+                <a:r>
+                  <a:rPr>
+                    <a:latin typeface="Courier"/>
+                  </a:rPr>
+                  <a:t>se </a:t>
+                </a:r>
+                <a:r>
+                  <a:rPr>
+                    <a:solidFill>
+                      <a:srgbClr val="007020"/>
+                    </a:solidFill>
+                    <a:latin typeface="Courier"/>
+                  </a:rPr>
+                  <a:t>&lt;-</a:t>
+                </a:r>
+                <a:r>
+                  <a:rPr>
+                    <a:latin typeface="Courier"/>
+                  </a:rPr>
+                  <a:t> </a:t>
+                </a:r>
+                <a:r>
+                  <a:rPr>
+                    <a:solidFill>
+                      <a:srgbClr val="06287E"/>
+                    </a:solidFill>
+                    <a:latin typeface="Courier"/>
+                  </a:rPr>
+                  <a:t>sd</a:t>
+                </a:r>
+                <a:r>
+                  <a:rPr>
+                    <a:latin typeface="Courier"/>
+                  </a:rPr>
+                  <a:t>(mass)</a:t>
+                </a:r>
+                <a:r>
+                  <a:rPr>
+                    <a:solidFill>
+                      <a:srgbClr val="4070A0"/>
+                    </a:solidFill>
+                    <a:latin typeface="Courier"/>
+                  </a:rPr>
+                  <a:t>/</a:t>
+                </a:r>
+                <a:r>
+                  <a:rPr>
+                    <a:solidFill>
+                      <a:srgbClr val="06287E"/>
+                    </a:solidFill>
+                    <a:latin typeface="Courier"/>
+                  </a:rPr>
+                  <a:t>sqrt</a:t>
+                </a:r>
+                <a:r>
+                  <a:rPr>
+                    <a:latin typeface="Courier"/>
+                  </a:rPr>
+                  <a:t>(</a:t>
+                </a:r>
+                <a:r>
+                  <a:rPr>
+                    <a:solidFill>
+                      <a:srgbClr val="06287E"/>
+                    </a:solidFill>
+                    <a:latin typeface="Courier"/>
+                  </a:rPr>
+                  <a:t>length</a:t>
+                </a:r>
+                <a:r>
+                  <a:rPr>
+                    <a:latin typeface="Courier"/>
+                  </a:rPr>
+                  <a:t>(mass))</a:t>
+                </a:r>
+                <a:br/>
+                <a:r>
+                  <a:rPr>
+                    <a:latin typeface="Courier"/>
+                  </a:rPr>
+                  <a:t>se</a:t>
+                </a:r>
+              </a:p>
+              <a:p>
+                <a:pPr lvl="0" indent="0" marL="0">
+                  <a:spcBef>
+                    <a:spcPts val="3000"/>
+                  </a:spcBef>
+                  <a:buNone/>
+                </a:pPr>
+                <a:r>
+                  <a:rPr b="1"/>
+                  <a:t>Plots</a:t>
+                </a:r>
+              </a:p>
+              <a:p>
+                <a:pPr lvl="0" indent="0">
+                  <a:buNone/>
+                </a:pPr>
+                <a:r>
+                  <a:rPr>
+                    <a:solidFill>
+                      <a:srgbClr val="06287E"/>
+                    </a:solidFill>
+                    <a:latin typeface="Courier"/>
+                  </a:rPr>
+                  <a:t>ggplot</a:t>
+                </a:r>
+                <a:r>
+                  <a:rPr>
+                    <a:latin typeface="Courier"/>
+                  </a:rPr>
+                  <a:t>() </a:t>
+                </a:r>
+                <a:r>
+                  <a:rPr>
+                    <a:solidFill>
+                      <a:srgbClr val="4070A0"/>
+                    </a:solidFill>
+                    <a:latin typeface="Courier"/>
+                  </a:rPr>
+                  <a:t>+</a:t>
+                </a:r>
+                <a:r>
+                  <a:rPr>
+                    <a:latin typeface="Courier"/>
+                  </a:rPr>
+                  <a:t> </a:t>
+                </a:r>
+                <a:r>
+                  <a:rPr>
+                    <a:solidFill>
+                      <a:srgbClr val="06287E"/>
+                    </a:solidFill>
+                    <a:latin typeface="Courier"/>
+                  </a:rPr>
+                  <a:t>geom_histogram</a:t>
+                </a:r>
+                <a:r>
+                  <a:rPr>
+                    <a:latin typeface="Courier"/>
+                  </a:rPr>
+                  <a:t>(</a:t>
+                </a:r>
+                <a:r>
+                  <a:rPr>
+                    <a:solidFill>
+                      <a:srgbClr val="06287E"/>
+                    </a:solidFill>
+                    <a:latin typeface="Courier"/>
+                  </a:rPr>
+                  <a:t>aes</a:t>
+                </a:r>
+                <a:r>
+                  <a:rPr>
+                    <a:latin typeface="Courier"/>
+                  </a:rPr>
+                  <a:t>(</a:t>
+                </a:r>
+                <a:r>
+                  <a:rPr>
+                    <a:solidFill>
+                      <a:srgbClr val="7D9029"/>
+                    </a:solidFill>
+                    <a:latin typeface="Courier"/>
+                  </a:rPr>
+                  <a:t>x =</a:t>
+                </a:r>
+                <a:r>
+                  <a:rPr>
+                    <a:latin typeface="Courier"/>
+                  </a:rPr>
+                  <a:t> means))</a:t>
+                </a:r>
+              </a:p>
+              <a:p>
+                <a:pPr lvl="0" indent="0" marL="0">
+                  <a:spcBef>
+                    <a:spcPts val="3000"/>
+                  </a:spcBef>
+                  <a:buNone/>
+                </a:pPr>
+                <a:r>
+                  <a:rPr b="1"/>
+                  <a:t>Zr</a:t>
+                </a:r>
+              </a:p>
+              <a:p>
+                <a:pPr lvl="0" indent="0">
+                  <a:buNone/>
+                </a:pPr>
+                <a:r>
+                  <a:rPr>
+                    <a:latin typeface="Courier"/>
+                  </a:rPr>
+                  <a:t>zr_data </a:t>
+                </a:r>
+                <a:r>
+                  <a:rPr>
+                    <a:solidFill>
+                      <a:srgbClr val="007020"/>
+                    </a:solidFill>
+                    <a:latin typeface="Courier"/>
+                  </a:rPr>
+                  <a:t>&lt;-</a:t>
+                </a:r>
+                <a:r>
+                  <a:rPr>
+                    <a:latin typeface="Courier"/>
+                  </a:rPr>
+                  <a:t> </a:t>
+                </a:r>
+                <a:r>
+                  <a:rPr>
+                    <a:solidFill>
+                      <a:srgbClr val="06287E"/>
+                    </a:solidFill>
+                    <a:latin typeface="Courier"/>
+                  </a:rPr>
+                  <a:t>read.csv</a:t>
+                </a:r>
+                <a:r>
+                  <a:rPr>
+                    <a:latin typeface="Courier"/>
+                  </a:rPr>
+                  <a:t>(</a:t>
+                </a:r>
+                <a:r>
+                  <a:rPr>
+                    <a:solidFill>
+                      <a:srgbClr val="4070A0"/>
+                    </a:solidFill>
+                    <a:latin typeface="Courier"/>
+                  </a:rPr>
+                  <a:t>"https://raw.githubusercontent.com/daniel1noble/meta-workshop/gh-pages/data/ind_disp_raw_data.csv"</a:t>
+                </a:r>
+                <a:r>
+                  <a:rPr>
+                    <a:latin typeface="Courier"/>
+                  </a:rPr>
+                  <a:t>) </a:t>
+                </a:r>
+                <a:r>
+                  <a:rPr>
+                    <a:solidFill>
+                      <a:srgbClr val="4070A0"/>
+                    </a:solidFill>
+                    <a:latin typeface="Courier"/>
+                  </a:rPr>
+                  <a:t>%&gt;%</a:t>
+                </a:r>
+                <a:br/>
+                <a:r>
+                  <a:rPr>
+                    <a:latin typeface="Courier"/>
+                  </a:rPr>
+                  <a:t>  dplyr</a:t>
+                </a:r>
+                <a:r>
+                  <a:rPr>
+                    <a:solidFill>
+                      <a:srgbClr val="4070A0"/>
+                    </a:solidFill>
+                    <a:latin typeface="Courier"/>
+                  </a:rPr>
+                  <a:t>::</a:t>
+                </a:r>
+                <a:r>
+                  <a:rPr>
+                    <a:solidFill>
+                      <a:srgbClr val="06287E"/>
+                    </a:solidFill>
+                    <a:latin typeface="Courier"/>
+                  </a:rPr>
+                  <a:t>select</a:t>
+                </a:r>
+                <a:r>
+                  <a:rPr>
+                    <a:latin typeface="Courier"/>
+                  </a:rPr>
+                  <a:t>(study_ID, taxa, species, trait, response, response_unit, disp_trait, disp_unit, corr_coeff, sample_size) </a:t>
+                </a:r>
+                <a:r>
+                  <a:rPr>
+                    <a:solidFill>
+                      <a:srgbClr val="4070A0"/>
+                    </a:solidFill>
+                    <a:latin typeface="Courier"/>
+                  </a:rPr>
+                  <a:t>%&gt;%</a:t>
+                </a:r>
+                <a:r>
+                  <a:rPr>
+                    <a:latin typeface="Courier"/>
+                  </a:rPr>
+                  <a:t> </a:t>
+                </a:r>
+                <a:r>
+                  <a:rPr i="1">
+                    <a:solidFill>
+                      <a:srgbClr val="60A0B0"/>
+                    </a:solidFill>
+                    <a:latin typeface="Courier"/>
+                  </a:rPr>
+                  <a:t># remove irrelevant columns for this tutorial</a:t>
+                </a:r>
+                <a:br/>
+                <a:r>
+                  <a:rPr>
+                    <a:latin typeface="Courier"/>
+                  </a:rPr>
+                  <a:t>  dplyr</a:t>
+                </a:r>
+                <a:r>
+                  <a:rPr>
+                    <a:solidFill>
+                      <a:srgbClr val="4070A0"/>
+                    </a:solidFill>
+                    <a:latin typeface="Courier"/>
+                  </a:rPr>
+                  <a:t>::</a:t>
+                </a:r>
+                <a:r>
+                  <a:rPr>
+                    <a:solidFill>
+                      <a:srgbClr val="06287E"/>
+                    </a:solidFill>
+                    <a:latin typeface="Courier"/>
+                  </a:rPr>
+                  <a:t>top_n</a:t>
+                </a:r>
+                <a:r>
+                  <a:rPr>
+                    <a:latin typeface="Courier"/>
+                  </a:rPr>
+                  <a:t>(</a:t>
+                </a:r>
+                <a:r>
+                  <a:rPr>
+                    <a:solidFill>
+                      <a:srgbClr val="40A070"/>
+                    </a:solidFill>
+                    <a:latin typeface="Courier"/>
+                  </a:rPr>
+                  <a:t>10</a:t>
+                </a:r>
+                <a:r>
+                  <a:rPr>
+                    <a:latin typeface="Courier"/>
+                  </a:rPr>
+                  <a:t>) </a:t>
+                </a:r>
+                <a:r>
+                  <a:rPr i="1">
+                    <a:solidFill>
+                      <a:srgbClr val="60A0B0"/>
+                    </a:solidFill>
+                    <a:latin typeface="Courier"/>
+                  </a:rPr>
+                  <a:t># select first 10 effect sizes to illustrate escalc function</a:t>
+                </a:r>
+              </a:p>
+              <a:p>
+                <a:pPr lvl="0" indent="0">
+                  <a:buNone/>
+                </a:pPr>
+                <a:r>
+                  <a:rPr>
+                    <a:latin typeface="Courier"/>
+                  </a:rPr>
+                  <a:t>## Selecting by sample_size</a:t>
                 </a:r>
               </a:p>
             </p:txBody>
@@ -4836,7 +5420,7 @@
 </p:sld>
 </file>
 
-<file path=ppt/slides/slide7.xml><?xml version="1.0" encoding="utf-8"?>
+<file path=ppt/slides/slide4.xml><?xml version="1.0" encoding="utf-8"?>
 <p:sld xmlns:a="http://schemas.openxmlformats.org/drawingml/2006/main" xmlns:r="http://schemas.openxmlformats.org/officeDocument/2006/relationships" xmlns:p="http://schemas.openxmlformats.org/presentationml/2006/main">
   <p:cSld>
     <p:spTree>
@@ -4873,7 +5457,7 @@
             </a:pPr>
             <a:r>
               <a:rPr/>
-              <a:t>se</a:t>
+              <a:t>Effect calculation</a:t>
             </a:r>
           </a:p>
         </p:txBody>
@@ -4896,11 +5480,21 @@
             <a:pPr lvl="0" indent="0">
               <a:buNone/>
             </a:pPr>
+            <a:r>
+              <a:rPr i="1">
+                <a:solidFill>
+                  <a:srgbClr val="60A0B0"/>
+                </a:solidFill>
+                <a:latin typeface="Courier"/>
+              </a:rPr>
+              <a:t># Calculate Fisher's r-to-z transformed correlation coefficient (ZCOR) as yi = effect size and vi = sampling variances, where ri = raw correlation coefficients, and ni = sample size.</a:t>
+            </a:r>
+            <a:br/>
             <a:r>
               <a:rPr>
                 <a:latin typeface="Courier"/>
               </a:rPr>
-              <a:t>means </a:t>
+              <a:t>zr_data </a:t>
             </a:r>
             <a:r>
               <a:rPr>
@@ -4915,7 +5509,115 @@
               <a:rPr>
                 <a:latin typeface="Courier"/>
               </a:rPr>
+              <a:t> metafor</a:t>
+            </a:r>
+            <a:r>
+              <a:rPr>
+                <a:solidFill>
+                  <a:srgbClr val="4070A0"/>
+                </a:solidFill>
+                <a:latin typeface="Courier"/>
+              </a:rPr>
+              <a:t>::</a:t>
+            </a:r>
+            <a:r>
+              <a:rPr>
+                <a:solidFill>
+                  <a:srgbClr val="06287E"/>
+                </a:solidFill>
+                <a:latin typeface="Courier"/>
+              </a:rPr>
+              <a:t>escalc</a:t>
+            </a:r>
+            <a:r>
+              <a:rPr>
+                <a:latin typeface="Courier"/>
+              </a:rPr>
+              <a:t>(</a:t>
+            </a:r>
+            <a:r>
+              <a:rPr>
+                <a:solidFill>
+                  <a:srgbClr val="7D9029"/>
+                </a:solidFill>
+                <a:latin typeface="Courier"/>
+              </a:rPr>
+              <a:t>measure =</a:t>
+            </a:r>
+            <a:r>
+              <a:rPr>
+                <a:latin typeface="Courier"/>
+              </a:rPr>
               <a:t> </a:t>
+            </a:r>
+            <a:r>
+              <a:rPr>
+                <a:solidFill>
+                  <a:srgbClr val="4070A0"/>
+                </a:solidFill>
+                <a:latin typeface="Courier"/>
+              </a:rPr>
+              <a:t>"ZCOR"</a:t>
+            </a:r>
+            <a:r>
+              <a:rPr>
+                <a:latin typeface="Courier"/>
+              </a:rPr>
+              <a:t>, </a:t>
+            </a:r>
+            <a:r>
+              <a:rPr>
+                <a:solidFill>
+                  <a:srgbClr val="7D9029"/>
+                </a:solidFill>
+                <a:latin typeface="Courier"/>
+              </a:rPr>
+              <a:t>ri =</a:t>
+            </a:r>
+            <a:r>
+              <a:rPr>
+                <a:latin typeface="Courier"/>
+              </a:rPr>
+              <a:t> corr_coeff, </a:t>
+            </a:r>
+            <a:r>
+              <a:rPr>
+                <a:solidFill>
+                  <a:srgbClr val="7D9029"/>
+                </a:solidFill>
+                <a:latin typeface="Courier"/>
+              </a:rPr>
+              <a:t>ni =</a:t>
+            </a:r>
+            <a:r>
+              <a:rPr>
+                <a:latin typeface="Courier"/>
+              </a:rPr>
+              <a:t> sample_size, </a:t>
+            </a:r>
+            <a:r>
+              <a:rPr>
+                <a:solidFill>
+                  <a:srgbClr val="7D9029"/>
+                </a:solidFill>
+                <a:latin typeface="Courier"/>
+              </a:rPr>
+              <a:t>data =</a:t>
+            </a:r>
+            <a:r>
+              <a:rPr>
+                <a:latin typeface="Courier"/>
+              </a:rPr>
+              <a:t> zr_data, </a:t>
+            </a:r>
+            <a:r>
+              <a:rPr>
+                <a:solidFill>
+                  <a:srgbClr val="7D9029"/>
+                </a:solidFill>
+                <a:latin typeface="Courier"/>
+              </a:rPr>
+              <a:t>var.names=</a:t>
             </a:r>
             <a:r>
               <a:rPr>
@@ -4930,48 +5632,7 @@
               <a:rPr>
                 <a:latin typeface="Courier"/>
               </a:rPr>
-              <a:t>()</a:t>
-            </a:r>
-            <a:br/>
-            <a:br/>
-            <a:r>
-              <a:rPr b="1">
-                <a:solidFill>
-                  <a:srgbClr val="007020"/>
-                </a:solidFill>
-                <a:latin typeface="Courier"/>
-              </a:rPr>
-              <a:t>for</a:t>
-            </a:r>
-            <a:r>
-              <a:rPr>
-                <a:latin typeface="Courier"/>
-              </a:rPr>
-              <a:t> (i </a:t>
-            </a:r>
-            <a:r>
-              <a:rPr b="1">
-                <a:solidFill>
-                  <a:srgbClr val="007020"/>
-                </a:solidFill>
-                <a:latin typeface="Courier"/>
-              </a:rPr>
-              <a:t>in</a:t>
-            </a:r>
-            <a:r>
-              <a:rPr>
-                <a:latin typeface="Courier"/>
-              </a:rPr>
-              <a:t> </a:t>
-            </a:r>
-            <a:r>
-              <a:rPr>
-                <a:solidFill>
-                  <a:srgbClr val="40A070"/>
-                </a:solidFill>
-                <a:latin typeface="Courier"/>
-              </a:rPr>
-              <a:t>1</a:t>
+              <a:t>(</a:t>
             </a:r>
             <a:r>
               <a:rPr>
@@ -4980,287 +5641,80 @@
                 </a:solidFill>
                 <a:latin typeface="Courier"/>
               </a:rPr>
-              <a:t>:</a:t>
+              <a:t>"Zr"</a:t>
+            </a:r>
+            <a:r>
+              <a:rPr>
+                <a:latin typeface="Courier"/>
+              </a:rPr>
+              <a:t>,</a:t>
             </a:r>
             <a:r>
               <a:rPr>
                 <a:solidFill>
-                  <a:srgbClr val="40A070"/>
+                  <a:srgbClr val="4070A0"/>
                 </a:solidFill>
                 <a:latin typeface="Courier"/>
               </a:rPr>
-              <a:t>1e+06</a:t>
+              <a:t>"v_Zr"</a:t>
             </a:r>
             <a:r>
               <a:rPr>
                 <a:latin typeface="Courier"/>
               </a:rPr>
-              <a:t>) {</a:t>
-            </a:r>
+              <a:t>))</a:t>
+            </a:r>
+            <a:br/>
             <a:br/>
             <a:r>
               <a:rPr>
                 <a:latin typeface="Courier"/>
               </a:rPr>
-              <a:t>    mass </a:t>
-            </a:r>
-            <a:r>
-              <a:rPr>
-                <a:solidFill>
-                  <a:srgbClr val="007020"/>
-                </a:solidFill>
-                <a:latin typeface="Courier"/>
-              </a:rPr>
-              <a:t>&lt;-</a:t>
-            </a:r>
+              <a:t>zr_data</a:t>
+            </a:r>
+          </a:p>
+          <a:p>
+            <a:pPr lvl="0" indent="0">
+              <a:buNone/>
+            </a:pPr>
             <a:r>
               <a:rPr>
                 <a:latin typeface="Courier"/>
               </a:rPr>
-              <a:t> </a:t>
-            </a:r>
-            <a:r>
-              <a:rPr>
-                <a:solidFill>
-                  <a:srgbClr val="06287E"/>
-                </a:solidFill>
-                <a:latin typeface="Courier"/>
-              </a:rPr>
-              <a:t>rnorm</a:t>
-            </a:r>
-            <a:r>
-              <a:rPr>
-                <a:latin typeface="Courier"/>
-              </a:rPr>
-              <a:t>(</a:t>
-            </a:r>
-            <a:r>
-              <a:rPr>
-                <a:solidFill>
-                  <a:srgbClr val="7D9029"/>
-                </a:solidFill>
-                <a:latin typeface="Courier"/>
-              </a:rPr>
-              <a:t>n =</a:t>
-            </a:r>
-            <a:r>
-              <a:rPr>
-                <a:latin typeface="Courier"/>
-              </a:rPr>
-              <a:t> </a:t>
-            </a:r>
-            <a:r>
-              <a:rPr>
-                <a:solidFill>
-                  <a:srgbClr val="40A070"/>
-                </a:solidFill>
-                <a:latin typeface="Courier"/>
-              </a:rPr>
-              <a:t>18</a:t>
-            </a:r>
-            <a:r>
-              <a:rPr>
-                <a:latin typeface="Courier"/>
-              </a:rPr>
-              <a:t>, </a:t>
-            </a:r>
-            <a:r>
-              <a:rPr>
-                <a:solidFill>
-                  <a:srgbClr val="7D9029"/>
-                </a:solidFill>
-                <a:latin typeface="Courier"/>
-              </a:rPr>
-              <a:t>mean =</a:t>
-            </a:r>
-            <a:r>
-              <a:rPr>
-                <a:latin typeface="Courier"/>
-              </a:rPr>
-              <a:t> </a:t>
-            </a:r>
-            <a:r>
-              <a:rPr>
-                <a:solidFill>
-                  <a:srgbClr val="40A070"/>
-                </a:solidFill>
-                <a:latin typeface="Courier"/>
-              </a:rPr>
-              <a:t>10.8</a:t>
-            </a:r>
-            <a:r>
-              <a:rPr>
-                <a:latin typeface="Courier"/>
-              </a:rPr>
-              <a:t>, </a:t>
-            </a:r>
-            <a:r>
-              <a:rPr>
-                <a:solidFill>
-                  <a:srgbClr val="7D9029"/>
-                </a:solidFill>
-                <a:latin typeface="Courier"/>
-              </a:rPr>
-              <a:t>sd =</a:t>
-            </a:r>
-            <a:r>
-              <a:rPr>
-                <a:latin typeface="Courier"/>
-              </a:rPr>
-              <a:t> </a:t>
-            </a:r>
-            <a:r>
-              <a:rPr>
-                <a:solidFill>
-                  <a:srgbClr val="40A070"/>
-                </a:solidFill>
-                <a:latin typeface="Courier"/>
-              </a:rPr>
-              <a:t>0.988</a:t>
-            </a:r>
-            <a:r>
-              <a:rPr>
-                <a:latin typeface="Courier"/>
-              </a:rPr>
-              <a:t>)</a:t>
-            </a:r>
-            <a:br/>
-            <a:r>
-              <a:rPr>
-                <a:latin typeface="Courier"/>
-              </a:rPr>
-              <a:t>    means </a:t>
-            </a:r>
-            <a:r>
-              <a:rPr>
-                <a:solidFill>
-                  <a:srgbClr val="007020"/>
-                </a:solidFill>
-                <a:latin typeface="Courier"/>
-              </a:rPr>
-              <a:t>&lt;-</a:t>
-            </a:r>
-            <a:r>
-              <a:rPr>
-                <a:latin typeface="Courier"/>
-              </a:rPr>
-              <a:t> </a:t>
-            </a:r>
-            <a:r>
-              <a:rPr>
-                <a:solidFill>
-                  <a:srgbClr val="06287E"/>
-                </a:solidFill>
-                <a:latin typeface="Courier"/>
-              </a:rPr>
-              <a:t>c</a:t>
-            </a:r>
-            <a:r>
-              <a:rPr>
-                <a:latin typeface="Courier"/>
-              </a:rPr>
-              <a:t>(means, </a:t>
-            </a:r>
-            <a:r>
-              <a:rPr>
-                <a:solidFill>
-                  <a:srgbClr val="06287E"/>
-                </a:solidFill>
-                <a:latin typeface="Courier"/>
-              </a:rPr>
-              <a:t>mean</a:t>
-            </a:r>
-            <a:r>
-              <a:rPr>
-                <a:latin typeface="Courier"/>
-              </a:rPr>
-              <a:t>(mass))</a:t>
-            </a:r>
-            <a:br/>
-            <a:r>
-              <a:rPr>
-                <a:latin typeface="Courier"/>
-              </a:rPr>
-              <a:t>}</a:t>
-            </a:r>
-            <a:br/>
-            <a:br/>
-            <a:r>
-              <a:rPr i="1">
-                <a:solidFill>
-                  <a:srgbClr val="60A0B0"/>
-                </a:solidFill>
-                <a:latin typeface="Courier"/>
-              </a:rPr>
-              <a:t># The mean of the means</a:t>
-            </a:r>
-            <a:br/>
-            <a:r>
-              <a:rPr>
-                <a:solidFill>
-                  <a:srgbClr val="06287E"/>
-                </a:solidFill>
-                <a:latin typeface="Courier"/>
-              </a:rPr>
-              <a:t>mean</a:t>
-            </a:r>
-            <a:r>
-              <a:rPr>
-                <a:latin typeface="Courier"/>
-              </a:rPr>
-              <a:t>(means)</a:t>
-            </a:r>
-          </a:p>
-          <a:p>
-            <a:pPr lvl="0" indent="0">
-              <a:buNone/>
-            </a:pPr>
-            <a:r>
-              <a:rPr>
-                <a:latin typeface="Courier"/>
-              </a:rPr>
-              <a:t>## [1] 10.79997</a:t>
-            </a:r>
-          </a:p>
-          <a:p>
-            <a:pPr lvl="0" indent="0">
-              <a:buNone/>
-            </a:pPr>
-            <a:r>
-              <a:rPr i="1">
-                <a:solidFill>
-                  <a:srgbClr val="60A0B0"/>
-                </a:solidFill>
-                <a:latin typeface="Courier"/>
-              </a:rPr>
-              <a:t># The standard deviation of the means or standard error</a:t>
-            </a:r>
-            <a:br/>
-            <a:r>
-              <a:rPr>
-                <a:solidFill>
-                  <a:srgbClr val="06287E"/>
-                </a:solidFill>
-                <a:latin typeface="Courier"/>
-              </a:rPr>
-              <a:t>sd</a:t>
-            </a:r>
-            <a:r>
-              <a:rPr>
-                <a:latin typeface="Courier"/>
-              </a:rPr>
-              <a:t>(means)</a:t>
-            </a:r>
-          </a:p>
-          <a:p>
-            <a:pPr lvl="0" indent="0">
-              <a:buNone/>
-            </a:pPr>
-            <a:r>
-              <a:rPr>
-                <a:latin typeface="Courier"/>
-              </a:rPr>
-              <a:t>## [1] 0.2327267</a:t>
+              <a:t>## 
+##    study_ID     taxa              species          trait       response 
+## 1         5 Mammalia      Tamias_striatus     Metabolism     Resting MR 
+## 2        13     Aves          Parus_major     Metabolism       Basal MR 
+## 3        13     Aves          Parus_major     Metabolism       Basal MR 
+## 4        45 Mammalia      Syncerus_caffer      Condition Body condition 
+## 5        45 Mammalia      Syncerus_caffer      Condition Body condition 
+## 6        55     Aves Phoenicopterus_ruber      Condition Body condition 
+## 7        87     Aves  Cyanistes caeruleus       Immunity            WBC 
+## 8        87     Aves  Cyanistes caeruleus Cardiovascular    Haematocrit 
+## 9        87     Aves  Cyanistes caeruleus       Immunity            WBC 
+## 10       87     Aves  Cyanistes caeruleus Cardiovascular    Haematocrit 
+##       response_unit  disp_trait disp_unit  corr_coeff sample_size      Zr 
+## 1       residual mW Exploration  residual -0.14300000         296 -0.1440 
+## 2  mass-corrected W Exploration            0.05547002         345  0.0555 
+## 3  mass-corrected W Exploration           -0.13969969         335 -0.1406 
+## 4             index   Dispersal         % -0.40000000         415 -0.4236 
+## 5             index   Dispersal         % -0.53000000         508 -0.5901 
+## 6                     Dispersal            0.87300000         462  1.3456 
+## 7                 n    Activity         n  0.06500000         485  0.0651 
+## 8                 %    Activity         n  0.01500000         485  0.0150 
+## 9                 n    Activity         n  0.17000000         485  0.1717 
+## 10                %    Activity         n -0.13000000         485 -0.1307 
+##      v_Zr 
+## 1  0.0034 
+## 2  0.0029 
+## 3  0.0030 
+## 4  0.0024 
+## 5  0.0020 
+## 6  0.0022 
+## 7  0.0021 
+## 8  0.0021 
+## 9  0.0021 
+## 10 0.0021</a:t>
             </a:r>
           </a:p>
         </p:txBody>
@@ -5270,7 +5724,7 @@
 </p:sld>
 </file>
 
-<file path=ppt/slides/slide8.xml><?xml version="1.0" encoding="utf-8"?>
+<file path=ppt/slides/slide5.xml><?xml version="1.0" encoding="utf-8"?>
 <p:sld xmlns:a="http://schemas.openxmlformats.org/drawingml/2006/main" xmlns:r="http://schemas.openxmlformats.org/officeDocument/2006/relationships" xmlns:p="http://schemas.openxmlformats.org/presentationml/2006/main">
   <p:cSld>
     <p:spTree>
@@ -5307,7 +5761,7 @@
             </a:pPr>
             <a:r>
               <a:rPr/>
-              <a:t>Our analytical calculaton</a:t>
+              <a:t>Back transofrmation</a:t>
             </a:r>
           </a:p>
         </p:txBody>
@@ -5330,11 +5784,36 @@
             <a:pPr lvl="0" indent="0">
               <a:buNone/>
             </a:pPr>
+            <a:r>
+              <a:rPr i="1">
+                <a:solidFill>
+                  <a:srgbClr val="60A0B0"/>
+                </a:solidFill>
+                <a:latin typeface="Courier"/>
+              </a:rPr>
+              <a:t># We can easily convert back to r as follows</a:t>
+            </a:r>
+            <a:br/>
             <a:r>
               <a:rPr>
                 <a:latin typeface="Courier"/>
               </a:rPr>
-              <a:t>se </a:t>
+              <a:t>zr_data</a:t>
+            </a:r>
+            <a:r>
+              <a:rPr>
+                <a:solidFill>
+                  <a:srgbClr val="4070A0"/>
+                </a:solidFill>
+                <a:latin typeface="Courier"/>
+              </a:rPr>
+              <a:t>$</a:t>
+            </a:r>
+            <a:r>
+              <a:rPr>
+                <a:latin typeface="Courier"/>
+              </a:rPr>
+              <a:t>r </a:t>
             </a:r>
             <a:r>
               <a:rPr>
@@ -5358,13 +5837,13 @@
                 </a:solidFill>
                 <a:latin typeface="Courier"/>
               </a:rPr>
-              <a:t>sd</a:t>
+              <a:t>tanh</a:t>
             </a:r>
             <a:r>
               <a:rPr>
                 <a:latin typeface="Courier"/>
               </a:rPr>
-              <a:t>(mass)</a:t>
+              <a:t>(zr_data</a:t>
             </a:r>
             <a:r>
               <a:rPr>
@@ -5373,7 +5852,36 @@
                 </a:solidFill>
                 <a:latin typeface="Courier"/>
               </a:rPr>
-              <a:t>/</a:t>
+              <a:t>$</a:t>
+            </a:r>
+            <a:r>
+              <a:rPr>
+                <a:latin typeface="Courier"/>
+              </a:rPr>
+              <a:t>Zr)</a:t>
+            </a:r>
+            <a:br/>
+            <a:br/>
+            <a:r>
+              <a:rPr>
+                <a:latin typeface="Courier"/>
+              </a:rPr>
+              <a:t>zr_data </a:t>
+            </a:r>
+            <a:r>
+              <a:rPr>
+                <a:solidFill>
+                  <a:srgbClr val="4070A0"/>
+                </a:solidFill>
+                <a:latin typeface="Courier"/>
+              </a:rPr>
+              <a:t>%&gt;%</a:t>
+            </a:r>
+            <a:r>
+              <a:rPr>
+                <a:latin typeface="Courier"/>
+              </a:rPr>
+              <a:t> </a:t>
             </a:r>
             <a:r>
               <a:rPr>
@@ -5382,239 +5890,39 @@
                 </a:solidFill>
                 <a:latin typeface="Courier"/>
               </a:rPr>
-              <a:t>sqrt</a:t>
+              <a:t>select</a:t>
             </a:r>
             <a:r>
               <a:rPr>
                 <a:latin typeface="Courier"/>
               </a:rPr>
-              <a:t>(</a:t>
-            </a:r>
-            <a:r>
-              <a:rPr>
-                <a:solidFill>
-                  <a:srgbClr val="06287E"/>
-                </a:solidFill>
-                <a:latin typeface="Courier"/>
-              </a:rPr>
-              <a:t>length</a:t>
-            </a:r>
+              <a:t>(corr_coeff, r)</a:t>
+            </a:r>
+          </a:p>
+          <a:p>
+            <a:pPr lvl="0" indent="0">
+              <a:buNone/>
+            </a:pPr>
             <a:r>
               <a:rPr>
                 <a:latin typeface="Courier"/>
               </a:rPr>
-              <a:t>(mass))</a:t>
-            </a:r>
-            <a:br/>
-            <a:r>
-              <a:rPr>
-                <a:latin typeface="Courier"/>
-              </a:rPr>
-              <a:t>se</a:t>
-            </a:r>
-          </a:p>
-          <a:p>
-            <a:pPr lvl="0" indent="0">
-              <a:buNone/>
-            </a:pPr>
-            <a:r>
-              <a:rPr>
-                <a:latin typeface="Courier"/>
-              </a:rPr>
-              <a:t>## [1] 0.1858937</a:t>
-            </a:r>
-          </a:p>
-        </p:txBody>
-      </p:sp>
-    </p:spTree>
-  </p:cSld>
-</p:sld>
-</file>
-
-<file path=ppt/slides/slide9.xml><?xml version="1.0" encoding="utf-8"?>
-<p:sld xmlns:a="http://schemas.openxmlformats.org/drawingml/2006/main" xmlns:r="http://schemas.openxmlformats.org/officeDocument/2006/relationships" xmlns:p="http://schemas.openxmlformats.org/presentationml/2006/main">
-  <p:cSld>
-    <p:spTree>
-      <p:nvGrpSpPr>
-        <p:cNvPr id="1" name=""/>
-        <p:cNvGrpSpPr/>
-        <p:nvPr/>
-      </p:nvGrpSpPr>
-      <p:grpSpPr>
-        <a:xfrm>
-          <a:off x="0" y="0"/>
-          <a:ext cx="0" cy="0"/>
-          <a:chOff x="0" y="0"/>
-          <a:chExt cx="0" cy="0"/>
-        </a:xfrm>
-      </p:grpSpPr>
-      <p:sp>
-        <p:nvSpPr>
-          <p:cNvPr id="2" name="Title 1"/>
-          <p:cNvSpPr>
-            <a:spLocks noGrp="1"/>
-          </p:cNvSpPr>
-          <p:nvPr>
-            <p:ph type="title"/>
-          </p:nvPr>
-        </p:nvSpPr>
-        <p:spPr>
-          <a:xfrm>
-            <a:off x="457201" y="204787"/>
-            <a:ext cx="3008313" cy="871538"/>
-          </a:xfrm>
-        </p:spPr>
-        <p:txBody>
-          <a:bodyPr/>
-          <a:lstStyle/>
-          <a:p>
-            <a:pPr lvl="0" indent="0" marL="0">
-              <a:buNone/>
-            </a:pPr>
-            <a:r>
-              <a:rPr/>
-              <a:t>Plots</a:t>
-            </a:r>
-          </a:p>
-        </p:txBody>
-      </p:sp>
-      <p:sp>
-        <p:nvSpPr>
-          <p:cNvPr id="4" name="Text Placeholder 3"/>
-          <p:cNvSpPr>
-            <a:spLocks noGrp="1"/>
-          </p:cNvSpPr>
-          <p:nvPr>
-            <p:ph idx="2" sz="half" type="body"/>
-          </p:nvPr>
-        </p:nvSpPr>
-        <p:spPr/>
-        <p:txBody>
-          <a:bodyPr/>
-          <a:lstStyle/>
-          <a:p>
-            <a:pPr lvl="0" indent="0">
-              <a:buNone/>
-            </a:pPr>
-            <a:r>
-              <a:rPr>
-                <a:solidFill>
-                  <a:srgbClr val="06287E"/>
-                </a:solidFill>
-                <a:latin typeface="Courier"/>
-              </a:rPr>
-              <a:t>ggplot</a:t>
-            </a:r>
-            <a:r>
-              <a:rPr>
-                <a:latin typeface="Courier"/>
-              </a:rPr>
-              <a:t>() </a:t>
-            </a:r>
-            <a:r>
-              <a:rPr>
-                <a:solidFill>
-                  <a:srgbClr val="4070A0"/>
-                </a:solidFill>
-                <a:latin typeface="Courier"/>
-              </a:rPr>
-              <a:t>+</a:t>
-            </a:r>
-            <a:r>
-              <a:rPr>
-                <a:latin typeface="Courier"/>
-              </a:rPr>
-              <a:t> </a:t>
-            </a:r>
-            <a:r>
-              <a:rPr>
-                <a:solidFill>
-                  <a:srgbClr val="06287E"/>
-                </a:solidFill>
-                <a:latin typeface="Courier"/>
-              </a:rPr>
-              <a:t>geom_histogram</a:t>
-            </a:r>
-            <a:r>
-              <a:rPr>
-                <a:latin typeface="Courier"/>
-              </a:rPr>
-              <a:t>(</a:t>
-            </a:r>
-            <a:r>
-              <a:rPr>
-                <a:solidFill>
-                  <a:srgbClr val="06287E"/>
-                </a:solidFill>
-                <a:latin typeface="Courier"/>
-              </a:rPr>
-              <a:t>aes</a:t>
-            </a:r>
-            <a:r>
-              <a:rPr>
-                <a:latin typeface="Courier"/>
-              </a:rPr>
-              <a:t>(</a:t>
-            </a:r>
-            <a:r>
-              <a:rPr>
-                <a:solidFill>
-                  <a:srgbClr val="7D9029"/>
-                </a:solidFill>
-                <a:latin typeface="Courier"/>
-              </a:rPr>
-              <a:t>x =</a:t>
-            </a:r>
-            <a:r>
-              <a:rPr>
-                <a:latin typeface="Courier"/>
-              </a:rPr>
-              <a:t> means))</a:t>
-            </a:r>
-          </a:p>
-          <a:p>
-            <a:pPr lvl="0" indent="0">
-              <a:buNone/>
-            </a:pPr>
-            <a:r>
-              <a:rPr>
-                <a:latin typeface="Courier"/>
-              </a:rPr>
-              <a:t>## `stat_bin()` using `bins = 30`. Pick better value with `binwidth`.</a:t>
-            </a:r>
-          </a:p>
-        </p:txBody>
-      </p:sp>
-      <p:pic>
-        <p:nvPicPr>
-          <p:cNvPr descr="code_slides_files/figure-pptx/simfig3plot-1.png" id="0" name="Picture 1"/>
-          <p:cNvPicPr>
-            <a:picLocks noGrp="1" noChangeAspect="1"/>
-          </p:cNvPicPr>
-          <p:nvPr/>
-        </p:nvPicPr>
-        <p:blipFill>
-          <a:blip r:embed="rId2"/>
-          <a:stretch>
-            <a:fillRect/>
-          </a:stretch>
-        </p:blipFill>
-        <p:spPr bwMode="auto">
-          <a:xfrm>
-            <a:off x="3568700" y="355600"/>
-            <a:ext cx="5105400" cy="4089400"/>
-          </a:xfrm>
-          <a:prstGeom prst="rect">
-            <a:avLst/>
-          </a:prstGeom>
-          <a:noFill/>
-          <a:ln w="9525">
-            <a:noFill/>
-            <a:headEnd/>
-            <a:tailEnd/>
-          </a:ln>
-        </p:spPr>
-      </p:pic>
+              <a:t>## 
+##     corr_coeff           r 
+## 1  -0.14300000 -0.14300000 
+## 2   0.05547002  0.05547002 
+## 3  -0.13969969 -0.13969969 
+## 4  -0.40000000 -0.40000000 
+## 5  -0.53000000 -0.53000000 
+## 6   0.87300000  0.87300000 
+## 7   0.06500000  0.06500000 
+## 8   0.01500000  0.01500000 
+## 9   0.17000000  0.17000000 
+## 10 -0.13000000 -0.13000000</a:t>
+            </a:r>
+          </a:p>
+        </p:txBody>
+      </p:sp>
     </p:spTree>
   </p:cSld>
 </p:sld>

</xml_diff>

<commit_message>
random effects meta-analysis and fixed effect by hand
</commit_message>
<xml_diff>
--- a/slides/code_slides.pptx
+++ b/slides/code_slides.pptx
@@ -25,6 +25,16 @@
     <p:sldId id="273" r:id="rId19"/>
     <p:sldId id="274" r:id="rId20"/>
     <p:sldId id="275" r:id="rId21"/>
+    <p:sldId id="276" r:id="rId22"/>
+    <p:sldId id="277" r:id="rId23"/>
+    <p:sldId id="278" r:id="rId24"/>
+    <p:sldId id="279" r:id="rId25"/>
+    <p:sldId id="280" r:id="rId26"/>
+    <p:sldId id="281" r:id="rId27"/>
+    <p:sldId id="282" r:id="rId28"/>
+    <p:sldId id="283" r:id="rId29"/>
+    <p:sldId id="284" r:id="rId30"/>
+    <p:sldId id="285" r:id="rId31"/>
   </p:sldIdLst>
   <p:sldSz cx="9144000" cy="5143500" type="screen16x9"/>
   <p:notesSz cx="6858000" cy="9144000"/>
@@ -7741,6 +7751,2969 @@
 </p:sld>
 </file>
 
+<file path=ppt/slides/slide21.xml><?xml version="1.0" encoding="utf-8"?>
+<p:sld xmlns:a="http://schemas.openxmlformats.org/drawingml/2006/main" xmlns:r="http://schemas.openxmlformats.org/officeDocument/2006/relationships" xmlns:p="http://schemas.openxmlformats.org/presentationml/2006/main">
+  <p:cSld>
+    <p:spTree>
+      <p:nvGrpSpPr>
+        <p:cNvPr id="1" name=""/>
+        <p:cNvGrpSpPr/>
+        <p:nvPr/>
+      </p:nvGrpSpPr>
+      <p:grpSpPr>
+        <a:xfrm>
+          <a:off x="0" y="0"/>
+          <a:ext cx="0" cy="0"/>
+          <a:chOff x="0" y="0"/>
+          <a:chExt cx="0" cy="0"/>
+        </a:xfrm>
+      </p:grpSpPr>
+      <p:sp>
+        <p:nvSpPr>
+          <p:cNvPr id="2" name="Title 1"/>
+          <p:cNvSpPr>
+            <a:spLocks noGrp="1"/>
+          </p:cNvSpPr>
+          <p:nvPr>
+            <p:ph type="title"/>
+          </p:nvPr>
+        </p:nvSpPr>
+        <p:spPr/>
+        <p:txBody>
+          <a:bodyPr/>
+          <a:lstStyle/>
+          <a:p>
+            <a:pPr lvl="0" indent="0" marL="0">
+              <a:buNone/>
+            </a:pPr>
+            <a:r>
+              <a:rPr/>
+              <a:t>Fixed effect</a:t>
+            </a:r>
+          </a:p>
+        </p:txBody>
+      </p:sp>
+      <p:sp>
+        <p:nvSpPr>
+          <p:cNvPr id="3" name="Content Placeholder 2"/>
+          <p:cNvSpPr>
+            <a:spLocks noGrp="1"/>
+          </p:cNvSpPr>
+          <p:nvPr>
+            <p:ph idx="1"/>
+          </p:nvPr>
+        </p:nvSpPr>
+        <p:spPr/>
+        <p:txBody>
+          <a:bodyPr/>
+          <a:lstStyle/>
+          <a:p>
+            <a:pPr lvl="0" indent="0">
+              <a:buNone/>
+            </a:pPr>
+            <a:r>
+              <a:rPr i="1">
+                <a:solidFill>
+                  <a:srgbClr val="60A0B0"/>
+                </a:solidFill>
+                <a:latin typeface="Courier"/>
+              </a:rPr>
+              <a:t># Generate some simulated effect size data with known sampling variance</a:t>
+            </a:r>
+            <a:br/>
+            <a:r>
+              <a:rPr i="1">
+                <a:solidFill>
+                  <a:srgbClr val="60A0B0"/>
+                </a:solidFill>
+                <a:latin typeface="Courier"/>
+              </a:rPr>
+              <a:t># assumed to come from a common underlying distribution</a:t>
+            </a:r>
+            <a:br/>
+            <a:r>
+              <a:rPr>
+                <a:solidFill>
+                  <a:srgbClr val="06287E"/>
+                </a:solidFill>
+                <a:latin typeface="Courier"/>
+              </a:rPr>
+              <a:t>set.seed</a:t>
+            </a:r>
+            <a:r>
+              <a:rPr>
+                <a:latin typeface="Courier"/>
+              </a:rPr>
+              <a:t>(</a:t>
+            </a:r>
+            <a:r>
+              <a:rPr>
+                <a:solidFill>
+                  <a:srgbClr val="40A070"/>
+                </a:solidFill>
+                <a:latin typeface="Courier"/>
+              </a:rPr>
+              <a:t>86</a:t>
+            </a:r>
+            <a:r>
+              <a:rPr>
+                <a:latin typeface="Courier"/>
+              </a:rPr>
+              <a:t>) </a:t>
+            </a:r>
+            <a:r>
+              <a:rPr i="1">
+                <a:solidFill>
+                  <a:srgbClr val="60A0B0"/>
+                </a:solidFill>
+                <a:latin typeface="Courier"/>
+              </a:rPr>
+              <a:t># Set see so that we all get the same simulated results</a:t>
+            </a:r>
+            <a:br/>
+            <a:r>
+              <a:rPr>
+                <a:latin typeface="Courier"/>
+              </a:rPr>
+              <a:t> </a:t>
+            </a:r>
+            <a:r>
+              <a:rPr i="1">
+                <a:solidFill>
+                  <a:srgbClr val="60A0B0"/>
+                </a:solidFill>
+                <a:latin typeface="Courier"/>
+              </a:rPr>
+              <a:t># We will have 5 studies</a:t>
+            </a:r>
+            <a:br/>
+            <a:r>
+              <a:rPr>
+                <a:latin typeface="Courier"/>
+              </a:rPr>
+              <a:t>    stdy  </a:t>
+            </a:r>
+            <a:r>
+              <a:rPr>
+                <a:solidFill>
+                  <a:srgbClr val="007020"/>
+                </a:solidFill>
+                <a:latin typeface="Courier"/>
+              </a:rPr>
+              <a:t>&lt;-</a:t>
+            </a:r>
+            <a:r>
+              <a:rPr>
+                <a:latin typeface="Courier"/>
+              </a:rPr>
+              <a:t> </a:t>
+            </a:r>
+            <a:r>
+              <a:rPr>
+                <a:solidFill>
+                  <a:srgbClr val="40A070"/>
+                </a:solidFill>
+                <a:latin typeface="Courier"/>
+              </a:rPr>
+              <a:t>1</a:t>
+            </a:r>
+            <a:r>
+              <a:rPr>
+                <a:solidFill>
+                  <a:srgbClr val="4070A0"/>
+                </a:solidFill>
+                <a:latin typeface="Courier"/>
+              </a:rPr>
+              <a:t>:</a:t>
+            </a:r>
+            <a:r>
+              <a:rPr>
+                <a:solidFill>
+                  <a:srgbClr val="40A070"/>
+                </a:solidFill>
+                <a:latin typeface="Courier"/>
+              </a:rPr>
+              <a:t>5</a:t>
+            </a:r>
+            <a:r>
+              <a:rPr>
+                <a:latin typeface="Courier"/>
+              </a:rPr>
+              <a:t>                                      </a:t>
+            </a:r>
+            <a:br/>
+            <a:r>
+              <a:rPr i="1">
+                <a:solidFill>
+                  <a:srgbClr val="60A0B0"/>
+                </a:solidFill>
+                <a:latin typeface="Courier"/>
+              </a:rPr>
+              <a:t># We know the variance for each effect</a:t>
+            </a:r>
+            <a:br/>
+            <a:r>
+              <a:rPr>
+                <a:latin typeface="Courier"/>
+              </a:rPr>
+              <a:t>    Ves     </a:t>
+            </a:r>
+            <a:r>
+              <a:rPr>
+                <a:solidFill>
+                  <a:srgbClr val="007020"/>
+                </a:solidFill>
+                <a:latin typeface="Courier"/>
+              </a:rPr>
+              <a:t>&lt;-</a:t>
+            </a:r>
+            <a:r>
+              <a:rPr>
+                <a:latin typeface="Courier"/>
+              </a:rPr>
+              <a:t> </a:t>
+            </a:r>
+            <a:r>
+              <a:rPr>
+                <a:solidFill>
+                  <a:srgbClr val="06287E"/>
+                </a:solidFill>
+                <a:latin typeface="Courier"/>
+              </a:rPr>
+              <a:t>c</a:t>
+            </a:r>
+            <a:r>
+              <a:rPr>
+                <a:latin typeface="Courier"/>
+              </a:rPr>
+              <a:t>(</a:t>
+            </a:r>
+            <a:r>
+              <a:rPr>
+                <a:solidFill>
+                  <a:srgbClr val="40A070"/>
+                </a:solidFill>
+                <a:latin typeface="Courier"/>
+              </a:rPr>
+              <a:t>0.05</a:t>
+            </a:r>
+            <a:r>
+              <a:rPr>
+                <a:latin typeface="Courier"/>
+              </a:rPr>
+              <a:t>, </a:t>
+            </a:r>
+            <a:r>
+              <a:rPr>
+                <a:solidFill>
+                  <a:srgbClr val="40A070"/>
+                </a:solidFill>
+                <a:latin typeface="Courier"/>
+              </a:rPr>
+              <a:t>0.10</a:t>
+            </a:r>
+            <a:r>
+              <a:rPr>
+                <a:latin typeface="Courier"/>
+              </a:rPr>
+              <a:t>, </a:t>
+            </a:r>
+            <a:r>
+              <a:rPr>
+                <a:solidFill>
+                  <a:srgbClr val="40A070"/>
+                </a:solidFill>
+                <a:latin typeface="Courier"/>
+              </a:rPr>
+              <a:t>0.02</a:t>
+            </a:r>
+            <a:r>
+              <a:rPr>
+                <a:latin typeface="Courier"/>
+              </a:rPr>
+              <a:t>, </a:t>
+            </a:r>
+            <a:r>
+              <a:rPr>
+                <a:solidFill>
+                  <a:srgbClr val="40A070"/>
+                </a:solidFill>
+                <a:latin typeface="Courier"/>
+              </a:rPr>
+              <a:t>0.10</a:t>
+            </a:r>
+            <a:r>
+              <a:rPr>
+                <a:latin typeface="Courier"/>
+              </a:rPr>
+              <a:t>, </a:t>
+            </a:r>
+            <a:r>
+              <a:rPr>
+                <a:solidFill>
+                  <a:srgbClr val="40A070"/>
+                </a:solidFill>
+                <a:latin typeface="Courier"/>
+              </a:rPr>
+              <a:t>0.09</a:t>
+            </a:r>
+            <a:r>
+              <a:rPr>
+                <a:latin typeface="Courier"/>
+              </a:rPr>
+              <a:t>)    </a:t>
+            </a:r>
+            <a:br/>
+            <a:r>
+              <a:rPr i="1">
+                <a:solidFill>
+                  <a:srgbClr val="60A0B0"/>
+                </a:solidFill>
+                <a:latin typeface="Courier"/>
+              </a:rPr>
+              <a:t># We'll need this later but these are weights</a:t>
+            </a:r>
+            <a:br/>
+            <a:r>
+              <a:rPr>
+                <a:latin typeface="Courier"/>
+              </a:rPr>
+              <a:t>    W     </a:t>
+            </a:r>
+            <a:r>
+              <a:rPr>
+                <a:solidFill>
+                  <a:srgbClr val="007020"/>
+                </a:solidFill>
+                <a:latin typeface="Courier"/>
+              </a:rPr>
+              <a:t>&lt;-</a:t>
+            </a:r>
+            <a:r>
+              <a:rPr>
+                <a:latin typeface="Courier"/>
+              </a:rPr>
+              <a:t> </a:t>
+            </a:r>
+            <a:r>
+              <a:rPr>
+                <a:solidFill>
+                  <a:srgbClr val="40A070"/>
+                </a:solidFill>
+                <a:latin typeface="Courier"/>
+              </a:rPr>
+              <a:t>1</a:t>
+            </a:r>
+            <a:r>
+              <a:rPr>
+                <a:latin typeface="Courier"/>
+              </a:rPr>
+              <a:t> </a:t>
+            </a:r>
+            <a:r>
+              <a:rPr>
+                <a:solidFill>
+                  <a:srgbClr val="4070A0"/>
+                </a:solidFill>
+                <a:latin typeface="Courier"/>
+              </a:rPr>
+              <a:t>/</a:t>
+            </a:r>
+            <a:r>
+              <a:rPr>
+                <a:latin typeface="Courier"/>
+              </a:rPr>
+              <a:t> Ves                                          </a:t>
+            </a:r>
+            <a:br/>
+            <a:r>
+              <a:rPr i="1">
+                <a:solidFill>
+                  <a:srgbClr val="60A0B0"/>
+                </a:solidFill>
+                <a:latin typeface="Courier"/>
+              </a:rPr>
+              <a:t># We assume they are sampled from a normal distribution  with a mean effect size of 2</a:t>
+            </a:r>
+            <a:br/>
+            <a:r>
+              <a:rPr>
+                <a:latin typeface="Courier"/>
+              </a:rPr>
+              <a:t>    es     </a:t>
+            </a:r>
+            <a:r>
+              <a:rPr>
+                <a:solidFill>
+                  <a:srgbClr val="007020"/>
+                </a:solidFill>
+                <a:latin typeface="Courier"/>
+              </a:rPr>
+              <a:t>&lt;-</a:t>
+            </a:r>
+            <a:r>
+              <a:rPr>
+                <a:latin typeface="Courier"/>
+              </a:rPr>
+              <a:t> </a:t>
+            </a:r>
+            <a:r>
+              <a:rPr>
+                <a:solidFill>
+                  <a:srgbClr val="06287E"/>
+                </a:solidFill>
+                <a:latin typeface="Courier"/>
+              </a:rPr>
+              <a:t>rnorm</a:t>
+            </a:r>
+            <a:r>
+              <a:rPr>
+                <a:latin typeface="Courier"/>
+              </a:rPr>
+              <a:t>(</a:t>
+            </a:r>
+            <a:r>
+              <a:rPr>
+                <a:solidFill>
+                  <a:srgbClr val="06287E"/>
+                </a:solidFill>
+                <a:latin typeface="Courier"/>
+              </a:rPr>
+              <a:t>length</a:t>
+            </a:r>
+            <a:r>
+              <a:rPr>
+                <a:latin typeface="Courier"/>
+              </a:rPr>
+              <a:t>(Ves), </a:t>
+            </a:r>
+            <a:r>
+              <a:rPr>
+                <a:solidFill>
+                  <a:srgbClr val="40A070"/>
+                </a:solidFill>
+                <a:latin typeface="Courier"/>
+              </a:rPr>
+              <a:t>2</a:t>
+            </a:r>
+            <a:r>
+              <a:rPr>
+                <a:latin typeface="Courier"/>
+              </a:rPr>
+              <a:t>, </a:t>
+            </a:r>
+            <a:r>
+              <a:rPr>
+                <a:solidFill>
+                  <a:srgbClr val="06287E"/>
+                </a:solidFill>
+                <a:latin typeface="Courier"/>
+              </a:rPr>
+              <a:t>sqrt</a:t>
+            </a:r>
+            <a:r>
+              <a:rPr>
+                <a:latin typeface="Courier"/>
+              </a:rPr>
+              <a:t>(Ves))          </a:t>
+            </a:r>
+            <a:br/>
+            <a:r>
+              <a:rPr i="1">
+                <a:solidFill>
+                  <a:srgbClr val="60A0B0"/>
+                </a:solidFill>
+                <a:latin typeface="Courier"/>
+              </a:rPr>
+              <a:t># Data for our fixed effect meta-analysis</a:t>
+            </a:r>
+            <a:br/>
+            <a:r>
+              <a:rPr>
+                <a:latin typeface="Courier"/>
+              </a:rPr>
+              <a:t>    dataFE </a:t>
+            </a:r>
+            <a:r>
+              <a:rPr>
+                <a:solidFill>
+                  <a:srgbClr val="007020"/>
+                </a:solidFill>
+                <a:latin typeface="Courier"/>
+              </a:rPr>
+              <a:t>&lt;-</a:t>
+            </a:r>
+            <a:r>
+              <a:rPr>
+                <a:latin typeface="Courier"/>
+              </a:rPr>
+              <a:t> </a:t>
+            </a:r>
+            <a:r>
+              <a:rPr>
+                <a:solidFill>
+                  <a:srgbClr val="06287E"/>
+                </a:solidFill>
+                <a:latin typeface="Courier"/>
+              </a:rPr>
+              <a:t>data.frame</a:t>
+            </a:r>
+            <a:r>
+              <a:rPr>
+                <a:latin typeface="Courier"/>
+              </a:rPr>
+              <a:t>(</a:t>
+            </a:r>
+            <a:r>
+              <a:rPr>
+                <a:solidFill>
+                  <a:srgbClr val="7D9029"/>
+                </a:solidFill>
+                <a:latin typeface="Courier"/>
+              </a:rPr>
+              <a:t>stdy =</a:t>
+            </a:r>
+            <a:r>
+              <a:rPr>
+                <a:latin typeface="Courier"/>
+              </a:rPr>
+              <a:t> stdy, es, Ves)</a:t>
+            </a:r>
+          </a:p>
+        </p:txBody>
+      </p:sp>
+    </p:spTree>
+  </p:cSld>
+</p:sld>
+</file>
+
+<file path=ppt/slides/slide22.xml><?xml version="1.0" encoding="utf-8"?>
+<p:sld xmlns:a="http://schemas.openxmlformats.org/drawingml/2006/main" xmlns:r="http://schemas.openxmlformats.org/officeDocument/2006/relationships" xmlns:p="http://schemas.openxmlformats.org/presentationml/2006/main">
+  <p:cSld>
+    <p:spTree>
+      <p:nvGrpSpPr>
+        <p:cNvPr id="1" name=""/>
+        <p:cNvGrpSpPr/>
+        <p:nvPr/>
+      </p:nvGrpSpPr>
+      <p:grpSpPr>
+        <a:xfrm>
+          <a:off x="0" y="0"/>
+          <a:ext cx="0" cy="0"/>
+          <a:chOff x="0" y="0"/>
+          <a:chExt cx="0" cy="0"/>
+        </a:xfrm>
+      </p:grpSpPr>
+      <p:sp>
+        <p:nvSpPr>
+          <p:cNvPr id="2" name="Title 1"/>
+          <p:cNvSpPr>
+            <a:spLocks noGrp="1"/>
+          </p:cNvSpPr>
+          <p:nvPr>
+            <p:ph type="title"/>
+          </p:nvPr>
+        </p:nvSpPr>
+        <p:spPr/>
+        <p:txBody>
+          <a:bodyPr/>
+          <a:lstStyle/>
+          <a:p>
+            <a:pPr lvl="0" indent="0" marL="0">
+              <a:buNone/>
+            </a:pPr>
+            <a:r>
+              <a:rPr/>
+              <a:t>Fixed effects</a:t>
+            </a:r>
+          </a:p>
+        </p:txBody>
+      </p:sp>
+      <p:pic>
+        <p:nvPicPr>
+          <p:cNvPr descr="code_slides_files/figure-pptx/fePLOT-1.png" id="0" name="Picture 1"/>
+          <p:cNvPicPr>
+            <a:picLocks noGrp="1" noChangeAspect="1"/>
+          </p:cNvPicPr>
+          <p:nvPr/>
+        </p:nvPicPr>
+        <p:blipFill>
+          <a:blip r:embed="rId2"/>
+          <a:stretch>
+            <a:fillRect/>
+          </a:stretch>
+        </p:blipFill>
+        <p:spPr bwMode="auto">
+          <a:xfrm>
+            <a:off x="2451100" y="1193800"/>
+            <a:ext cx="4241800" cy="3390900"/>
+          </a:xfrm>
+          <a:prstGeom prst="rect">
+            <a:avLst/>
+          </a:prstGeom>
+          <a:noFill/>
+          <a:ln w="9525">
+            <a:noFill/>
+            <a:headEnd/>
+            <a:tailEnd/>
+          </a:ln>
+        </p:spPr>
+      </p:pic>
+    </p:spTree>
+  </p:cSld>
+</p:sld>
+</file>
+
+<file path=ppt/slides/slide23.xml><?xml version="1.0" encoding="utf-8"?>
+<p:sld xmlns:a="http://schemas.openxmlformats.org/drawingml/2006/main" xmlns:r="http://schemas.openxmlformats.org/officeDocument/2006/relationships" xmlns:p="http://schemas.openxmlformats.org/presentationml/2006/main">
+  <p:cSld>
+    <p:spTree>
+      <p:nvGrpSpPr>
+        <p:cNvPr id="1" name=""/>
+        <p:cNvGrpSpPr/>
+        <p:nvPr/>
+      </p:nvGrpSpPr>
+      <p:grpSpPr>
+        <a:xfrm>
+          <a:off x="0" y="0"/>
+          <a:ext cx="0" cy="0"/>
+          <a:chOff x="0" y="0"/>
+          <a:chExt cx="0" cy="0"/>
+        </a:xfrm>
+      </p:grpSpPr>
+      <p:sp>
+        <p:nvSpPr>
+          <p:cNvPr id="2" name="Title 1"/>
+          <p:cNvSpPr>
+            <a:spLocks noGrp="1"/>
+          </p:cNvSpPr>
+          <p:nvPr>
+            <p:ph type="title"/>
+          </p:nvPr>
+        </p:nvSpPr>
+        <p:spPr/>
+        <p:txBody>
+          <a:bodyPr/>
+          <a:lstStyle/>
+          <a:p>
+            <a:pPr lvl="0" indent="0" marL="0">
+              <a:buNone/>
+            </a:pPr>
+            <a:r>
+              <a:rPr/>
+              <a:t>Fixed effect model</a:t>
+            </a:r>
+          </a:p>
+        </p:txBody>
+      </p:sp>
+      <p:sp>
+        <p:nvSpPr>
+          <p:cNvPr id="3" name="Content Placeholder 2"/>
+          <p:cNvSpPr>
+            <a:spLocks noGrp="1"/>
+          </p:cNvSpPr>
+          <p:nvPr>
+            <p:ph idx="1"/>
+          </p:nvPr>
+        </p:nvSpPr>
+        <p:spPr/>
+        <p:txBody>
+          <a:bodyPr/>
+          <a:lstStyle/>
+          <a:p>
+            <a:pPr lvl="0" indent="0">
+              <a:buNone/>
+            </a:pPr>
+            <a:r>
+              <a:rPr i="1">
+                <a:solidFill>
+                  <a:srgbClr val="60A0B0"/>
+                </a:solidFill>
+                <a:latin typeface="Courier"/>
+              </a:rPr>
+              <a:t># Run a fixed effect meta-analysis using the FE dataset. </a:t>
+            </a:r>
+            <a:br/>
+            <a:r>
+              <a:rPr>
+                <a:latin typeface="Courier"/>
+              </a:rPr>
+              <a:t>    metafor</a:t>
+            </a:r>
+            <a:r>
+              <a:rPr>
+                <a:solidFill>
+                  <a:srgbClr val="4070A0"/>
+                </a:solidFill>
+                <a:latin typeface="Courier"/>
+              </a:rPr>
+              <a:t>::</a:t>
+            </a:r>
+            <a:r>
+              <a:rPr>
+                <a:solidFill>
+                  <a:srgbClr val="06287E"/>
+                </a:solidFill>
+                <a:latin typeface="Courier"/>
+              </a:rPr>
+              <a:t>rma</a:t>
+            </a:r>
+            <a:r>
+              <a:rPr>
+                <a:latin typeface="Courier"/>
+              </a:rPr>
+              <a:t>(</a:t>
+            </a:r>
+            <a:r>
+              <a:rPr>
+                <a:solidFill>
+                  <a:srgbClr val="7D9029"/>
+                </a:solidFill>
+                <a:latin typeface="Courier"/>
+              </a:rPr>
+              <a:t>yi =</a:t>
+            </a:r>
+            <a:r>
+              <a:rPr>
+                <a:latin typeface="Courier"/>
+              </a:rPr>
+              <a:t> es, </a:t>
+            </a:r>
+            <a:r>
+              <a:rPr>
+                <a:solidFill>
+                  <a:srgbClr val="7D9029"/>
+                </a:solidFill>
+                <a:latin typeface="Courier"/>
+              </a:rPr>
+              <a:t>vi =</a:t>
+            </a:r>
+            <a:r>
+              <a:rPr>
+                <a:latin typeface="Courier"/>
+              </a:rPr>
+              <a:t> Ves, </a:t>
+            </a:r>
+            <a:r>
+              <a:rPr>
+                <a:solidFill>
+                  <a:srgbClr val="7D9029"/>
+                </a:solidFill>
+                <a:latin typeface="Courier"/>
+              </a:rPr>
+              <a:t>method =</a:t>
+            </a:r>
+            <a:r>
+              <a:rPr>
+                <a:latin typeface="Courier"/>
+              </a:rPr>
+              <a:t> </a:t>
+            </a:r>
+            <a:r>
+              <a:rPr>
+                <a:solidFill>
+                  <a:srgbClr val="4070A0"/>
+                </a:solidFill>
+                <a:latin typeface="Courier"/>
+              </a:rPr>
+              <a:t>"FE"</a:t>
+            </a:r>
+            <a:r>
+              <a:rPr>
+                <a:latin typeface="Courier"/>
+              </a:rPr>
+              <a:t>, </a:t>
+            </a:r>
+            <a:r>
+              <a:rPr>
+                <a:solidFill>
+                  <a:srgbClr val="7D9029"/>
+                </a:solidFill>
+                <a:latin typeface="Courier"/>
+              </a:rPr>
+              <a:t>data =</a:t>
+            </a:r>
+            <a:r>
+              <a:rPr>
+                <a:latin typeface="Courier"/>
+              </a:rPr>
+              <a:t> dataFE)</a:t>
+            </a:r>
+          </a:p>
+          <a:p>
+            <a:pPr lvl="0" indent="0">
+              <a:buNone/>
+            </a:pPr>
+            <a:r>
+              <a:rPr>
+                <a:latin typeface="Courier"/>
+              </a:rPr>
+              <a:t>## 
+## Fixed-Effects Model (k = 5)
+## 
+## I^2 (total heterogeneity / total variability):   0.00%
+## H^2 (total variability / sampling variability):  0.56
+## 
+## Test for Heterogeneity:
+## Q(df = 4) = 2.2340, p-val = 0.6928
+## 
+## Model Results:
+## 
+## estimate      se     zval    pval   ci.lb   ci.ub     ​ 
+##   2.0731  0.0994  20.8459  &lt;.0001  1.8782  2.2680  *** 
+## 
+## ---
+## Signif. codes:  0 '***' 0.001 '**' 0.01 '*' 0.05 '.' 0.1 ' ' 1</a:t>
+            </a:r>
+          </a:p>
+        </p:txBody>
+      </p:sp>
+    </p:spTree>
+  </p:cSld>
+</p:sld>
+</file>
+
+<file path=ppt/slides/slide24.xml><?xml version="1.0" encoding="utf-8"?>
+<p:sld xmlns:a="http://schemas.openxmlformats.org/drawingml/2006/main" xmlns:r="http://schemas.openxmlformats.org/officeDocument/2006/relationships" xmlns:p="http://schemas.openxmlformats.org/presentationml/2006/main">
+  <p:cSld>
+    <p:spTree>
+      <p:nvGrpSpPr>
+        <p:cNvPr id="1" name=""/>
+        <p:cNvGrpSpPr/>
+        <p:nvPr/>
+      </p:nvGrpSpPr>
+      <p:grpSpPr>
+        <a:xfrm>
+          <a:off x="0" y="0"/>
+          <a:ext cx="0" cy="0"/>
+          <a:chOff x="0" y="0"/>
+          <a:chExt cx="0" cy="0"/>
+        </a:xfrm>
+      </p:grpSpPr>
+      <p:sp>
+        <p:nvSpPr>
+          <p:cNvPr id="2" name="Title 1"/>
+          <p:cNvSpPr>
+            <a:spLocks noGrp="1"/>
+          </p:cNvSpPr>
+          <p:nvPr>
+            <p:ph type="title"/>
+          </p:nvPr>
+        </p:nvSpPr>
+        <p:spPr/>
+        <p:txBody>
+          <a:bodyPr/>
+          <a:lstStyle/>
+          <a:p>
+            <a:pPr lvl="0" indent="0" marL="0">
+              <a:buNone/>
+            </a:pPr>
+            <a:r>
+              <a:rPr/>
+              <a:t>Now by hand FE</a:t>
+            </a:r>
+          </a:p>
+        </p:txBody>
+      </p:sp>
+      <mc:AlternateContent xmlns:mc="http://schemas.openxmlformats.org/markup-compatibility/2006">
+        <mc:Choice xmlns:a14="http://schemas.microsoft.com/office/drawing/2010/main" Requires="a14">
+          <p:sp>
+            <p:nvSpPr>
+              <p:cNvPr id="3" name="Content Placeholder 2"/>
+              <p:cNvSpPr>
+                <a:spLocks noGrp="1"/>
+              </p:cNvSpPr>
+              <p:nvPr>
+                <p:ph idx="1"/>
+              </p:nvPr>
+            </p:nvSpPr>
+            <p:spPr/>
+            <p:txBody>
+              <a:bodyPr/>
+              <a:lstStyle/>
+              <a:p>
+                <a:pPr lvl="0" indent="0" marL="0">
+                  <a:buNone/>
+                </a:pPr>
+                <a:r>
+                  <a:rPr/>
+                  <a:t>We can even do all the seemingly fancy stuff </a:t>
+                </a:r>
+                <a:r>
+                  <a:rPr>
+                    <a:latin typeface="Courier"/>
+                  </a:rPr>
+                  <a:t>metafor</a:t>
+                </a:r>
+                <a:r>
+                  <a:rPr/>
+                  <a:t> is doing ourselves if we want….we just need to know the equations:</a:t>
+                </a:r>
+              </a:p>
+              <a:p>
+                <a:pPr lvl="0" indent="0" marL="0">
+                  <a:buNone/>
+                </a:pPr>
+                <a14:m>
+                  <m:oMathPara xmlns:m="http://schemas.openxmlformats.org/officeDocument/2006/math">
+                    <m:oMathParaPr>
+                      <m:jc m:val="center"/>
+                    </m:oMathParaPr>
+                    <m:oMath>
+                      <m:acc>
+                        <m:accPr>
+                          <m:chr m:val="‾"/>
+                        </m:accPr>
+                        <m:e>
+                          <m:r>
+                            <m:t>E</m:t>
+                          </m:r>
+                          <m:r>
+                            <m:t>S</m:t>
+                          </m:r>
+                        </m:e>
+                      </m:acc>
+                      <m:r>
+                        <m:rPr>
+                          <m:sty m:val="p"/>
+                        </m:rPr>
+                        <m:t>=</m:t>
+                      </m:r>
+                      <m:r>
+                        <m:rPr>
+                          <m:sty m:val="p"/>
+                        </m:rPr>
+                        <m:t>∑</m:t>
+                      </m:r>
+                      <m:d>
+                        <m:dPr>
+                          <m:begChr m:val="("/>
+                          <m:endChr m:val=")"/>
+                          <m:sepChr m:val=""/>
+                          <m:grow/>
+                        </m:dPr>
+                        <m:e>
+                          <m:r>
+                            <m:t>W</m:t>
+                          </m:r>
+                          <m:r>
+                            <m:rPr>
+                              <m:sty m:val="p"/>
+                            </m:rPr>
+                            <m:t>*</m:t>
+                          </m:r>
+                          <m:r>
+                            <m:t>E</m:t>
+                          </m:r>
+                          <m:r>
+                            <m:t>S</m:t>
+                          </m:r>
+                        </m:e>
+                      </m:d>
+                      <m:r>
+                        <m:rPr>
+                          <m:sty m:val="p"/>
+                        </m:rPr>
+                        <m:t>/</m:t>
+                      </m:r>
+                      <m:r>
+                        <m:rPr>
+                          <m:sty m:val="p"/>
+                        </m:rPr>
+                        <m:t>∑</m:t>
+                      </m:r>
+                      <m:r>
+                        <m:t>W</m:t>
+                      </m:r>
+                    </m:oMath>
+                  </m:oMathPara>
+                </a14:m>
+              </a:p>
+              <a:p>
+                <a:pPr lvl="0" indent="0" marL="0">
+                  <a:buNone/>
+                </a:pPr>
+                <a14:m>
+                  <m:oMathPara xmlns:m="http://schemas.openxmlformats.org/officeDocument/2006/math">
+                    <m:oMathParaPr>
+                      <m:jc m:val="center"/>
+                    </m:oMathParaPr>
+                    <m:oMath>
+                      <m:sSubSup>
+                        <m:e>
+                          <m:r>
+                            <m:t>σ</m:t>
+                          </m:r>
+                        </m:e>
+                        <m:sub>
+                          <m:acc>
+                            <m:accPr>
+                              <m:chr m:val="‾"/>
+                            </m:accPr>
+                            <m:e>
+                              <m:r>
+                                <m:t>E</m:t>
+                              </m:r>
+                              <m:r>
+                                <m:t>S</m:t>
+                              </m:r>
+                            </m:e>
+                          </m:acc>
+                        </m:sub>
+                        <m:sup>
+                          <m:r>
+                            <m:t>2</m:t>
+                          </m:r>
+                        </m:sup>
+                      </m:sSubSup>
+                      <m:r>
+                        <m:rPr>
+                          <m:sty m:val="p"/>
+                        </m:rPr>
+                        <m:t>=</m:t>
+                      </m:r>
+                      <m:f>
+                        <m:fPr>
+                          <m:type m:val="bar"/>
+                        </m:fPr>
+                        <m:num>
+                          <m:r>
+                            <m:t>1</m:t>
+                          </m:r>
+                        </m:num>
+                        <m:den>
+                          <m:r>
+                            <m:rPr>
+                              <m:sty m:val="p"/>
+                            </m:rPr>
+                            <m:t>∑</m:t>
+                          </m:r>
+                          <m:r>
+                            <m:t>W</m:t>
+                          </m:r>
+                        </m:den>
+                      </m:f>
+                    </m:oMath>
+                  </m:oMathPara>
+                </a14:m>
+              </a:p>
+              <a:p>
+                <a:pPr lvl="0" indent="0">
+                  <a:buNone/>
+                </a:pPr>
+                <a:r>
+                  <a:rPr i="1">
+                    <a:solidFill>
+                      <a:srgbClr val="60A0B0"/>
+                    </a:solidFill>
+                    <a:latin typeface="Courier"/>
+                  </a:rPr>
+                  <a:t># Calculate pooled effect size</a:t>
+                </a:r>
+                <a:br/>
+                <a:r>
+                  <a:rPr>
+                    <a:latin typeface="Courier"/>
+                  </a:rPr>
+                  <a:t>       EsP.FE </a:t>
+                </a:r>
+                <a:r>
+                  <a:rPr>
+                    <a:solidFill>
+                      <a:srgbClr val="007020"/>
+                    </a:solidFill>
+                    <a:latin typeface="Courier"/>
+                  </a:rPr>
+                  <a:t>&lt;-</a:t>
+                </a:r>
+                <a:r>
+                  <a:rPr>
+                    <a:latin typeface="Courier"/>
+                  </a:rPr>
+                  <a:t> </a:t>
+                </a:r>
+                <a:r>
+                  <a:rPr>
+                    <a:solidFill>
+                      <a:srgbClr val="06287E"/>
+                    </a:solidFill>
+                    <a:latin typeface="Courier"/>
+                  </a:rPr>
+                  <a:t>sum</a:t>
+                </a:r>
+                <a:r>
+                  <a:rPr>
+                    <a:latin typeface="Courier"/>
+                  </a:rPr>
+                  <a:t>(W</a:t>
+                </a:r>
+                <a:r>
+                  <a:rPr>
+                    <a:solidFill>
+                      <a:srgbClr val="4070A0"/>
+                    </a:solidFill>
+                    <a:latin typeface="Courier"/>
+                  </a:rPr>
+                  <a:t>*</a:t>
+                </a:r>
+                <a:r>
+                  <a:rPr>
+                    <a:latin typeface="Courier"/>
+                  </a:rPr>
+                  <a:t>dataFE</a:t>
+                </a:r>
+                <a:r>
+                  <a:rPr>
+                    <a:solidFill>
+                      <a:srgbClr val="4070A0"/>
+                    </a:solidFill>
+                    <a:latin typeface="Courier"/>
+                  </a:rPr>
+                  <a:t>$</a:t>
+                </a:r>
+                <a:r>
+                  <a:rPr>
+                    <a:latin typeface="Courier"/>
+                  </a:rPr>
+                  <a:t>es) </a:t>
+                </a:r>
+                <a:r>
+                  <a:rPr>
+                    <a:solidFill>
+                      <a:srgbClr val="4070A0"/>
+                    </a:solidFill>
+                    <a:latin typeface="Courier"/>
+                  </a:rPr>
+                  <a:t>/</a:t>
+                </a:r>
+                <a:r>
+                  <a:rPr>
+                    <a:latin typeface="Courier"/>
+                  </a:rPr>
+                  <a:t> </a:t>
+                </a:r>
+                <a:r>
+                  <a:rPr>
+                    <a:solidFill>
+                      <a:srgbClr val="06287E"/>
+                    </a:solidFill>
+                    <a:latin typeface="Courier"/>
+                  </a:rPr>
+                  <a:t>sum</a:t>
+                </a:r>
+                <a:r>
+                  <a:rPr>
+                    <a:latin typeface="Courier"/>
+                  </a:rPr>
+                  <a:t>(W)</a:t>
+                </a:r>
+                <a:br/>
+                <a:r>
+                  <a:rPr>
+                    <a:latin typeface="Courier"/>
+                  </a:rPr>
+                  <a:t>       EsP.FE</a:t>
+                </a:r>
+              </a:p>
+              <a:p>
+                <a:pPr lvl="0" indent="0">
+                  <a:buNone/>
+                </a:pPr>
+                <a:r>
+                  <a:rPr>
+                    <a:latin typeface="Courier"/>
+                  </a:rPr>
+                  <a:t>## [1] 2.073105</a:t>
+                </a:r>
+              </a:p>
+              <a:p>
+                <a:pPr lvl="0" indent="0">
+                  <a:buNone/>
+                </a:pPr>
+                <a:r>
+                  <a:rPr i="1">
+                    <a:solidFill>
+                      <a:srgbClr val="60A0B0"/>
+                    </a:solidFill>
+                    <a:latin typeface="Courier"/>
+                  </a:rPr>
+                  <a:t># Calculate the pooled variance around estimate</a:t>
+                </a:r>
+                <a:br/>
+                <a:r>
+                  <a:rPr>
+                    <a:latin typeface="Courier"/>
+                  </a:rPr>
+                  <a:t>    VarEsP.FE </a:t>
+                </a:r>
+                <a:r>
+                  <a:rPr>
+                    <a:solidFill>
+                      <a:srgbClr val="007020"/>
+                    </a:solidFill>
+                    <a:latin typeface="Courier"/>
+                  </a:rPr>
+                  <a:t>&lt;-</a:t>
+                </a:r>
+                <a:r>
+                  <a:rPr>
+                    <a:latin typeface="Courier"/>
+                  </a:rPr>
+                  <a:t> </a:t>
+                </a:r>
+                <a:r>
+                  <a:rPr>
+                    <a:solidFill>
+                      <a:srgbClr val="40A070"/>
+                    </a:solidFill>
+                    <a:latin typeface="Courier"/>
+                  </a:rPr>
+                  <a:t>1</a:t>
+                </a:r>
+                <a:r>
+                  <a:rPr>
+                    <a:latin typeface="Courier"/>
+                  </a:rPr>
+                  <a:t> </a:t>
+                </a:r>
+                <a:r>
+                  <a:rPr>
+                    <a:solidFill>
+                      <a:srgbClr val="4070A0"/>
+                    </a:solidFill>
+                    <a:latin typeface="Courier"/>
+                  </a:rPr>
+                  <a:t>/</a:t>
+                </a:r>
+                <a:r>
+                  <a:rPr>
+                    <a:latin typeface="Courier"/>
+                  </a:rPr>
+                  <a:t> </a:t>
+                </a:r>
+                <a:r>
+                  <a:rPr>
+                    <a:solidFill>
+                      <a:srgbClr val="06287E"/>
+                    </a:solidFill>
+                    <a:latin typeface="Courier"/>
+                  </a:rPr>
+                  <a:t>sum</a:t>
+                </a:r>
+                <a:r>
+                  <a:rPr>
+                    <a:latin typeface="Courier"/>
+                  </a:rPr>
+                  <a:t>(W)</a:t>
+                </a:r>
+                <a:br/>
+                <a:r>
+                  <a:rPr>
+                    <a:latin typeface="Courier"/>
+                  </a:rPr>
+                  <a:t>    VarEsP.FE</a:t>
+                </a:r>
+              </a:p>
+              <a:p>
+                <a:pPr lvl="0" indent="0">
+                  <a:buNone/>
+                </a:pPr>
+                <a:r>
+                  <a:rPr>
+                    <a:latin typeface="Courier"/>
+                  </a:rPr>
+                  <a:t>## [1] 0.00989011</a:t>
+                </a:r>
+              </a:p>
+              <a:p>
+                <a:pPr lvl="0" indent="0">
+                  <a:buNone/>
+                </a:pPr>
+                <a:r>
+                  <a:rPr i="1">
+                    <a:solidFill>
+                      <a:srgbClr val="60A0B0"/>
+                    </a:solidFill>
+                    <a:latin typeface="Courier"/>
+                  </a:rPr>
+                  <a:t># Calculate the standard error around estimate</a:t>
+                </a:r>
+                <a:br/>
+                <a:r>
+                  <a:rPr>
+                    <a:latin typeface="Courier"/>
+                  </a:rPr>
+                  <a:t>    SE.EsP.FE </a:t>
+                </a:r>
+                <a:r>
+                  <a:rPr>
+                    <a:solidFill>
+                      <a:srgbClr val="007020"/>
+                    </a:solidFill>
+                    <a:latin typeface="Courier"/>
+                  </a:rPr>
+                  <a:t>&lt;-</a:t>
+                </a:r>
+                <a:r>
+                  <a:rPr>
+                    <a:latin typeface="Courier"/>
+                  </a:rPr>
+                  <a:t> </a:t>
+                </a:r>
+                <a:r>
+                  <a:rPr>
+                    <a:solidFill>
+                      <a:srgbClr val="06287E"/>
+                    </a:solidFill>
+                    <a:latin typeface="Courier"/>
+                  </a:rPr>
+                  <a:t>sqrt</a:t>
+                </a:r>
+                <a:r>
+                  <a:rPr>
+                    <a:latin typeface="Courier"/>
+                  </a:rPr>
+                  <a:t>(VarEsP.FE)</a:t>
+                </a:r>
+                <a:br/>
+                <a:r>
+                  <a:rPr>
+                    <a:latin typeface="Courier"/>
+                  </a:rPr>
+                  <a:t>    SE.EsP.FE</a:t>
+                </a:r>
+              </a:p>
+              <a:p>
+                <a:pPr lvl="0" indent="0">
+                  <a:buNone/>
+                </a:pPr>
+                <a:r>
+                  <a:rPr>
+                    <a:latin typeface="Courier"/>
+                  </a:rPr>
+                  <a:t>## [1] 0.09944903</a:t>
+                </a:r>
+              </a:p>
+            </p:txBody>
+          </p:sp>
+        </mc:Choice>
+      </mc:AlternateContent>
+    </p:spTree>
+  </p:cSld>
+</p:sld>
+</file>
+
+<file path=ppt/slides/slide25.xml><?xml version="1.0" encoding="utf-8"?>
+<p:sld xmlns:a="http://schemas.openxmlformats.org/drawingml/2006/main" xmlns:r="http://schemas.openxmlformats.org/officeDocument/2006/relationships" xmlns:p="http://schemas.openxmlformats.org/presentationml/2006/main">
+  <p:cSld>
+    <p:spTree>
+      <p:nvGrpSpPr>
+        <p:cNvPr id="1" name=""/>
+        <p:cNvGrpSpPr/>
+        <p:nvPr/>
+      </p:nvGrpSpPr>
+      <p:grpSpPr>
+        <a:xfrm>
+          <a:off x="0" y="0"/>
+          <a:ext cx="0" cy="0"/>
+          <a:chOff x="0" y="0"/>
+          <a:chExt cx="0" cy="0"/>
+        </a:xfrm>
+      </p:grpSpPr>
+      <p:sp>
+        <p:nvSpPr>
+          <p:cNvPr id="2" name="Title 1"/>
+          <p:cNvSpPr>
+            <a:spLocks noGrp="1"/>
+          </p:cNvSpPr>
+          <p:nvPr>
+            <p:ph type="title"/>
+          </p:nvPr>
+        </p:nvSpPr>
+        <p:spPr/>
+        <p:txBody>
+          <a:bodyPr/>
+          <a:lstStyle/>
+          <a:p>
+            <a:pPr lvl="0" indent="0" marL="0">
+              <a:buNone/>
+            </a:pPr>
+            <a:r>
+              <a:rPr/>
+              <a:t>Random effect in code</a:t>
+            </a:r>
+          </a:p>
+        </p:txBody>
+      </p:sp>
+      <p:sp>
+        <p:nvSpPr>
+          <p:cNvPr id="3" name="Content Placeholder 2"/>
+          <p:cNvSpPr>
+            <a:spLocks noGrp="1"/>
+          </p:cNvSpPr>
+          <p:nvPr>
+            <p:ph idx="1"/>
+          </p:nvPr>
+        </p:nvSpPr>
+        <p:spPr/>
+        <p:txBody>
+          <a:bodyPr/>
+          <a:lstStyle/>
+          <a:p>
+            <a:pPr lvl="0" indent="0">
+              <a:buNone/>
+            </a:pPr>
+            <a:r>
+              <a:rPr i="1">
+                <a:solidFill>
+                  <a:srgbClr val="60A0B0"/>
+                </a:solidFill>
+                <a:latin typeface="Courier"/>
+              </a:rPr>
+              <a:t># Here adding 0.8 says we want to add 0.8 as the between study variability. In other words, each effect size is sampled from a larger distribution of effect sizes that itself comes from a distribution with a variance of 0.8. </a:t>
+            </a:r>
+            <a:br/>
+            <a:r>
+              <a:rPr>
+                <a:latin typeface="Courier"/>
+              </a:rPr>
+              <a:t>    esRE        </a:t>
+            </a:r>
+            <a:r>
+              <a:rPr>
+                <a:solidFill>
+                  <a:srgbClr val="007020"/>
+                </a:solidFill>
+                <a:latin typeface="Courier"/>
+              </a:rPr>
+              <a:t>&lt;-</a:t>
+            </a:r>
+            <a:r>
+              <a:rPr>
+                <a:latin typeface="Courier"/>
+              </a:rPr>
+              <a:t> </a:t>
+            </a:r>
+            <a:r>
+              <a:rPr>
+                <a:solidFill>
+                  <a:srgbClr val="06287E"/>
+                </a:solidFill>
+                <a:latin typeface="Courier"/>
+              </a:rPr>
+              <a:t>rnorm</a:t>
+            </a:r>
+            <a:r>
+              <a:rPr>
+                <a:latin typeface="Courier"/>
+              </a:rPr>
+              <a:t>(</a:t>
+            </a:r>
+            <a:r>
+              <a:rPr>
+                <a:solidFill>
+                  <a:srgbClr val="06287E"/>
+                </a:solidFill>
+                <a:latin typeface="Courier"/>
+              </a:rPr>
+              <a:t>length</a:t>
+            </a:r>
+            <a:r>
+              <a:rPr>
+                <a:latin typeface="Courier"/>
+              </a:rPr>
+              <a:t>(Ves), </a:t>
+            </a:r>
+            <a:r>
+              <a:rPr>
+                <a:solidFill>
+                  <a:srgbClr val="40A070"/>
+                </a:solidFill>
+                <a:latin typeface="Courier"/>
+              </a:rPr>
+              <a:t>2</a:t>
+            </a:r>
+            <a:r>
+              <a:rPr>
+                <a:latin typeface="Courier"/>
+              </a:rPr>
+              <a:t>, </a:t>
+            </a:r>
+            <a:r>
+              <a:rPr>
+                <a:solidFill>
+                  <a:srgbClr val="06287E"/>
+                </a:solidFill>
+                <a:latin typeface="Courier"/>
+              </a:rPr>
+              <a:t>sqrt</a:t>
+            </a:r>
+            <a:r>
+              <a:rPr>
+                <a:latin typeface="Courier"/>
+              </a:rPr>
+              <a:t>(Ves </a:t>
+            </a:r>
+            <a:r>
+              <a:rPr>
+                <a:solidFill>
+                  <a:srgbClr val="4070A0"/>
+                </a:solidFill>
+                <a:latin typeface="Courier"/>
+              </a:rPr>
+              <a:t>+</a:t>
+            </a:r>
+            <a:r>
+              <a:rPr>
+                <a:latin typeface="Courier"/>
+              </a:rPr>
+              <a:t> </a:t>
+            </a:r>
+            <a:r>
+              <a:rPr>
+                <a:solidFill>
+                  <a:srgbClr val="40A070"/>
+                </a:solidFill>
+                <a:latin typeface="Courier"/>
+              </a:rPr>
+              <a:t>0.8</a:t>
+            </a:r>
+            <a:r>
+              <a:rPr>
+                <a:latin typeface="Courier"/>
+              </a:rPr>
+              <a:t>)) </a:t>
+            </a:r>
+            <a:br/>
+            <a:r>
+              <a:rPr i="1">
+                <a:solidFill>
+                  <a:srgbClr val="60A0B0"/>
+                </a:solidFill>
+                <a:latin typeface="Courier"/>
+              </a:rPr>
+              <a:t># Data for our random effect meta-analysis </a:t>
+            </a:r>
+            <a:br/>
+            <a:r>
+              <a:rPr>
+                <a:latin typeface="Courier"/>
+              </a:rPr>
+              <a:t>    dataRE </a:t>
+            </a:r>
+            <a:r>
+              <a:rPr>
+                <a:solidFill>
+                  <a:srgbClr val="007020"/>
+                </a:solidFill>
+                <a:latin typeface="Courier"/>
+              </a:rPr>
+              <a:t>&lt;-</a:t>
+            </a:r>
+            <a:r>
+              <a:rPr>
+                <a:latin typeface="Courier"/>
+              </a:rPr>
+              <a:t>  </a:t>
+            </a:r>
+            <a:r>
+              <a:rPr>
+                <a:solidFill>
+                  <a:srgbClr val="06287E"/>
+                </a:solidFill>
+                <a:latin typeface="Courier"/>
+              </a:rPr>
+              <a:t>data.frame</a:t>
+            </a:r>
+            <a:r>
+              <a:rPr>
+                <a:latin typeface="Courier"/>
+              </a:rPr>
+              <a:t>(</a:t>
+            </a:r>
+            <a:r>
+              <a:rPr>
+                <a:solidFill>
+                  <a:srgbClr val="7D9029"/>
+                </a:solidFill>
+                <a:latin typeface="Courier"/>
+              </a:rPr>
+              <a:t>stdy =</a:t>
+            </a:r>
+            <a:r>
+              <a:rPr>
+                <a:latin typeface="Courier"/>
+              </a:rPr>
+              <a:t> stdy, esRE, Ves)</a:t>
+            </a:r>
+          </a:p>
+        </p:txBody>
+      </p:sp>
+    </p:spTree>
+  </p:cSld>
+</p:sld>
+</file>
+
+<file path=ppt/slides/slide26.xml><?xml version="1.0" encoding="utf-8"?>
+<p:sld xmlns:a="http://schemas.openxmlformats.org/drawingml/2006/main" xmlns:r="http://schemas.openxmlformats.org/officeDocument/2006/relationships" xmlns:p="http://schemas.openxmlformats.org/presentationml/2006/main">
+  <p:cSld>
+    <p:spTree>
+      <p:nvGrpSpPr>
+        <p:cNvPr id="1" name=""/>
+        <p:cNvGrpSpPr/>
+        <p:nvPr/>
+      </p:nvGrpSpPr>
+      <p:grpSpPr>
+        <a:xfrm>
+          <a:off x="0" y="0"/>
+          <a:ext cx="0" cy="0"/>
+          <a:chOff x="0" y="0"/>
+          <a:chExt cx="0" cy="0"/>
+        </a:xfrm>
+      </p:grpSpPr>
+      <p:sp>
+        <p:nvSpPr>
+          <p:cNvPr id="2" name="Title 1"/>
+          <p:cNvSpPr>
+            <a:spLocks noGrp="1"/>
+          </p:cNvSpPr>
+          <p:nvPr>
+            <p:ph type="title"/>
+          </p:nvPr>
+        </p:nvSpPr>
+        <p:spPr/>
+        <p:txBody>
+          <a:bodyPr/>
+          <a:lstStyle/>
+          <a:p>
+            <a:pPr lvl="0" indent="0" marL="0">
+              <a:buNone/>
+            </a:pPr>
+            <a:r>
+              <a:rPr/>
+              <a:t>Random effect plot</a:t>
+            </a:r>
+          </a:p>
+        </p:txBody>
+      </p:sp>
+      <p:pic>
+        <p:nvPicPr>
+          <p:cNvPr descr="code_slides_files/figure-pptx/fvsr-1.png" id="0" name="Picture 1"/>
+          <p:cNvPicPr>
+            <a:picLocks noGrp="1" noChangeAspect="1"/>
+          </p:cNvPicPr>
+          <p:nvPr/>
+        </p:nvPicPr>
+        <p:blipFill>
+          <a:blip r:embed="rId2"/>
+          <a:stretch>
+            <a:fillRect/>
+          </a:stretch>
+        </p:blipFill>
+        <p:spPr bwMode="auto">
+          <a:xfrm>
+            <a:off x="2768600" y="1193800"/>
+            <a:ext cx="3606800" cy="2882900"/>
+          </a:xfrm>
+          <a:prstGeom prst="rect">
+            <a:avLst/>
+          </a:prstGeom>
+          <a:noFill/>
+          <a:ln w="9525">
+            <a:noFill/>
+            <a:headEnd/>
+            <a:tailEnd/>
+          </a:ln>
+        </p:spPr>
+      </p:pic>
+      <p:sp>
+        <p:nvSpPr>
+          <p:cNvPr id="1" name="TextBox 3"/>
+          <p:cNvSpPr txBox="1"/>
+          <p:nvPr/>
+        </p:nvSpPr>
+        <p:spPr>
+          <a:xfrm>
+            <a:off x="457200" y="4076700"/>
+            <a:ext cx="8229600" cy="508000"/>
+          </a:xfrm>
+          <a:prstGeom prst="rect">
+            <a:avLst/>
+          </a:prstGeom>
+          <a:noFill/>
+        </p:spPr>
+        <p:txBody>
+          <a:bodyPr/>
+          <a:lstStyle/>
+          <a:p>
+            <a:pPr lvl="0" indent="0" marL="0" algn="ctr">
+              <a:buNone/>
+            </a:pPr>
+            <a:r>
+              <a:rPr/>
+              <a:t>Mean (arrows are sampling standard deviation) effect size for each study. Data simulated under a fixed effect model in black and data simulated under a random effect model in red.</a:t>
+            </a:r>
+          </a:p>
+        </p:txBody>
+      </p:sp>
+    </p:spTree>
+  </p:cSld>
+</p:sld>
+</file>
+
+<file path=ppt/slides/slide27.xml><?xml version="1.0" encoding="utf-8"?>
+<p:sld xmlns:a="http://schemas.openxmlformats.org/drawingml/2006/main" xmlns:r="http://schemas.openxmlformats.org/officeDocument/2006/relationships" xmlns:p="http://schemas.openxmlformats.org/presentationml/2006/main">
+  <p:cSld>
+    <p:spTree>
+      <p:nvGrpSpPr>
+        <p:cNvPr id="1" name=""/>
+        <p:cNvGrpSpPr/>
+        <p:nvPr/>
+      </p:nvGrpSpPr>
+      <p:grpSpPr>
+        <a:xfrm>
+          <a:off x="0" y="0"/>
+          <a:ext cx="0" cy="0"/>
+          <a:chOff x="0" y="0"/>
+          <a:chExt cx="0" cy="0"/>
+        </a:xfrm>
+      </p:grpSpPr>
+      <p:sp>
+        <p:nvSpPr>
+          <p:cNvPr id="3" name="Content Placeholder 2"/>
+          <p:cNvSpPr>
+            <a:spLocks noGrp="1"/>
+          </p:cNvSpPr>
+          <p:nvPr>
+            <p:ph idx="1"/>
+          </p:nvPr>
+        </p:nvSpPr>
+        <p:spPr/>
+        <p:txBody>
+          <a:bodyPr/>
+          <a:lstStyle/>
+          <a:p>
+            <a:pPr lvl="0" indent="0" marL="0">
+              <a:buNone/>
+            </a:pPr>
+            <a:r>
+              <a:rPr/>
+              <a:t> ## random effect model</a:t>
+            </a:r>
+          </a:p>
+          <a:p>
+            <a:pPr lvl="0" indent="0">
+              <a:buNone/>
+            </a:pPr>
+            <a:r>
+              <a:rPr>
+                <a:latin typeface="Courier"/>
+              </a:rPr>
+              <a:t>metafor</a:t>
+            </a:r>
+            <a:r>
+              <a:rPr>
+                <a:solidFill>
+                  <a:srgbClr val="4070A0"/>
+                </a:solidFill>
+                <a:latin typeface="Courier"/>
+              </a:rPr>
+              <a:t>::</a:t>
+            </a:r>
+            <a:r>
+              <a:rPr>
+                <a:solidFill>
+                  <a:srgbClr val="06287E"/>
+                </a:solidFill>
+                <a:latin typeface="Courier"/>
+              </a:rPr>
+              <a:t>rma</a:t>
+            </a:r>
+            <a:r>
+              <a:rPr>
+                <a:latin typeface="Courier"/>
+              </a:rPr>
+              <a:t>(</a:t>
+            </a:r>
+            <a:r>
+              <a:rPr>
+                <a:solidFill>
+                  <a:srgbClr val="7D9029"/>
+                </a:solidFill>
+                <a:latin typeface="Courier"/>
+              </a:rPr>
+              <a:t>yi =</a:t>
+            </a:r>
+            <a:r>
+              <a:rPr>
+                <a:latin typeface="Courier"/>
+              </a:rPr>
+              <a:t> esRE, </a:t>
+            </a:r>
+            <a:r>
+              <a:rPr>
+                <a:solidFill>
+                  <a:srgbClr val="7D9029"/>
+                </a:solidFill>
+                <a:latin typeface="Courier"/>
+              </a:rPr>
+              <a:t>vi =</a:t>
+            </a:r>
+            <a:r>
+              <a:rPr>
+                <a:latin typeface="Courier"/>
+              </a:rPr>
+              <a:t> Ves, </a:t>
+            </a:r>
+            <a:r>
+              <a:rPr>
+                <a:solidFill>
+                  <a:srgbClr val="7D9029"/>
+                </a:solidFill>
+                <a:latin typeface="Courier"/>
+              </a:rPr>
+              <a:t>method=</a:t>
+            </a:r>
+            <a:r>
+              <a:rPr>
+                <a:solidFill>
+                  <a:srgbClr val="4070A0"/>
+                </a:solidFill>
+                <a:latin typeface="Courier"/>
+              </a:rPr>
+              <a:t>"DL"</a:t>
+            </a:r>
+            <a:r>
+              <a:rPr>
+                <a:latin typeface="Courier"/>
+              </a:rPr>
+              <a:t>, </a:t>
+            </a:r>
+            <a:r>
+              <a:rPr>
+                <a:solidFill>
+                  <a:srgbClr val="7D9029"/>
+                </a:solidFill>
+                <a:latin typeface="Courier"/>
+              </a:rPr>
+              <a:t>data =</a:t>
+            </a:r>
+            <a:r>
+              <a:rPr>
+                <a:latin typeface="Courier"/>
+              </a:rPr>
+              <a:t> dataRE)</a:t>
+            </a:r>
+          </a:p>
+          <a:p>
+            <a:pPr lvl="0" indent="0">
+              <a:buNone/>
+            </a:pPr>
+            <a:r>
+              <a:rPr>
+                <a:latin typeface="Courier"/>
+              </a:rPr>
+              <a:t>## 
+## Random-Effects Model (k = 5; tau^2 estimator: DL)
+## 
+## tau^2 (estimated amount of total heterogeneity): 0.2947 (SE = 0.2731)
+## tau (square root of estimated tau^2 value):      0.5429
+## I^2 (total heterogeneity / total variability):   83.61%
+## H^2 (total variability / sampling variability):  6.10
+## 
+## Test for Heterogeneity:
+## Q(df = 4) = 24.4015, p-val &lt; .0001
+## 
+## Model Results:
+## 
+## estimate      se    zval    pval   ci.lb   ci.ub     ​ 
+##   2.0163  0.2697  7.4753  &lt;.0001  1.4876  2.5449  *** 
+## 
+## ---
+## Signif. codes:  0 '***' 0.001 '**' 0.01 '*' 0.05 '.' 0.1 ' ' 1</a:t>
+            </a:r>
+          </a:p>
+        </p:txBody>
+      </p:sp>
+    </p:spTree>
+  </p:cSld>
+</p:sld>
+</file>
+
+<file path=ppt/slides/slide28.xml><?xml version="1.0" encoding="utf-8"?>
+<p:sld xmlns:a="http://schemas.openxmlformats.org/drawingml/2006/main" xmlns:r="http://schemas.openxmlformats.org/officeDocument/2006/relationships" xmlns:p="http://schemas.openxmlformats.org/presentationml/2006/main">
+  <p:cSld>
+    <p:spTree>
+      <p:nvGrpSpPr>
+        <p:cNvPr id="1" name=""/>
+        <p:cNvGrpSpPr/>
+        <p:nvPr/>
+      </p:nvGrpSpPr>
+      <p:grpSpPr>
+        <a:xfrm>
+          <a:off x="0" y="0"/>
+          <a:ext cx="0" cy="0"/>
+          <a:chOff x="0" y="0"/>
+          <a:chExt cx="0" cy="0"/>
+        </a:xfrm>
+      </p:grpSpPr>
+      <p:sp>
+        <p:nvSpPr>
+          <p:cNvPr id="2" name="Title 1"/>
+          <p:cNvSpPr>
+            <a:spLocks noGrp="1"/>
+          </p:cNvSpPr>
+          <p:nvPr>
+            <p:ph type="title"/>
+          </p:nvPr>
+        </p:nvSpPr>
+        <p:spPr/>
+        <p:txBody>
+          <a:bodyPr/>
+          <a:lstStyle/>
+          <a:p>
+            <a:pPr lvl="0" indent="0" marL="0">
+              <a:buNone/>
+            </a:pPr>
+            <a:r>
+              <a:rPr/>
+              <a:t>Random by hand</a:t>
+            </a:r>
+          </a:p>
+        </p:txBody>
+      </p:sp>
+      <mc:AlternateContent xmlns:mc="http://schemas.openxmlformats.org/markup-compatibility/2006">
+        <mc:Choice xmlns:a14="http://schemas.microsoft.com/office/drawing/2010/main" Requires="a14">
+          <p:sp>
+            <p:nvSpPr>
+              <p:cNvPr id="3" name="Content Placeholder 2"/>
+              <p:cNvSpPr>
+                <a:spLocks noGrp="1"/>
+              </p:cNvSpPr>
+              <p:nvPr>
+                <p:ph idx="1"/>
+              </p:nvPr>
+            </p:nvSpPr>
+            <p:spPr/>
+            <p:txBody>
+              <a:bodyPr/>
+              <a:lstStyle/>
+              <a:p>
+                <a:pPr lvl="0" indent="0" marL="0">
+                  <a:buNone/>
+                </a:pPr>
+                <a:r>
+                  <a:rPr/>
+                  <a:t>We first need to estimate </a:t>
+                </a:r>
+                <a14:m>
+                  <m:oMath xmlns:m="http://schemas.openxmlformats.org/officeDocument/2006/math">
+                    <m:sSup>
+                      <m:e>
+                        <m:r>
+                          <m:t>τ</m:t>
+                        </m:r>
+                      </m:e>
+                      <m:sup>
+                        <m:r>
+                          <m:t>2</m:t>
+                        </m:r>
+                      </m:sup>
+                    </m:sSup>
+                  </m:oMath>
+                </a14:m>
+                <a:r>
+                  <a:rPr/>
+                  <a:t> or the between-study variance which can be calculated from these equations:</a:t>
+                </a:r>
+              </a:p>
+              <a:p>
+                <a:pPr lvl="0" indent="0" marL="0">
+                  <a:buNone/>
+                </a:pPr>
+                <a14:m>
+                  <m:oMathPara xmlns:m="http://schemas.openxmlformats.org/officeDocument/2006/math">
+                    <m:oMathParaPr>
+                      <m:jc m:val="center"/>
+                    </m:oMathParaPr>
+                    <m:oMath>
+                      <m:sSup>
+                        <m:e>
+                          <m:r>
+                            <m:t>τ</m:t>
+                          </m:r>
+                        </m:e>
+                        <m:sup>
+                          <m:r>
+                            <m:t>2</m:t>
+                          </m:r>
+                        </m:sup>
+                      </m:sSup>
+                      <m:r>
+                        <m:rPr>
+                          <m:sty m:val="p"/>
+                        </m:rPr>
+                        <m:t>=</m:t>
+                      </m:r>
+                      <m:f>
+                        <m:fPr>
+                          <m:type m:val="bar"/>
+                        </m:fPr>
+                        <m:num>
+                          <m:r>
+                            <m:t>Q</m:t>
+                          </m:r>
+                          <m:r>
+                            <m:rPr>
+                              <m:sty m:val="p"/>
+                            </m:rPr>
+                            <m:t>−</m:t>
+                          </m:r>
+                          <m:r>
+                            <m:t>d</m:t>
+                          </m:r>
+                          <m:r>
+                            <m:t>f</m:t>
+                          </m:r>
+                        </m:num>
+                        <m:den>
+                          <m:r>
+                            <m:t>C</m:t>
+                          </m:r>
+                        </m:den>
+                      </m:f>
+                    </m:oMath>
+                  </m:oMathPara>
+                </a14:m>
+              </a:p>
+              <a:p>
+                <a:pPr lvl="0" indent="0" marL="0">
+                  <a:buNone/>
+                </a:pPr>
+                <a:r>
+                  <a:rPr/>
+                  <a:t>where</a:t>
+                </a:r>
+              </a:p>
+              <a:p>
+                <a:pPr lvl="0" indent="0" marL="0">
+                  <a:buNone/>
+                </a:pPr>
+                <a14:m>
+                  <m:oMathPara xmlns:m="http://schemas.openxmlformats.org/officeDocument/2006/math">
+                    <m:oMathParaPr>
+                      <m:jc m:val="center"/>
+                    </m:oMathParaPr>
+                    <m:oMath>
+                      <m:r>
+                        <m:t>Q</m:t>
+                      </m:r>
+                      <m:r>
+                        <m:rPr>
+                          <m:sty m:val="p"/>
+                        </m:rPr>
+                        <m:t>=</m:t>
+                      </m:r>
+                      <m:nary>
+                        <m:naryPr>
+                          <m:chr m:val="∑"/>
+                          <m:limLoc m:val="undOvr"/>
+                          <m:subHide m:val="0"/>
+                          <m:supHide m:val="0"/>
+                        </m:naryPr>
+                        <m:sub>
+                          <m:r>
+                            <m:t>i</m:t>
+                          </m:r>
+                          <m:r>
+                            <m:rPr>
+                              <m:sty m:val="p"/>
+                            </m:rPr>
+                            <m:t>=</m:t>
+                          </m:r>
+                          <m:r>
+                            <m:t>1</m:t>
+                          </m:r>
+                        </m:sub>
+                        <m:sup>
+                          <m:r>
+                            <m:t>k</m:t>
+                          </m:r>
+                        </m:sup>
+                        <m:e>
+                          <m:sSub>
+                            <m:e>
+                              <m:r>
+                                <m:t>W</m:t>
+                              </m:r>
+                            </m:e>
+                            <m:sub>
+                              <m:r>
+                                <m:t>i</m:t>
+                              </m:r>
+                            </m:sub>
+                          </m:sSub>
+                          <m:r>
+                            <m:t>E</m:t>
+                          </m:r>
+                          <m:sSubSup>
+                            <m:e>
+                              <m:r>
+                                <m:t>S</m:t>
+                              </m:r>
+                            </m:e>
+                            <m:sub>
+                              <m:r>
+                                <m:t>i</m:t>
+                              </m:r>
+                            </m:sub>
+                            <m:sup>
+                              <m:r>
+                                <m:t>2</m:t>
+                              </m:r>
+                            </m:sup>
+                          </m:sSubSup>
+                        </m:e>
+                      </m:nary>
+                      <m:r>
+                        <m:rPr>
+                          <m:sty m:val="p"/>
+                        </m:rPr>
+                        <m:t>−</m:t>
+                      </m:r>
+                      <m:f>
+                        <m:fPr>
+                          <m:type m:val="bar"/>
+                        </m:fPr>
+                        <m:num>
+                          <m:sSup>
+                            <m:e>
+                              <m:d>
+                                <m:dPr>
+                                  <m:begChr m:val="("/>
+                                  <m:endChr m:val=")"/>
+                                  <m:sepChr m:val=""/>
+                                  <m:grow/>
+                                </m:dPr>
+                                <m:e>
+                                  <m:nary>
+                                    <m:naryPr>
+                                      <m:chr m:val="∑"/>
+                                      <m:limLoc m:val="undOvr"/>
+                                      <m:subHide m:val="0"/>
+                                      <m:supHide m:val="0"/>
+                                    </m:naryPr>
+                                    <m:sub>
+                                      <m:r>
+                                        <m:t>i</m:t>
+                                      </m:r>
+                                      <m:r>
+                                        <m:rPr>
+                                          <m:sty m:val="p"/>
+                                        </m:rPr>
+                                        <m:t>=</m:t>
+                                      </m:r>
+                                      <m:r>
+                                        <m:t>1</m:t>
+                                      </m:r>
+                                    </m:sub>
+                                    <m:sup>
+                                      <m:r>
+                                        <m:t>k</m:t>
+                                      </m:r>
+                                    </m:sup>
+                                    <m:e>
+                                      <m:sSub>
+                                        <m:e>
+                                          <m:r>
+                                            <m:t>W</m:t>
+                                          </m:r>
+                                        </m:e>
+                                        <m:sub>
+                                          <m:r>
+                                            <m:t>i</m:t>
+                                          </m:r>
+                                        </m:sub>
+                                      </m:sSub>
+                                      <m:r>
+                                        <m:t>E</m:t>
+                                      </m:r>
+                                      <m:sSub>
+                                        <m:e>
+                                          <m:r>
+                                            <m:t>S</m:t>
+                                          </m:r>
+                                        </m:e>
+                                        <m:sub>
+                                          <m:r>
+                                            <m:t>i</m:t>
+                                          </m:r>
+                                        </m:sub>
+                                      </m:sSub>
+                                    </m:e>
+                                  </m:nary>
+                                </m:e>
+                              </m:d>
+                            </m:e>
+                            <m:sup>
+                              <m:r>
+                                <m:t>2</m:t>
+                              </m:r>
+                            </m:sup>
+                          </m:sSup>
+                        </m:num>
+                        <m:den>
+                          <m:nary>
+                            <m:naryPr>
+                              <m:chr m:val="∑"/>
+                              <m:limLoc m:val="undOvr"/>
+                              <m:subHide m:val="0"/>
+                              <m:supHide m:val="0"/>
+                            </m:naryPr>
+                            <m:sub>
+                              <m:r>
+                                <m:t>i</m:t>
+                              </m:r>
+                              <m:r>
+                                <m:rPr>
+                                  <m:sty m:val="p"/>
+                                </m:rPr>
+                                <m:t>=</m:t>
+                              </m:r>
+                              <m:r>
+                                <m:t>1</m:t>
+                              </m:r>
+                            </m:sub>
+                            <m:sup>
+                              <m:r>
+                                <m:t>k</m:t>
+                              </m:r>
+                            </m:sup>
+                            <m:e>
+                              <m:sSub>
+                                <m:e>
+                                  <m:r>
+                                    <m:t>W</m:t>
+                                  </m:r>
+                                </m:e>
+                                <m:sub>
+                                  <m:r>
+                                    <m:t>i</m:t>
+                                  </m:r>
+                                </m:sub>
+                              </m:sSub>
+                            </m:e>
+                          </m:nary>
+                        </m:den>
+                      </m:f>
+                    </m:oMath>
+                  </m:oMathPara>
+                </a14:m>
+              </a:p>
+              <a:p>
+                <a:pPr lvl="0" indent="0" marL="0">
+                  <a:buNone/>
+                </a:pPr>
+                <a14:m>
+                  <m:oMathPara xmlns:m="http://schemas.openxmlformats.org/officeDocument/2006/math">
+                    <m:oMathParaPr>
+                      <m:jc m:val="center"/>
+                    </m:oMathParaPr>
+                    <m:oMath>
+                      <m:r>
+                        <m:t>C</m:t>
+                      </m:r>
+                      <m:r>
+                        <m:rPr>
+                          <m:sty m:val="p"/>
+                        </m:rPr>
+                        <m:t>=</m:t>
+                      </m:r>
+                      <m:r>
+                        <m:rPr>
+                          <m:sty m:val="p"/>
+                        </m:rPr>
+                        <m:t>∑</m:t>
+                      </m:r>
+                      <m:sSub>
+                        <m:e>
+                          <m:r>
+                            <m:t>W</m:t>
+                          </m:r>
+                        </m:e>
+                        <m:sub>
+                          <m:r>
+                            <m:t>i</m:t>
+                          </m:r>
+                        </m:sub>
+                      </m:sSub>
+                      <m:r>
+                        <m:rPr>
+                          <m:sty m:val="p"/>
+                        </m:rPr>
+                        <m:t>−</m:t>
+                      </m:r>
+                      <m:f>
+                        <m:fPr>
+                          <m:type m:val="bar"/>
+                        </m:fPr>
+                        <m:num>
+                          <m:r>
+                            <m:rPr>
+                              <m:sty m:val="p"/>
+                            </m:rPr>
+                            <m:t>∑</m:t>
+                          </m:r>
+                          <m:sSubSup>
+                            <m:e>
+                              <m:r>
+                                <m:t>W</m:t>
+                              </m:r>
+                            </m:e>
+                            <m:sub>
+                              <m:r>
+                                <m:t>i</m:t>
+                              </m:r>
+                            </m:sub>
+                            <m:sup>
+                              <m:r>
+                                <m:t>2</m:t>
+                              </m:r>
+                            </m:sup>
+                          </m:sSubSup>
+                        </m:num>
+                        <m:den>
+                          <m:r>
+                            <m:rPr>
+                              <m:sty m:val="p"/>
+                            </m:rPr>
+                            <m:t>∑</m:t>
+                          </m:r>
+                          <m:sSub>
+                            <m:e>
+                              <m:r>
+                                <m:t>W</m:t>
+                              </m:r>
+                            </m:e>
+                            <m:sub>
+                              <m:r>
+                                <m:t>i</m:t>
+                              </m:r>
+                            </m:sub>
+                          </m:sSub>
+                        </m:den>
+                      </m:f>
+                    </m:oMath>
+                  </m:oMathPara>
+                </a14:m>
+              </a:p>
+            </p:txBody>
+          </p:sp>
+        </mc:Choice>
+      </mc:AlternateContent>
+    </p:spTree>
+  </p:cSld>
+</p:sld>
+</file>
+
+<file path=ppt/slides/slide29.xml><?xml version="1.0" encoding="utf-8"?>
+<p:sld xmlns:a="http://schemas.openxmlformats.org/drawingml/2006/main" xmlns:r="http://schemas.openxmlformats.org/officeDocument/2006/relationships" xmlns:p="http://schemas.openxmlformats.org/presentationml/2006/main">
+  <p:cSld>
+    <p:spTree>
+      <p:nvGrpSpPr>
+        <p:cNvPr id="1" name=""/>
+        <p:cNvGrpSpPr/>
+        <p:nvPr/>
+      </p:nvGrpSpPr>
+      <p:grpSpPr>
+        <a:xfrm>
+          <a:off x="0" y="0"/>
+          <a:ext cx="0" cy="0"/>
+          <a:chOff x="0" y="0"/>
+          <a:chExt cx="0" cy="0"/>
+        </a:xfrm>
+      </p:grpSpPr>
+      <p:sp>
+        <p:nvSpPr>
+          <p:cNvPr id="2" name="Title 1"/>
+          <p:cNvSpPr>
+            <a:spLocks noGrp="1"/>
+          </p:cNvSpPr>
+          <p:nvPr>
+            <p:ph type="title"/>
+          </p:nvPr>
+        </p:nvSpPr>
+        <p:spPr/>
+        <p:txBody>
+          <a:bodyPr/>
+          <a:lstStyle/>
+          <a:p>
+            <a:pPr lvl="0" indent="0" marL="0">
+              <a:buNone/>
+            </a:pPr>
+            <a:r>
+              <a:rPr/>
+              <a:t>Random effect by hand 2</a:t>
+            </a:r>
+          </a:p>
+        </p:txBody>
+      </p:sp>
+      <p:sp>
+        <p:nvSpPr>
+          <p:cNvPr id="3" name="Content Placeholder 2"/>
+          <p:cNvSpPr>
+            <a:spLocks noGrp="1"/>
+          </p:cNvSpPr>
+          <p:nvPr>
+            <p:ph idx="1"/>
+          </p:nvPr>
+        </p:nvSpPr>
+        <p:spPr/>
+        <p:txBody>
+          <a:bodyPr/>
+          <a:lstStyle/>
+          <a:p>
+            <a:pPr lvl="0" indent="0">
+              <a:buNone/>
+            </a:pPr>
+            <a:r>
+              <a:rPr i="1">
+                <a:solidFill>
+                  <a:srgbClr val="60A0B0"/>
+                </a:solidFill>
+                <a:latin typeface="Courier"/>
+              </a:rPr>
+              <a:t># Calculate our Q statistic again</a:t>
+            </a:r>
+            <a:br/>
+            <a:r>
+              <a:rPr>
+                <a:latin typeface="Courier"/>
+              </a:rPr>
+              <a:t>    Q </a:t>
+            </a:r>
+            <a:r>
+              <a:rPr>
+                <a:solidFill>
+                  <a:srgbClr val="007020"/>
+                </a:solidFill>
+                <a:latin typeface="Courier"/>
+              </a:rPr>
+              <a:t>&lt;-</a:t>
+            </a:r>
+            <a:r>
+              <a:rPr>
+                <a:latin typeface="Courier"/>
+              </a:rPr>
+              <a:t> </a:t>
+            </a:r>
+            <a:r>
+              <a:rPr>
+                <a:solidFill>
+                  <a:srgbClr val="06287E"/>
+                </a:solidFill>
+                <a:latin typeface="Courier"/>
+              </a:rPr>
+              <a:t>sum</a:t>
+            </a:r>
+            <a:r>
+              <a:rPr>
+                <a:latin typeface="Courier"/>
+              </a:rPr>
+              <a:t>(W</a:t>
+            </a:r>
+            <a:r>
+              <a:rPr>
+                <a:solidFill>
+                  <a:srgbClr val="4070A0"/>
+                </a:solidFill>
+                <a:latin typeface="Courier"/>
+              </a:rPr>
+              <a:t>*</a:t>
+            </a:r>
+            <a:r>
+              <a:rPr>
+                <a:latin typeface="Courier"/>
+              </a:rPr>
+              <a:t>(dataRE</a:t>
+            </a:r>
+            <a:r>
+              <a:rPr>
+                <a:solidFill>
+                  <a:srgbClr val="4070A0"/>
+                </a:solidFill>
+                <a:latin typeface="Courier"/>
+              </a:rPr>
+              <a:t>$</a:t>
+            </a:r>
+            <a:r>
+              <a:rPr>
+                <a:latin typeface="Courier"/>
+              </a:rPr>
+              <a:t>es</a:t>
+            </a:r>
+            <a:r>
+              <a:rPr>
+                <a:solidFill>
+                  <a:srgbClr val="4070A0"/>
+                </a:solidFill>
+                <a:latin typeface="Courier"/>
+              </a:rPr>
+              <a:t>^</a:t>
+            </a:r>
+            <a:r>
+              <a:rPr>
+                <a:solidFill>
+                  <a:srgbClr val="40A070"/>
+                </a:solidFill>
+                <a:latin typeface="Courier"/>
+              </a:rPr>
+              <a:t>2</a:t>
+            </a:r>
+            <a:r>
+              <a:rPr>
+                <a:latin typeface="Courier"/>
+              </a:rPr>
+              <a:t>) ) </a:t>
+            </a:r>
+            <a:r>
+              <a:rPr>
+                <a:solidFill>
+                  <a:srgbClr val="4070A0"/>
+                </a:solidFill>
+                <a:latin typeface="Courier"/>
+              </a:rPr>
+              <a:t>-</a:t>
+            </a:r>
+            <a:r>
+              <a:rPr>
+                <a:latin typeface="Courier"/>
+              </a:rPr>
+              <a:t> (</a:t>
+            </a:r>
+            <a:r>
+              <a:rPr>
+                <a:solidFill>
+                  <a:srgbClr val="06287E"/>
+                </a:solidFill>
+                <a:latin typeface="Courier"/>
+              </a:rPr>
+              <a:t>sum</a:t>
+            </a:r>
+            <a:r>
+              <a:rPr>
+                <a:latin typeface="Courier"/>
+              </a:rPr>
+              <a:t>(W</a:t>
+            </a:r>
+            <a:r>
+              <a:rPr>
+                <a:solidFill>
+                  <a:srgbClr val="4070A0"/>
+                </a:solidFill>
+                <a:latin typeface="Courier"/>
+              </a:rPr>
+              <a:t>*</a:t>
+            </a:r>
+            <a:r>
+              <a:rPr>
+                <a:latin typeface="Courier"/>
+              </a:rPr>
+              <a:t>dataRE</a:t>
+            </a:r>
+            <a:r>
+              <a:rPr>
+                <a:solidFill>
+                  <a:srgbClr val="4070A0"/>
+                </a:solidFill>
+                <a:latin typeface="Courier"/>
+              </a:rPr>
+              <a:t>$</a:t>
+            </a:r>
+            <a:r>
+              <a:rPr>
+                <a:latin typeface="Courier"/>
+              </a:rPr>
+              <a:t>es)</a:t>
+            </a:r>
+            <a:r>
+              <a:rPr>
+                <a:solidFill>
+                  <a:srgbClr val="4070A0"/>
+                </a:solidFill>
+                <a:latin typeface="Courier"/>
+              </a:rPr>
+              <a:t>^</a:t>
+            </a:r>
+            <a:r>
+              <a:rPr>
+                <a:solidFill>
+                  <a:srgbClr val="40A070"/>
+                </a:solidFill>
+                <a:latin typeface="Courier"/>
+              </a:rPr>
+              <a:t>2</a:t>
+            </a:r>
+            <a:r>
+              <a:rPr>
+                <a:latin typeface="Courier"/>
+              </a:rPr>
+              <a:t> </a:t>
+            </a:r>
+            <a:r>
+              <a:rPr>
+                <a:solidFill>
+                  <a:srgbClr val="4070A0"/>
+                </a:solidFill>
+                <a:latin typeface="Courier"/>
+              </a:rPr>
+              <a:t>/</a:t>
+            </a:r>
+            <a:r>
+              <a:rPr>
+                <a:latin typeface="Courier"/>
+              </a:rPr>
+              <a:t> </a:t>
+            </a:r>
+            <a:r>
+              <a:rPr>
+                <a:solidFill>
+                  <a:srgbClr val="06287E"/>
+                </a:solidFill>
+                <a:latin typeface="Courier"/>
+              </a:rPr>
+              <a:t>sum</a:t>
+            </a:r>
+            <a:r>
+              <a:rPr>
+                <a:latin typeface="Courier"/>
+              </a:rPr>
+              <a:t>(W))</a:t>
+            </a:r>
+            <a:br/>
+            <a:r>
+              <a:rPr>
+                <a:latin typeface="Courier"/>
+              </a:rPr>
+              <a:t>    Q</a:t>
+            </a:r>
+          </a:p>
+          <a:p>
+            <a:pPr lvl="0" indent="0">
+              <a:buNone/>
+            </a:pPr>
+            <a:r>
+              <a:rPr>
+                <a:latin typeface="Courier"/>
+              </a:rPr>
+              <a:t>## [1] 24.40149</a:t>
+            </a:r>
+          </a:p>
+          <a:p>
+            <a:pPr lvl="0" indent="0">
+              <a:buNone/>
+            </a:pPr>
+            <a:r>
+              <a:rPr i="1">
+                <a:solidFill>
+                  <a:srgbClr val="60A0B0"/>
+                </a:solidFill>
+                <a:latin typeface="Courier"/>
+              </a:rPr>
+              <a:t># Calculate tau2</a:t>
+            </a:r>
+            <a:br/>
+            <a:r>
+              <a:rPr>
+                <a:latin typeface="Courier"/>
+              </a:rPr>
+              <a:t>    C </a:t>
+            </a:r>
+            <a:r>
+              <a:rPr>
+                <a:solidFill>
+                  <a:srgbClr val="007020"/>
+                </a:solidFill>
+                <a:latin typeface="Courier"/>
+              </a:rPr>
+              <a:t>&lt;-</a:t>
+            </a:r>
+            <a:r>
+              <a:rPr>
+                <a:latin typeface="Courier"/>
+              </a:rPr>
+              <a:t> </a:t>
+            </a:r>
+            <a:r>
+              <a:rPr>
+                <a:solidFill>
+                  <a:srgbClr val="06287E"/>
+                </a:solidFill>
+                <a:latin typeface="Courier"/>
+              </a:rPr>
+              <a:t>sum</a:t>
+            </a:r>
+            <a:r>
+              <a:rPr>
+                <a:latin typeface="Courier"/>
+              </a:rPr>
+              <a:t>(W) </a:t>
+            </a:r>
+            <a:r>
+              <a:rPr>
+                <a:solidFill>
+                  <a:srgbClr val="4070A0"/>
+                </a:solidFill>
+                <a:latin typeface="Courier"/>
+              </a:rPr>
+              <a:t>-</a:t>
+            </a:r>
+            <a:r>
+              <a:rPr>
+                <a:latin typeface="Courier"/>
+              </a:rPr>
+              <a:t> ((</a:t>
+            </a:r>
+            <a:r>
+              <a:rPr>
+                <a:solidFill>
+                  <a:srgbClr val="06287E"/>
+                </a:solidFill>
+                <a:latin typeface="Courier"/>
+              </a:rPr>
+              <a:t>sum</a:t>
+            </a:r>
+            <a:r>
+              <a:rPr>
+                <a:latin typeface="Courier"/>
+              </a:rPr>
+              <a:t>(W</a:t>
+            </a:r>
+            <a:r>
+              <a:rPr>
+                <a:solidFill>
+                  <a:srgbClr val="4070A0"/>
+                </a:solidFill>
+                <a:latin typeface="Courier"/>
+              </a:rPr>
+              <a:t>^</a:t>
+            </a:r>
+            <a:r>
+              <a:rPr>
+                <a:solidFill>
+                  <a:srgbClr val="40A070"/>
+                </a:solidFill>
+                <a:latin typeface="Courier"/>
+              </a:rPr>
+              <a:t>2</a:t>
+            </a:r>
+            <a:r>
+              <a:rPr>
+                <a:latin typeface="Courier"/>
+              </a:rPr>
+              <a:t>))</a:t>
+            </a:r>
+            <a:r>
+              <a:rPr>
+                <a:solidFill>
+                  <a:srgbClr val="4070A0"/>
+                </a:solidFill>
+                <a:latin typeface="Courier"/>
+              </a:rPr>
+              <a:t>/</a:t>
+            </a:r>
+            <a:r>
+              <a:rPr>
+                <a:solidFill>
+                  <a:srgbClr val="06287E"/>
+                </a:solidFill>
+                <a:latin typeface="Courier"/>
+              </a:rPr>
+              <a:t>sum</a:t>
+            </a:r>
+            <a:r>
+              <a:rPr>
+                <a:latin typeface="Courier"/>
+              </a:rPr>
+              <a:t>(W))</a:t>
+            </a:r>
+            <a:br/>
+            <a:r>
+              <a:rPr>
+                <a:latin typeface="Courier"/>
+              </a:rPr>
+              <a:t>    C</a:t>
+            </a:r>
+          </a:p>
+          <a:p>
+            <a:pPr lvl="0" indent="0">
+              <a:buNone/>
+            </a:pPr>
+            <a:r>
+              <a:rPr>
+                <a:latin typeface="Courier"/>
+              </a:rPr>
+              <a:t>## [1] 69.23077</a:t>
+            </a:r>
+          </a:p>
+          <a:p>
+            <a:pPr lvl="0" indent="0">
+              <a:buNone/>
+            </a:pPr>
+            <a:r>
+              <a:rPr i="1">
+                <a:solidFill>
+                  <a:srgbClr val="60A0B0"/>
+                </a:solidFill>
+                <a:latin typeface="Courier"/>
+              </a:rPr>
+              <a:t># Calculate df</a:t>
+            </a:r>
+            <a:br/>
+            <a:r>
+              <a:rPr>
+                <a:latin typeface="Courier"/>
+              </a:rPr>
+              <a:t>    df </a:t>
+            </a:r>
+            <a:r>
+              <a:rPr>
+                <a:solidFill>
+                  <a:srgbClr val="007020"/>
+                </a:solidFill>
+                <a:latin typeface="Courier"/>
+              </a:rPr>
+              <a:t>&lt;-</a:t>
+            </a:r>
+            <a:r>
+              <a:rPr>
+                <a:latin typeface="Courier"/>
+              </a:rPr>
+              <a:t> </a:t>
+            </a:r>
+            <a:r>
+              <a:rPr>
+                <a:solidFill>
+                  <a:srgbClr val="06287E"/>
+                </a:solidFill>
+                <a:latin typeface="Courier"/>
+              </a:rPr>
+              <a:t>nrow</a:t>
+            </a:r>
+            <a:r>
+              <a:rPr>
+                <a:latin typeface="Courier"/>
+              </a:rPr>
+              <a:t>(dataRE) </a:t>
+            </a:r>
+            <a:r>
+              <a:rPr>
+                <a:solidFill>
+                  <a:srgbClr val="4070A0"/>
+                </a:solidFill>
+                <a:latin typeface="Courier"/>
+              </a:rPr>
+              <a:t>-</a:t>
+            </a:r>
+            <a:r>
+              <a:rPr>
+                <a:latin typeface="Courier"/>
+              </a:rPr>
+              <a:t> </a:t>
+            </a:r>
+            <a:r>
+              <a:rPr>
+                <a:solidFill>
+                  <a:srgbClr val="40A070"/>
+                </a:solidFill>
+                <a:latin typeface="Courier"/>
+              </a:rPr>
+              <a:t>1</a:t>
+            </a:r>
+            <a:r>
+              <a:rPr>
+                <a:latin typeface="Courier"/>
+              </a:rPr>
+              <a:t>   </a:t>
+            </a:r>
+            <a:br/>
+            <a:r>
+              <a:rPr>
+                <a:latin typeface="Courier"/>
+              </a:rPr>
+              <a:t>    T2 </a:t>
+            </a:r>
+            <a:r>
+              <a:rPr>
+                <a:solidFill>
+                  <a:srgbClr val="007020"/>
+                </a:solidFill>
+                <a:latin typeface="Courier"/>
+              </a:rPr>
+              <a:t>&lt;-</a:t>
+            </a:r>
+            <a:r>
+              <a:rPr>
+                <a:latin typeface="Courier"/>
+              </a:rPr>
+              <a:t> (Q </a:t>
+            </a:r>
+            <a:r>
+              <a:rPr>
+                <a:solidFill>
+                  <a:srgbClr val="4070A0"/>
+                </a:solidFill>
+                <a:latin typeface="Courier"/>
+              </a:rPr>
+              <a:t>-</a:t>
+            </a:r>
+            <a:r>
+              <a:rPr>
+                <a:latin typeface="Courier"/>
+              </a:rPr>
+              <a:t> df) </a:t>
+            </a:r>
+            <a:r>
+              <a:rPr>
+                <a:solidFill>
+                  <a:srgbClr val="4070A0"/>
+                </a:solidFill>
+                <a:latin typeface="Courier"/>
+              </a:rPr>
+              <a:t>/</a:t>
+            </a:r>
+            <a:r>
+              <a:rPr>
+                <a:latin typeface="Courier"/>
+              </a:rPr>
+              <a:t> C</a:t>
+            </a:r>
+            <a:br/>
+            <a:r>
+              <a:rPr>
+                <a:latin typeface="Courier"/>
+              </a:rPr>
+              <a:t>    T2</a:t>
+            </a:r>
+          </a:p>
+          <a:p>
+            <a:pPr lvl="0" indent="0">
+              <a:buNone/>
+            </a:pPr>
+            <a:r>
+              <a:rPr>
+                <a:latin typeface="Courier"/>
+              </a:rPr>
+              <a:t>## [1] 0.2946883</a:t>
+            </a:r>
+          </a:p>
+        </p:txBody>
+      </p:sp>
+    </p:spTree>
+  </p:cSld>
+</p:sld>
+</file>
+
 <file path=ppt/slides/slide3.xml><?xml version="1.0" encoding="utf-8"?>
 <p:sld xmlns:a="http://schemas.openxmlformats.org/drawingml/2006/main" xmlns:r="http://schemas.openxmlformats.org/officeDocument/2006/relationships" xmlns:p="http://schemas.openxmlformats.org/presentationml/2006/main">
   <p:cSld>
@@ -8036,7 +11009,7 @@
               <a:rPr>
                 <a:latin typeface="Courier"/>
               </a:rPr>
-              <a:t>## [1] 0.4488822</a:t>
+              <a:t>## [1] 0.2004822</a:t>
             </a:r>
           </a:p>
           <a:p>
@@ -8071,13 +11044,490 @@
 ##  Welch Two Sample t-test
 ## 
 ## data:  trt_26C and trt_8C
-## t = 3.3675, df = 14.857, p-value = 0.004279
+## t = 1.3226, df = 10.893, p-value = 0.2131
 ## alternative hypothesis: true difference in means is not equal to 0
 ## 95 percent confidence interval:
-##  0.1645284 0.7332360
+##  -0.1335494  0.5345138
 ## sample estimates:
 ## mean of x mean of y 
-## 0.6295455 0.1806633</a:t>
+## 0.5349029 0.3344207</a:t>
+            </a:r>
+          </a:p>
+        </p:txBody>
+      </p:sp>
+    </p:spTree>
+  </p:cSld>
+</p:sld>
+</file>
+
+<file path=ppt/slides/slide30.xml><?xml version="1.0" encoding="utf-8"?>
+<p:sld xmlns:a="http://schemas.openxmlformats.org/drawingml/2006/main" xmlns:r="http://schemas.openxmlformats.org/officeDocument/2006/relationships" xmlns:p="http://schemas.openxmlformats.org/presentationml/2006/main">
+  <p:cSld>
+    <p:spTree>
+      <p:nvGrpSpPr>
+        <p:cNvPr id="1" name=""/>
+        <p:cNvGrpSpPr/>
+        <p:nvPr/>
+      </p:nvGrpSpPr>
+      <p:grpSpPr>
+        <a:xfrm>
+          <a:off x="0" y="0"/>
+          <a:ext cx="0" cy="0"/>
+          <a:chOff x="0" y="0"/>
+          <a:chExt cx="0" cy="0"/>
+        </a:xfrm>
+      </p:grpSpPr>
+      <p:sp>
+        <p:nvSpPr>
+          <p:cNvPr id="2" name="Title 1"/>
+          <p:cNvSpPr>
+            <a:spLocks noGrp="1"/>
+          </p:cNvSpPr>
+          <p:nvPr>
+            <p:ph type="title"/>
+          </p:nvPr>
+        </p:nvSpPr>
+        <p:spPr/>
+        <p:txBody>
+          <a:bodyPr/>
+          <a:lstStyle/>
+          <a:p>
+            <a:pPr lvl="0" indent="0" marL="0">
+              <a:buNone/>
+            </a:pPr>
+            <a:r>
+              <a:rPr/>
+              <a:t>Now that we have tau2 lets do the meta-analysis</a:t>
+            </a:r>
+          </a:p>
+        </p:txBody>
+      </p:sp>
+      <p:sp>
+        <p:nvSpPr>
+          <p:cNvPr id="3" name="Content Placeholder 2"/>
+          <p:cNvSpPr>
+            <a:spLocks noGrp="1"/>
+          </p:cNvSpPr>
+          <p:nvPr>
+            <p:ph idx="1"/>
+          </p:nvPr>
+        </p:nvSpPr>
+        <p:spPr/>
+        <p:txBody>
+          <a:bodyPr/>
+          <a:lstStyle/>
+          <a:p>
+            <a:pPr lvl="0" indent="0" marL="0">
+              <a:buNone/>
+            </a:pPr>
+            <a:r>
+              <a:rPr/>
+              <a:t>Remember, things are the same but the weighting is different now.</a:t>
+            </a:r>
+          </a:p>
+          <a:p>
+            <a:pPr lvl="0" indent="0">
+              <a:buNone/>
+            </a:pPr>
+            <a:r>
+              <a:rPr>
+                <a:latin typeface="Courier"/>
+              </a:rPr>
+              <a:t>    </a:t>
+            </a:r>
+            <a:r>
+              <a:rPr i="1">
+                <a:solidFill>
+                  <a:srgbClr val="60A0B0"/>
+                </a:solidFill>
+                <a:latin typeface="Courier"/>
+              </a:rPr>
+              <a:t># RE weights</a:t>
+            </a:r>
+            <a:br/>
+            <a:r>
+              <a:rPr>
+                <a:latin typeface="Courier"/>
+              </a:rPr>
+              <a:t>      W.re </a:t>
+            </a:r>
+            <a:r>
+              <a:rPr>
+                <a:solidFill>
+                  <a:srgbClr val="007020"/>
+                </a:solidFill>
+                <a:latin typeface="Courier"/>
+              </a:rPr>
+              <a:t>&lt;-</a:t>
+            </a:r>
+            <a:r>
+              <a:rPr>
+                <a:latin typeface="Courier"/>
+              </a:rPr>
+              <a:t> </a:t>
+            </a:r>
+            <a:r>
+              <a:rPr>
+                <a:solidFill>
+                  <a:srgbClr val="40A070"/>
+                </a:solidFill>
+                <a:latin typeface="Courier"/>
+              </a:rPr>
+              <a:t>1</a:t>
+            </a:r>
+            <a:r>
+              <a:rPr>
+                <a:latin typeface="Courier"/>
+              </a:rPr>
+              <a:t> </a:t>
+            </a:r>
+            <a:r>
+              <a:rPr>
+                <a:solidFill>
+                  <a:srgbClr val="4070A0"/>
+                </a:solidFill>
+                <a:latin typeface="Courier"/>
+              </a:rPr>
+              <a:t>/</a:t>
+            </a:r>
+            <a:r>
+              <a:rPr>
+                <a:latin typeface="Courier"/>
+              </a:rPr>
+              <a:t> (T2 </a:t>
+            </a:r>
+            <a:r>
+              <a:rPr>
+                <a:solidFill>
+                  <a:srgbClr val="4070A0"/>
+                </a:solidFill>
+                <a:latin typeface="Courier"/>
+              </a:rPr>
+              <a:t>+</a:t>
+            </a:r>
+            <a:r>
+              <a:rPr>
+                <a:latin typeface="Courier"/>
+              </a:rPr>
+              <a:t> dataRE</a:t>
+            </a:r>
+            <a:r>
+              <a:rPr>
+                <a:solidFill>
+                  <a:srgbClr val="4070A0"/>
+                </a:solidFill>
+                <a:latin typeface="Courier"/>
+              </a:rPr>
+              <a:t>$</a:t>
+            </a:r>
+            <a:r>
+              <a:rPr>
+                <a:latin typeface="Courier"/>
+              </a:rPr>
+              <a:t>Ves)</a:t>
+            </a:r>
+            <a:br/>
+            <a:r>
+              <a:rPr>
+                <a:latin typeface="Courier"/>
+              </a:rPr>
+              <a:t>    </a:t>
+            </a:r>
+            <a:br/>
+            <a:r>
+              <a:rPr>
+                <a:latin typeface="Courier"/>
+              </a:rPr>
+              <a:t>    </a:t>
+            </a:r>
+            <a:r>
+              <a:rPr i="1">
+                <a:solidFill>
+                  <a:srgbClr val="60A0B0"/>
+                </a:solidFill>
+                <a:latin typeface="Courier"/>
+              </a:rPr>
+              <a:t>#Pooled effect size for random effect meta-analysis</a:t>
+            </a:r>
+            <a:br/>
+            <a:r>
+              <a:rPr>
+                <a:latin typeface="Courier"/>
+              </a:rPr>
+              <a:t>      esPoolRE  </a:t>
+            </a:r>
+            <a:r>
+              <a:rPr>
+                <a:solidFill>
+                  <a:srgbClr val="007020"/>
+                </a:solidFill>
+                <a:latin typeface="Courier"/>
+              </a:rPr>
+              <a:t>&lt;-</a:t>
+            </a:r>
+            <a:r>
+              <a:rPr>
+                <a:latin typeface="Courier"/>
+              </a:rPr>
+              <a:t> </a:t>
+            </a:r>
+            <a:r>
+              <a:rPr>
+                <a:solidFill>
+                  <a:srgbClr val="06287E"/>
+                </a:solidFill>
+                <a:latin typeface="Courier"/>
+              </a:rPr>
+              <a:t>sum</a:t>
+            </a:r>
+            <a:r>
+              <a:rPr>
+                <a:latin typeface="Courier"/>
+              </a:rPr>
+              <a:t>(W.re</a:t>
+            </a:r>
+            <a:r>
+              <a:rPr>
+                <a:solidFill>
+                  <a:srgbClr val="4070A0"/>
+                </a:solidFill>
+                <a:latin typeface="Courier"/>
+              </a:rPr>
+              <a:t>*</a:t>
+            </a:r>
+            <a:r>
+              <a:rPr>
+                <a:latin typeface="Courier"/>
+              </a:rPr>
+              <a:t>dataRE</a:t>
+            </a:r>
+            <a:r>
+              <a:rPr>
+                <a:solidFill>
+                  <a:srgbClr val="4070A0"/>
+                </a:solidFill>
+                <a:latin typeface="Courier"/>
+              </a:rPr>
+              <a:t>$</a:t>
+            </a:r>
+            <a:r>
+              <a:rPr>
+                <a:latin typeface="Courier"/>
+              </a:rPr>
+              <a:t>es) </a:t>
+            </a:r>
+            <a:r>
+              <a:rPr>
+                <a:solidFill>
+                  <a:srgbClr val="4070A0"/>
+                </a:solidFill>
+                <a:latin typeface="Courier"/>
+              </a:rPr>
+              <a:t>/</a:t>
+            </a:r>
+            <a:r>
+              <a:rPr>
+                <a:latin typeface="Courier"/>
+              </a:rPr>
+              <a:t> </a:t>
+            </a:r>
+            <a:r>
+              <a:rPr>
+                <a:solidFill>
+                  <a:srgbClr val="06287E"/>
+                </a:solidFill>
+                <a:latin typeface="Courier"/>
+              </a:rPr>
+              <a:t>sum</a:t>
+            </a:r>
+            <a:r>
+              <a:rPr>
+                <a:latin typeface="Courier"/>
+              </a:rPr>
+              <a:t>(W.re) </a:t>
+            </a:r>
+            <a:br/>
+            <a:r>
+              <a:rPr>
+                <a:latin typeface="Courier"/>
+              </a:rPr>
+              <a:t>      esPoolRE</a:t>
+            </a:r>
+          </a:p>
+          <a:p>
+            <a:pPr lvl="0" indent="0">
+              <a:buNone/>
+            </a:pPr>
+            <a:r>
+              <a:rPr>
+                <a:latin typeface="Courier"/>
+              </a:rPr>
+              <a:t>## [1] 2.016261</a:t>
+            </a:r>
+          </a:p>
+          <a:p>
+            <a:pPr lvl="0" indent="0">
+              <a:buNone/>
+            </a:pPr>
+            <a:r>
+              <a:rPr>
+                <a:latin typeface="Courier"/>
+              </a:rPr>
+              <a:t>    </a:t>
+            </a:r>
+            <a:r>
+              <a:rPr i="1">
+                <a:solidFill>
+                  <a:srgbClr val="60A0B0"/>
+                </a:solidFill>
+                <a:latin typeface="Courier"/>
+              </a:rPr>
+              <a:t># Calculate the pooled variance around estimate</a:t>
+            </a:r>
+            <a:br/>
+            <a:r>
+              <a:rPr>
+                <a:latin typeface="Courier"/>
+              </a:rPr>
+              <a:t>       VarES </a:t>
+            </a:r>
+            <a:r>
+              <a:rPr>
+                <a:solidFill>
+                  <a:srgbClr val="007020"/>
+                </a:solidFill>
+                <a:latin typeface="Courier"/>
+              </a:rPr>
+              <a:t>&lt;-</a:t>
+            </a:r>
+            <a:r>
+              <a:rPr>
+                <a:latin typeface="Courier"/>
+              </a:rPr>
+              <a:t> </a:t>
+            </a:r>
+            <a:r>
+              <a:rPr>
+                <a:solidFill>
+                  <a:srgbClr val="40A070"/>
+                </a:solidFill>
+                <a:latin typeface="Courier"/>
+              </a:rPr>
+              <a:t>1</a:t>
+            </a:r>
+            <a:r>
+              <a:rPr>
+                <a:latin typeface="Courier"/>
+              </a:rPr>
+              <a:t> </a:t>
+            </a:r>
+            <a:r>
+              <a:rPr>
+                <a:solidFill>
+                  <a:srgbClr val="4070A0"/>
+                </a:solidFill>
+                <a:latin typeface="Courier"/>
+              </a:rPr>
+              <a:t>/</a:t>
+            </a:r>
+            <a:r>
+              <a:rPr>
+                <a:latin typeface="Courier"/>
+              </a:rPr>
+              <a:t> </a:t>
+            </a:r>
+            <a:r>
+              <a:rPr>
+                <a:solidFill>
+                  <a:srgbClr val="06287E"/>
+                </a:solidFill>
+                <a:latin typeface="Courier"/>
+              </a:rPr>
+              <a:t>sum</a:t>
+            </a:r>
+            <a:r>
+              <a:rPr>
+                <a:latin typeface="Courier"/>
+              </a:rPr>
+              <a:t>(W.re)</a:t>
+            </a:r>
+            <a:br/>
+            <a:r>
+              <a:rPr>
+                <a:latin typeface="Courier"/>
+              </a:rPr>
+              <a:t>    </a:t>
+            </a:r>
+            <a:br/>
+            <a:r>
+              <a:rPr>
+                <a:latin typeface="Courier"/>
+              </a:rPr>
+              <a:t>    </a:t>
+            </a:r>
+            <a:r>
+              <a:rPr i="1">
+                <a:solidFill>
+                  <a:srgbClr val="60A0B0"/>
+                </a:solidFill>
+                <a:latin typeface="Courier"/>
+              </a:rPr>
+              <a:t># Calculate the standard error around estimate</a:t>
+            </a:r>
+            <a:br/>
+            <a:r>
+              <a:rPr>
+                <a:latin typeface="Courier"/>
+              </a:rPr>
+              <a:t>       SE.ES.RE </a:t>
+            </a:r>
+            <a:r>
+              <a:rPr>
+                <a:solidFill>
+                  <a:srgbClr val="007020"/>
+                </a:solidFill>
+                <a:latin typeface="Courier"/>
+              </a:rPr>
+              <a:t>&lt;-</a:t>
+            </a:r>
+            <a:r>
+              <a:rPr>
+                <a:latin typeface="Courier"/>
+              </a:rPr>
+              <a:t> </a:t>
+            </a:r>
+            <a:r>
+              <a:rPr>
+                <a:solidFill>
+                  <a:srgbClr val="06287E"/>
+                </a:solidFill>
+                <a:latin typeface="Courier"/>
+              </a:rPr>
+              <a:t>sqrt</a:t>
+            </a:r>
+            <a:r>
+              <a:rPr>
+                <a:latin typeface="Courier"/>
+              </a:rPr>
+              <a:t>(VarES)</a:t>
+            </a:r>
+            <a:br/>
+            <a:r>
+              <a:rPr>
+                <a:latin typeface="Courier"/>
+              </a:rPr>
+              <a:t>       SE.ES.RE</a:t>
+            </a:r>
+          </a:p>
+          <a:p>
+            <a:pPr lvl="0" indent="0">
+              <a:buNone/>
+            </a:pPr>
+            <a:r>
+              <a:rPr>
+                <a:latin typeface="Courier"/>
+              </a:rPr>
+              <a:t>## [1] 0.2697219</a:t>
             </a:r>
           </a:p>
         </p:txBody>
@@ -9098,7 +12548,7 @@
                   <a:rPr>
                     <a:latin typeface="Courier"/>
                   </a:rPr>
-                  <a:t>## [1] 0.169391</a:t>
+                  <a:t>## [1] 0.1719139</a:t>
                 </a:r>
               </a:p>
             </p:txBody>

</xml_diff>

<commit_message>
Slides with MLMA code
</commit_message>
<xml_diff>
--- a/slides/code_slides.pptx
+++ b/slides/code_slides.pptx
@@ -38,6 +38,9 @@
     <p:sldId id="286" r:id="rId32"/>
     <p:sldId id="287" r:id="rId33"/>
     <p:sldId id="288" r:id="rId34"/>
+    <p:sldId id="289" r:id="rId35"/>
+    <p:sldId id="290" r:id="rId36"/>
+    <p:sldId id="291" r:id="rId37"/>
   </p:sldIdLst>
   <p:sldSz cx="9144000" cy="5143500" type="screen16x9"/>
   <p:notesSz cx="6858000" cy="9144000"/>
@@ -3204,7 +3207,7 @@
             </a:pPr>
             <a:r>
               <a:rPr/>
-              <a:t>2022-06-27</a:t>
+              <a:t>2022-06-28</a:t>
             </a:r>
           </a:p>
         </p:txBody>
@@ -13316,7 +13319,7 @@
               <a:rPr>
                 <a:latin typeface="Courier"/>
               </a:rPr>
-              <a:t>## [1] -0.0549564</a:t>
+              <a:t>## [1] 0.08647018</a:t>
             </a:r>
           </a:p>
           <a:p>
@@ -13351,13 +13354,13 @@
 ##  Welch Two Sample t-test
 ## 
 ## data:  trt_26C and trt_8C
-## t = -0.39812, df = 11.942, p-value = 0.6976
+## t = 0.48662, df = 13.648, p-value = 0.6342
 ## alternative hypothesis: true difference in means is not equal to 0
 ## 95 percent confidence interval:
-##  -0.3558830  0.2459702
+##  -0.2955729  0.4685132
 ## sample estimates:
 ## mean of x mean of y 
-## 0.6234178 0.6783742</a:t>
+## 0.5910876 0.5046174</a:t>
             </a:r>
           </a:p>
         </p:txBody>
@@ -15359,6 +15362,1641 @@
 </p:sld>
 </file>
 
+<file path=ppt/slides/slide34.xml><?xml version="1.0" encoding="utf-8"?>
+<p:sld xmlns:a="http://schemas.openxmlformats.org/drawingml/2006/main" xmlns:r="http://schemas.openxmlformats.org/officeDocument/2006/relationships" xmlns:p="http://schemas.openxmlformats.org/presentationml/2006/main">
+  <p:cSld>
+    <p:spTree>
+      <p:nvGrpSpPr>
+        <p:cNvPr id="1" name=""/>
+        <p:cNvGrpSpPr/>
+        <p:nvPr/>
+      </p:nvGrpSpPr>
+      <p:grpSpPr>
+        <a:xfrm>
+          <a:off x="0" y="0"/>
+          <a:ext cx="0" cy="0"/>
+          <a:chOff x="0" y="0"/>
+          <a:chExt cx="0" cy="0"/>
+        </a:xfrm>
+      </p:grpSpPr>
+      <p:sp>
+        <p:nvSpPr>
+          <p:cNvPr id="2" name="Title 1"/>
+          <p:cNvSpPr>
+            <a:spLocks noGrp="1"/>
+          </p:cNvSpPr>
+          <p:nvPr>
+            <p:ph type="title"/>
+          </p:nvPr>
+        </p:nvSpPr>
+        <p:spPr/>
+        <p:txBody>
+          <a:bodyPr/>
+          <a:lstStyle/>
+          <a:p>
+            <a:pPr lvl="0" indent="0" marL="0">
+              <a:buNone/>
+            </a:pPr>
+            <a:r>
+              <a:rPr/>
+              <a:t>MLMA</a:t>
+            </a:r>
+          </a:p>
+        </p:txBody>
+      </p:sp>
+      <p:sp>
+        <p:nvSpPr>
+          <p:cNvPr id="3" name="Content Placeholder 2"/>
+          <p:cNvSpPr>
+            <a:spLocks noGrp="1"/>
+          </p:cNvSpPr>
+          <p:nvPr>
+            <p:ph idx="1"/>
+          </p:nvPr>
+        </p:nvSpPr>
+        <p:spPr/>
+        <p:txBody>
+          <a:bodyPr/>
+          <a:lstStyle/>
+          <a:p>
+            <a:pPr lvl="0" indent="0">
+              <a:buNone/>
+            </a:pPr>
+            <a:r>
+              <a:rPr i="1">
+                <a:solidFill>
+                  <a:srgbClr val="60A0B0"/>
+                </a:solidFill>
+                <a:latin typeface="Courier"/>
+              </a:rPr>
+              <a:t># install.packages("pacman") ; uncomment this line if you haven't already installed 'pacman'</a:t>
+            </a:r>
+            <a:br/>
+            <a:r>
+              <a:rPr>
+                <a:latin typeface="Courier"/>
+              </a:rPr>
+              <a:t>pacman</a:t>
+            </a:r>
+            <a:r>
+              <a:rPr>
+                <a:solidFill>
+                  <a:srgbClr val="4070A0"/>
+                </a:solidFill>
+                <a:latin typeface="Courier"/>
+              </a:rPr>
+              <a:t>::</a:t>
+            </a:r>
+            <a:r>
+              <a:rPr>
+                <a:solidFill>
+                  <a:srgbClr val="06287E"/>
+                </a:solidFill>
+                <a:latin typeface="Courier"/>
+              </a:rPr>
+              <a:t>p_load</a:t>
+            </a:r>
+            <a:r>
+              <a:rPr>
+                <a:latin typeface="Courier"/>
+              </a:rPr>
+              <a:t>(metafor, tidyverse)</a:t>
+            </a:r>
+            <a:br/>
+            <a:br/>
+            <a:r>
+              <a:rPr>
+                <a:latin typeface="Courier"/>
+              </a:rPr>
+              <a:t>asr_dat </a:t>
+            </a:r>
+            <a:r>
+              <a:rPr>
+                <a:solidFill>
+                  <a:srgbClr val="007020"/>
+                </a:solidFill>
+                <a:latin typeface="Courier"/>
+              </a:rPr>
+              <a:t>&lt;-</a:t>
+            </a:r>
+            <a:r>
+              <a:rPr>
+                <a:latin typeface="Courier"/>
+              </a:rPr>
+              <a:t> </a:t>
+            </a:r>
+            <a:r>
+              <a:rPr>
+                <a:solidFill>
+                  <a:srgbClr val="06287E"/>
+                </a:solidFill>
+                <a:latin typeface="Courier"/>
+              </a:rPr>
+              <a:t>read.csv</a:t>
+            </a:r>
+            <a:r>
+              <a:rPr>
+                <a:latin typeface="Courier"/>
+              </a:rPr>
+              <a:t>(</a:t>
+            </a:r>
+            <a:r>
+              <a:rPr>
+                <a:solidFill>
+                  <a:srgbClr val="4070A0"/>
+                </a:solidFill>
+                <a:latin typeface="Courier"/>
+              </a:rPr>
+              <a:t>"https://osf.io/qn2af/download"</a:t>
+            </a:r>
+            <a:r>
+              <a:rPr>
+                <a:latin typeface="Courier"/>
+              </a:rPr>
+              <a:t>)</a:t>
+            </a:r>
+          </a:p>
+          <a:p>
+            <a:pPr lvl="0" indent="0" marL="0">
+              <a:buNone/>
+            </a:pPr>
+            <a:r>
+              <a:rPr/>
+              <a:t>We’ll also need our function for calculating ARR and its sampling variance because these don’t exist in any current packages.</a:t>
+            </a:r>
+          </a:p>
+          <a:p>
+            <a:pPr lvl="0" indent="0">
+              <a:buNone/>
+            </a:pPr>
+            <a:r>
+              <a:rPr i="1">
+                <a:solidFill>
+                  <a:srgbClr val="60A0B0"/>
+                </a:solidFill>
+                <a:latin typeface="Courier"/>
+              </a:rPr>
+              <a:t>#' @title arr</a:t>
+            </a:r>
+            <a:br/>
+            <a:r>
+              <a:rPr i="1">
+                <a:solidFill>
+                  <a:srgbClr val="60A0B0"/>
+                </a:solidFill>
+                <a:latin typeface="Courier"/>
+              </a:rPr>
+              <a:t>#' @description Calculates the acclimation response ratio (ARR).  </a:t>
+            </a:r>
+            <a:br/>
+            <a:r>
+              <a:rPr i="1">
+                <a:solidFill>
+                  <a:srgbClr val="60A0B0"/>
+                </a:solidFill>
+                <a:latin typeface="Courier"/>
+              </a:rPr>
+              <a:t>#' @param t2_l  Lowest of the two treatment temperatures</a:t>
+            </a:r>
+            <a:br/>
+            <a:r>
+              <a:rPr i="1">
+                <a:solidFill>
+                  <a:srgbClr val="60A0B0"/>
+                </a:solidFill>
+                <a:latin typeface="Courier"/>
+              </a:rPr>
+              <a:t>#' @param t1_h  Highest of the two treatment temperatures</a:t>
+            </a:r>
+            <a:br/>
+            <a:r>
+              <a:rPr i="1">
+                <a:solidFill>
+                  <a:srgbClr val="60A0B0"/>
+                </a:solidFill>
+                <a:latin typeface="Courier"/>
+              </a:rPr>
+              <a:t>#' @param x1_h  Mean trait value at high temperature</a:t>
+            </a:r>
+            <a:br/>
+            <a:r>
+              <a:rPr i="1">
+                <a:solidFill>
+                  <a:srgbClr val="60A0B0"/>
+                </a:solidFill>
+                <a:latin typeface="Courier"/>
+              </a:rPr>
+              <a:t>#' @param x2_l  Mean trait value at low temperature</a:t>
+            </a:r>
+            <a:br/>
+            <a:r>
+              <a:rPr i="1">
+                <a:solidFill>
+                  <a:srgbClr val="60A0B0"/>
+                </a:solidFill>
+                <a:latin typeface="Courier"/>
+              </a:rPr>
+              <a:t>#' @param sd1_h Standard deviation of mean trait value at high temperature</a:t>
+            </a:r>
+            <a:br/>
+            <a:r>
+              <a:rPr i="1">
+                <a:solidFill>
+                  <a:srgbClr val="60A0B0"/>
+                </a:solidFill>
+                <a:latin typeface="Courier"/>
+              </a:rPr>
+              <a:t>#' @param sd2_l Standard deviation of mean trait value at low temperature</a:t>
+            </a:r>
+            <a:br/>
+            <a:r>
+              <a:rPr i="1">
+                <a:solidFill>
+                  <a:srgbClr val="60A0B0"/>
+                </a:solidFill>
+                <a:latin typeface="Courier"/>
+              </a:rPr>
+              <a:t>#' @param n1_h  Sample size at high temperature</a:t>
+            </a:r>
+            <a:br/>
+            <a:r>
+              <a:rPr i="1">
+                <a:solidFill>
+                  <a:srgbClr val="60A0B0"/>
+                </a:solidFill>
+                <a:latin typeface="Courier"/>
+              </a:rPr>
+              <a:t>#' @param n2_l  Sample size at low temperature</a:t>
+            </a:r>
+            <a:br/>
+            <a:br/>
+            <a:r>
+              <a:rPr>
+                <a:latin typeface="Courier"/>
+              </a:rPr>
+              <a:t>arr </a:t>
+            </a:r>
+            <a:r>
+              <a:rPr>
+                <a:solidFill>
+                  <a:srgbClr val="007020"/>
+                </a:solidFill>
+                <a:latin typeface="Courier"/>
+              </a:rPr>
+              <a:t>&lt;-</a:t>
+            </a:r>
+            <a:r>
+              <a:rPr>
+                <a:latin typeface="Courier"/>
+              </a:rPr>
+              <a:t> </a:t>
+            </a:r>
+            <a:r>
+              <a:rPr b="1">
+                <a:solidFill>
+                  <a:srgbClr val="007020"/>
+                </a:solidFill>
+                <a:latin typeface="Courier"/>
+              </a:rPr>
+              <a:t>function</a:t>
+            </a:r>
+            <a:r>
+              <a:rPr>
+                <a:latin typeface="Courier"/>
+              </a:rPr>
+              <a:t>(x1_h, x2_l, sd1_h, sd2_l, n1_h, n2_l, t1_h, t2_l){</a:t>
+            </a:r>
+            <a:br/>
+            <a:r>
+              <a:rPr>
+                <a:latin typeface="Courier"/>
+              </a:rPr>
+              <a:t>        ARR </a:t>
+            </a:r>
+            <a:r>
+              <a:rPr>
+                <a:solidFill>
+                  <a:srgbClr val="007020"/>
+                </a:solidFill>
+                <a:latin typeface="Courier"/>
+              </a:rPr>
+              <a:t>&lt;-</a:t>
+            </a:r>
+            <a:r>
+              <a:rPr>
+                <a:latin typeface="Courier"/>
+              </a:rPr>
+              <a:t> (x1_h </a:t>
+            </a:r>
+            <a:r>
+              <a:rPr>
+                <a:solidFill>
+                  <a:srgbClr val="4070A0"/>
+                </a:solidFill>
+                <a:latin typeface="Courier"/>
+              </a:rPr>
+              <a:t>-</a:t>
+            </a:r>
+            <a:r>
+              <a:rPr>
+                <a:latin typeface="Courier"/>
+              </a:rPr>
+              <a:t> x2_l)</a:t>
+            </a:r>
+            <a:r>
+              <a:rPr>
+                <a:solidFill>
+                  <a:srgbClr val="4070A0"/>
+                </a:solidFill>
+                <a:latin typeface="Courier"/>
+              </a:rPr>
+              <a:t>/</a:t>
+            </a:r>
+            <a:r>
+              <a:rPr>
+                <a:latin typeface="Courier"/>
+              </a:rPr>
+              <a:t>(t1_h </a:t>
+            </a:r>
+            <a:r>
+              <a:rPr>
+                <a:solidFill>
+                  <a:srgbClr val="4070A0"/>
+                </a:solidFill>
+                <a:latin typeface="Courier"/>
+              </a:rPr>
+              <a:t>-</a:t>
+            </a:r>
+            <a:r>
+              <a:rPr>
+                <a:latin typeface="Courier"/>
+              </a:rPr>
+              <a:t> t2_l)</a:t>
+            </a:r>
+            <a:br/>
+            <a:r>
+              <a:rPr>
+                <a:latin typeface="Courier"/>
+              </a:rPr>
+              <a:t>      V_ARR </a:t>
+            </a:r>
+            <a:r>
+              <a:rPr>
+                <a:solidFill>
+                  <a:srgbClr val="007020"/>
+                </a:solidFill>
+                <a:latin typeface="Courier"/>
+              </a:rPr>
+              <a:t>&lt;-</a:t>
+            </a:r>
+            <a:r>
+              <a:rPr>
+                <a:latin typeface="Courier"/>
+              </a:rPr>
+              <a:t> ((</a:t>
+            </a:r>
+            <a:r>
+              <a:rPr>
+                <a:solidFill>
+                  <a:srgbClr val="40A070"/>
+                </a:solidFill>
+                <a:latin typeface="Courier"/>
+              </a:rPr>
+              <a:t>1</a:t>
+            </a:r>
+            <a:r>
+              <a:rPr>
+                <a:solidFill>
+                  <a:srgbClr val="4070A0"/>
+                </a:solidFill>
+                <a:latin typeface="Courier"/>
+              </a:rPr>
+              <a:t>/</a:t>
+            </a:r>
+            <a:r>
+              <a:rPr>
+                <a:latin typeface="Courier"/>
+              </a:rPr>
+              <a:t>(t1_h </a:t>
+            </a:r>
+            <a:r>
+              <a:rPr>
+                <a:solidFill>
+                  <a:srgbClr val="4070A0"/>
+                </a:solidFill>
+                <a:latin typeface="Courier"/>
+              </a:rPr>
+              <a:t>-</a:t>
+            </a:r>
+            <a:r>
+              <a:rPr>
+                <a:latin typeface="Courier"/>
+              </a:rPr>
+              <a:t> t2_l))</a:t>
+            </a:r>
+            <a:r>
+              <a:rPr>
+                <a:solidFill>
+                  <a:srgbClr val="4070A0"/>
+                </a:solidFill>
+                <a:latin typeface="Courier"/>
+              </a:rPr>
+              <a:t>^</a:t>
+            </a:r>
+            <a:r>
+              <a:rPr>
+                <a:solidFill>
+                  <a:srgbClr val="40A070"/>
+                </a:solidFill>
+                <a:latin typeface="Courier"/>
+              </a:rPr>
+              <a:t>2</a:t>
+            </a:r>
+            <a:r>
+              <a:rPr>
+                <a:solidFill>
+                  <a:srgbClr val="4070A0"/>
+                </a:solidFill>
+                <a:latin typeface="Courier"/>
+              </a:rPr>
+              <a:t>*</a:t>
+            </a:r>
+            <a:r>
+              <a:rPr>
+                <a:latin typeface="Courier"/>
+              </a:rPr>
+              <a:t>(sd2_l</a:t>
+            </a:r>
+            <a:r>
+              <a:rPr>
+                <a:solidFill>
+                  <a:srgbClr val="4070A0"/>
+                </a:solidFill>
+                <a:latin typeface="Courier"/>
+              </a:rPr>
+              <a:t>^</a:t>
+            </a:r>
+            <a:r>
+              <a:rPr>
+                <a:solidFill>
+                  <a:srgbClr val="40A070"/>
+                </a:solidFill>
+                <a:latin typeface="Courier"/>
+              </a:rPr>
+              <a:t>2</a:t>
+            </a:r>
+            <a:r>
+              <a:rPr>
+                <a:solidFill>
+                  <a:srgbClr val="4070A0"/>
+                </a:solidFill>
+                <a:latin typeface="Courier"/>
+              </a:rPr>
+              <a:t>/</a:t>
+            </a:r>
+            <a:r>
+              <a:rPr>
+                <a:latin typeface="Courier"/>
+              </a:rPr>
+              <a:t>n2_l </a:t>
+            </a:r>
+            <a:r>
+              <a:rPr>
+                <a:solidFill>
+                  <a:srgbClr val="4070A0"/>
+                </a:solidFill>
+                <a:latin typeface="Courier"/>
+              </a:rPr>
+              <a:t>+</a:t>
+            </a:r>
+            <a:r>
+              <a:rPr>
+                <a:latin typeface="Courier"/>
+              </a:rPr>
+              <a:t> sd1_h</a:t>
+            </a:r>
+            <a:r>
+              <a:rPr>
+                <a:solidFill>
+                  <a:srgbClr val="4070A0"/>
+                </a:solidFill>
+                <a:latin typeface="Courier"/>
+              </a:rPr>
+              <a:t>^</a:t>
+            </a:r>
+            <a:r>
+              <a:rPr>
+                <a:solidFill>
+                  <a:srgbClr val="40A070"/>
+                </a:solidFill>
+                <a:latin typeface="Courier"/>
+              </a:rPr>
+              <a:t>2</a:t>
+            </a:r>
+            <a:r>
+              <a:rPr>
+                <a:solidFill>
+                  <a:srgbClr val="4070A0"/>
+                </a:solidFill>
+                <a:latin typeface="Courier"/>
+              </a:rPr>
+              <a:t>/</a:t>
+            </a:r>
+            <a:r>
+              <a:rPr>
+                <a:latin typeface="Courier"/>
+              </a:rPr>
+              <a:t>n1_h))</a:t>
+            </a:r>
+            <a:br/>
+            <a:r>
+              <a:rPr>
+                <a:solidFill>
+                  <a:srgbClr val="06287E"/>
+                </a:solidFill>
+                <a:latin typeface="Courier"/>
+              </a:rPr>
+              <a:t>return</a:t>
+            </a:r>
+            <a:r>
+              <a:rPr>
+                <a:latin typeface="Courier"/>
+              </a:rPr>
+              <a:t>(</a:t>
+            </a:r>
+            <a:r>
+              <a:rPr>
+                <a:solidFill>
+                  <a:srgbClr val="06287E"/>
+                </a:solidFill>
+                <a:latin typeface="Courier"/>
+              </a:rPr>
+              <a:t>data.frame</a:t>
+            </a:r>
+            <a:r>
+              <a:rPr>
+                <a:latin typeface="Courier"/>
+              </a:rPr>
+              <a:t>(ARR, V_ARR))</a:t>
+            </a:r>
+            <a:br/>
+            <a:r>
+              <a:rPr>
+                <a:latin typeface="Courier"/>
+              </a:rPr>
+              <a:t>}</a:t>
+            </a:r>
+          </a:p>
+        </p:txBody>
+      </p:sp>
+    </p:spTree>
+  </p:cSld>
+</p:sld>
+</file>
+
+<file path=ppt/slides/slide35.xml><?xml version="1.0" encoding="utf-8"?>
+<p:sld xmlns:a="http://schemas.openxmlformats.org/drawingml/2006/main" xmlns:r="http://schemas.openxmlformats.org/officeDocument/2006/relationships" xmlns:p="http://schemas.openxmlformats.org/presentationml/2006/main">
+  <p:cSld>
+    <p:spTree>
+      <p:nvGrpSpPr>
+        <p:cNvPr id="1" name=""/>
+        <p:cNvGrpSpPr/>
+        <p:nvPr/>
+      </p:nvGrpSpPr>
+      <p:grpSpPr>
+        <a:xfrm>
+          <a:off x="0" y="0"/>
+          <a:ext cx="0" cy="0"/>
+          <a:chOff x="0" y="0"/>
+          <a:chExt cx="0" cy="0"/>
+        </a:xfrm>
+      </p:grpSpPr>
+      <p:sp>
+        <p:nvSpPr>
+          <p:cNvPr id="2" name="Title 1"/>
+          <p:cNvSpPr>
+            <a:spLocks noGrp="1"/>
+          </p:cNvSpPr>
+          <p:nvPr>
+            <p:ph type="title"/>
+          </p:nvPr>
+        </p:nvSpPr>
+        <p:spPr/>
+        <p:txBody>
+          <a:bodyPr/>
+          <a:lstStyle/>
+          <a:p>
+            <a:pPr lvl="0" indent="0" marL="0">
+              <a:buNone/>
+            </a:pPr>
+            <a:r>
+              <a:rPr/>
+              <a:t>Caluclate ARR</a:t>
+            </a:r>
+          </a:p>
+        </p:txBody>
+      </p:sp>
+      <p:sp>
+        <p:nvSpPr>
+          <p:cNvPr id="3" name="Content Placeholder 2"/>
+          <p:cNvSpPr>
+            <a:spLocks noGrp="1"/>
+          </p:cNvSpPr>
+          <p:nvPr>
+            <p:ph idx="1"/>
+          </p:nvPr>
+        </p:nvSpPr>
+        <p:spPr/>
+        <p:txBody>
+          <a:bodyPr/>
+          <a:lstStyle/>
+          <a:p>
+            <a:pPr lvl="0" indent="0">
+              <a:buNone/>
+            </a:pPr>
+            <a:r>
+              <a:rPr i="1">
+                <a:solidFill>
+                  <a:srgbClr val="60A0B0"/>
+                </a:solidFill>
+                <a:latin typeface="Courier"/>
+              </a:rPr>
+              <a:t># Calculate the effect sizes</a:t>
+            </a:r>
+            <a:br/>
+            <a:r>
+              <a:rPr>
+                <a:latin typeface="Courier"/>
+              </a:rPr>
+              <a:t>asr_dat </a:t>
+            </a:r>
+            <a:r>
+              <a:rPr>
+                <a:solidFill>
+                  <a:srgbClr val="007020"/>
+                </a:solidFill>
+                <a:latin typeface="Courier"/>
+              </a:rPr>
+              <a:t>&lt;-</a:t>
+            </a:r>
+            <a:r>
+              <a:rPr>
+                <a:latin typeface="Courier"/>
+              </a:rPr>
+              <a:t> asr_dat </a:t>
+            </a:r>
+            <a:r>
+              <a:rPr>
+                <a:solidFill>
+                  <a:srgbClr val="4070A0"/>
+                </a:solidFill>
+                <a:latin typeface="Courier"/>
+              </a:rPr>
+              <a:t>%&gt;%</a:t>
+            </a:r>
+            <a:br/>
+            <a:r>
+              <a:rPr>
+                <a:latin typeface="Courier"/>
+              </a:rPr>
+              <a:t>    </a:t>
+            </a:r>
+            <a:r>
+              <a:rPr>
+                <a:solidFill>
+                  <a:srgbClr val="06287E"/>
+                </a:solidFill>
+                <a:latin typeface="Courier"/>
+              </a:rPr>
+              <a:t>mutate</a:t>
+            </a:r>
+            <a:r>
+              <a:rPr>
+                <a:latin typeface="Courier"/>
+              </a:rPr>
+              <a:t>(</a:t>
+            </a:r>
+            <a:r>
+              <a:rPr>
+                <a:solidFill>
+                  <a:srgbClr val="7D9029"/>
+                </a:solidFill>
+                <a:latin typeface="Courier"/>
+              </a:rPr>
+              <a:t>ARR =</a:t>
+            </a:r>
+            <a:r>
+              <a:rPr>
+                <a:latin typeface="Courier"/>
+              </a:rPr>
+              <a:t> </a:t>
+            </a:r>
+            <a:r>
+              <a:rPr>
+                <a:solidFill>
+                  <a:srgbClr val="06287E"/>
+                </a:solidFill>
+                <a:latin typeface="Courier"/>
+              </a:rPr>
+              <a:t>arr</a:t>
+            </a:r>
+            <a:r>
+              <a:rPr>
+                <a:latin typeface="Courier"/>
+              </a:rPr>
+              <a:t>(</a:t>
+            </a:r>
+            <a:r>
+              <a:rPr>
+                <a:solidFill>
+                  <a:srgbClr val="7D9029"/>
+                </a:solidFill>
+                <a:latin typeface="Courier"/>
+              </a:rPr>
+              <a:t>x1_h =</a:t>
+            </a:r>
+            <a:r>
+              <a:rPr>
+                <a:latin typeface="Courier"/>
+              </a:rPr>
+              <a:t> mean_high, </a:t>
+            </a:r>
+            <a:r>
+              <a:rPr>
+                <a:solidFill>
+                  <a:srgbClr val="7D9029"/>
+                </a:solidFill>
+                <a:latin typeface="Courier"/>
+              </a:rPr>
+              <a:t>x2_l =</a:t>
+            </a:r>
+            <a:r>
+              <a:rPr>
+                <a:latin typeface="Courier"/>
+              </a:rPr>
+              <a:t> mean_low, </a:t>
+            </a:r>
+            <a:r>
+              <a:rPr>
+                <a:solidFill>
+                  <a:srgbClr val="7D9029"/>
+                </a:solidFill>
+                <a:latin typeface="Courier"/>
+              </a:rPr>
+              <a:t>t1_h =</a:t>
+            </a:r>
+            <a:r>
+              <a:rPr>
+                <a:latin typeface="Courier"/>
+              </a:rPr>
+              <a:t> acc_temp_high, </a:t>
+            </a:r>
+            <a:r>
+              <a:rPr>
+                <a:solidFill>
+                  <a:srgbClr val="7D9029"/>
+                </a:solidFill>
+                <a:latin typeface="Courier"/>
+              </a:rPr>
+              <a:t>t2_l =</a:t>
+            </a:r>
+            <a:r>
+              <a:rPr>
+                <a:latin typeface="Courier"/>
+              </a:rPr>
+              <a:t> acc_temp_low,</a:t>
+            </a:r>
+            <a:br/>
+            <a:r>
+              <a:rPr>
+                <a:latin typeface="Courier"/>
+              </a:rPr>
+              <a:t>        </a:t>
+            </a:r>
+            <a:r>
+              <a:rPr>
+                <a:solidFill>
+                  <a:srgbClr val="7D9029"/>
+                </a:solidFill>
+                <a:latin typeface="Courier"/>
+              </a:rPr>
+              <a:t>sd1_h =</a:t>
+            </a:r>
+            <a:r>
+              <a:rPr>
+                <a:latin typeface="Courier"/>
+              </a:rPr>
+              <a:t> sd_high, </a:t>
+            </a:r>
+            <a:r>
+              <a:rPr>
+                <a:solidFill>
+                  <a:srgbClr val="7D9029"/>
+                </a:solidFill>
+                <a:latin typeface="Courier"/>
+              </a:rPr>
+              <a:t>sd2_l =</a:t>
+            </a:r>
+            <a:r>
+              <a:rPr>
+                <a:latin typeface="Courier"/>
+              </a:rPr>
+              <a:t> sd_low, </a:t>
+            </a:r>
+            <a:r>
+              <a:rPr>
+                <a:solidFill>
+                  <a:srgbClr val="7D9029"/>
+                </a:solidFill>
+                <a:latin typeface="Courier"/>
+              </a:rPr>
+              <a:t>n1_h =</a:t>
+            </a:r>
+            <a:r>
+              <a:rPr>
+                <a:latin typeface="Courier"/>
+              </a:rPr>
+              <a:t> n_high_adj, </a:t>
+            </a:r>
+            <a:r>
+              <a:rPr>
+                <a:solidFill>
+                  <a:srgbClr val="7D9029"/>
+                </a:solidFill>
+                <a:latin typeface="Courier"/>
+              </a:rPr>
+              <a:t>n2_l =</a:t>
+            </a:r>
+            <a:r>
+              <a:rPr>
+                <a:latin typeface="Courier"/>
+              </a:rPr>
+              <a:t> n_low_adj)[, </a:t>
+            </a:r>
+            <a:r>
+              <a:rPr>
+                <a:solidFill>
+                  <a:srgbClr val="40A070"/>
+                </a:solidFill>
+                <a:latin typeface="Courier"/>
+              </a:rPr>
+              <a:t>1</a:t>
+            </a:r>
+            <a:r>
+              <a:rPr>
+                <a:latin typeface="Courier"/>
+              </a:rPr>
+              <a:t>],</a:t>
+            </a:r>
+            <a:br/>
+            <a:r>
+              <a:rPr>
+                <a:latin typeface="Courier"/>
+              </a:rPr>
+              <a:t>        </a:t>
+            </a:r>
+            <a:r>
+              <a:rPr>
+                <a:solidFill>
+                  <a:srgbClr val="7D9029"/>
+                </a:solidFill>
+                <a:latin typeface="Courier"/>
+              </a:rPr>
+              <a:t>V_ARR =</a:t>
+            </a:r>
+            <a:r>
+              <a:rPr>
+                <a:latin typeface="Courier"/>
+              </a:rPr>
+              <a:t> </a:t>
+            </a:r>
+            <a:r>
+              <a:rPr>
+                <a:solidFill>
+                  <a:srgbClr val="06287E"/>
+                </a:solidFill>
+                <a:latin typeface="Courier"/>
+              </a:rPr>
+              <a:t>arr</a:t>
+            </a:r>
+            <a:r>
+              <a:rPr>
+                <a:latin typeface="Courier"/>
+              </a:rPr>
+              <a:t>(</a:t>
+            </a:r>
+            <a:r>
+              <a:rPr>
+                <a:solidFill>
+                  <a:srgbClr val="7D9029"/>
+                </a:solidFill>
+                <a:latin typeface="Courier"/>
+              </a:rPr>
+              <a:t>x1_h =</a:t>
+            </a:r>
+            <a:r>
+              <a:rPr>
+                <a:latin typeface="Courier"/>
+              </a:rPr>
+              <a:t> mean_high, </a:t>
+            </a:r>
+            <a:r>
+              <a:rPr>
+                <a:solidFill>
+                  <a:srgbClr val="7D9029"/>
+                </a:solidFill>
+                <a:latin typeface="Courier"/>
+              </a:rPr>
+              <a:t>x2_l =</a:t>
+            </a:r>
+            <a:r>
+              <a:rPr>
+                <a:latin typeface="Courier"/>
+              </a:rPr>
+              <a:t> mean_low, </a:t>
+            </a:r>
+            <a:r>
+              <a:rPr>
+                <a:solidFill>
+                  <a:srgbClr val="7D9029"/>
+                </a:solidFill>
+                <a:latin typeface="Courier"/>
+              </a:rPr>
+              <a:t>t1_h =</a:t>
+            </a:r>
+            <a:r>
+              <a:rPr>
+                <a:latin typeface="Courier"/>
+              </a:rPr>
+              <a:t> acc_temp_high, </a:t>
+            </a:r>
+            <a:r>
+              <a:rPr>
+                <a:solidFill>
+                  <a:srgbClr val="7D9029"/>
+                </a:solidFill>
+                <a:latin typeface="Courier"/>
+              </a:rPr>
+              <a:t>t2_l =</a:t>
+            </a:r>
+            <a:r>
+              <a:rPr>
+                <a:latin typeface="Courier"/>
+              </a:rPr>
+              <a:t> acc_temp_low,</a:t>
+            </a:r>
+            <a:br/>
+            <a:r>
+              <a:rPr>
+                <a:latin typeface="Courier"/>
+              </a:rPr>
+              <a:t>            </a:t>
+            </a:r>
+            <a:r>
+              <a:rPr>
+                <a:solidFill>
+                  <a:srgbClr val="7D9029"/>
+                </a:solidFill>
+                <a:latin typeface="Courier"/>
+              </a:rPr>
+              <a:t>sd1_h =</a:t>
+            </a:r>
+            <a:r>
+              <a:rPr>
+                <a:latin typeface="Courier"/>
+              </a:rPr>
+              <a:t> sd_high, </a:t>
+            </a:r>
+            <a:r>
+              <a:rPr>
+                <a:solidFill>
+                  <a:srgbClr val="7D9029"/>
+                </a:solidFill>
+                <a:latin typeface="Courier"/>
+              </a:rPr>
+              <a:t>sd2_l =</a:t>
+            </a:r>
+            <a:r>
+              <a:rPr>
+                <a:latin typeface="Courier"/>
+              </a:rPr>
+              <a:t> sd_low, </a:t>
+            </a:r>
+            <a:r>
+              <a:rPr>
+                <a:solidFill>
+                  <a:srgbClr val="7D9029"/>
+                </a:solidFill>
+                <a:latin typeface="Courier"/>
+              </a:rPr>
+              <a:t>n1_h =</a:t>
+            </a:r>
+            <a:r>
+              <a:rPr>
+                <a:latin typeface="Courier"/>
+              </a:rPr>
+              <a:t> n_high_adj, </a:t>
+            </a:r>
+            <a:r>
+              <a:rPr>
+                <a:solidFill>
+                  <a:srgbClr val="7D9029"/>
+                </a:solidFill>
+                <a:latin typeface="Courier"/>
+              </a:rPr>
+              <a:t>n2_l =</a:t>
+            </a:r>
+            <a:r>
+              <a:rPr>
+                <a:latin typeface="Courier"/>
+              </a:rPr>
+              <a:t> n_low_adj)[,</a:t>
+            </a:r>
+            <a:br/>
+            <a:r>
+              <a:rPr>
+                <a:latin typeface="Courier"/>
+              </a:rPr>
+              <a:t>            </a:t>
+            </a:r>
+            <a:r>
+              <a:rPr>
+                <a:solidFill>
+                  <a:srgbClr val="40A070"/>
+                </a:solidFill>
+                <a:latin typeface="Courier"/>
+              </a:rPr>
+              <a:t>2</a:t>
+            </a:r>
+            <a:r>
+              <a:rPr>
+                <a:latin typeface="Courier"/>
+              </a:rPr>
+              <a:t>]) </a:t>
+            </a:r>
+            <a:r>
+              <a:rPr>
+                <a:solidFill>
+                  <a:srgbClr val="4070A0"/>
+                </a:solidFill>
+                <a:latin typeface="Courier"/>
+              </a:rPr>
+              <a:t>%&gt;%</a:t>
+            </a:r>
+            <a:br/>
+            <a:r>
+              <a:rPr>
+                <a:latin typeface="Courier"/>
+              </a:rPr>
+              <a:t>    </a:t>
+            </a:r>
+            <a:r>
+              <a:rPr>
+                <a:solidFill>
+                  <a:srgbClr val="06287E"/>
+                </a:solidFill>
+                <a:latin typeface="Courier"/>
+              </a:rPr>
+              <a:t>filter</a:t>
+            </a:r>
+            <a:r>
+              <a:rPr>
+                <a:latin typeface="Courier"/>
+              </a:rPr>
+              <a:t>(sex </a:t>
+            </a:r>
+            <a:r>
+              <a:rPr>
+                <a:solidFill>
+                  <a:srgbClr val="4070A0"/>
+                </a:solidFill>
+                <a:latin typeface="Courier"/>
+              </a:rPr>
+              <a:t>==</a:t>
+            </a:r>
+            <a:r>
+              <a:rPr>
+                <a:latin typeface="Courier"/>
+              </a:rPr>
+              <a:t> </a:t>
+            </a:r>
+            <a:r>
+              <a:rPr>
+                <a:solidFill>
+                  <a:srgbClr val="4070A0"/>
+                </a:solidFill>
+                <a:latin typeface="Courier"/>
+              </a:rPr>
+              <a:t>"female"</a:t>
+            </a:r>
+            <a:r>
+              <a:rPr>
+                <a:latin typeface="Courier"/>
+              </a:rPr>
+              <a:t>)</a:t>
+            </a:r>
+          </a:p>
+        </p:txBody>
+      </p:sp>
+    </p:spTree>
+  </p:cSld>
+</p:sld>
+</file>
+
+<file path=ppt/slides/slide36.xml><?xml version="1.0" encoding="utf-8"?>
+<p:sld xmlns:a="http://schemas.openxmlformats.org/drawingml/2006/main" xmlns:r="http://schemas.openxmlformats.org/officeDocument/2006/relationships" xmlns:p="http://schemas.openxmlformats.org/presentationml/2006/main">
+  <p:cSld>
+    <p:spTree>
+      <p:nvGrpSpPr>
+        <p:cNvPr id="1" name=""/>
+        <p:cNvGrpSpPr/>
+        <p:nvPr/>
+      </p:nvGrpSpPr>
+      <p:grpSpPr>
+        <a:xfrm>
+          <a:off x="0" y="0"/>
+          <a:ext cx="0" cy="0"/>
+          <a:chOff x="0" y="0"/>
+          <a:chExt cx="0" cy="0"/>
+        </a:xfrm>
+      </p:grpSpPr>
+      <p:sp>
+        <p:nvSpPr>
+          <p:cNvPr id="2" name="Title 1"/>
+          <p:cNvSpPr>
+            <a:spLocks noGrp="1"/>
+          </p:cNvSpPr>
+          <p:nvPr>
+            <p:ph type="title"/>
+          </p:nvPr>
+        </p:nvSpPr>
+        <p:spPr/>
+        <p:txBody>
+          <a:bodyPr/>
+          <a:lstStyle/>
+          <a:p>
+            <a:pPr lvl="0" indent="0" marL="0">
+              <a:buNone/>
+            </a:pPr>
+            <a:r>
+              <a:rPr/>
+              <a:t>Fit model</a:t>
+            </a:r>
+          </a:p>
+        </p:txBody>
+      </p:sp>
+      <p:sp>
+        <p:nvSpPr>
+          <p:cNvPr id="3" name="Content Placeholder 2"/>
+          <p:cNvSpPr>
+            <a:spLocks noGrp="1"/>
+          </p:cNvSpPr>
+          <p:nvPr>
+            <p:ph idx="1"/>
+          </p:nvPr>
+        </p:nvSpPr>
+        <p:spPr/>
+        <p:txBody>
+          <a:bodyPr/>
+          <a:lstStyle/>
+          <a:p>
+            <a:pPr lvl="0" indent="0">
+              <a:buNone/>
+            </a:pPr>
+            <a:r>
+              <a:rPr i="1">
+                <a:solidFill>
+                  <a:srgbClr val="60A0B0"/>
+                </a:solidFill>
+                <a:latin typeface="Courier"/>
+              </a:rPr>
+              <a:t># Multi-level meta-analytic model</a:t>
+            </a:r>
+            <a:br/>
+            <a:r>
+              <a:rPr>
+                <a:latin typeface="Courier"/>
+              </a:rPr>
+              <a:t>MLMA </a:t>
+            </a:r>
+            <a:r>
+              <a:rPr>
+                <a:solidFill>
+                  <a:srgbClr val="007020"/>
+                </a:solidFill>
+                <a:latin typeface="Courier"/>
+              </a:rPr>
+              <a:t>&lt;-</a:t>
+            </a:r>
+            <a:r>
+              <a:rPr>
+                <a:latin typeface="Courier"/>
+              </a:rPr>
+              <a:t> metafor</a:t>
+            </a:r>
+            <a:r>
+              <a:rPr>
+                <a:solidFill>
+                  <a:srgbClr val="4070A0"/>
+                </a:solidFill>
+                <a:latin typeface="Courier"/>
+              </a:rPr>
+              <a:t>::</a:t>
+            </a:r>
+            <a:r>
+              <a:rPr>
+                <a:solidFill>
+                  <a:srgbClr val="06287E"/>
+                </a:solidFill>
+                <a:latin typeface="Courier"/>
+              </a:rPr>
+              <a:t>rma.mv</a:t>
+            </a:r>
+            <a:r>
+              <a:rPr>
+                <a:latin typeface="Courier"/>
+              </a:rPr>
+              <a:t>(</a:t>
+            </a:r>
+            <a:r>
+              <a:rPr>
+                <a:solidFill>
+                  <a:srgbClr val="7D9029"/>
+                </a:solidFill>
+                <a:latin typeface="Courier"/>
+              </a:rPr>
+              <a:t>yi=</a:t>
+            </a:r>
+            <a:r>
+              <a:rPr>
+                <a:latin typeface="Courier"/>
+              </a:rPr>
+              <a:t> ARR</a:t>
+            </a:r>
+            <a:r>
+              <a:rPr>
+                <a:solidFill>
+                  <a:srgbClr val="4070A0"/>
+                </a:solidFill>
+                <a:latin typeface="Courier"/>
+              </a:rPr>
+              <a:t>~</a:t>
+            </a:r>
+            <a:r>
+              <a:rPr>
+                <a:latin typeface="Courier"/>
+              </a:rPr>
+              <a:t> </a:t>
+            </a:r>
+            <a:r>
+              <a:rPr>
+                <a:solidFill>
+                  <a:srgbClr val="40A070"/>
+                </a:solidFill>
+                <a:latin typeface="Courier"/>
+              </a:rPr>
+              <a:t>1</a:t>
+            </a:r>
+            <a:r>
+              <a:rPr>
+                <a:latin typeface="Courier"/>
+              </a:rPr>
+              <a:t>, </a:t>
+            </a:r>
+            <a:r>
+              <a:rPr>
+                <a:solidFill>
+                  <a:srgbClr val="7D9029"/>
+                </a:solidFill>
+                <a:latin typeface="Courier"/>
+              </a:rPr>
+              <a:t>V =</a:t>
+            </a:r>
+            <a:r>
+              <a:rPr>
+                <a:latin typeface="Courier"/>
+              </a:rPr>
+              <a:t> V_ARR, </a:t>
+            </a:r>
+            <a:br/>
+            <a:r>
+              <a:rPr>
+                <a:latin typeface="Courier"/>
+              </a:rPr>
+              <a:t>                   </a:t>
+            </a:r>
+            <a:r>
+              <a:rPr>
+                <a:solidFill>
+                  <a:srgbClr val="7D9029"/>
+                </a:solidFill>
+                <a:latin typeface="Courier"/>
+              </a:rPr>
+              <a:t>method=</a:t>
+            </a:r>
+            <a:r>
+              <a:rPr>
+                <a:solidFill>
+                  <a:srgbClr val="4070A0"/>
+                </a:solidFill>
+                <a:latin typeface="Courier"/>
+              </a:rPr>
+              <a:t>"REML"</a:t>
+            </a:r>
+            <a:r>
+              <a:rPr>
+                <a:latin typeface="Courier"/>
+              </a:rPr>
+              <a:t>,</a:t>
+            </a:r>
+            <a:br/>
+            <a:r>
+              <a:rPr>
+                <a:latin typeface="Courier"/>
+              </a:rPr>
+              <a:t>                   </a:t>
+            </a:r>
+            <a:r>
+              <a:rPr>
+                <a:solidFill>
+                  <a:srgbClr val="7D9029"/>
+                </a:solidFill>
+                <a:latin typeface="Courier"/>
+              </a:rPr>
+              <a:t>random=</a:t>
+            </a:r>
+            <a:r>
+              <a:rPr>
+                <a:solidFill>
+                  <a:srgbClr val="06287E"/>
+                </a:solidFill>
+                <a:latin typeface="Courier"/>
+              </a:rPr>
+              <a:t>list</a:t>
+            </a:r>
+            <a:r>
+              <a:rPr>
+                <a:latin typeface="Courier"/>
+              </a:rPr>
+              <a:t>(</a:t>
+            </a:r>
+            <a:r>
+              <a:rPr>
+                <a:solidFill>
+                  <a:srgbClr val="4070A0"/>
+                </a:solidFill>
+                <a:latin typeface="Courier"/>
+              </a:rPr>
+              <a:t>~</a:t>
+            </a:r>
+            <a:r>
+              <a:rPr>
+                <a:solidFill>
+                  <a:srgbClr val="40A070"/>
+                </a:solidFill>
+                <a:latin typeface="Courier"/>
+              </a:rPr>
+              <a:t>1</a:t>
+            </a:r>
+            <a:r>
+              <a:rPr>
+                <a:solidFill>
+                  <a:srgbClr val="4070A0"/>
+                </a:solidFill>
+                <a:latin typeface="Courier"/>
+              </a:rPr>
+              <a:t>|</a:t>
+            </a:r>
+            <a:r>
+              <a:rPr>
+                <a:latin typeface="Courier"/>
+              </a:rPr>
+              <a:t>species_ID,</a:t>
+            </a:r>
+            <a:br/>
+            <a:r>
+              <a:rPr>
+                <a:latin typeface="Courier"/>
+              </a:rPr>
+              <a:t>                               </a:t>
+            </a:r>
+            <a:r>
+              <a:rPr>
+                <a:solidFill>
+                  <a:srgbClr val="4070A0"/>
+                </a:solidFill>
+                <a:latin typeface="Courier"/>
+              </a:rPr>
+              <a:t>~</a:t>
+            </a:r>
+            <a:r>
+              <a:rPr>
+                <a:solidFill>
+                  <a:srgbClr val="40A070"/>
+                </a:solidFill>
+                <a:latin typeface="Courier"/>
+              </a:rPr>
+              <a:t>1</a:t>
+            </a:r>
+            <a:r>
+              <a:rPr>
+                <a:solidFill>
+                  <a:srgbClr val="4070A0"/>
+                </a:solidFill>
+                <a:latin typeface="Courier"/>
+              </a:rPr>
+              <a:t>|</a:t>
+            </a:r>
+            <a:r>
+              <a:rPr>
+                <a:latin typeface="Courier"/>
+              </a:rPr>
+              <a:t>authors,</a:t>
+            </a:r>
+            <a:br/>
+            <a:r>
+              <a:rPr>
+                <a:latin typeface="Courier"/>
+              </a:rPr>
+              <a:t>                               </a:t>
+            </a:r>
+            <a:r>
+              <a:rPr>
+                <a:solidFill>
+                  <a:srgbClr val="4070A0"/>
+                </a:solidFill>
+                <a:latin typeface="Courier"/>
+              </a:rPr>
+              <a:t>~</a:t>
+            </a:r>
+            <a:r>
+              <a:rPr>
+                <a:solidFill>
+                  <a:srgbClr val="40A070"/>
+                </a:solidFill>
+                <a:latin typeface="Courier"/>
+              </a:rPr>
+              <a:t>1</a:t>
+            </a:r>
+            <a:r>
+              <a:rPr>
+                <a:solidFill>
+                  <a:srgbClr val="4070A0"/>
+                </a:solidFill>
+                <a:latin typeface="Courier"/>
+              </a:rPr>
+              <a:t>|</a:t>
+            </a:r>
+            <a:r>
+              <a:rPr>
+                <a:latin typeface="Courier"/>
+              </a:rPr>
+              <a:t>es_ID), </a:t>
+            </a:r>
+            <a:br/>
+            <a:r>
+              <a:rPr>
+                <a:latin typeface="Courier"/>
+              </a:rPr>
+              <a:t>                   </a:t>
+            </a:r>
+            <a:r>
+              <a:rPr>
+                <a:solidFill>
+                  <a:srgbClr val="7D9029"/>
+                </a:solidFill>
+                <a:latin typeface="Courier"/>
+              </a:rPr>
+              <a:t>dfs =</a:t>
+            </a:r>
+            <a:r>
+              <a:rPr>
+                <a:latin typeface="Courier"/>
+              </a:rPr>
+              <a:t> </a:t>
+            </a:r>
+            <a:r>
+              <a:rPr>
+                <a:solidFill>
+                  <a:srgbClr val="4070A0"/>
+                </a:solidFill>
+                <a:latin typeface="Courier"/>
+              </a:rPr>
+              <a:t>"contain"</a:t>
+            </a:r>
+            <a:r>
+              <a:rPr>
+                <a:latin typeface="Courier"/>
+              </a:rPr>
+              <a:t>,</a:t>
+            </a:r>
+            <a:br/>
+            <a:r>
+              <a:rPr>
+                <a:latin typeface="Courier"/>
+              </a:rPr>
+              <a:t>                   </a:t>
+            </a:r>
+            <a:r>
+              <a:rPr>
+                <a:solidFill>
+                  <a:srgbClr val="7D9029"/>
+                </a:solidFill>
+                <a:latin typeface="Courier"/>
+              </a:rPr>
+              <a:t>test=</a:t>
+            </a:r>
+            <a:r>
+              <a:rPr>
+                <a:solidFill>
+                  <a:srgbClr val="4070A0"/>
+                </a:solidFill>
+                <a:latin typeface="Courier"/>
+              </a:rPr>
+              <a:t>"t"</a:t>
+            </a:r>
+            <a:r>
+              <a:rPr>
+                <a:latin typeface="Courier"/>
+              </a:rPr>
+              <a:t>,</a:t>
+            </a:r>
+            <a:br/>
+            <a:r>
+              <a:rPr>
+                <a:latin typeface="Courier"/>
+              </a:rPr>
+              <a:t>                   </a:t>
+            </a:r>
+            <a:r>
+              <a:rPr>
+                <a:solidFill>
+                  <a:srgbClr val="7D9029"/>
+                </a:solidFill>
+                <a:latin typeface="Courier"/>
+              </a:rPr>
+              <a:t>data=</a:t>
+            </a:r>
+            <a:r>
+              <a:rPr>
+                <a:latin typeface="Courier"/>
+              </a:rPr>
+              <a:t>asr_dat)</a:t>
+            </a:r>
+            <a:br/>
+            <a:r>
+              <a:rPr>
+                <a:solidFill>
+                  <a:srgbClr val="06287E"/>
+                </a:solidFill>
+                <a:latin typeface="Courier"/>
+              </a:rPr>
+              <a:t>print</a:t>
+            </a:r>
+            <a:r>
+              <a:rPr>
+                <a:latin typeface="Courier"/>
+              </a:rPr>
+              <a:t>(MLMA)</a:t>
+            </a:r>
+          </a:p>
+          <a:p>
+            <a:pPr lvl="0" indent="0">
+              <a:buNone/>
+            </a:pPr>
+            <a:r>
+              <a:rPr>
+                <a:latin typeface="Courier"/>
+              </a:rPr>
+              <a:t>## 
+## Multivariate Meta-Analysis Model (k = 123; method: REML)
+## 
+## Variance Components:
+## 
+##             estim    sqrt  nlvls  fixed      factor 
+## sigma^2.1  0.0008  0.0280     29     no  species_ID 
+## sigma^2.2  0.0154  0.1241     21     no     authors 
+## sigma^2.3  0.0097  0.0987    123     no       es_ID 
+## 
+## Test for Heterogeneity:
+## Q(df = 122) = 3941.0055, p-val &lt; .0001
+## 
+## Model Results:
+## 
+## estimate      se    tval  df    pval   ci.lb   ci.ub     ​ 
+##   0.1668  0.0316  5.2857  20  &lt;.0001  0.1010  0.2327  *** 
+## 
+## ---
+## Signif. codes:  0 '***' 0.001 '**' 0.01 '*' 0.05 '.' 0.1 ' ' 1</a:t>
+            </a:r>
+          </a:p>
+        </p:txBody>
+      </p:sp>
+    </p:spTree>
+  </p:cSld>
+</p:sld>
+</file>
+
 <file path=ppt/slides/slide4.xml><?xml version="1.0" encoding="utf-8"?>
 <p:sld xmlns:a="http://schemas.openxmlformats.org/drawingml/2006/main" xmlns:r="http://schemas.openxmlformats.org/officeDocument/2006/relationships" xmlns:p="http://schemas.openxmlformats.org/presentationml/2006/main">
   <p:cSld>
@@ -16370,7 +18008,7 @@
                   <a:rPr>
                     <a:latin typeface="Courier"/>
                   </a:rPr>
-                  <a:t>## [1] 0.1737988</a:t>
+                  <a:t>## [1] 0.1708647</a:t>
                 </a:r>
               </a:p>
             </p:txBody>

</xml_diff>

<commit_message>
Code added for pub bias. Need eqna
</commit_message>
<xml_diff>
--- a/slides/code_slides.pptx
+++ b/slides/code_slides.pptx
@@ -54,6 +54,15 @@
     <p:sldId id="302" r:id="rId48"/>
     <p:sldId id="303" r:id="rId49"/>
     <p:sldId id="304" r:id="rId50"/>
+    <p:sldId id="305" r:id="rId51"/>
+    <p:sldId id="306" r:id="rId52"/>
+    <p:sldId id="307" r:id="rId53"/>
+    <p:sldId id="308" r:id="rId54"/>
+    <p:sldId id="309" r:id="rId55"/>
+    <p:sldId id="310" r:id="rId56"/>
+    <p:sldId id="311" r:id="rId57"/>
+    <p:sldId id="312" r:id="rId58"/>
+    <p:sldId id="313" r:id="rId59"/>
   </p:sldIdLst>
   <p:sldSz cx="9144000" cy="5143500" type="screen16x9"/>
   <p:notesSz cx="6858000" cy="9144000"/>
@@ -11721,7 +11730,7 @@
       </p:sp>
       <p:pic>
         <p:nvPicPr>
-          <p:cNvPr descr="code_slides_files/figure-pptx/fvsr-1.png" id="0" name="Picture 1"/>
+          <p:cNvPr descr="fig:  code_slides_files/figure-pptx/fvsr-1.png" id="0" name="Picture 1"/>
           <p:cNvPicPr>
             <a:picLocks noGrp="1" noChangeAspect="1"/>
           </p:cNvPicPr>
@@ -11803,6 +11812,31 @@
       </p:grpSpPr>
       <p:sp>
         <p:nvSpPr>
+          <p:cNvPr id="2" name="Title 1"/>
+          <p:cNvSpPr>
+            <a:spLocks noGrp="1"/>
+          </p:cNvSpPr>
+          <p:nvPr>
+            <p:ph type="title"/>
+          </p:nvPr>
+        </p:nvSpPr>
+        <p:spPr/>
+        <p:txBody>
+          <a:bodyPr/>
+          <a:lstStyle/>
+          <a:p>
+            <a:pPr lvl="0" indent="0" marL="0">
+              <a:buNone/>
+            </a:pPr>
+            <a:r>
+              <a:rPr/>
+              <a:t>random effect model</a:t>
+            </a:r>
+          </a:p>
+        </p:txBody>
+      </p:sp>
+      <p:sp>
+        <p:nvSpPr>
           <p:cNvPr id="3" name="Content Placeholder 2"/>
           <p:cNvSpPr>
             <a:spLocks noGrp="1"/>
@@ -11815,15 +11849,6 @@
         <p:txBody>
           <a:bodyPr/>
           <a:lstStyle/>
-          <a:p>
-            <a:pPr lvl="0" indent="0" marL="0">
-              <a:buNone/>
-            </a:pPr>
-            <a:r>
-              <a:rPr/>
-              <a:t> ## random effect model</a:t>
-            </a:r>
-          </a:p>
           <a:p>
             <a:pPr lvl="0" indent="0">
               <a:buNone/>
@@ -13332,7 +13357,7 @@
               <a:rPr>
                 <a:latin typeface="Courier"/>
               </a:rPr>
-              <a:t>## [1] -0.002541888</a:t>
+              <a:t>## [1] -0.2072644</a:t>
             </a:r>
           </a:p>
           <a:p>
@@ -13367,13 +13392,13 @@
 ##  Welch Two Sample t-test
 ## 
 ## data:  trt_26C and trt_8C
-## t = -0.018689, df = 10.811, p-value = 0.9854
+## t = -1.5054, df = 15.603, p-value = 0.1522
 ## alternative hypothesis: true difference in means is not equal to 0
 ## 95 percent confidence interval:
-##  -0.3025320  0.2974482
+##  -0.49974244  0.08521369
 ## sample estimates:
 ## mean of x mean of y 
-## 0.5646176 0.5671595</a:t>
+## 0.5791558 0.7864202</a:t>
             </a:r>
           </a:p>
         </p:txBody>
@@ -15358,12 +15383,8 @@
                   </m:oMath>
                 </a14:m>
                 <a:r>
-                  <a:rPr b="1"/>
-                  <a:t>C is expected to decrease by ~67% (1-0.33)</a:t>
-                </a:r>
-                <a:r>
                   <a:rPr/>
-                  <a:t>.</a:t>
+                  <a:t>C is expected to decrease by ~67% (1-0.33).</a:t>
                 </a:r>
               </a:p>
             </p:txBody>
@@ -22996,6 +23017,3116 @@
 </p:sld>
 </file>
 
+<file path=ppt/slides/slide50.xml><?xml version="1.0" encoding="utf-8"?>
+<p:sld xmlns:a="http://schemas.openxmlformats.org/drawingml/2006/main" xmlns:r="http://schemas.openxmlformats.org/officeDocument/2006/relationships" xmlns:p="http://schemas.openxmlformats.org/presentationml/2006/main">
+  <p:cSld>
+    <p:spTree>
+      <p:nvGrpSpPr>
+        <p:cNvPr id="1" name=""/>
+        <p:cNvGrpSpPr/>
+        <p:nvPr/>
+      </p:nvGrpSpPr>
+      <p:grpSpPr>
+        <a:xfrm>
+          <a:off x="0" y="0"/>
+          <a:ext cx="0" cy="0"/>
+          <a:chOff x="0" y="0"/>
+          <a:chExt cx="0" cy="0"/>
+        </a:xfrm>
+      </p:grpSpPr>
+      <p:sp>
+        <p:nvSpPr>
+          <p:cNvPr id="2" name="Title 1"/>
+          <p:cNvSpPr>
+            <a:spLocks noGrp="1"/>
+          </p:cNvSpPr>
+          <p:nvPr>
+            <p:ph type="title"/>
+          </p:nvPr>
+        </p:nvSpPr>
+        <p:spPr>
+          <a:xfrm>
+            <a:off x="457201" y="204787"/>
+            <a:ext cx="3008313" cy="871538"/>
+          </a:xfrm>
+        </p:spPr>
+        <p:txBody>
+          <a:bodyPr/>
+          <a:lstStyle/>
+          <a:p>
+            <a:pPr lvl="0" indent="0" marL="0">
+              <a:buNone/>
+            </a:pPr>
+            <a:r>
+              <a:rPr/>
+              <a:t>Orchard</a:t>
+            </a:r>
+          </a:p>
+        </p:txBody>
+      </p:sp>
+      <p:sp>
+        <p:nvSpPr>
+          <p:cNvPr id="4" name="Text Placeholder 3"/>
+          <p:cNvSpPr>
+            <a:spLocks noGrp="1"/>
+          </p:cNvSpPr>
+          <p:nvPr>
+            <p:ph idx="2" sz="half" type="body"/>
+          </p:nvPr>
+        </p:nvSpPr>
+        <p:spPr/>
+        <p:txBody>
+          <a:bodyPr/>
+          <a:lstStyle/>
+          <a:p>
+            <a:pPr lvl="0" indent="0">
+              <a:buNone/>
+            </a:pPr>
+            <a:r>
+              <a:rPr>
+                <a:latin typeface="Courier"/>
+              </a:rPr>
+              <a:t>orchaRd</a:t>
+            </a:r>
+            <a:r>
+              <a:rPr>
+                <a:solidFill>
+                  <a:srgbClr val="4070A0"/>
+                </a:solidFill>
+                <a:latin typeface="Courier"/>
+              </a:rPr>
+              <a:t>::</a:t>
+            </a:r>
+            <a:r>
+              <a:rPr>
+                <a:solidFill>
+                  <a:srgbClr val="06287E"/>
+                </a:solidFill>
+                <a:latin typeface="Courier"/>
+              </a:rPr>
+              <a:t>orchard_plot</a:t>
+            </a:r>
+            <a:r>
+              <a:rPr>
+                <a:latin typeface="Courier"/>
+              </a:rPr>
+              <a:t>(meta_reg, </a:t>
+            </a:r>
+            <a:r>
+              <a:rPr>
+                <a:solidFill>
+                  <a:srgbClr val="7D9029"/>
+                </a:solidFill>
+                <a:latin typeface="Courier"/>
+              </a:rPr>
+              <a:t>data =</a:t>
+            </a:r>
+            <a:r>
+              <a:rPr>
+                <a:latin typeface="Courier"/>
+              </a:rPr>
+              <a:t> asr_dat, </a:t>
+            </a:r>
+            <a:r>
+              <a:rPr>
+                <a:solidFill>
+                  <a:srgbClr val="7D9029"/>
+                </a:solidFill>
+                <a:latin typeface="Courier"/>
+              </a:rPr>
+              <a:t>mod =</a:t>
+            </a:r>
+            <a:r>
+              <a:rPr>
+                <a:latin typeface="Courier"/>
+              </a:rPr>
+              <a:t> </a:t>
+            </a:r>
+            <a:r>
+              <a:rPr>
+                <a:solidFill>
+                  <a:srgbClr val="4070A0"/>
+                </a:solidFill>
+                <a:latin typeface="Courier"/>
+              </a:rPr>
+              <a:t>"class"</a:t>
+            </a:r>
+            <a:r>
+              <a:rPr>
+                <a:latin typeface="Courier"/>
+              </a:rPr>
+              <a:t>, </a:t>
+            </a:r>
+            <a:r>
+              <a:rPr>
+                <a:solidFill>
+                  <a:srgbClr val="7D9029"/>
+                </a:solidFill>
+                <a:latin typeface="Courier"/>
+              </a:rPr>
+              <a:t>group =</a:t>
+            </a:r>
+            <a:r>
+              <a:rPr>
+                <a:latin typeface="Courier"/>
+              </a:rPr>
+              <a:t> </a:t>
+            </a:r>
+            <a:r>
+              <a:rPr>
+                <a:solidFill>
+                  <a:srgbClr val="4070A0"/>
+                </a:solidFill>
+                <a:latin typeface="Courier"/>
+              </a:rPr>
+              <a:t>"study_ID"</a:t>
+            </a:r>
+            <a:r>
+              <a:rPr>
+                <a:latin typeface="Courier"/>
+              </a:rPr>
+              <a:t>, </a:t>
+            </a:r>
+            <a:r>
+              <a:rPr>
+                <a:solidFill>
+                  <a:srgbClr val="7D9029"/>
+                </a:solidFill>
+                <a:latin typeface="Courier"/>
+              </a:rPr>
+              <a:t>xlab =</a:t>
+            </a:r>
+            <a:r>
+              <a:rPr>
+                <a:latin typeface="Courier"/>
+              </a:rPr>
+              <a:t> </a:t>
+            </a:r>
+            <a:r>
+              <a:rPr>
+                <a:solidFill>
+                  <a:srgbClr val="4070A0"/>
+                </a:solidFill>
+                <a:latin typeface="Courier"/>
+              </a:rPr>
+              <a:t>"Acclimation Response Ratio (ARR)"</a:t>
+            </a:r>
+            <a:r>
+              <a:rPr>
+                <a:latin typeface="Courier"/>
+              </a:rPr>
+              <a:t>, </a:t>
+            </a:r>
+            <a:r>
+              <a:rPr>
+                <a:solidFill>
+                  <a:srgbClr val="7D9029"/>
+                </a:solidFill>
+                <a:latin typeface="Courier"/>
+              </a:rPr>
+              <a:t>angle =</a:t>
+            </a:r>
+            <a:r>
+              <a:rPr>
+                <a:latin typeface="Courier"/>
+              </a:rPr>
+              <a:t> </a:t>
+            </a:r>
+            <a:r>
+              <a:rPr>
+                <a:solidFill>
+                  <a:srgbClr val="40A070"/>
+                </a:solidFill>
+                <a:latin typeface="Courier"/>
+              </a:rPr>
+              <a:t>45</a:t>
+            </a:r>
+            <a:r>
+              <a:rPr>
+                <a:latin typeface="Courier"/>
+              </a:rPr>
+              <a:t>)</a:t>
+            </a:r>
+          </a:p>
+        </p:txBody>
+      </p:sp>
+      <p:pic>
+        <p:nvPicPr>
+          <p:cNvPr descr="code_slides_files/figure-pptx/orchard-1.png" id="0" name="Picture 1"/>
+          <p:cNvPicPr>
+            <a:picLocks noGrp="1" noChangeAspect="1"/>
+          </p:cNvPicPr>
+          <p:nvPr/>
+        </p:nvPicPr>
+        <p:blipFill>
+          <a:blip r:embed="rId2"/>
+          <a:stretch>
+            <a:fillRect/>
+          </a:stretch>
+        </p:blipFill>
+        <p:spPr bwMode="auto">
+          <a:xfrm>
+            <a:off x="3568700" y="355600"/>
+            <a:ext cx="5105400" cy="4089400"/>
+          </a:xfrm>
+          <a:prstGeom prst="rect">
+            <a:avLst/>
+          </a:prstGeom>
+          <a:noFill/>
+          <a:ln w="9525">
+            <a:noFill/>
+            <a:headEnd/>
+            <a:tailEnd/>
+          </a:ln>
+        </p:spPr>
+      </p:pic>
+    </p:spTree>
+  </p:cSld>
+</p:sld>
+</file>
+
+<file path=ppt/slides/slide51.xml><?xml version="1.0" encoding="utf-8"?>
+<p:sld xmlns:a="http://schemas.openxmlformats.org/drawingml/2006/main" xmlns:r="http://schemas.openxmlformats.org/officeDocument/2006/relationships" xmlns:p="http://schemas.openxmlformats.org/presentationml/2006/main">
+  <p:cSld>
+    <p:spTree>
+      <p:nvGrpSpPr>
+        <p:cNvPr id="1" name=""/>
+        <p:cNvGrpSpPr/>
+        <p:nvPr/>
+      </p:nvGrpSpPr>
+      <p:grpSpPr>
+        <a:xfrm>
+          <a:off x="0" y="0"/>
+          <a:ext cx="0" cy="0"/>
+          <a:chOff x="0" y="0"/>
+          <a:chExt cx="0" cy="0"/>
+        </a:xfrm>
+      </p:grpSpPr>
+      <p:sp>
+        <p:nvSpPr>
+          <p:cNvPr id="2" name="Title 1"/>
+          <p:cNvSpPr>
+            <a:spLocks noGrp="1"/>
+          </p:cNvSpPr>
+          <p:nvPr>
+            <p:ph type="title"/>
+          </p:nvPr>
+        </p:nvSpPr>
+        <p:spPr>
+          <a:xfrm>
+            <a:off x="457201" y="204787"/>
+            <a:ext cx="3008313" cy="871538"/>
+          </a:xfrm>
+        </p:spPr>
+        <p:txBody>
+          <a:bodyPr/>
+          <a:lstStyle/>
+          <a:p>
+            <a:pPr lvl="0" indent="0" marL="0">
+              <a:buNone/>
+            </a:pPr>
+            <a:r>
+              <a:rPr/>
+              <a:t>Orchard2</a:t>
+            </a:r>
+          </a:p>
+        </p:txBody>
+      </p:sp>
+      <p:sp>
+        <p:nvSpPr>
+          <p:cNvPr id="4" name="Text Placeholder 3"/>
+          <p:cNvSpPr>
+            <a:spLocks noGrp="1"/>
+          </p:cNvSpPr>
+          <p:nvPr>
+            <p:ph idx="2" sz="half" type="body"/>
+          </p:nvPr>
+        </p:nvSpPr>
+        <p:spPr/>
+        <p:txBody>
+          <a:bodyPr/>
+          <a:lstStyle/>
+          <a:p>
+            <a:pPr lvl="0" indent="0">
+              <a:buNone/>
+            </a:pPr>
+            <a:r>
+              <a:rPr>
+                <a:latin typeface="Courier"/>
+              </a:rPr>
+              <a:t>mod_table </a:t>
+            </a:r>
+            <a:r>
+              <a:rPr>
+                <a:solidFill>
+                  <a:srgbClr val="007020"/>
+                </a:solidFill>
+                <a:latin typeface="Courier"/>
+              </a:rPr>
+              <a:t>&lt;-</a:t>
+            </a:r>
+            <a:r>
+              <a:rPr>
+                <a:latin typeface="Courier"/>
+              </a:rPr>
+              <a:t> orchaRd</a:t>
+            </a:r>
+            <a:r>
+              <a:rPr>
+                <a:solidFill>
+                  <a:srgbClr val="4070A0"/>
+                </a:solidFill>
+                <a:latin typeface="Courier"/>
+              </a:rPr>
+              <a:t>::</a:t>
+            </a:r>
+            <a:r>
+              <a:rPr>
+                <a:solidFill>
+                  <a:srgbClr val="06287E"/>
+                </a:solidFill>
+                <a:latin typeface="Courier"/>
+              </a:rPr>
+              <a:t>mod_results</a:t>
+            </a:r>
+            <a:r>
+              <a:rPr>
+                <a:latin typeface="Courier"/>
+              </a:rPr>
+              <a:t>(meta_reg,  </a:t>
+            </a:r>
+            <a:r>
+              <a:rPr>
+                <a:solidFill>
+                  <a:srgbClr val="7D9029"/>
+                </a:solidFill>
+                <a:latin typeface="Courier"/>
+              </a:rPr>
+              <a:t>data =</a:t>
+            </a:r>
+            <a:r>
+              <a:rPr>
+                <a:latin typeface="Courier"/>
+              </a:rPr>
+              <a:t> asr_dat,  </a:t>
+            </a:r>
+            <a:r>
+              <a:rPr>
+                <a:solidFill>
+                  <a:srgbClr val="7D9029"/>
+                </a:solidFill>
+                <a:latin typeface="Courier"/>
+              </a:rPr>
+              <a:t>mod =</a:t>
+            </a:r>
+            <a:r>
+              <a:rPr>
+                <a:latin typeface="Courier"/>
+              </a:rPr>
+              <a:t> </a:t>
+            </a:r>
+            <a:r>
+              <a:rPr>
+                <a:solidFill>
+                  <a:srgbClr val="4070A0"/>
+                </a:solidFill>
+                <a:latin typeface="Courier"/>
+              </a:rPr>
+              <a:t>"class"</a:t>
+            </a:r>
+            <a:r>
+              <a:rPr>
+                <a:latin typeface="Courier"/>
+              </a:rPr>
+              <a:t>, </a:t>
+            </a:r>
+            <a:r>
+              <a:rPr>
+                <a:solidFill>
+                  <a:srgbClr val="7D9029"/>
+                </a:solidFill>
+                <a:latin typeface="Courier"/>
+              </a:rPr>
+              <a:t>group =</a:t>
+            </a:r>
+            <a:r>
+              <a:rPr>
+                <a:latin typeface="Courier"/>
+              </a:rPr>
+              <a:t> </a:t>
+            </a:r>
+            <a:r>
+              <a:rPr>
+                <a:solidFill>
+                  <a:srgbClr val="4070A0"/>
+                </a:solidFill>
+                <a:latin typeface="Courier"/>
+              </a:rPr>
+              <a:t>"study_ID"</a:t>
+            </a:r>
+            <a:r>
+              <a:rPr>
+                <a:latin typeface="Courier"/>
+              </a:rPr>
+              <a:t>, </a:t>
+            </a:r>
+            <a:r>
+              <a:rPr>
+                <a:solidFill>
+                  <a:srgbClr val="7D9029"/>
+                </a:solidFill>
+                <a:latin typeface="Courier"/>
+              </a:rPr>
+              <a:t>at =</a:t>
+            </a:r>
+            <a:r>
+              <a:rPr>
+                <a:latin typeface="Courier"/>
+              </a:rPr>
+              <a:t> </a:t>
+            </a:r>
+            <a:r>
+              <a:rPr>
+                <a:solidFill>
+                  <a:srgbClr val="06287E"/>
+                </a:solidFill>
+                <a:latin typeface="Courier"/>
+              </a:rPr>
+              <a:t>list</a:t>
+            </a:r>
+            <a:r>
+              <a:rPr>
+                <a:latin typeface="Courier"/>
+              </a:rPr>
+              <a:t>(</a:t>
+            </a:r>
+            <a:r>
+              <a:rPr>
+                <a:solidFill>
+                  <a:srgbClr val="7D9029"/>
+                </a:solidFill>
+                <a:latin typeface="Courier"/>
+              </a:rPr>
+              <a:t>class =</a:t>
+            </a:r>
+            <a:r>
+              <a:rPr>
+                <a:latin typeface="Courier"/>
+              </a:rPr>
+              <a:t> </a:t>
+            </a:r>
+            <a:r>
+              <a:rPr>
+                <a:solidFill>
+                  <a:srgbClr val="06287E"/>
+                </a:solidFill>
+                <a:latin typeface="Courier"/>
+              </a:rPr>
+              <a:t>c</a:t>
+            </a:r>
+            <a:r>
+              <a:rPr>
+                <a:latin typeface="Courier"/>
+              </a:rPr>
+              <a:t>(</a:t>
+            </a:r>
+            <a:r>
+              <a:rPr>
+                <a:solidFill>
+                  <a:srgbClr val="4070A0"/>
+                </a:solidFill>
+                <a:latin typeface="Courier"/>
+              </a:rPr>
+              <a:t>"Malacostraca"</a:t>
+            </a:r>
+            <a:r>
+              <a:rPr>
+                <a:latin typeface="Courier"/>
+              </a:rPr>
+              <a:t>, </a:t>
+            </a:r>
+            <a:r>
+              <a:rPr>
+                <a:solidFill>
+                  <a:srgbClr val="4070A0"/>
+                </a:solidFill>
+                <a:latin typeface="Courier"/>
+              </a:rPr>
+              <a:t>"Insecta"</a:t>
+            </a:r>
+            <a:r>
+              <a:rPr>
+                <a:latin typeface="Courier"/>
+              </a:rPr>
+              <a:t>, </a:t>
+            </a:r>
+            <a:r>
+              <a:rPr>
+                <a:solidFill>
+                  <a:srgbClr val="4070A0"/>
+                </a:solidFill>
+                <a:latin typeface="Courier"/>
+              </a:rPr>
+              <a:t>"Actinopterygii"</a:t>
+            </a:r>
+            <a:r>
+              <a:rPr>
+                <a:latin typeface="Courier"/>
+              </a:rPr>
+              <a:t>, </a:t>
+            </a:r>
+            <a:r>
+              <a:rPr>
+                <a:solidFill>
+                  <a:srgbClr val="4070A0"/>
+                </a:solidFill>
+                <a:latin typeface="Courier"/>
+              </a:rPr>
+              <a:t>"Amphibia"</a:t>
+            </a:r>
+            <a:r>
+              <a:rPr>
+                <a:latin typeface="Courier"/>
+              </a:rPr>
+              <a:t>)), </a:t>
+            </a:r>
+            <a:r>
+              <a:rPr>
+                <a:solidFill>
+                  <a:srgbClr val="7D9029"/>
+                </a:solidFill>
+                <a:latin typeface="Courier"/>
+              </a:rPr>
+              <a:t>subset =</a:t>
+            </a:r>
+            <a:r>
+              <a:rPr>
+                <a:latin typeface="Courier"/>
+              </a:rPr>
+              <a:t> </a:t>
+            </a:r>
+            <a:r>
+              <a:rPr>
+                <a:solidFill>
+                  <a:srgbClr val="880000"/>
+                </a:solidFill>
+                <a:latin typeface="Courier"/>
+              </a:rPr>
+              <a:t>TRUE</a:t>
+            </a:r>
+            <a:r>
+              <a:rPr>
+                <a:latin typeface="Courier"/>
+              </a:rPr>
+              <a:t>)</a:t>
+            </a:r>
+            <a:br/>
+            <a:br/>
+            <a:r>
+              <a:rPr>
+                <a:latin typeface="Courier"/>
+              </a:rPr>
+              <a:t>orchaRd</a:t>
+            </a:r>
+            <a:r>
+              <a:rPr>
+                <a:solidFill>
+                  <a:srgbClr val="4070A0"/>
+                </a:solidFill>
+                <a:latin typeface="Courier"/>
+              </a:rPr>
+              <a:t>::</a:t>
+            </a:r>
+            <a:r>
+              <a:rPr>
+                <a:solidFill>
+                  <a:srgbClr val="06287E"/>
+                </a:solidFill>
+                <a:latin typeface="Courier"/>
+              </a:rPr>
+              <a:t>orchard_plot</a:t>
+            </a:r>
+            <a:r>
+              <a:rPr>
+                <a:latin typeface="Courier"/>
+              </a:rPr>
+              <a:t>(mod_table, </a:t>
+            </a:r>
+            <a:r>
+              <a:rPr>
+                <a:solidFill>
+                  <a:srgbClr val="7D9029"/>
+                </a:solidFill>
+                <a:latin typeface="Courier"/>
+              </a:rPr>
+              <a:t>xlab =</a:t>
+            </a:r>
+            <a:r>
+              <a:rPr>
+                <a:latin typeface="Courier"/>
+              </a:rPr>
+              <a:t> </a:t>
+            </a:r>
+            <a:r>
+              <a:rPr>
+                <a:solidFill>
+                  <a:srgbClr val="4070A0"/>
+                </a:solidFill>
+                <a:latin typeface="Courier"/>
+              </a:rPr>
+              <a:t>"Acclimation Response Ratio (ARR)"</a:t>
+            </a:r>
+            <a:r>
+              <a:rPr>
+                <a:latin typeface="Courier"/>
+              </a:rPr>
+              <a:t>, </a:t>
+            </a:r>
+            <a:r>
+              <a:rPr>
+                <a:solidFill>
+                  <a:srgbClr val="7D9029"/>
+                </a:solidFill>
+                <a:latin typeface="Courier"/>
+              </a:rPr>
+              <a:t>angle =</a:t>
+            </a:r>
+            <a:r>
+              <a:rPr>
+                <a:latin typeface="Courier"/>
+              </a:rPr>
+              <a:t> </a:t>
+            </a:r>
+            <a:r>
+              <a:rPr>
+                <a:solidFill>
+                  <a:srgbClr val="40A070"/>
+                </a:solidFill>
+                <a:latin typeface="Courier"/>
+              </a:rPr>
+              <a:t>45</a:t>
+            </a:r>
+            <a:r>
+              <a:rPr>
+                <a:latin typeface="Courier"/>
+              </a:rPr>
+              <a:t>)</a:t>
+            </a:r>
+          </a:p>
+        </p:txBody>
+      </p:sp>
+      <p:pic>
+        <p:nvPicPr>
+          <p:cNvPr descr="code_slides_files/figure-pptx/orchard2-1.png" id="0" name="Picture 1"/>
+          <p:cNvPicPr>
+            <a:picLocks noGrp="1" noChangeAspect="1"/>
+          </p:cNvPicPr>
+          <p:nvPr/>
+        </p:nvPicPr>
+        <p:blipFill>
+          <a:blip r:embed="rId2"/>
+          <a:stretch>
+            <a:fillRect/>
+          </a:stretch>
+        </p:blipFill>
+        <p:spPr bwMode="auto">
+          <a:xfrm>
+            <a:off x="3568700" y="355600"/>
+            <a:ext cx="5105400" cy="4089400"/>
+          </a:xfrm>
+          <a:prstGeom prst="rect">
+            <a:avLst/>
+          </a:prstGeom>
+          <a:noFill/>
+          <a:ln w="9525">
+            <a:noFill/>
+            <a:headEnd/>
+            <a:tailEnd/>
+          </a:ln>
+        </p:spPr>
+      </p:pic>
+    </p:spTree>
+  </p:cSld>
+</p:sld>
+</file>
+
+<file path=ppt/slides/slide52.xml><?xml version="1.0" encoding="utf-8"?>
+<p:sld xmlns:a="http://schemas.openxmlformats.org/drawingml/2006/main" xmlns:r="http://schemas.openxmlformats.org/officeDocument/2006/relationships" xmlns:p="http://schemas.openxmlformats.org/presentationml/2006/main">
+  <p:cSld>
+    <p:spTree>
+      <p:nvGrpSpPr>
+        <p:cNvPr id="1" name=""/>
+        <p:cNvGrpSpPr/>
+        <p:nvPr/>
+      </p:nvGrpSpPr>
+      <p:grpSpPr>
+        <a:xfrm>
+          <a:off x="0" y="0"/>
+          <a:ext cx="0" cy="0"/>
+          <a:chOff x="0" y="0"/>
+          <a:chExt cx="0" cy="0"/>
+        </a:xfrm>
+      </p:grpSpPr>
+      <p:sp>
+        <p:nvSpPr>
+          <p:cNvPr id="2" name="Title 1"/>
+          <p:cNvSpPr>
+            <a:spLocks noGrp="1"/>
+          </p:cNvSpPr>
+          <p:nvPr>
+            <p:ph type="title"/>
+          </p:nvPr>
+        </p:nvSpPr>
+        <p:spPr/>
+        <p:txBody>
+          <a:bodyPr/>
+          <a:lstStyle/>
+          <a:p>
+            <a:pPr lvl="0" indent="0" marL="0">
+              <a:buNone/>
+            </a:pPr>
+            <a:r>
+              <a:rPr/>
+              <a:t>Pub bias</a:t>
+            </a:r>
+          </a:p>
+        </p:txBody>
+      </p:sp>
+      <p:sp>
+        <p:nvSpPr>
+          <p:cNvPr id="3" name="Content Placeholder 2"/>
+          <p:cNvSpPr>
+            <a:spLocks noGrp="1"/>
+          </p:cNvSpPr>
+          <p:nvPr>
+            <p:ph idx="1"/>
+          </p:nvPr>
+        </p:nvSpPr>
+        <p:spPr/>
+        <p:txBody>
+          <a:bodyPr/>
+          <a:lstStyle/>
+          <a:p>
+            <a:pPr lvl="0" indent="0">
+              <a:buNone/>
+            </a:pPr>
+            <a:r>
+              <a:rPr>
+                <a:latin typeface="Courier"/>
+              </a:rPr>
+              <a:t>## Warning: Some 'yi' and/or 'vi' values equal to +-Inf. Recoded to NAs.</a:t>
+            </a:r>
+          </a:p>
+        </p:txBody>
+      </p:sp>
+    </p:spTree>
+  </p:cSld>
+</p:sld>
+</file>
+
+<file path=ppt/slides/slide53.xml><?xml version="1.0" encoding="utf-8"?>
+<p:sld xmlns:a="http://schemas.openxmlformats.org/drawingml/2006/main" xmlns:r="http://schemas.openxmlformats.org/officeDocument/2006/relationships" xmlns:p="http://schemas.openxmlformats.org/presentationml/2006/main">
+  <p:cSld>
+    <p:spTree>
+      <p:nvGrpSpPr>
+        <p:cNvPr id="1" name=""/>
+        <p:cNvGrpSpPr/>
+        <p:nvPr/>
+      </p:nvGrpSpPr>
+      <p:grpSpPr>
+        <a:xfrm>
+          <a:off x="0" y="0"/>
+          <a:ext cx="0" cy="0"/>
+          <a:chOff x="0" y="0"/>
+          <a:chExt cx="0" cy="0"/>
+        </a:xfrm>
+      </p:grpSpPr>
+      <p:sp>
+        <p:nvSpPr>
+          <p:cNvPr id="2" name="Title 1"/>
+          <p:cNvSpPr>
+            <a:spLocks noGrp="1"/>
+          </p:cNvSpPr>
+          <p:nvPr>
+            <p:ph type="title"/>
+          </p:nvPr>
+        </p:nvSpPr>
+        <p:spPr>
+          <a:xfrm>
+            <a:off x="457201" y="204787"/>
+            <a:ext cx="3008313" cy="871538"/>
+          </a:xfrm>
+        </p:spPr>
+        <p:txBody>
+          <a:bodyPr/>
+          <a:lstStyle/>
+          <a:p>
+            <a:pPr lvl="0" indent="0" marL="0">
+              <a:buNone/>
+            </a:pPr>
+            <a:r>
+              <a:rPr/>
+              <a:t>Pub bias 2</a:t>
+            </a:r>
+          </a:p>
+        </p:txBody>
+      </p:sp>
+      <p:sp>
+        <p:nvSpPr>
+          <p:cNvPr id="4" name="Text Placeholder 3"/>
+          <p:cNvSpPr>
+            <a:spLocks noGrp="1"/>
+          </p:cNvSpPr>
+          <p:nvPr>
+            <p:ph idx="2" sz="half" type="body"/>
+          </p:nvPr>
+        </p:nvSpPr>
+        <p:spPr/>
+        <p:txBody>
+          <a:bodyPr/>
+          <a:lstStyle/>
+          <a:p>
+            <a:pPr lvl="0" indent="0">
+              <a:buNone/>
+            </a:pPr>
+            <a:r>
+              <a:rPr>
+                <a:solidFill>
+                  <a:srgbClr val="06287E"/>
+                </a:solidFill>
+                <a:latin typeface="Courier"/>
+              </a:rPr>
+              <a:t>par</a:t>
+            </a:r>
+            <a:r>
+              <a:rPr>
+                <a:latin typeface="Courier"/>
+              </a:rPr>
+              <a:t>(</a:t>
+            </a:r>
+            <a:r>
+              <a:rPr>
+                <a:solidFill>
+                  <a:srgbClr val="7D9029"/>
+                </a:solidFill>
+                <a:latin typeface="Courier"/>
+              </a:rPr>
+              <a:t>mfrow=</a:t>
+            </a:r>
+            <a:r>
+              <a:rPr>
+                <a:solidFill>
+                  <a:srgbClr val="06287E"/>
+                </a:solidFill>
+                <a:latin typeface="Courier"/>
+              </a:rPr>
+              <a:t>c</a:t>
+            </a:r>
+            <a:r>
+              <a:rPr>
+                <a:latin typeface="Courier"/>
+              </a:rPr>
+              <a:t>(</a:t>
+            </a:r>
+            <a:r>
+              <a:rPr>
+                <a:solidFill>
+                  <a:srgbClr val="40A070"/>
+                </a:solidFill>
+                <a:latin typeface="Courier"/>
+              </a:rPr>
+              <a:t>1</a:t>
+            </a:r>
+            <a:r>
+              <a:rPr>
+                <a:latin typeface="Courier"/>
+              </a:rPr>
+              <a:t>,</a:t>
+            </a:r>
+            <a:r>
+              <a:rPr>
+                <a:solidFill>
+                  <a:srgbClr val="40A070"/>
+                </a:solidFill>
+                <a:latin typeface="Courier"/>
+              </a:rPr>
+              <a:t>1</a:t>
+            </a:r>
+            <a:r>
+              <a:rPr>
+                <a:latin typeface="Courier"/>
+              </a:rPr>
+              <a:t>))</a:t>
+            </a:r>
+            <a:br/>
+            <a:r>
+              <a:rPr>
+                <a:latin typeface="Courier"/>
+              </a:rPr>
+              <a:t>metafor</a:t>
+            </a:r>
+            <a:r>
+              <a:rPr>
+                <a:solidFill>
+                  <a:srgbClr val="4070A0"/>
+                </a:solidFill>
+                <a:latin typeface="Courier"/>
+              </a:rPr>
+              <a:t>::</a:t>
+            </a:r>
+            <a:r>
+              <a:rPr>
+                <a:solidFill>
+                  <a:srgbClr val="06287E"/>
+                </a:solidFill>
+                <a:latin typeface="Courier"/>
+              </a:rPr>
+              <a:t>funnel</a:t>
+            </a:r>
+            <a:r>
+              <a:rPr>
+                <a:latin typeface="Courier"/>
+              </a:rPr>
+              <a:t>(</a:t>
+            </a:r>
+            <a:r>
+              <a:rPr>
+                <a:solidFill>
+                  <a:srgbClr val="7D9029"/>
+                </a:solidFill>
+                <a:latin typeface="Courier"/>
+              </a:rPr>
+              <a:t>x =</a:t>
+            </a:r>
+            <a:r>
+              <a:rPr>
+                <a:latin typeface="Courier"/>
+              </a:rPr>
+              <a:t> arnold_data_endo</a:t>
+            </a:r>
+            <a:r>
+              <a:rPr>
+                <a:solidFill>
+                  <a:srgbClr val="4070A0"/>
+                </a:solidFill>
+                <a:latin typeface="Courier"/>
+              </a:rPr>
+              <a:t>$</a:t>
+            </a:r>
+            <a:r>
+              <a:rPr>
+                <a:latin typeface="Courier"/>
+              </a:rPr>
+              <a:t>Zr, </a:t>
+            </a:r>
+            <a:r>
+              <a:rPr>
+                <a:solidFill>
+                  <a:srgbClr val="7D9029"/>
+                </a:solidFill>
+                <a:latin typeface="Courier"/>
+              </a:rPr>
+              <a:t>vi =</a:t>
+            </a:r>
+            <a:r>
+              <a:rPr>
+                <a:latin typeface="Courier"/>
+              </a:rPr>
+              <a:t> arnold_data_endo</a:t>
+            </a:r>
+            <a:r>
+              <a:rPr>
+                <a:solidFill>
+                  <a:srgbClr val="4070A0"/>
+                </a:solidFill>
+                <a:latin typeface="Courier"/>
+              </a:rPr>
+              <a:t>$</a:t>
+            </a:r>
+            <a:r>
+              <a:rPr>
+                <a:latin typeface="Courier"/>
+              </a:rPr>
+              <a:t>Zr_v, </a:t>
+            </a:r>
+            <a:r>
+              <a:rPr>
+                <a:solidFill>
+                  <a:srgbClr val="7D9029"/>
+                </a:solidFill>
+                <a:latin typeface="Courier"/>
+              </a:rPr>
+              <a:t>yaxis =</a:t>
+            </a:r>
+            <a:r>
+              <a:rPr>
+                <a:latin typeface="Courier"/>
+              </a:rPr>
+              <a:t> </a:t>
+            </a:r>
+            <a:r>
+              <a:rPr>
+                <a:solidFill>
+                  <a:srgbClr val="4070A0"/>
+                </a:solidFill>
+                <a:latin typeface="Courier"/>
+              </a:rPr>
+              <a:t>"seinv"</a:t>
+            </a:r>
+            <a:r>
+              <a:rPr>
+                <a:latin typeface="Courier"/>
+              </a:rPr>
+              <a:t>,</a:t>
+            </a:r>
+            <a:br/>
+            <a:r>
+              <a:rPr>
+                <a:latin typeface="Courier"/>
+              </a:rPr>
+              <a:t>    </a:t>
+            </a:r>
+            <a:r>
+              <a:rPr>
+                <a:solidFill>
+                  <a:srgbClr val="7D9029"/>
+                </a:solidFill>
+                <a:latin typeface="Courier"/>
+              </a:rPr>
+              <a:t>digits =</a:t>
+            </a:r>
+            <a:r>
+              <a:rPr>
+                <a:latin typeface="Courier"/>
+              </a:rPr>
+              <a:t> </a:t>
+            </a:r>
+            <a:r>
+              <a:rPr>
+                <a:solidFill>
+                  <a:srgbClr val="40A070"/>
+                </a:solidFill>
+                <a:latin typeface="Courier"/>
+              </a:rPr>
+              <a:t>2</a:t>
+            </a:r>
+            <a:r>
+              <a:rPr>
+                <a:latin typeface="Courier"/>
+              </a:rPr>
+              <a:t>, </a:t>
+            </a:r>
+            <a:r>
+              <a:rPr>
+                <a:solidFill>
+                  <a:srgbClr val="7D9029"/>
+                </a:solidFill>
+                <a:latin typeface="Courier"/>
+              </a:rPr>
+              <a:t>level =</a:t>
+            </a:r>
+            <a:r>
+              <a:rPr>
+                <a:latin typeface="Courier"/>
+              </a:rPr>
+              <a:t> </a:t>
+            </a:r>
+            <a:r>
+              <a:rPr>
+                <a:solidFill>
+                  <a:srgbClr val="06287E"/>
+                </a:solidFill>
+                <a:latin typeface="Courier"/>
+              </a:rPr>
+              <a:t>c</a:t>
+            </a:r>
+            <a:r>
+              <a:rPr>
+                <a:latin typeface="Courier"/>
+              </a:rPr>
+              <a:t>(</a:t>
+            </a:r>
+            <a:r>
+              <a:rPr>
+                <a:solidFill>
+                  <a:srgbClr val="40A070"/>
+                </a:solidFill>
+                <a:latin typeface="Courier"/>
+              </a:rPr>
+              <a:t>0.1</a:t>
+            </a:r>
+            <a:r>
+              <a:rPr>
+                <a:latin typeface="Courier"/>
+              </a:rPr>
+              <a:t>, </a:t>
+            </a:r>
+            <a:r>
+              <a:rPr>
+                <a:solidFill>
+                  <a:srgbClr val="40A070"/>
+                </a:solidFill>
+                <a:latin typeface="Courier"/>
+              </a:rPr>
+              <a:t>0.05</a:t>
+            </a:r>
+            <a:r>
+              <a:rPr>
+                <a:latin typeface="Courier"/>
+              </a:rPr>
+              <a:t>, </a:t>
+            </a:r>
+            <a:r>
+              <a:rPr>
+                <a:solidFill>
+                  <a:srgbClr val="40A070"/>
+                </a:solidFill>
+                <a:latin typeface="Courier"/>
+              </a:rPr>
+              <a:t>0.01</a:t>
+            </a:r>
+            <a:r>
+              <a:rPr>
+                <a:latin typeface="Courier"/>
+              </a:rPr>
+              <a:t>), </a:t>
+            </a:r>
+            <a:r>
+              <a:rPr>
+                <a:solidFill>
+                  <a:srgbClr val="7D9029"/>
+                </a:solidFill>
+                <a:latin typeface="Courier"/>
+              </a:rPr>
+              <a:t>shade =</a:t>
+            </a:r>
+            <a:r>
+              <a:rPr>
+                <a:latin typeface="Courier"/>
+              </a:rPr>
+              <a:t> </a:t>
+            </a:r>
+            <a:r>
+              <a:rPr>
+                <a:solidFill>
+                  <a:srgbClr val="06287E"/>
+                </a:solidFill>
+                <a:latin typeface="Courier"/>
+              </a:rPr>
+              <a:t>c</a:t>
+            </a:r>
+            <a:r>
+              <a:rPr>
+                <a:latin typeface="Courier"/>
+              </a:rPr>
+              <a:t>(</a:t>
+            </a:r>
+            <a:r>
+              <a:rPr>
+                <a:solidFill>
+                  <a:srgbClr val="4070A0"/>
+                </a:solidFill>
+                <a:latin typeface="Courier"/>
+              </a:rPr>
+              <a:t>"white"</a:t>
+            </a:r>
+            <a:r>
+              <a:rPr>
+                <a:latin typeface="Courier"/>
+              </a:rPr>
+              <a:t>, </a:t>
+            </a:r>
+            <a:r>
+              <a:rPr>
+                <a:solidFill>
+                  <a:srgbClr val="4070A0"/>
+                </a:solidFill>
+                <a:latin typeface="Courier"/>
+              </a:rPr>
+              <a:t>"gray55"</a:t>
+            </a:r>
+            <a:r>
+              <a:rPr>
+                <a:latin typeface="Courier"/>
+              </a:rPr>
+              <a:t>, </a:t>
+            </a:r>
+            <a:r>
+              <a:rPr>
+                <a:solidFill>
+                  <a:srgbClr val="4070A0"/>
+                </a:solidFill>
+                <a:latin typeface="Courier"/>
+              </a:rPr>
+              <a:t>"gray 75"</a:t>
+            </a:r>
+            <a:r>
+              <a:rPr>
+                <a:latin typeface="Courier"/>
+              </a:rPr>
+              <a:t>),</a:t>
+            </a:r>
+            <a:br/>
+            <a:r>
+              <a:rPr>
+                <a:latin typeface="Courier"/>
+              </a:rPr>
+              <a:t>    </a:t>
+            </a:r>
+            <a:r>
+              <a:rPr>
+                <a:solidFill>
+                  <a:srgbClr val="7D9029"/>
+                </a:solidFill>
+                <a:latin typeface="Courier"/>
+              </a:rPr>
+              <a:t>las =</a:t>
+            </a:r>
+            <a:r>
+              <a:rPr>
+                <a:latin typeface="Courier"/>
+              </a:rPr>
+              <a:t> </a:t>
+            </a:r>
+            <a:r>
+              <a:rPr>
+                <a:solidFill>
+                  <a:srgbClr val="40A070"/>
+                </a:solidFill>
+                <a:latin typeface="Courier"/>
+              </a:rPr>
+              <a:t>1</a:t>
+            </a:r>
+            <a:r>
+              <a:rPr>
+                <a:latin typeface="Courier"/>
+              </a:rPr>
+              <a:t>, </a:t>
+            </a:r>
+            <a:r>
+              <a:rPr>
+                <a:solidFill>
+                  <a:srgbClr val="7D9029"/>
+                </a:solidFill>
+                <a:latin typeface="Courier"/>
+              </a:rPr>
+              <a:t>xlab =</a:t>
+            </a:r>
+            <a:r>
+              <a:rPr>
+                <a:latin typeface="Courier"/>
+              </a:rPr>
+              <a:t> </a:t>
+            </a:r>
+            <a:r>
+              <a:rPr>
+                <a:solidFill>
+                  <a:srgbClr val="4070A0"/>
+                </a:solidFill>
+                <a:latin typeface="Courier"/>
+              </a:rPr>
+              <a:t>"Correlation Coefficient (r)"</a:t>
+            </a:r>
+            <a:r>
+              <a:rPr>
+                <a:latin typeface="Courier"/>
+              </a:rPr>
+              <a:t>, </a:t>
+            </a:r>
+            <a:r>
+              <a:rPr>
+                <a:solidFill>
+                  <a:srgbClr val="7D9029"/>
+                </a:solidFill>
+                <a:latin typeface="Courier"/>
+              </a:rPr>
+              <a:t>atransf =</a:t>
+            </a:r>
+            <a:r>
+              <a:rPr>
+                <a:latin typeface="Courier"/>
+              </a:rPr>
+              <a:t> tanh, </a:t>
+            </a:r>
+            <a:r>
+              <a:rPr>
+                <a:solidFill>
+                  <a:srgbClr val="7D9029"/>
+                </a:solidFill>
+                <a:latin typeface="Courier"/>
+              </a:rPr>
+              <a:t>legend =</a:t>
+            </a:r>
+            <a:r>
+              <a:rPr>
+                <a:latin typeface="Courier"/>
+              </a:rPr>
+              <a:t> </a:t>
+            </a:r>
+            <a:r>
+              <a:rPr>
+                <a:solidFill>
+                  <a:srgbClr val="880000"/>
+                </a:solidFill>
+                <a:latin typeface="Courier"/>
+              </a:rPr>
+              <a:t>TRUE</a:t>
+            </a:r>
+            <a:r>
+              <a:rPr>
+                <a:latin typeface="Courier"/>
+              </a:rPr>
+              <a:t>)</a:t>
+            </a:r>
+          </a:p>
+        </p:txBody>
+      </p:sp>
+      <p:pic>
+        <p:nvPicPr>
+          <p:cNvPr descr="code_slides_files/figure-pptx/funnel-1.png" id="0" name="Picture 1"/>
+          <p:cNvPicPr>
+            <a:picLocks noGrp="1" noChangeAspect="1"/>
+          </p:cNvPicPr>
+          <p:nvPr/>
+        </p:nvPicPr>
+        <p:blipFill>
+          <a:blip r:embed="rId2"/>
+          <a:stretch>
+            <a:fillRect/>
+          </a:stretch>
+        </p:blipFill>
+        <p:spPr bwMode="auto">
+          <a:xfrm>
+            <a:off x="3568700" y="355600"/>
+            <a:ext cx="5105400" cy="4089400"/>
+          </a:xfrm>
+          <a:prstGeom prst="rect">
+            <a:avLst/>
+          </a:prstGeom>
+          <a:noFill/>
+          <a:ln w="9525">
+            <a:noFill/>
+            <a:headEnd/>
+            <a:tailEnd/>
+          </a:ln>
+        </p:spPr>
+      </p:pic>
+    </p:spTree>
+  </p:cSld>
+</p:sld>
+</file>
+
+<file path=ppt/slides/slide54.xml><?xml version="1.0" encoding="utf-8"?>
+<p:sld xmlns:a="http://schemas.openxmlformats.org/drawingml/2006/main" xmlns:r="http://schemas.openxmlformats.org/officeDocument/2006/relationships" xmlns:p="http://schemas.openxmlformats.org/presentationml/2006/main">
+  <p:cSld>
+    <p:spTree>
+      <p:nvGrpSpPr>
+        <p:cNvPr id="1" name=""/>
+        <p:cNvGrpSpPr/>
+        <p:nvPr/>
+      </p:nvGrpSpPr>
+      <p:grpSpPr>
+        <a:xfrm>
+          <a:off x="0" y="0"/>
+          <a:ext cx="0" cy="0"/>
+          <a:chOff x="0" y="0"/>
+          <a:chExt cx="0" cy="0"/>
+        </a:xfrm>
+      </p:grpSpPr>
+      <p:sp>
+        <p:nvSpPr>
+          <p:cNvPr id="2" name="Title 1"/>
+          <p:cNvSpPr>
+            <a:spLocks noGrp="1"/>
+          </p:cNvSpPr>
+          <p:nvPr>
+            <p:ph type="title"/>
+          </p:nvPr>
+        </p:nvSpPr>
+        <p:spPr/>
+        <p:txBody>
+          <a:bodyPr/>
+          <a:lstStyle/>
+          <a:p>
+            <a:pPr lvl="0" indent="0" marL="0">
+              <a:buNone/>
+            </a:pPr>
+            <a:r>
+              <a:rPr/>
+              <a:t>Pub bias 3</a:t>
+            </a:r>
+          </a:p>
+        </p:txBody>
+      </p:sp>
+      <p:pic>
+        <p:nvPicPr>
+          <p:cNvPr descr="code_slides_files/figure-pptx/unnamed-chunk-8-1.png" id="0" name="Picture 1"/>
+          <p:cNvPicPr>
+            <a:picLocks noGrp="1" noChangeAspect="1"/>
+          </p:cNvPicPr>
+          <p:nvPr/>
+        </p:nvPicPr>
+        <p:blipFill>
+          <a:blip r:embed="rId2"/>
+          <a:stretch>
+            <a:fillRect/>
+          </a:stretch>
+        </p:blipFill>
+        <p:spPr bwMode="auto">
+          <a:xfrm>
+            <a:off x="2451100" y="1193800"/>
+            <a:ext cx="4241800" cy="3390900"/>
+          </a:xfrm>
+          <a:prstGeom prst="rect">
+            <a:avLst/>
+          </a:prstGeom>
+          <a:noFill/>
+          <a:ln w="9525">
+            <a:noFill/>
+            <a:headEnd/>
+            <a:tailEnd/>
+          </a:ln>
+        </p:spPr>
+      </p:pic>
+    </p:spTree>
+  </p:cSld>
+</p:sld>
+</file>
+
+<file path=ppt/slides/slide55.xml><?xml version="1.0" encoding="utf-8"?>
+<p:sld xmlns:a="http://schemas.openxmlformats.org/drawingml/2006/main" xmlns:r="http://schemas.openxmlformats.org/officeDocument/2006/relationships" xmlns:p="http://schemas.openxmlformats.org/presentationml/2006/main">
+  <p:cSld>
+    <p:spTree>
+      <p:nvGrpSpPr>
+        <p:cNvPr id="1" name=""/>
+        <p:cNvGrpSpPr/>
+        <p:nvPr/>
+      </p:nvGrpSpPr>
+      <p:grpSpPr>
+        <a:xfrm>
+          <a:off x="0" y="0"/>
+          <a:ext cx="0" cy="0"/>
+          <a:chOff x="0" y="0"/>
+          <a:chExt cx="0" cy="0"/>
+        </a:xfrm>
+      </p:grpSpPr>
+      <p:sp>
+        <p:nvSpPr>
+          <p:cNvPr id="2" name="Title 1"/>
+          <p:cNvSpPr>
+            <a:spLocks noGrp="1"/>
+          </p:cNvSpPr>
+          <p:nvPr>
+            <p:ph type="title"/>
+          </p:nvPr>
+        </p:nvSpPr>
+        <p:spPr/>
+        <p:txBody>
+          <a:bodyPr/>
+          <a:lstStyle/>
+          <a:p>
+            <a:pPr lvl="0" indent="0" marL="0">
+              <a:buNone/>
+            </a:pPr>
+            <a:r>
+              <a:rPr/>
+              <a:t>Pub bias 4</a:t>
+            </a:r>
+          </a:p>
+        </p:txBody>
+      </p:sp>
+      <p:sp>
+        <p:nvSpPr>
+          <p:cNvPr id="3" name="Content Placeholder 2"/>
+          <p:cNvSpPr>
+            <a:spLocks noGrp="1"/>
+          </p:cNvSpPr>
+          <p:nvPr>
+            <p:ph idx="1"/>
+          </p:nvPr>
+        </p:nvSpPr>
+        <p:spPr/>
+        <p:txBody>
+          <a:bodyPr/>
+          <a:lstStyle/>
+          <a:p>
+            <a:pPr lvl="0" indent="0" marL="0">
+              <a:buNone/>
+            </a:pPr>
+            <a:r>
+              <a:rPr/>
+              <a:t>$$
+\begin{equation}
+y_{i} = \mu + \beta_{se}se +  s_{j[i]} + spp_{k[i]} + e_{i} + m_{i} \\
+(\#eq:itot1)
+\end{equation}
+$$</a:t>
+            </a:r>
+          </a:p>
+        </p:txBody>
+      </p:sp>
+    </p:spTree>
+  </p:cSld>
+</p:sld>
+</file>
+
+<file path=ppt/slides/slide56.xml><?xml version="1.0" encoding="utf-8"?>
+<p:sld xmlns:a="http://schemas.openxmlformats.org/drawingml/2006/main" xmlns:r="http://schemas.openxmlformats.org/officeDocument/2006/relationships" xmlns:p="http://schemas.openxmlformats.org/presentationml/2006/main">
+  <p:cSld>
+    <p:spTree>
+      <p:nvGrpSpPr>
+        <p:cNvPr id="1" name=""/>
+        <p:cNvGrpSpPr/>
+        <p:nvPr/>
+      </p:nvGrpSpPr>
+      <p:grpSpPr>
+        <a:xfrm>
+          <a:off x="0" y="0"/>
+          <a:ext cx="0" cy="0"/>
+          <a:chOff x="0" y="0"/>
+          <a:chExt cx="0" cy="0"/>
+        </a:xfrm>
+      </p:grpSpPr>
+      <p:sp>
+        <p:nvSpPr>
+          <p:cNvPr id="2" name="Title 1"/>
+          <p:cNvSpPr>
+            <a:spLocks noGrp="1"/>
+          </p:cNvSpPr>
+          <p:nvPr>
+            <p:ph type="title"/>
+          </p:nvPr>
+        </p:nvSpPr>
+        <p:spPr/>
+        <p:txBody>
+          <a:bodyPr/>
+          <a:lstStyle/>
+          <a:p>
+            <a:pPr lvl="0" indent="0" marL="0">
+              <a:buNone/>
+            </a:pPr>
+            <a:r>
+              <a:rPr/>
+              <a:t>Pub bias 4.3</a:t>
+            </a:r>
+          </a:p>
+        </p:txBody>
+      </p:sp>
+      <p:sp>
+        <p:nvSpPr>
+          <p:cNvPr id="3" name="Content Placeholder 2"/>
+          <p:cNvSpPr>
+            <a:spLocks noGrp="1"/>
+          </p:cNvSpPr>
+          <p:nvPr>
+            <p:ph idx="1"/>
+          </p:nvPr>
+        </p:nvSpPr>
+        <p:spPr/>
+        <p:txBody>
+          <a:bodyPr/>
+          <a:lstStyle/>
+          <a:p>
+            <a:pPr lvl="0" indent="0" marL="0">
+              <a:buNone/>
+            </a:pPr>
+            <a:r>
+              <a:rPr/>
+              <a:t>$$
+\begin{equation}
+y_{i} = \mu + \sum_{i = 1}^{N_{m}}\beta_{m}x_{m} + \beta_{se}se + \beta_{y}Year +  s_{j[i]} + spp_{k[i]} + e_{i} + m_{i} \\
+(\#eq:itot2)
+\end{equation}
+$$</a:t>
+            </a:r>
+          </a:p>
+        </p:txBody>
+      </p:sp>
+    </p:spTree>
+  </p:cSld>
+</p:sld>
+</file>
+
+<file path=ppt/slides/slide57.xml><?xml version="1.0" encoding="utf-8"?>
+<p:sld xmlns:a="http://schemas.openxmlformats.org/drawingml/2006/main" xmlns:r="http://schemas.openxmlformats.org/officeDocument/2006/relationships" xmlns:p="http://schemas.openxmlformats.org/presentationml/2006/main">
+  <p:cSld>
+    <p:spTree>
+      <p:nvGrpSpPr>
+        <p:cNvPr id="1" name=""/>
+        <p:cNvGrpSpPr/>
+        <p:nvPr/>
+      </p:nvGrpSpPr>
+      <p:grpSpPr>
+        <a:xfrm>
+          <a:off x="0" y="0"/>
+          <a:ext cx="0" cy="0"/>
+          <a:chOff x="0" y="0"/>
+          <a:chExt cx="0" cy="0"/>
+        </a:xfrm>
+      </p:grpSpPr>
+      <p:sp>
+        <p:nvSpPr>
+          <p:cNvPr id="2" name="Title 1"/>
+          <p:cNvSpPr>
+            <a:spLocks noGrp="1"/>
+          </p:cNvSpPr>
+          <p:nvPr>
+            <p:ph type="title"/>
+          </p:nvPr>
+        </p:nvSpPr>
+        <p:spPr/>
+        <p:txBody>
+          <a:bodyPr/>
+          <a:lstStyle/>
+          <a:p>
+            <a:pPr lvl="0" indent="0" marL="0">
+              <a:buNone/>
+            </a:pPr>
+            <a:r>
+              <a:rPr/>
+              <a:t>Pub bias 5</a:t>
+            </a:r>
+          </a:p>
+        </p:txBody>
+      </p:sp>
+      <p:sp>
+        <p:nvSpPr>
+          <p:cNvPr id="3" name="Content Placeholder 2"/>
+          <p:cNvSpPr>
+            <a:spLocks noGrp="1"/>
+          </p:cNvSpPr>
+          <p:nvPr>
+            <p:ph idx="1"/>
+          </p:nvPr>
+        </p:nvSpPr>
+        <p:spPr/>
+        <p:txBody>
+          <a:bodyPr/>
+          <a:lstStyle/>
+          <a:p>
+            <a:pPr lvl="0" indent="0">
+              <a:buNone/>
+            </a:pPr>
+            <a:r>
+              <a:rPr i="1">
+                <a:solidFill>
+                  <a:srgbClr val="60A0B0"/>
+                </a:solidFill>
+                <a:latin typeface="Courier"/>
+              </a:rPr>
+              <a:t># Including sampling standard error as moderator</a:t>
+            </a:r>
+            <a:br/>
+            <a:r>
+              <a:rPr>
+                <a:latin typeface="Courier"/>
+              </a:rPr>
+              <a:t>metareg_se </a:t>
+            </a:r>
+            <a:r>
+              <a:rPr>
+                <a:solidFill>
+                  <a:srgbClr val="007020"/>
+                </a:solidFill>
+                <a:latin typeface="Courier"/>
+              </a:rPr>
+              <a:t>&lt;-</a:t>
+            </a:r>
+            <a:r>
+              <a:rPr>
+                <a:latin typeface="Courier"/>
+              </a:rPr>
+              <a:t> </a:t>
+            </a:r>
+            <a:r>
+              <a:rPr>
+                <a:solidFill>
+                  <a:srgbClr val="06287E"/>
+                </a:solidFill>
+                <a:latin typeface="Courier"/>
+              </a:rPr>
+              <a:t>rma.mv</a:t>
+            </a:r>
+            <a:r>
+              <a:rPr>
+                <a:latin typeface="Courier"/>
+              </a:rPr>
+              <a:t>(</a:t>
+            </a:r>
+            <a:r>
+              <a:rPr>
+                <a:solidFill>
+                  <a:srgbClr val="7D9029"/>
+                </a:solidFill>
+                <a:latin typeface="Courier"/>
+              </a:rPr>
+              <a:t>yi =</a:t>
+            </a:r>
+            <a:r>
+              <a:rPr>
+                <a:latin typeface="Courier"/>
+              </a:rPr>
+              <a:t> Zr, </a:t>
+            </a:r>
+            <a:r>
+              <a:rPr>
+                <a:solidFill>
+                  <a:srgbClr val="7D9029"/>
+                </a:solidFill>
+                <a:latin typeface="Courier"/>
+              </a:rPr>
+              <a:t>V =</a:t>
+            </a:r>
+            <a:r>
+              <a:rPr>
+                <a:latin typeface="Courier"/>
+              </a:rPr>
+              <a:t> Zr_v, </a:t>
+            </a:r>
+            <a:r>
+              <a:rPr>
+                <a:solidFill>
+                  <a:srgbClr val="7D9029"/>
+                </a:solidFill>
+                <a:latin typeface="Courier"/>
+              </a:rPr>
+              <a:t>mods =</a:t>
+            </a:r>
+            <a:r>
+              <a:rPr>
+                <a:latin typeface="Courier"/>
+              </a:rPr>
+              <a:t> </a:t>
+            </a:r>
+            <a:r>
+              <a:rPr>
+                <a:solidFill>
+                  <a:srgbClr val="4070A0"/>
+                </a:solidFill>
+                <a:latin typeface="Courier"/>
+              </a:rPr>
+              <a:t>~</a:t>
+            </a:r>
+            <a:r>
+              <a:rPr>
+                <a:latin typeface="Courier"/>
+              </a:rPr>
+              <a:t> </a:t>
+            </a:r>
+            <a:r>
+              <a:rPr>
+                <a:solidFill>
+                  <a:srgbClr val="06287E"/>
+                </a:solidFill>
+                <a:latin typeface="Courier"/>
+              </a:rPr>
+              <a:t>sqrt</a:t>
+            </a:r>
+            <a:r>
+              <a:rPr>
+                <a:latin typeface="Courier"/>
+              </a:rPr>
+              <a:t>(Zr_v), </a:t>
+            </a:r>
+            <a:r>
+              <a:rPr>
+                <a:solidFill>
+                  <a:srgbClr val="7D9029"/>
+                </a:solidFill>
+                <a:latin typeface="Courier"/>
+              </a:rPr>
+              <a:t>test =</a:t>
+            </a:r>
+            <a:r>
+              <a:rPr>
+                <a:latin typeface="Courier"/>
+              </a:rPr>
+              <a:t> </a:t>
+            </a:r>
+            <a:r>
+              <a:rPr>
+                <a:solidFill>
+                  <a:srgbClr val="4070A0"/>
+                </a:solidFill>
+                <a:latin typeface="Courier"/>
+              </a:rPr>
+              <a:t>"t"</a:t>
+            </a:r>
+            <a:r>
+              <a:rPr>
+                <a:latin typeface="Courier"/>
+              </a:rPr>
+              <a:t>, </a:t>
+            </a:r>
+            <a:r>
+              <a:rPr>
+                <a:solidFill>
+                  <a:srgbClr val="7D9029"/>
+                </a:solidFill>
+                <a:latin typeface="Courier"/>
+              </a:rPr>
+              <a:t>dfs =</a:t>
+            </a:r>
+            <a:r>
+              <a:rPr>
+                <a:latin typeface="Courier"/>
+              </a:rPr>
+              <a:t> </a:t>
+            </a:r>
+            <a:r>
+              <a:rPr>
+                <a:solidFill>
+                  <a:srgbClr val="4070A0"/>
+                </a:solidFill>
+                <a:latin typeface="Courier"/>
+              </a:rPr>
+              <a:t>"contain"</a:t>
+            </a:r>
+            <a:r>
+              <a:rPr>
+                <a:latin typeface="Courier"/>
+              </a:rPr>
+              <a:t>, </a:t>
+            </a:r>
+            <a:r>
+              <a:rPr>
+                <a:solidFill>
+                  <a:srgbClr val="7D9029"/>
+                </a:solidFill>
+                <a:latin typeface="Courier"/>
+              </a:rPr>
+              <a:t>data =</a:t>
+            </a:r>
+            <a:r>
+              <a:rPr>
+                <a:latin typeface="Courier"/>
+              </a:rPr>
+              <a:t> arnold_data_endo, </a:t>
+            </a:r>
+            <a:r>
+              <a:rPr>
+                <a:solidFill>
+                  <a:srgbClr val="7D9029"/>
+                </a:solidFill>
+                <a:latin typeface="Courier"/>
+              </a:rPr>
+              <a:t>random =</a:t>
+            </a:r>
+            <a:r>
+              <a:rPr>
+                <a:latin typeface="Courier"/>
+              </a:rPr>
+              <a:t> </a:t>
+            </a:r>
+            <a:r>
+              <a:rPr>
+                <a:solidFill>
+                  <a:srgbClr val="06287E"/>
+                </a:solidFill>
+                <a:latin typeface="Courier"/>
+              </a:rPr>
+              <a:t>list</a:t>
+            </a:r>
+            <a:r>
+              <a:rPr>
+                <a:latin typeface="Courier"/>
+              </a:rPr>
+              <a:t>(</a:t>
+            </a:r>
+            <a:r>
+              <a:rPr>
+                <a:solidFill>
+                  <a:srgbClr val="4070A0"/>
+                </a:solidFill>
+                <a:latin typeface="Courier"/>
+              </a:rPr>
+              <a:t>~</a:t>
+            </a:r>
+            <a:r>
+              <a:rPr>
+                <a:solidFill>
+                  <a:srgbClr val="40A070"/>
+                </a:solidFill>
+                <a:latin typeface="Courier"/>
+              </a:rPr>
+              <a:t>1</a:t>
+            </a:r>
+            <a:r>
+              <a:rPr>
+                <a:solidFill>
+                  <a:srgbClr val="4070A0"/>
+                </a:solidFill>
+                <a:latin typeface="Courier"/>
+              </a:rPr>
+              <a:t>|</a:t>
+            </a:r>
+            <a:r>
+              <a:rPr>
+                <a:latin typeface="Courier"/>
+              </a:rPr>
+              <a:t>Ref, </a:t>
+            </a:r>
+            <a:r>
+              <a:rPr>
+                <a:solidFill>
+                  <a:srgbClr val="4070A0"/>
+                </a:solidFill>
+                <a:latin typeface="Courier"/>
+              </a:rPr>
+              <a:t>~</a:t>
+            </a:r>
+            <a:r>
+              <a:rPr>
+                <a:solidFill>
+                  <a:srgbClr val="40A070"/>
+                </a:solidFill>
+                <a:latin typeface="Courier"/>
+              </a:rPr>
+              <a:t>1</a:t>
+            </a:r>
+            <a:r>
+              <a:rPr>
+                <a:solidFill>
+                  <a:srgbClr val="4070A0"/>
+                </a:solidFill>
+                <a:latin typeface="Courier"/>
+              </a:rPr>
+              <a:t>|</a:t>
+            </a:r>
+            <a:r>
+              <a:rPr>
+                <a:latin typeface="Courier"/>
+              </a:rPr>
+              <a:t>obs))</a:t>
+            </a:r>
+            <a:br/>
+            <a:r>
+              <a:rPr>
+                <a:solidFill>
+                  <a:srgbClr val="06287E"/>
+                </a:solidFill>
+                <a:latin typeface="Courier"/>
+              </a:rPr>
+              <a:t>summary</a:t>
+            </a:r>
+            <a:r>
+              <a:rPr>
+                <a:latin typeface="Courier"/>
+              </a:rPr>
+              <a:t>(metareg_se)</a:t>
+            </a:r>
+          </a:p>
+          <a:p>
+            <a:pPr lvl="0" indent="0">
+              <a:buNone/>
+            </a:pPr>
+            <a:r>
+              <a:rPr>
+                <a:latin typeface="Courier"/>
+              </a:rPr>
+              <a:t>## 
+## Multivariate Meta-Analysis Model (k = 209; method: REML)
+## 
+##   logLik  Deviance       AIC       BIC      AICc  ​ 
+## -77.9464  155.8928  163.8928  177.2237  164.0908   
+## 
+## Variance Components:
+## 
+##             estim    sqrt  nlvls  fixed  factor 
+## sigma^2.1  0.0626  0.2503     62     no     Ref 
+## sigma^2.2  0.0380  0.1951    209     no     obs 
+## 
+## Test for Residual Heterogeneity:
+## QE(df = 207) = 844.4496, p-val &lt; .0001
+## 
+## Test of Moderators (coefficient 2):
+## F(df1 = 1, df2 = 207) = 14.3314, p-val = 0.0002
+## 
+## Model Results:
+## 
+##             estimate      se     tval   df    pval    ci.lb   ci.ub     ​ 
+## intrcpt      -0.0668  0.0727  -0.9184   60  0.3621  -0.2122  0.0787      
+## sqrt(Zr_v)    1.3908  0.3674   3.7857  207  0.0002   0.6665  2.1151  *** 
+## 
+## ---
+## Signif. codes:  0 '***' 0.001 '**' 0.01 '*' 0.05 '.' 0.1 ' ' 1</a:t>
+            </a:r>
+          </a:p>
+        </p:txBody>
+      </p:sp>
+    </p:spTree>
+  </p:cSld>
+</p:sld>
+</file>
+
+<file path=ppt/slides/slide58.xml><?xml version="1.0" encoding="utf-8"?>
+<p:sld xmlns:a="http://schemas.openxmlformats.org/drawingml/2006/main" xmlns:r="http://schemas.openxmlformats.org/officeDocument/2006/relationships" xmlns:p="http://schemas.openxmlformats.org/presentationml/2006/main">
+  <p:cSld>
+    <p:spTree>
+      <p:nvGrpSpPr>
+        <p:cNvPr id="1" name=""/>
+        <p:cNvGrpSpPr/>
+        <p:nvPr/>
+      </p:nvGrpSpPr>
+      <p:grpSpPr>
+        <a:xfrm>
+          <a:off x="0" y="0"/>
+          <a:ext cx="0" cy="0"/>
+          <a:chOff x="0" y="0"/>
+          <a:chExt cx="0" cy="0"/>
+        </a:xfrm>
+      </p:grpSpPr>
+      <p:sp>
+        <p:nvSpPr>
+          <p:cNvPr id="2" name="Title 1"/>
+          <p:cNvSpPr>
+            <a:spLocks noGrp="1"/>
+          </p:cNvSpPr>
+          <p:nvPr>
+            <p:ph type="title"/>
+          </p:nvPr>
+        </p:nvSpPr>
+        <p:spPr>
+          <a:xfrm>
+            <a:off x="457201" y="204787"/>
+            <a:ext cx="3008313" cy="871538"/>
+          </a:xfrm>
+        </p:spPr>
+        <p:txBody>
+          <a:bodyPr/>
+          <a:lstStyle/>
+          <a:p>
+            <a:pPr lvl="0" indent="0" marL="0">
+              <a:buNone/>
+            </a:pPr>
+            <a:r>
+              <a:rPr/>
+              <a:t>Pub bias 6</a:t>
+            </a:r>
+          </a:p>
+        </p:txBody>
+      </p:sp>
+      <p:sp>
+        <p:nvSpPr>
+          <p:cNvPr id="4" name="Text Placeholder 3"/>
+          <p:cNvSpPr>
+            <a:spLocks noGrp="1"/>
+          </p:cNvSpPr>
+          <p:nvPr>
+            <p:ph idx="2" sz="half" type="body"/>
+          </p:nvPr>
+        </p:nvSpPr>
+        <p:spPr/>
+        <p:txBody>
+          <a:bodyPr/>
+          <a:lstStyle/>
+          <a:p>
+            <a:pPr lvl="0" indent="0">
+              <a:buNone/>
+            </a:pPr>
+            <a:r>
+              <a:rPr i="1">
+                <a:solidFill>
+                  <a:srgbClr val="60A0B0"/>
+                </a:solidFill>
+                <a:latin typeface="Courier"/>
+              </a:rPr>
+              <a:t># Including sampling standard error as moderator and year</a:t>
+            </a:r>
+            <a:br/>
+            <a:r>
+              <a:rPr>
+                <a:latin typeface="Courier"/>
+              </a:rPr>
+              <a:t>arnold_data_endo</a:t>
+            </a:r>
+            <a:r>
+              <a:rPr>
+                <a:solidFill>
+                  <a:srgbClr val="4070A0"/>
+                </a:solidFill>
+                <a:latin typeface="Courier"/>
+              </a:rPr>
+              <a:t>$</a:t>
+            </a:r>
+            <a:r>
+              <a:rPr>
+                <a:latin typeface="Courier"/>
+              </a:rPr>
+              <a:t>se </a:t>
+            </a:r>
+            <a:r>
+              <a:rPr>
+                <a:solidFill>
+                  <a:srgbClr val="007020"/>
+                </a:solidFill>
+                <a:latin typeface="Courier"/>
+              </a:rPr>
+              <a:t>&lt;-</a:t>
+            </a:r>
+            <a:r>
+              <a:rPr>
+                <a:latin typeface="Courier"/>
+              </a:rPr>
+              <a:t> </a:t>
+            </a:r>
+            <a:r>
+              <a:rPr>
+                <a:solidFill>
+                  <a:srgbClr val="06287E"/>
+                </a:solidFill>
+                <a:latin typeface="Courier"/>
+              </a:rPr>
+              <a:t>sqrt</a:t>
+            </a:r>
+            <a:r>
+              <a:rPr>
+                <a:latin typeface="Courier"/>
+              </a:rPr>
+              <a:t>(arnold_data_endo</a:t>
+            </a:r>
+            <a:r>
+              <a:rPr>
+                <a:solidFill>
+                  <a:srgbClr val="4070A0"/>
+                </a:solidFill>
+                <a:latin typeface="Courier"/>
+              </a:rPr>
+              <a:t>$</a:t>
+            </a:r>
+            <a:r>
+              <a:rPr>
+                <a:latin typeface="Courier"/>
+              </a:rPr>
+              <a:t>Zr_v)</a:t>
+            </a:r>
+            <a:br/>
+            <a:r>
+              <a:rPr>
+                <a:latin typeface="Courier"/>
+              </a:rPr>
+              <a:t>arnold_data_endo</a:t>
+            </a:r>
+            <a:r>
+              <a:rPr>
+                <a:solidFill>
+                  <a:srgbClr val="4070A0"/>
+                </a:solidFill>
+                <a:latin typeface="Courier"/>
+              </a:rPr>
+              <a:t>$</a:t>
+            </a:r>
+            <a:r>
+              <a:rPr>
+                <a:latin typeface="Courier"/>
+              </a:rPr>
+              <a:t>c_log_year </a:t>
+            </a:r>
+            <a:r>
+              <a:rPr>
+                <a:solidFill>
+                  <a:srgbClr val="007020"/>
+                </a:solidFill>
+                <a:latin typeface="Courier"/>
+              </a:rPr>
+              <a:t>&lt;-</a:t>
+            </a:r>
+            <a:r>
+              <a:rPr>
+                <a:latin typeface="Courier"/>
+              </a:rPr>
+              <a:t> </a:t>
+            </a:r>
+            <a:r>
+              <a:rPr>
+                <a:solidFill>
+                  <a:srgbClr val="06287E"/>
+                </a:solidFill>
+                <a:latin typeface="Courier"/>
+              </a:rPr>
+              <a:t>scale</a:t>
+            </a:r>
+            <a:r>
+              <a:rPr>
+                <a:latin typeface="Courier"/>
+              </a:rPr>
+              <a:t>(</a:t>
+            </a:r>
+            <a:r>
+              <a:rPr>
+                <a:solidFill>
+                  <a:srgbClr val="06287E"/>
+                </a:solidFill>
+                <a:latin typeface="Courier"/>
+              </a:rPr>
+              <a:t>log</a:t>
+            </a:r>
+            <a:r>
+              <a:rPr>
+                <a:latin typeface="Courier"/>
+              </a:rPr>
+              <a:t>(arnold_data_endo</a:t>
+            </a:r>
+            <a:r>
+              <a:rPr>
+                <a:solidFill>
+                  <a:srgbClr val="4070A0"/>
+                </a:solidFill>
+                <a:latin typeface="Courier"/>
+              </a:rPr>
+              <a:t>$</a:t>
+            </a:r>
+            <a:r>
+              <a:rPr>
+                <a:latin typeface="Courier"/>
+              </a:rPr>
+              <a:t>Year))</a:t>
+            </a:r>
+            <a:br/>
+            <a:br/>
+            <a:r>
+              <a:rPr i="1">
+                <a:solidFill>
+                  <a:srgbClr val="60A0B0"/>
+                </a:solidFill>
+                <a:latin typeface="Courier"/>
+              </a:rPr>
+              <a:t># Fit model</a:t>
+            </a:r>
+            <a:br/>
+            <a:r>
+              <a:rPr>
+                <a:latin typeface="Courier"/>
+              </a:rPr>
+              <a:t>metareg_se_time </a:t>
+            </a:r>
+            <a:r>
+              <a:rPr>
+                <a:solidFill>
+                  <a:srgbClr val="007020"/>
+                </a:solidFill>
+                <a:latin typeface="Courier"/>
+              </a:rPr>
+              <a:t>&lt;-</a:t>
+            </a:r>
+            <a:r>
+              <a:rPr>
+                <a:latin typeface="Courier"/>
+              </a:rPr>
+              <a:t> </a:t>
+            </a:r>
+            <a:r>
+              <a:rPr>
+                <a:solidFill>
+                  <a:srgbClr val="06287E"/>
+                </a:solidFill>
+                <a:latin typeface="Courier"/>
+              </a:rPr>
+              <a:t>rma.mv</a:t>
+            </a:r>
+            <a:r>
+              <a:rPr>
+                <a:latin typeface="Courier"/>
+              </a:rPr>
+              <a:t>(</a:t>
+            </a:r>
+            <a:r>
+              <a:rPr>
+                <a:solidFill>
+                  <a:srgbClr val="7D9029"/>
+                </a:solidFill>
+                <a:latin typeface="Courier"/>
+              </a:rPr>
+              <a:t>yi =</a:t>
+            </a:r>
+            <a:r>
+              <a:rPr>
+                <a:latin typeface="Courier"/>
+              </a:rPr>
+              <a:t> Zr, </a:t>
+            </a:r>
+            <a:r>
+              <a:rPr>
+                <a:solidFill>
+                  <a:srgbClr val="7D9029"/>
+                </a:solidFill>
+                <a:latin typeface="Courier"/>
+              </a:rPr>
+              <a:t>V =</a:t>
+            </a:r>
+            <a:r>
+              <a:rPr>
+                <a:latin typeface="Courier"/>
+              </a:rPr>
+              <a:t> Zr_v, </a:t>
+            </a:r>
+            <a:r>
+              <a:rPr>
+                <a:solidFill>
+                  <a:srgbClr val="7D9029"/>
+                </a:solidFill>
+                <a:latin typeface="Courier"/>
+              </a:rPr>
+              <a:t>mods =</a:t>
+            </a:r>
+            <a:r>
+              <a:rPr>
+                <a:latin typeface="Courier"/>
+              </a:rPr>
+              <a:t> </a:t>
+            </a:r>
+            <a:r>
+              <a:rPr>
+                <a:solidFill>
+                  <a:srgbClr val="4070A0"/>
+                </a:solidFill>
+                <a:latin typeface="Courier"/>
+              </a:rPr>
+              <a:t>~</a:t>
+            </a:r>
+            <a:r>
+              <a:rPr>
+                <a:latin typeface="Courier"/>
+              </a:rPr>
+              <a:t> se </a:t>
+            </a:r>
+            <a:r>
+              <a:rPr>
+                <a:solidFill>
+                  <a:srgbClr val="4070A0"/>
+                </a:solidFill>
+                <a:latin typeface="Courier"/>
+              </a:rPr>
+              <a:t>+</a:t>
+            </a:r>
+            <a:r>
+              <a:rPr>
+                <a:latin typeface="Courier"/>
+              </a:rPr>
+              <a:t> c_log_year, </a:t>
+            </a:r>
+            <a:r>
+              <a:rPr>
+                <a:solidFill>
+                  <a:srgbClr val="7D9029"/>
+                </a:solidFill>
+                <a:latin typeface="Courier"/>
+              </a:rPr>
+              <a:t>test =</a:t>
+            </a:r>
+            <a:r>
+              <a:rPr>
+                <a:latin typeface="Courier"/>
+              </a:rPr>
+              <a:t> </a:t>
+            </a:r>
+            <a:r>
+              <a:rPr>
+                <a:solidFill>
+                  <a:srgbClr val="4070A0"/>
+                </a:solidFill>
+                <a:latin typeface="Courier"/>
+              </a:rPr>
+              <a:t>"t"</a:t>
+            </a:r>
+            <a:r>
+              <a:rPr>
+                <a:latin typeface="Courier"/>
+              </a:rPr>
+              <a:t>, </a:t>
+            </a:r>
+            <a:r>
+              <a:rPr>
+                <a:solidFill>
+                  <a:srgbClr val="7D9029"/>
+                </a:solidFill>
+                <a:latin typeface="Courier"/>
+              </a:rPr>
+              <a:t>dfs =</a:t>
+            </a:r>
+            <a:r>
+              <a:rPr>
+                <a:latin typeface="Courier"/>
+              </a:rPr>
+              <a:t> </a:t>
+            </a:r>
+            <a:r>
+              <a:rPr>
+                <a:solidFill>
+                  <a:srgbClr val="4070A0"/>
+                </a:solidFill>
+                <a:latin typeface="Courier"/>
+              </a:rPr>
+              <a:t>"contain"</a:t>
+            </a:r>
+            <a:r>
+              <a:rPr>
+                <a:latin typeface="Courier"/>
+              </a:rPr>
+              <a:t>, </a:t>
+            </a:r>
+            <a:r>
+              <a:rPr>
+                <a:solidFill>
+                  <a:srgbClr val="7D9029"/>
+                </a:solidFill>
+                <a:latin typeface="Courier"/>
+              </a:rPr>
+              <a:t>data =</a:t>
+            </a:r>
+            <a:r>
+              <a:rPr>
+                <a:latin typeface="Courier"/>
+              </a:rPr>
+              <a:t> arnold_data_endo, </a:t>
+            </a:r>
+            <a:r>
+              <a:rPr>
+                <a:solidFill>
+                  <a:srgbClr val="7D9029"/>
+                </a:solidFill>
+                <a:latin typeface="Courier"/>
+              </a:rPr>
+              <a:t>random =</a:t>
+            </a:r>
+            <a:r>
+              <a:rPr>
+                <a:latin typeface="Courier"/>
+              </a:rPr>
+              <a:t> </a:t>
+            </a:r>
+            <a:r>
+              <a:rPr>
+                <a:solidFill>
+                  <a:srgbClr val="06287E"/>
+                </a:solidFill>
+                <a:latin typeface="Courier"/>
+              </a:rPr>
+              <a:t>list</a:t>
+            </a:r>
+            <a:r>
+              <a:rPr>
+                <a:latin typeface="Courier"/>
+              </a:rPr>
+              <a:t>(</a:t>
+            </a:r>
+            <a:r>
+              <a:rPr>
+                <a:solidFill>
+                  <a:srgbClr val="4070A0"/>
+                </a:solidFill>
+                <a:latin typeface="Courier"/>
+              </a:rPr>
+              <a:t>~</a:t>
+            </a:r>
+            <a:r>
+              <a:rPr>
+                <a:solidFill>
+                  <a:srgbClr val="40A070"/>
+                </a:solidFill>
+                <a:latin typeface="Courier"/>
+              </a:rPr>
+              <a:t>1</a:t>
+            </a:r>
+            <a:r>
+              <a:rPr>
+                <a:solidFill>
+                  <a:srgbClr val="4070A0"/>
+                </a:solidFill>
+                <a:latin typeface="Courier"/>
+              </a:rPr>
+              <a:t>|</a:t>
+            </a:r>
+            <a:r>
+              <a:rPr>
+                <a:latin typeface="Courier"/>
+              </a:rPr>
+              <a:t>Ref, </a:t>
+            </a:r>
+            <a:r>
+              <a:rPr>
+                <a:solidFill>
+                  <a:srgbClr val="4070A0"/>
+                </a:solidFill>
+                <a:latin typeface="Courier"/>
+              </a:rPr>
+              <a:t>~</a:t>
+            </a:r>
+            <a:r>
+              <a:rPr>
+                <a:solidFill>
+                  <a:srgbClr val="40A070"/>
+                </a:solidFill>
+                <a:latin typeface="Courier"/>
+              </a:rPr>
+              <a:t>1</a:t>
+            </a:r>
+            <a:r>
+              <a:rPr>
+                <a:solidFill>
+                  <a:srgbClr val="4070A0"/>
+                </a:solidFill>
+                <a:latin typeface="Courier"/>
+              </a:rPr>
+              <a:t>|</a:t>
+            </a:r>
+            <a:r>
+              <a:rPr>
+                <a:latin typeface="Courier"/>
+              </a:rPr>
+              <a:t>obs))</a:t>
+            </a:r>
+            <a:br/>
+            <a:r>
+              <a:rPr>
+                <a:solidFill>
+                  <a:srgbClr val="06287E"/>
+                </a:solidFill>
+                <a:latin typeface="Courier"/>
+              </a:rPr>
+              <a:t>summary</a:t>
+            </a:r>
+            <a:r>
+              <a:rPr>
+                <a:latin typeface="Courier"/>
+              </a:rPr>
+              <a:t>(metareg_se_time)</a:t>
+            </a:r>
+          </a:p>
+          <a:p>
+            <a:pPr lvl="0" indent="0">
+              <a:buNone/>
+            </a:pPr>
+            <a:r>
+              <a:rPr>
+                <a:latin typeface="Courier"/>
+              </a:rPr>
+              <a:t>## 
+## Multivariate Meta-Analysis Model (k = 209; method: REML)
+## 
+##   logLik  Deviance       AIC       BIC      AICc  ​ 
+## -74.9818  149.9636  159.9636  176.6030  160.2636   
+## 
+## Variance Components:
+## 
+##             estim    sqrt  nlvls  fixed  factor 
+## sigma^2.1  0.0569  0.2385     62     no     Ref 
+## sigma^2.2  0.0376  0.1940    209     no     obs 
+## 
+## Test for Residual Heterogeneity:
+## QE(df = 206) = 835.6677, p-val &lt; .0001
+## 
+## Test of Moderators (coefficients 2:3):
+## F(df1 = 2, df2 = 59) = 10.2748, p-val = 0.0001
+## 
+## Model Results:
+## 
+##             estimate      se     tval   df    pval    ci.lb    ci.ub    ​ 
+## intrcpt      -0.0202  0.0733  -0.2757   59  0.7837  -0.1669   0.1265     
+## se            1.1444  0.3734   3.0644  206  0.0025   0.4081   1.8806  ** 
+## c_log_year   -0.0949  0.0408  -2.3251   59  0.0235  -0.1765  -0.0132   * 
+## 
+## ---
+## Signif. codes:  0 '***' 0.001 '**' 0.01 '*' 0.05 '.' 0.1 ' ' 1</a:t>
+            </a:r>
+          </a:p>
+          <a:p>
+            <a:pPr lvl="0" indent="0">
+              <a:buNone/>
+            </a:pPr>
+            <a:r>
+              <a:rPr i="1">
+                <a:solidFill>
+                  <a:srgbClr val="60A0B0"/>
+                </a:solidFill>
+                <a:latin typeface="Courier"/>
+              </a:rPr>
+              <a:t># Bubble plots!</a:t>
+            </a:r>
+            <a:br/>
+            <a:r>
+              <a:rPr>
+                <a:latin typeface="Courier"/>
+              </a:rPr>
+              <a:t>p1 </a:t>
+            </a:r>
+            <a:r>
+              <a:rPr>
+                <a:solidFill>
+                  <a:srgbClr val="007020"/>
+                </a:solidFill>
+                <a:latin typeface="Courier"/>
+              </a:rPr>
+              <a:t>&lt;-</a:t>
+            </a:r>
+            <a:r>
+              <a:rPr>
+                <a:latin typeface="Courier"/>
+              </a:rPr>
+              <a:t> orchaRd</a:t>
+            </a:r>
+            <a:r>
+              <a:rPr>
+                <a:solidFill>
+                  <a:srgbClr val="4070A0"/>
+                </a:solidFill>
+                <a:latin typeface="Courier"/>
+              </a:rPr>
+              <a:t>::</a:t>
+            </a:r>
+            <a:r>
+              <a:rPr>
+                <a:solidFill>
+                  <a:srgbClr val="06287E"/>
+                </a:solidFill>
+                <a:latin typeface="Courier"/>
+              </a:rPr>
+              <a:t>bubble_plot</a:t>
+            </a:r>
+            <a:r>
+              <a:rPr>
+                <a:latin typeface="Courier"/>
+              </a:rPr>
+              <a:t>(metareg_se_time, </a:t>
+            </a:r>
+            <a:r>
+              <a:rPr>
+                <a:solidFill>
+                  <a:srgbClr val="7D9029"/>
+                </a:solidFill>
+                <a:latin typeface="Courier"/>
+              </a:rPr>
+              <a:t>mod =</a:t>
+            </a:r>
+            <a:r>
+              <a:rPr>
+                <a:latin typeface="Courier"/>
+              </a:rPr>
+              <a:t> </a:t>
+            </a:r>
+            <a:r>
+              <a:rPr>
+                <a:solidFill>
+                  <a:srgbClr val="4070A0"/>
+                </a:solidFill>
+                <a:latin typeface="Courier"/>
+              </a:rPr>
+              <a:t>"se"</a:t>
+            </a:r>
+            <a:r>
+              <a:rPr>
+                <a:latin typeface="Courier"/>
+              </a:rPr>
+              <a:t>, </a:t>
+            </a:r>
+            <a:r>
+              <a:rPr>
+                <a:solidFill>
+                  <a:srgbClr val="7D9029"/>
+                </a:solidFill>
+                <a:latin typeface="Courier"/>
+              </a:rPr>
+              <a:t>group =</a:t>
+            </a:r>
+            <a:r>
+              <a:rPr>
+                <a:latin typeface="Courier"/>
+              </a:rPr>
+              <a:t> </a:t>
+            </a:r>
+            <a:r>
+              <a:rPr>
+                <a:solidFill>
+                  <a:srgbClr val="4070A0"/>
+                </a:solidFill>
+                <a:latin typeface="Courier"/>
+              </a:rPr>
+              <a:t>"Ref"</a:t>
+            </a:r>
+            <a:r>
+              <a:rPr>
+                <a:latin typeface="Courier"/>
+              </a:rPr>
+              <a:t>, </a:t>
+            </a:r>
+            <a:r>
+              <a:rPr>
+                <a:solidFill>
+                  <a:srgbClr val="7D9029"/>
+                </a:solidFill>
+                <a:latin typeface="Courier"/>
+              </a:rPr>
+              <a:t>data =</a:t>
+            </a:r>
+            <a:r>
+              <a:rPr>
+                <a:latin typeface="Courier"/>
+              </a:rPr>
+              <a:t> arnold_data_endo, </a:t>
+            </a:r>
+            <a:r>
+              <a:rPr>
+                <a:solidFill>
+                  <a:srgbClr val="7D9029"/>
+                </a:solidFill>
+                <a:latin typeface="Courier"/>
+              </a:rPr>
+              <a:t>xlab =</a:t>
+            </a:r>
+            <a:r>
+              <a:rPr>
+                <a:latin typeface="Courier"/>
+              </a:rPr>
+              <a:t> </a:t>
+            </a:r>
+            <a:r>
+              <a:rPr>
+                <a:solidFill>
+                  <a:srgbClr val="4070A0"/>
+                </a:solidFill>
+                <a:latin typeface="Courier"/>
+              </a:rPr>
+              <a:t>"Sampling Standard Error (SE)"</a:t>
+            </a:r>
+            <a:r>
+              <a:rPr>
+                <a:latin typeface="Courier"/>
+              </a:rPr>
+              <a:t>, </a:t>
+            </a:r>
+            <a:r>
+              <a:rPr>
+                <a:solidFill>
+                  <a:srgbClr val="7D9029"/>
+                </a:solidFill>
+                <a:latin typeface="Courier"/>
+              </a:rPr>
+              <a:t>ylab =</a:t>
+            </a:r>
+            <a:r>
+              <a:rPr>
+                <a:latin typeface="Courier"/>
+              </a:rPr>
+              <a:t> </a:t>
+            </a:r>
+            <a:r>
+              <a:rPr>
+                <a:solidFill>
+                  <a:srgbClr val="4070A0"/>
+                </a:solidFill>
+                <a:latin typeface="Courier"/>
+              </a:rPr>
+              <a:t>"Zr"</a:t>
+            </a:r>
+            <a:r>
+              <a:rPr>
+                <a:latin typeface="Courier"/>
+              </a:rPr>
+              <a:t>, </a:t>
+            </a:r>
+            <a:r>
+              <a:rPr>
+                <a:solidFill>
+                  <a:srgbClr val="7D9029"/>
+                </a:solidFill>
+                <a:latin typeface="Courier"/>
+              </a:rPr>
+              <a:t>legend.pos =</a:t>
+            </a:r>
+            <a:r>
+              <a:rPr>
+                <a:latin typeface="Courier"/>
+              </a:rPr>
+              <a:t> </a:t>
+            </a:r>
+            <a:r>
+              <a:rPr>
+                <a:solidFill>
+                  <a:srgbClr val="4070A0"/>
+                </a:solidFill>
+                <a:latin typeface="Courier"/>
+              </a:rPr>
+              <a:t>"bottom.left"</a:t>
+            </a:r>
+            <a:r>
+              <a:rPr>
+                <a:latin typeface="Courier"/>
+              </a:rPr>
+              <a:t>)</a:t>
+            </a:r>
+            <a:br/>
+            <a:br/>
+            <a:r>
+              <a:rPr>
+                <a:latin typeface="Courier"/>
+              </a:rPr>
+              <a:t>p2 </a:t>
+            </a:r>
+            <a:r>
+              <a:rPr>
+                <a:solidFill>
+                  <a:srgbClr val="007020"/>
+                </a:solidFill>
+                <a:latin typeface="Courier"/>
+              </a:rPr>
+              <a:t>&lt;-</a:t>
+            </a:r>
+            <a:r>
+              <a:rPr>
+                <a:latin typeface="Courier"/>
+              </a:rPr>
+              <a:t> orchaRd</a:t>
+            </a:r>
+            <a:r>
+              <a:rPr>
+                <a:solidFill>
+                  <a:srgbClr val="4070A0"/>
+                </a:solidFill>
+                <a:latin typeface="Courier"/>
+              </a:rPr>
+              <a:t>::</a:t>
+            </a:r>
+            <a:r>
+              <a:rPr>
+                <a:solidFill>
+                  <a:srgbClr val="06287E"/>
+                </a:solidFill>
+                <a:latin typeface="Courier"/>
+              </a:rPr>
+              <a:t>bubble_plot</a:t>
+            </a:r>
+            <a:r>
+              <a:rPr>
+                <a:latin typeface="Courier"/>
+              </a:rPr>
+              <a:t>(metareg_se_time, </a:t>
+            </a:r>
+            <a:r>
+              <a:rPr>
+                <a:solidFill>
+                  <a:srgbClr val="7D9029"/>
+                </a:solidFill>
+                <a:latin typeface="Courier"/>
+              </a:rPr>
+              <a:t>mod =</a:t>
+            </a:r>
+            <a:r>
+              <a:rPr>
+                <a:latin typeface="Courier"/>
+              </a:rPr>
+              <a:t> </a:t>
+            </a:r>
+            <a:r>
+              <a:rPr>
+                <a:solidFill>
+                  <a:srgbClr val="4070A0"/>
+                </a:solidFill>
+                <a:latin typeface="Courier"/>
+              </a:rPr>
+              <a:t>"c_log_year"</a:t>
+            </a:r>
+            <a:r>
+              <a:rPr>
+                <a:latin typeface="Courier"/>
+              </a:rPr>
+              <a:t>, </a:t>
+            </a:r>
+            <a:r>
+              <a:rPr>
+                <a:solidFill>
+                  <a:srgbClr val="7D9029"/>
+                </a:solidFill>
+                <a:latin typeface="Courier"/>
+              </a:rPr>
+              <a:t>group =</a:t>
+            </a:r>
+            <a:r>
+              <a:rPr>
+                <a:latin typeface="Courier"/>
+              </a:rPr>
+              <a:t> </a:t>
+            </a:r>
+            <a:r>
+              <a:rPr>
+                <a:solidFill>
+                  <a:srgbClr val="4070A0"/>
+                </a:solidFill>
+                <a:latin typeface="Courier"/>
+              </a:rPr>
+              <a:t>"Ref"</a:t>
+            </a:r>
+            <a:r>
+              <a:rPr>
+                <a:latin typeface="Courier"/>
+              </a:rPr>
+              <a:t>, </a:t>
+            </a:r>
+            <a:r>
+              <a:rPr>
+                <a:solidFill>
+                  <a:srgbClr val="7D9029"/>
+                </a:solidFill>
+                <a:latin typeface="Courier"/>
+              </a:rPr>
+              <a:t>data =</a:t>
+            </a:r>
+            <a:r>
+              <a:rPr>
+                <a:latin typeface="Courier"/>
+              </a:rPr>
+              <a:t> arnold_data_endo, </a:t>
+            </a:r>
+            <a:r>
+              <a:rPr>
+                <a:solidFill>
+                  <a:srgbClr val="7D9029"/>
+                </a:solidFill>
+                <a:latin typeface="Courier"/>
+              </a:rPr>
+              <a:t>xlab =</a:t>
+            </a:r>
+            <a:r>
+              <a:rPr>
+                <a:latin typeface="Courier"/>
+              </a:rPr>
+              <a:t> </a:t>
+            </a:r>
+            <a:r>
+              <a:rPr>
+                <a:solidFill>
+                  <a:srgbClr val="4070A0"/>
+                </a:solidFill>
+                <a:latin typeface="Courier"/>
+              </a:rPr>
+              <a:t>"Publication Year (log-transformed &amp; scaled)"</a:t>
+            </a:r>
+            <a:r>
+              <a:rPr>
+                <a:latin typeface="Courier"/>
+              </a:rPr>
+              <a:t>, </a:t>
+            </a:r>
+            <a:r>
+              <a:rPr>
+                <a:solidFill>
+                  <a:srgbClr val="7D9029"/>
+                </a:solidFill>
+                <a:latin typeface="Courier"/>
+              </a:rPr>
+              <a:t>ylab =</a:t>
+            </a:r>
+            <a:r>
+              <a:rPr>
+                <a:latin typeface="Courier"/>
+              </a:rPr>
+              <a:t> </a:t>
+            </a:r>
+            <a:r>
+              <a:rPr>
+                <a:solidFill>
+                  <a:srgbClr val="4070A0"/>
+                </a:solidFill>
+                <a:latin typeface="Courier"/>
+              </a:rPr>
+              <a:t>"Zr"</a:t>
+            </a:r>
+            <a:r>
+              <a:rPr>
+                <a:latin typeface="Courier"/>
+              </a:rPr>
+              <a:t>, </a:t>
+            </a:r>
+            <a:r>
+              <a:rPr>
+                <a:solidFill>
+                  <a:srgbClr val="7D9029"/>
+                </a:solidFill>
+                <a:latin typeface="Courier"/>
+              </a:rPr>
+              <a:t>legend.pos =</a:t>
+            </a:r>
+            <a:r>
+              <a:rPr>
+                <a:latin typeface="Courier"/>
+              </a:rPr>
+              <a:t> </a:t>
+            </a:r>
+            <a:r>
+              <a:rPr>
+                <a:solidFill>
+                  <a:srgbClr val="4070A0"/>
+                </a:solidFill>
+                <a:latin typeface="Courier"/>
+              </a:rPr>
+              <a:t>"none"</a:t>
+            </a:r>
+            <a:r>
+              <a:rPr>
+                <a:latin typeface="Courier"/>
+              </a:rPr>
+              <a:t>)</a:t>
+            </a:r>
+            <a:br/>
+            <a:br/>
+            <a:r>
+              <a:rPr>
+                <a:latin typeface="Courier"/>
+              </a:rPr>
+              <a:t>p1 </a:t>
+            </a:r>
+            <a:r>
+              <a:rPr>
+                <a:solidFill>
+                  <a:srgbClr val="4070A0"/>
+                </a:solidFill>
+                <a:latin typeface="Courier"/>
+              </a:rPr>
+              <a:t>|</a:t>
+            </a:r>
+            <a:r>
+              <a:rPr>
+                <a:latin typeface="Courier"/>
+              </a:rPr>
+              <a:t> p2</a:t>
+            </a:r>
+          </a:p>
+        </p:txBody>
+      </p:sp>
+      <p:pic>
+        <p:nvPicPr>
+          <p:cNvPr descr="code_slides_files/figure-pptx/unnamed-chunk-10-1.png" id="0" name="Picture 1"/>
+          <p:cNvPicPr>
+            <a:picLocks noGrp="1" noChangeAspect="1"/>
+          </p:cNvPicPr>
+          <p:nvPr/>
+        </p:nvPicPr>
+        <p:blipFill>
+          <a:blip r:embed="rId2"/>
+          <a:stretch>
+            <a:fillRect/>
+          </a:stretch>
+        </p:blipFill>
+        <p:spPr bwMode="auto">
+          <a:xfrm>
+            <a:off x="3568700" y="355600"/>
+            <a:ext cx="5105400" cy="4089400"/>
+          </a:xfrm>
+          <a:prstGeom prst="rect">
+            <a:avLst/>
+          </a:prstGeom>
+          <a:noFill/>
+          <a:ln w="9525">
+            <a:noFill/>
+            <a:headEnd/>
+            <a:tailEnd/>
+          </a:ln>
+        </p:spPr>
+      </p:pic>
+    </p:spTree>
+  </p:cSld>
+</p:sld>
+</file>
+
 <file path=ppt/slides/slide6.xml><?xml version="1.0" encoding="utf-8"?>
 <p:sld xmlns:a="http://schemas.openxmlformats.org/drawingml/2006/main" xmlns:r="http://schemas.openxmlformats.org/officeDocument/2006/relationships" xmlns:p="http://schemas.openxmlformats.org/presentationml/2006/main">
   <p:cSld>
@@ -23146,7 +26277,7 @@
                   <a:rPr>
                     <a:latin typeface="Courier"/>
                   </a:rPr>
-                  <a:t>## [1] 0.1700801</a:t>
+                  <a:t>## [1] 0.1710802</a:t>
                 </a:r>
               </a:p>
             </p:txBody>

</xml_diff>